<commit_message>
added solution to problem 1
</commit_message>
<xml_diff>
--- a/Assignment 1/Assignment Presentation.pptx
+++ b/Assignment 1/Assignment Presentation.pptx
@@ -23,35 +23,37 @@
     <p:sldId id="303" r:id="rId17"/>
     <p:sldId id="304" r:id="rId18"/>
     <p:sldId id="305" r:id="rId19"/>
-    <p:sldId id="289" r:id="rId20"/>
-    <p:sldId id="257" r:id="rId21"/>
-    <p:sldId id="259" r:id="rId22"/>
-    <p:sldId id="260" r:id="rId23"/>
-    <p:sldId id="261" r:id="rId24"/>
-    <p:sldId id="272" r:id="rId25"/>
-    <p:sldId id="258" r:id="rId26"/>
-    <p:sldId id="273" r:id="rId27"/>
-    <p:sldId id="275" r:id="rId28"/>
-    <p:sldId id="263" r:id="rId29"/>
-    <p:sldId id="264" r:id="rId30"/>
-    <p:sldId id="276" r:id="rId31"/>
-    <p:sldId id="267" r:id="rId32"/>
-    <p:sldId id="268" r:id="rId33"/>
-    <p:sldId id="269" r:id="rId34"/>
-    <p:sldId id="270" r:id="rId35"/>
-    <p:sldId id="277" r:id="rId36"/>
-    <p:sldId id="266" r:id="rId37"/>
-    <p:sldId id="278" r:id="rId38"/>
-    <p:sldId id="279" r:id="rId39"/>
-    <p:sldId id="280" r:id="rId40"/>
-    <p:sldId id="281" r:id="rId41"/>
-    <p:sldId id="282" r:id="rId42"/>
-    <p:sldId id="283" r:id="rId43"/>
-    <p:sldId id="284" r:id="rId44"/>
-    <p:sldId id="285" r:id="rId45"/>
-    <p:sldId id="286" r:id="rId46"/>
-    <p:sldId id="287" r:id="rId47"/>
-    <p:sldId id="288" r:id="rId48"/>
+    <p:sldId id="309" r:id="rId20"/>
+    <p:sldId id="310" r:id="rId21"/>
+    <p:sldId id="289" r:id="rId22"/>
+    <p:sldId id="257" r:id="rId23"/>
+    <p:sldId id="259" r:id="rId24"/>
+    <p:sldId id="260" r:id="rId25"/>
+    <p:sldId id="261" r:id="rId26"/>
+    <p:sldId id="272" r:id="rId27"/>
+    <p:sldId id="258" r:id="rId28"/>
+    <p:sldId id="273" r:id="rId29"/>
+    <p:sldId id="275" r:id="rId30"/>
+    <p:sldId id="263" r:id="rId31"/>
+    <p:sldId id="264" r:id="rId32"/>
+    <p:sldId id="276" r:id="rId33"/>
+    <p:sldId id="267" r:id="rId34"/>
+    <p:sldId id="268" r:id="rId35"/>
+    <p:sldId id="269" r:id="rId36"/>
+    <p:sldId id="270" r:id="rId37"/>
+    <p:sldId id="277" r:id="rId38"/>
+    <p:sldId id="266" r:id="rId39"/>
+    <p:sldId id="278" r:id="rId40"/>
+    <p:sldId id="279" r:id="rId41"/>
+    <p:sldId id="280" r:id="rId42"/>
+    <p:sldId id="281" r:id="rId43"/>
+    <p:sldId id="282" r:id="rId44"/>
+    <p:sldId id="283" r:id="rId45"/>
+    <p:sldId id="284" r:id="rId46"/>
+    <p:sldId id="285" r:id="rId47"/>
+    <p:sldId id="286" r:id="rId48"/>
+    <p:sldId id="287" r:id="rId49"/>
+    <p:sldId id="288" r:id="rId50"/>
   </p:sldIdLst>
   <p:sldSz cx="12192000" cy="6858000"/>
   <p:notesSz cx="6858000" cy="9144000"/>
@@ -162,7 +164,7 @@
 <p1510:revInfo xmlns:a="http://schemas.openxmlformats.org/drawingml/2006/main" xmlns:r="http://schemas.openxmlformats.org/officeDocument/2006/relationships" xmlns:p1510="http://schemas.microsoft.com/office/powerpoint/2015/10/main">
   <p1510:revLst>
     <p1510:client id="{B5950655-B52F-4C4A-8D4C-2CA8B2A214A1}" v="2005" dt="2021-04-06T19:15:56.565"/>
-    <p1510:client id="{BA04AB18-81BA-44F6-8A17-E30D392E2E82}" v="1561" dt="2021-04-06T19:31:10.425"/>
+    <p1510:client id="{BA04AB18-81BA-44F6-8A17-E30D392E2E82}" v="1620" dt="2021-04-07T09:43:06.935"/>
   </p1510:revLst>
 </p1510:revInfo>
 </file>
@@ -1803,7 +1805,7 @@
   <pc:docChgLst>
     <pc:chgData name="Abhiroop Mukherjee" userId="5fbc6062963ca2c0" providerId="LiveId" clId="{BA04AB18-81BA-44F6-8A17-E30D392E2E82}"/>
     <pc:docChg chg="undo custSel addSld delSld modSld sldOrd">
-      <pc:chgData name="Abhiroop Mukherjee" userId="5fbc6062963ca2c0" providerId="LiveId" clId="{BA04AB18-81BA-44F6-8A17-E30D392E2E82}" dt="2021-04-06T19:31:27.740" v="333" actId="26606"/>
+      <pc:chgData name="Abhiroop Mukherjee" userId="5fbc6062963ca2c0" providerId="LiveId" clId="{BA04AB18-81BA-44F6-8A17-E30D392E2E82}" dt="2021-04-07T09:43:56.179" v="1612" actId="26606"/>
       <pc:docMkLst>
         <pc:docMk/>
       </pc:docMkLst>
@@ -1914,6 +1916,218 @@
         <pc:sldMkLst>
           <pc:docMk/>
           <pc:sldMk cId="2997176504" sldId="307"/>
+        </pc:sldMkLst>
+      </pc:sldChg>
+      <pc:sldChg chg="modSp add del mod ord">
+        <pc:chgData name="Abhiroop Mukherjee" userId="5fbc6062963ca2c0" providerId="LiveId" clId="{BA04AB18-81BA-44F6-8A17-E30D392E2E82}" dt="2021-04-07T09:35:08.090" v="396" actId="47"/>
+        <pc:sldMkLst>
+          <pc:docMk/>
+          <pc:sldMk cId="1280086815" sldId="308"/>
+        </pc:sldMkLst>
+        <pc:spChg chg="mod">
+          <ac:chgData name="Abhiroop Mukherjee" userId="5fbc6062963ca2c0" providerId="LiveId" clId="{BA04AB18-81BA-44F6-8A17-E30D392E2E82}" dt="2021-04-07T09:34:54.134" v="392" actId="20577"/>
+          <ac:spMkLst>
+            <pc:docMk/>
+            <pc:sldMk cId="1280086815" sldId="308"/>
+            <ac:spMk id="2" creationId="{D595B95A-705A-4D49-A704-0108F2F33E09}"/>
+          </ac:spMkLst>
+        </pc:spChg>
+        <pc:spChg chg="mod">
+          <ac:chgData name="Abhiroop Mukherjee" userId="5fbc6062963ca2c0" providerId="LiveId" clId="{BA04AB18-81BA-44F6-8A17-E30D392E2E82}" dt="2021-04-07T09:34:57.182" v="394" actId="5793"/>
+          <ac:spMkLst>
+            <pc:docMk/>
+            <pc:sldMk cId="1280086815" sldId="308"/>
+            <ac:spMk id="3" creationId="{4B817802-A38C-4038-895E-B8B15F8D564B}"/>
+          </ac:spMkLst>
+        </pc:spChg>
+      </pc:sldChg>
+      <pc:sldChg chg="addSp delSp modSp add del mod">
+        <pc:chgData name="Abhiroop Mukherjee" userId="5fbc6062963ca2c0" providerId="LiveId" clId="{BA04AB18-81BA-44F6-8A17-E30D392E2E82}" dt="2021-04-07T09:40:26.523" v="1120" actId="47"/>
+        <pc:sldMkLst>
+          <pc:docMk/>
+          <pc:sldMk cId="1023645759" sldId="309"/>
+        </pc:sldMkLst>
+        <pc:spChg chg="mod">
+          <ac:chgData name="Abhiroop Mukherjee" userId="5fbc6062963ca2c0" providerId="LiveId" clId="{BA04AB18-81BA-44F6-8A17-E30D392E2E82}" dt="2021-04-07T09:39:40.975" v="1115" actId="26606"/>
+          <ac:spMkLst>
+            <pc:docMk/>
+            <pc:sldMk cId="1023645759" sldId="309"/>
+            <ac:spMk id="2" creationId="{A2E81D72-EC99-4091-AA2C-660CCFAC39B6}"/>
+          </ac:spMkLst>
+        </pc:spChg>
+        <pc:spChg chg="mod">
+          <ac:chgData name="Abhiroop Mukherjee" userId="5fbc6062963ca2c0" providerId="LiveId" clId="{BA04AB18-81BA-44F6-8A17-E30D392E2E82}" dt="2021-04-07T09:39:40.975" v="1115" actId="26606"/>
+          <ac:spMkLst>
+            <pc:docMk/>
+            <pc:sldMk cId="1023645759" sldId="309"/>
+            <ac:spMk id="10" creationId="{B0DBBD15-5CB7-4758-94C6-9FCA6E3AA552}"/>
+          </ac:spMkLst>
+        </pc:spChg>
+        <pc:spChg chg="del">
+          <ac:chgData name="Abhiroop Mukherjee" userId="5fbc6062963ca2c0" providerId="LiveId" clId="{BA04AB18-81BA-44F6-8A17-E30D392E2E82}" dt="2021-04-07T09:39:40.975" v="1115" actId="26606"/>
+          <ac:spMkLst>
+            <pc:docMk/>
+            <pc:sldMk cId="1023645759" sldId="309"/>
+            <ac:spMk id="80" creationId="{10162E77-11AD-44A7-84EC-40C59EEFBD2E}"/>
+          </ac:spMkLst>
+        </pc:spChg>
+        <pc:spChg chg="del">
+          <ac:chgData name="Abhiroop Mukherjee" userId="5fbc6062963ca2c0" providerId="LiveId" clId="{BA04AB18-81BA-44F6-8A17-E30D392E2E82}" dt="2021-04-07T09:39:40.975" v="1115" actId="26606"/>
+          <ac:spMkLst>
+            <pc:docMk/>
+            <pc:sldMk cId="1023645759" sldId="309"/>
+            <ac:spMk id="82" creationId="{6329CBCE-21AE-419D-AC1F-8ACF510A6670}"/>
+          </ac:spMkLst>
+        </pc:spChg>
+        <pc:spChg chg="del">
+          <ac:chgData name="Abhiroop Mukherjee" userId="5fbc6062963ca2c0" providerId="LiveId" clId="{BA04AB18-81BA-44F6-8A17-E30D392E2E82}" dt="2021-04-07T09:39:40.975" v="1115" actId="26606"/>
+          <ac:spMkLst>
+            <pc:docMk/>
+            <pc:sldMk cId="1023645759" sldId="309"/>
+            <ac:spMk id="83" creationId="{FF2DA012-1414-493D-888F-5D99D0BDA322}"/>
+          </ac:spMkLst>
+        </pc:spChg>
+        <pc:spChg chg="add">
+          <ac:chgData name="Abhiroop Mukherjee" userId="5fbc6062963ca2c0" providerId="LiveId" clId="{BA04AB18-81BA-44F6-8A17-E30D392E2E82}" dt="2021-04-07T09:39:40.975" v="1115" actId="26606"/>
+          <ac:spMkLst>
+            <pc:docMk/>
+            <pc:sldMk cId="1023645759" sldId="309"/>
+            <ac:spMk id="88" creationId="{284B70D5-875B-433D-BDBD-1522A85D6C1D}"/>
+          </ac:spMkLst>
+        </pc:spChg>
+        <pc:spChg chg="add">
+          <ac:chgData name="Abhiroop Mukherjee" userId="5fbc6062963ca2c0" providerId="LiveId" clId="{BA04AB18-81BA-44F6-8A17-E30D392E2E82}" dt="2021-04-07T09:39:40.975" v="1115" actId="26606"/>
+          <ac:spMkLst>
+            <pc:docMk/>
+            <pc:sldMk cId="1023645759" sldId="309"/>
+            <ac:spMk id="92" creationId="{1E299956-A9E7-4FC1-A0B1-D590CA9730E8}"/>
+          </ac:spMkLst>
+        </pc:spChg>
+        <pc:spChg chg="add">
+          <ac:chgData name="Abhiroop Mukherjee" userId="5fbc6062963ca2c0" providerId="LiveId" clId="{BA04AB18-81BA-44F6-8A17-E30D392E2E82}" dt="2021-04-07T09:39:40.975" v="1115" actId="26606"/>
+          <ac:spMkLst>
+            <pc:docMk/>
+            <pc:sldMk cId="1023645759" sldId="309"/>
+            <ac:spMk id="94" creationId="{17FC539C-B783-4B03-9F9E-D13430F3F64F}"/>
+          </ac:spMkLst>
+        </pc:spChg>
+        <pc:picChg chg="mod">
+          <ac:chgData name="Abhiroop Mukherjee" userId="5fbc6062963ca2c0" providerId="LiveId" clId="{BA04AB18-81BA-44F6-8A17-E30D392E2E82}" dt="2021-04-07T09:39:40.975" v="1115" actId="26606"/>
+          <ac:picMkLst>
+            <pc:docMk/>
+            <pc:sldMk cId="1023645759" sldId="309"/>
+            <ac:picMk id="5" creationId="{99059347-F5D1-41F7-B30A-23EE2BA4D650}"/>
+          </ac:picMkLst>
+        </pc:picChg>
+        <pc:cxnChg chg="del">
+          <ac:chgData name="Abhiroop Mukherjee" userId="5fbc6062963ca2c0" providerId="LiveId" clId="{BA04AB18-81BA-44F6-8A17-E30D392E2E82}" dt="2021-04-07T09:39:40.975" v="1115" actId="26606"/>
+          <ac:cxnSpMkLst>
+            <pc:docMk/>
+            <pc:sldMk cId="1023645759" sldId="309"/>
+            <ac:cxnSpMk id="81" creationId="{5AB158E9-1B40-4CD6-95F0-95CA11DF7B7A}"/>
+          </ac:cxnSpMkLst>
+        </pc:cxnChg>
+        <pc:cxnChg chg="add">
+          <ac:chgData name="Abhiroop Mukherjee" userId="5fbc6062963ca2c0" providerId="LiveId" clId="{BA04AB18-81BA-44F6-8A17-E30D392E2E82}" dt="2021-04-07T09:39:40.975" v="1115" actId="26606"/>
+          <ac:cxnSpMkLst>
+            <pc:docMk/>
+            <pc:sldMk cId="1023645759" sldId="309"/>
+            <ac:cxnSpMk id="90" creationId="{C947DF4A-614C-4B4C-8B80-E5B9D8E8CFED}"/>
+          </ac:cxnSpMkLst>
+        </pc:cxnChg>
+      </pc:sldChg>
+      <pc:sldChg chg="addSp delSp modSp add mod">
+        <pc:chgData name="Abhiroop Mukherjee" userId="5fbc6062963ca2c0" providerId="LiveId" clId="{BA04AB18-81BA-44F6-8A17-E30D392E2E82}" dt="2021-04-07T09:43:56.179" v="1612" actId="26606"/>
+        <pc:sldMkLst>
+          <pc:docMk/>
+          <pc:sldMk cId="898223925" sldId="310"/>
+        </pc:sldMkLst>
+        <pc:spChg chg="mod">
+          <ac:chgData name="Abhiroop Mukherjee" userId="5fbc6062963ca2c0" providerId="LiveId" clId="{BA04AB18-81BA-44F6-8A17-E30D392E2E82}" dt="2021-04-07T09:43:56.179" v="1612" actId="26606"/>
+          <ac:spMkLst>
+            <pc:docMk/>
+            <pc:sldMk cId="898223925" sldId="310"/>
+            <ac:spMk id="2" creationId="{A2E81D72-EC99-4091-AA2C-660CCFAC39B6}"/>
+          </ac:spMkLst>
+        </pc:spChg>
+        <pc:spChg chg="mod">
+          <ac:chgData name="Abhiroop Mukherjee" userId="5fbc6062963ca2c0" providerId="LiveId" clId="{BA04AB18-81BA-44F6-8A17-E30D392E2E82}" dt="2021-04-07T09:43:56.179" v="1612" actId="26606"/>
+          <ac:spMkLst>
+            <pc:docMk/>
+            <pc:sldMk cId="898223925" sldId="310"/>
+            <ac:spMk id="10" creationId="{B0DBBD15-5CB7-4758-94C6-9FCA6E3AA552}"/>
+          </ac:spMkLst>
+        </pc:spChg>
+        <pc:spChg chg="del">
+          <ac:chgData name="Abhiroop Mukherjee" userId="5fbc6062963ca2c0" providerId="LiveId" clId="{BA04AB18-81BA-44F6-8A17-E30D392E2E82}" dt="2021-04-07T09:43:56.179" v="1612" actId="26606"/>
+          <ac:spMkLst>
+            <pc:docMk/>
+            <pc:sldMk cId="898223925" sldId="310"/>
+            <ac:spMk id="88" creationId="{284B70D5-875B-433D-BDBD-1522A85D6C1D}"/>
+          </ac:spMkLst>
+        </pc:spChg>
+        <pc:spChg chg="del">
+          <ac:chgData name="Abhiroop Mukherjee" userId="5fbc6062963ca2c0" providerId="LiveId" clId="{BA04AB18-81BA-44F6-8A17-E30D392E2E82}" dt="2021-04-07T09:43:56.179" v="1612" actId="26606"/>
+          <ac:spMkLst>
+            <pc:docMk/>
+            <pc:sldMk cId="898223925" sldId="310"/>
+            <ac:spMk id="92" creationId="{1E299956-A9E7-4FC1-A0B1-D590CA9730E8}"/>
+          </ac:spMkLst>
+        </pc:spChg>
+        <pc:spChg chg="del">
+          <ac:chgData name="Abhiroop Mukherjee" userId="5fbc6062963ca2c0" providerId="LiveId" clId="{BA04AB18-81BA-44F6-8A17-E30D392E2E82}" dt="2021-04-07T09:43:56.179" v="1612" actId="26606"/>
+          <ac:spMkLst>
+            <pc:docMk/>
+            <pc:sldMk cId="898223925" sldId="310"/>
+            <ac:spMk id="94" creationId="{17FC539C-B783-4B03-9F9E-D13430F3F64F}"/>
+          </ac:spMkLst>
+        </pc:spChg>
+        <pc:spChg chg="add">
+          <ac:chgData name="Abhiroop Mukherjee" userId="5fbc6062963ca2c0" providerId="LiveId" clId="{BA04AB18-81BA-44F6-8A17-E30D392E2E82}" dt="2021-04-07T09:43:56.179" v="1612" actId="26606"/>
+          <ac:spMkLst>
+            <pc:docMk/>
+            <pc:sldMk cId="898223925" sldId="310"/>
+            <ac:spMk id="99" creationId="{284B70D5-875B-433D-BDBD-1522A85D6C1D}"/>
+          </ac:spMkLst>
+        </pc:spChg>
+        <pc:spChg chg="add">
+          <ac:chgData name="Abhiroop Mukherjee" userId="5fbc6062963ca2c0" providerId="LiveId" clId="{BA04AB18-81BA-44F6-8A17-E30D392E2E82}" dt="2021-04-07T09:43:56.179" v="1612" actId="26606"/>
+          <ac:spMkLst>
+            <pc:docMk/>
+            <pc:sldMk cId="898223925" sldId="310"/>
+            <ac:spMk id="103" creationId="{1E299956-A9E7-4FC1-A0B1-D590CA9730E8}"/>
+          </ac:spMkLst>
+        </pc:spChg>
+        <pc:spChg chg="add">
+          <ac:chgData name="Abhiroop Mukherjee" userId="5fbc6062963ca2c0" providerId="LiveId" clId="{BA04AB18-81BA-44F6-8A17-E30D392E2E82}" dt="2021-04-07T09:43:56.179" v="1612" actId="26606"/>
+          <ac:spMkLst>
+            <pc:docMk/>
+            <pc:sldMk cId="898223925" sldId="310"/>
+            <ac:spMk id="105" creationId="{17FC539C-B783-4B03-9F9E-D13430F3F64F}"/>
+          </ac:spMkLst>
+        </pc:spChg>
+        <pc:cxnChg chg="del">
+          <ac:chgData name="Abhiroop Mukherjee" userId="5fbc6062963ca2c0" providerId="LiveId" clId="{BA04AB18-81BA-44F6-8A17-E30D392E2E82}" dt="2021-04-07T09:43:56.179" v="1612" actId="26606"/>
+          <ac:cxnSpMkLst>
+            <pc:docMk/>
+            <pc:sldMk cId="898223925" sldId="310"/>
+            <ac:cxnSpMk id="90" creationId="{C947DF4A-614C-4B4C-8B80-E5B9D8E8CFED}"/>
+          </ac:cxnSpMkLst>
+        </pc:cxnChg>
+        <pc:cxnChg chg="add">
+          <ac:chgData name="Abhiroop Mukherjee" userId="5fbc6062963ca2c0" providerId="LiveId" clId="{BA04AB18-81BA-44F6-8A17-E30D392E2E82}" dt="2021-04-07T09:43:56.179" v="1612" actId="26606"/>
+          <ac:cxnSpMkLst>
+            <pc:docMk/>
+            <pc:sldMk cId="898223925" sldId="310"/>
+            <ac:cxnSpMk id="101" creationId="{C947DF4A-614C-4B4C-8B80-E5B9D8E8CFED}"/>
+          </ac:cxnSpMkLst>
+        </pc:cxnChg>
+      </pc:sldChg>
+      <pc:sldChg chg="add del ord">
+        <pc:chgData name="Abhiroop Mukherjee" userId="5fbc6062963ca2c0" providerId="LiveId" clId="{BA04AB18-81BA-44F6-8A17-E30D392E2E82}" dt="2021-04-07T09:40:30.597" v="1121" actId="47"/>
+        <pc:sldMkLst>
+          <pc:docMk/>
+          <pc:sldMk cId="1772457837" sldId="310"/>
         </pc:sldMkLst>
       </pc:sldChg>
     </pc:docChg>
@@ -21549,6 +21763,1188 @@
           <a:chExt cx="0" cy="0"/>
         </a:xfrm>
       </p:grpSpPr>
+      <p:sp useBgFill="1">
+        <p:nvSpPr>
+          <p:cNvPr id="88" name="Rectangle 87">
+            <a:extLst>
+              <a:ext uri="{FF2B5EF4-FFF2-40B4-BE49-F238E27FC236}">
+                <a16:creationId xmlns:a16="http://schemas.microsoft.com/office/drawing/2014/main" id="{284B70D5-875B-433D-BDBD-1522A85D6C1D}"/>
+              </a:ext>
+              <a:ext uri="{C183D7F6-B498-43B3-948B-1728B52AA6E4}">
+                <adec:decorative xmlns:adec="http://schemas.microsoft.com/office/drawing/2017/decorative" val="1"/>
+              </a:ext>
+            </a:extLst>
+          </p:cNvPr>
+          <p:cNvSpPr>
+            <a:spLocks noGrp="1" noRot="1" noChangeAspect="1" noMove="1" noResize="1" noEditPoints="1" noAdjustHandles="1" noChangeArrowheads="1" noChangeShapeType="1" noTextEdit="1"/>
+          </p:cNvSpPr>
+          <p:nvPr>
+            <p:extLst>
+              <p:ext uri="{386F3935-93C4-4BCD-93E2-E3B085C9AB24}">
+                <p16:designElem xmlns:p16="http://schemas.microsoft.com/office/powerpoint/2015/main" val="1"/>
+              </p:ext>
+            </p:extLst>
+          </p:nvPr>
+        </p:nvSpPr>
+        <p:spPr>
+          <a:xfrm>
+            <a:off x="0" y="0"/>
+            <a:ext cx="12192001" cy="6334316"/>
+          </a:xfrm>
+          <a:prstGeom prst="rect">
+            <a:avLst/>
+          </a:prstGeom>
+          <a:ln>
+            <a:noFill/>
+          </a:ln>
+        </p:spPr>
+        <p:style>
+          <a:lnRef idx="2">
+            <a:schemeClr val="accent1">
+              <a:shade val="50000"/>
+            </a:schemeClr>
+          </a:lnRef>
+          <a:fillRef idx="1">
+            <a:schemeClr val="accent1"/>
+          </a:fillRef>
+          <a:effectRef idx="0">
+            <a:schemeClr val="accent1"/>
+          </a:effectRef>
+          <a:fontRef idx="minor">
+            <a:schemeClr val="lt1"/>
+          </a:fontRef>
+        </p:style>
+        <p:txBody>
+          <a:bodyPr rtlCol="0" anchor="ctr"/>
+          <a:lstStyle/>
+          <a:p>
+            <a:pPr algn="ctr"/>
+            <a:endParaRPr lang="en-US"/>
+          </a:p>
+        </p:txBody>
+      </p:sp>
+      <p:sp>
+        <p:nvSpPr>
+          <p:cNvPr id="2" name="Title 1">
+            <a:extLst>
+              <a:ext uri="{FF2B5EF4-FFF2-40B4-BE49-F238E27FC236}">
+                <a16:creationId xmlns:a16="http://schemas.microsoft.com/office/drawing/2014/main" id="{A2E81D72-EC99-4091-AA2C-660CCFAC39B6}"/>
+              </a:ext>
+            </a:extLst>
+          </p:cNvPr>
+          <p:cNvSpPr>
+            <a:spLocks noGrp="1"/>
+          </p:cNvSpPr>
+          <p:nvPr>
+            <p:ph type="title"/>
+          </p:nvPr>
+        </p:nvSpPr>
+        <p:spPr>
+          <a:xfrm>
+            <a:off x="7859485" y="634946"/>
+            <a:ext cx="3690257" cy="1450757"/>
+          </a:xfrm>
+        </p:spPr>
+        <p:txBody>
+          <a:bodyPr>
+            <a:normAutofit/>
+          </a:bodyPr>
+          <a:lstStyle/>
+          <a:p>
+            <a:r>
+              <a:rPr lang="en-IN" sz="3700" b="1" dirty="0"/>
+              <a:t>Comparison  Analysis Quicksort </a:t>
+            </a:r>
+          </a:p>
+        </p:txBody>
+      </p:sp>
+      <p:pic>
+        <p:nvPicPr>
+          <p:cNvPr id="5" name="Content Placeholder 4">
+            <a:extLst>
+              <a:ext uri="{FF2B5EF4-FFF2-40B4-BE49-F238E27FC236}">
+                <a16:creationId xmlns:a16="http://schemas.microsoft.com/office/drawing/2014/main" id="{99059347-F5D1-41F7-B30A-23EE2BA4D650}"/>
+              </a:ext>
+            </a:extLst>
+          </p:cNvPr>
+          <p:cNvPicPr>
+            <a:picLocks noChangeAspect="1"/>
+          </p:cNvPicPr>
+          <p:nvPr/>
+        </p:nvPicPr>
+        <p:blipFill rotWithShape="1">
+          <a:blip r:embed="rId2">
+            <a:extLst>
+              <a:ext uri="{28A0092B-C50C-407E-A947-70E740481C1C}">
+                <a14:useLocalDpi xmlns:a14="http://schemas.microsoft.com/office/drawing/2010/main" val="0"/>
+              </a:ext>
+            </a:extLst>
+          </a:blip>
+          <a:srcRect l="621" r="7641" b="2"/>
+          <a:stretch/>
+        </p:blipFill>
+        <p:spPr>
+          <a:xfrm>
+            <a:off x="633999" y="943549"/>
+            <a:ext cx="6909801" cy="4707470"/>
+          </a:xfrm>
+          <a:prstGeom prst="rect">
+            <a:avLst/>
+          </a:prstGeom>
+        </p:spPr>
+      </p:pic>
+      <p:cxnSp>
+        <p:nvCxnSpPr>
+          <p:cNvPr id="90" name="Straight Connector 89">
+            <a:extLst>
+              <a:ext uri="{FF2B5EF4-FFF2-40B4-BE49-F238E27FC236}">
+                <a16:creationId xmlns:a16="http://schemas.microsoft.com/office/drawing/2014/main" id="{C947DF4A-614C-4B4C-8B80-E5B9D8E8CFED}"/>
+              </a:ext>
+              <a:ext uri="{C183D7F6-B498-43B3-948B-1728B52AA6E4}">
+                <adec:decorative xmlns:adec="http://schemas.microsoft.com/office/drawing/2017/decorative" val="1"/>
+              </a:ext>
+            </a:extLst>
+          </p:cNvPr>
+          <p:cNvCxnSpPr>
+            <a:cxnSpLocks noGrp="1" noRot="1" noChangeAspect="1" noMove="1" noResize="1" noEditPoints="1" noAdjustHandles="1" noChangeArrowheads="1" noChangeShapeType="1"/>
+          </p:cNvCxnSpPr>
+          <p:nvPr>
+            <p:extLst>
+              <p:ext uri="{386F3935-93C4-4BCD-93E2-E3B085C9AB24}">
+                <p16:designElem xmlns:p16="http://schemas.microsoft.com/office/powerpoint/2015/main" val="1"/>
+              </p:ext>
+            </p:extLst>
+          </p:nvPr>
+        </p:nvCxnSpPr>
+        <p:spPr>
+          <a:xfrm>
+            <a:off x="7892143" y="2085703"/>
+            <a:ext cx="3566160" cy="0"/>
+          </a:xfrm>
+          <a:prstGeom prst="line">
+            <a:avLst/>
+          </a:prstGeom>
+          <a:ln w="6350">
+            <a:solidFill>
+              <a:schemeClr val="tx1">
+                <a:lumMod val="50000"/>
+                <a:lumOff val="50000"/>
+                <a:alpha val="90000"/>
+              </a:schemeClr>
+            </a:solidFill>
+          </a:ln>
+        </p:spPr>
+        <p:style>
+          <a:lnRef idx="1">
+            <a:schemeClr val="accent1"/>
+          </a:lnRef>
+          <a:fillRef idx="0">
+            <a:schemeClr val="accent1"/>
+          </a:fillRef>
+          <a:effectRef idx="0">
+            <a:schemeClr val="accent1"/>
+          </a:effectRef>
+          <a:fontRef idx="minor">
+            <a:schemeClr val="tx1"/>
+          </a:fontRef>
+        </p:style>
+      </p:cxnSp>
+      <p:sp>
+        <p:nvSpPr>
+          <p:cNvPr id="10" name="Content Placeholder 8">
+            <a:extLst>
+              <a:ext uri="{FF2B5EF4-FFF2-40B4-BE49-F238E27FC236}">
+                <a16:creationId xmlns:a16="http://schemas.microsoft.com/office/drawing/2014/main" id="{B0DBBD15-5CB7-4758-94C6-9FCA6E3AA552}"/>
+              </a:ext>
+            </a:extLst>
+          </p:cNvPr>
+          <p:cNvSpPr>
+            <a:spLocks noGrp="1"/>
+          </p:cNvSpPr>
+          <p:nvPr>
+            <p:ph idx="1"/>
+          </p:nvPr>
+        </p:nvSpPr>
+        <p:spPr>
+          <a:xfrm>
+            <a:off x="7859485" y="2198914"/>
+            <a:ext cx="3690257" cy="3670180"/>
+          </a:xfrm>
+        </p:spPr>
+        <p:txBody>
+          <a:bodyPr>
+            <a:normAutofit/>
+          </a:bodyPr>
+          <a:lstStyle/>
+          <a:p>
+            <a:r>
+              <a:rPr lang="en-US" sz="1900"/>
+              <a:t>For Normal Distribution, there is higher chance for a pivot to be near median, which makes more chances for 1:1 Partitions.</a:t>
+            </a:r>
+          </a:p>
+          <a:p>
+            <a:r>
+              <a:rPr lang="en-US" sz="1900"/>
+              <a:t>And the more 1:1 partition we get, more the less sub partitions will be formed, resulting in less no. of comparisons.</a:t>
+            </a:r>
+          </a:p>
+          <a:p>
+            <a:r>
+              <a:rPr lang="en-US" sz="1900"/>
+              <a:t>Due to this property, we see a smaller number of comparisons for normal, when compared to uniform distribution</a:t>
+            </a:r>
+          </a:p>
+          <a:p>
+            <a:endParaRPr lang="en-US" sz="1900"/>
+          </a:p>
+        </p:txBody>
+      </p:sp>
+      <p:sp>
+        <p:nvSpPr>
+          <p:cNvPr id="92" name="Rectangle 91">
+            <a:extLst>
+              <a:ext uri="{FF2B5EF4-FFF2-40B4-BE49-F238E27FC236}">
+                <a16:creationId xmlns:a16="http://schemas.microsoft.com/office/drawing/2014/main" id="{1E299956-A9E7-4FC1-A0B1-D590CA9730E8}"/>
+              </a:ext>
+              <a:ext uri="{C183D7F6-B498-43B3-948B-1728B52AA6E4}">
+                <adec:decorative xmlns:adec="http://schemas.microsoft.com/office/drawing/2017/decorative" val="1"/>
+              </a:ext>
+            </a:extLst>
+          </p:cNvPr>
+          <p:cNvSpPr>
+            <a:spLocks noGrp="1" noRot="1" noChangeAspect="1" noMove="1" noResize="1" noEditPoints="1" noAdjustHandles="1" noChangeArrowheads="1" noChangeShapeType="1" noTextEdit="1"/>
+          </p:cNvSpPr>
+          <p:nvPr>
+            <p:extLst>
+              <p:ext uri="{386F3935-93C4-4BCD-93E2-E3B085C9AB24}">
+                <p16:designElem xmlns:p16="http://schemas.microsoft.com/office/powerpoint/2015/main" val="1"/>
+              </p:ext>
+            </p:extLst>
+          </p:nvPr>
+        </p:nvSpPr>
+        <p:spPr>
+          <a:xfrm>
+            <a:off x="15" y="6334316"/>
+            <a:ext cx="12191985" cy="66484"/>
+          </a:xfrm>
+          <a:prstGeom prst="rect">
+            <a:avLst/>
+          </a:prstGeom>
+          <a:solidFill>
+            <a:schemeClr val="accent1"/>
+          </a:solidFill>
+          <a:ln>
+            <a:noFill/>
+          </a:ln>
+        </p:spPr>
+        <p:style>
+          <a:lnRef idx="2">
+            <a:schemeClr val="accent1">
+              <a:shade val="50000"/>
+            </a:schemeClr>
+          </a:lnRef>
+          <a:fillRef idx="1">
+            <a:schemeClr val="accent1"/>
+          </a:fillRef>
+          <a:effectRef idx="0">
+            <a:schemeClr val="accent1"/>
+          </a:effectRef>
+          <a:fontRef idx="minor">
+            <a:schemeClr val="lt1"/>
+          </a:fontRef>
+        </p:style>
+      </p:sp>
+      <p:sp>
+        <p:nvSpPr>
+          <p:cNvPr id="94" name="Rectangle 93">
+            <a:extLst>
+              <a:ext uri="{FF2B5EF4-FFF2-40B4-BE49-F238E27FC236}">
+                <a16:creationId xmlns:a16="http://schemas.microsoft.com/office/drawing/2014/main" id="{17FC539C-B783-4B03-9F9E-D13430F3F64F}"/>
+              </a:ext>
+              <a:ext uri="{C183D7F6-B498-43B3-948B-1728B52AA6E4}">
+                <adec:decorative xmlns:adec="http://schemas.microsoft.com/office/drawing/2017/decorative" val="1"/>
+              </a:ext>
+            </a:extLst>
+          </p:cNvPr>
+          <p:cNvSpPr>
+            <a:spLocks noGrp="1" noRot="1" noChangeAspect="1" noMove="1" noResize="1" noEditPoints="1" noAdjustHandles="1" noChangeArrowheads="1" noChangeShapeType="1" noTextEdit="1"/>
+          </p:cNvSpPr>
+          <p:nvPr>
+            <p:extLst>
+              <p:ext uri="{386F3935-93C4-4BCD-93E2-E3B085C9AB24}">
+                <p16:designElem xmlns:p16="http://schemas.microsoft.com/office/powerpoint/2015/main" val="1"/>
+              </p:ext>
+            </p:extLst>
+          </p:nvPr>
+        </p:nvSpPr>
+        <p:spPr>
+          <a:xfrm>
+            <a:off x="1" y="6400800"/>
+            <a:ext cx="12192000" cy="457200"/>
+          </a:xfrm>
+          <a:prstGeom prst="rect">
+            <a:avLst/>
+          </a:prstGeom>
+          <a:solidFill>
+            <a:schemeClr val="accent2"/>
+          </a:solidFill>
+          <a:ln>
+            <a:noFill/>
+          </a:ln>
+        </p:spPr>
+        <p:style>
+          <a:lnRef idx="2">
+            <a:schemeClr val="accent1">
+              <a:shade val="50000"/>
+            </a:schemeClr>
+          </a:lnRef>
+          <a:fillRef idx="1">
+            <a:schemeClr val="accent1"/>
+          </a:fillRef>
+          <a:effectRef idx="0">
+            <a:schemeClr val="accent1"/>
+          </a:effectRef>
+          <a:fontRef idx="minor">
+            <a:schemeClr val="lt1"/>
+          </a:fontRef>
+        </p:style>
+      </p:sp>
+    </p:spTree>
+    <p:extLst>
+      <p:ext uri="{BB962C8B-B14F-4D97-AF65-F5344CB8AC3E}">
+        <p14:creationId xmlns:p14="http://schemas.microsoft.com/office/powerpoint/2010/main" val="1023645759"/>
+      </p:ext>
+    </p:extLst>
+  </p:cSld>
+  <p:clrMapOvr>
+    <a:masterClrMapping/>
+  </p:clrMapOvr>
+</p:sld>
+</file>
+
+<file path=ppt/slides/slide2.xml><?xml version="1.0" encoding="utf-8"?>
+<p:sld xmlns:a="http://schemas.openxmlformats.org/drawingml/2006/main" xmlns:r="http://schemas.openxmlformats.org/officeDocument/2006/relationships" xmlns:p="http://schemas.openxmlformats.org/presentationml/2006/main">
+  <p:cSld>
+    <p:bg>
+      <p:bgPr>
+        <a:solidFill>
+          <a:schemeClr val="bg1"/>
+        </a:solidFill>
+        <a:effectLst/>
+      </p:bgPr>
+    </p:bg>
+    <p:spTree>
+      <p:nvGrpSpPr>
+        <p:cNvPr id="1" name=""/>
+        <p:cNvGrpSpPr/>
+        <p:nvPr/>
+      </p:nvGrpSpPr>
+      <p:grpSpPr>
+        <a:xfrm>
+          <a:off x="0" y="0"/>
+          <a:ext cx="0" cy="0"/>
+          <a:chOff x="0" y="0"/>
+          <a:chExt cx="0" cy="0"/>
+        </a:xfrm>
+      </p:grpSpPr>
+      <p:sp useBgFill="1">
+        <p:nvSpPr>
+          <p:cNvPr id="8" name="Rectangle 7">
+            <a:extLst>
+              <a:ext uri="{FF2B5EF4-FFF2-40B4-BE49-F238E27FC236}">
+                <a16:creationId xmlns:a16="http://schemas.microsoft.com/office/drawing/2014/main" id="{3741B58E-3B65-4A01-A276-975AB2CF8A08}"/>
+              </a:ext>
+              <a:ext uri="{C183D7F6-B498-43B3-948B-1728B52AA6E4}">
+                <adec:decorative xmlns:adec="http://schemas.microsoft.com/office/drawing/2017/decorative" val="1"/>
+              </a:ext>
+            </a:extLst>
+          </p:cNvPr>
+          <p:cNvSpPr>
+            <a:spLocks noGrp="1" noRot="1" noChangeAspect="1" noMove="1" noResize="1" noEditPoints="1" noAdjustHandles="1" noChangeArrowheads="1" noChangeShapeType="1" noTextEdit="1"/>
+          </p:cNvSpPr>
+          <p:nvPr>
+            <p:extLst>
+              <p:ext uri="{386F3935-93C4-4BCD-93E2-E3B085C9AB24}">
+                <p16:designElem xmlns:p16="http://schemas.microsoft.com/office/powerpoint/2015/main" val="1"/>
+              </p:ext>
+            </p:extLst>
+          </p:nvPr>
+        </p:nvSpPr>
+        <p:spPr>
+          <a:xfrm>
+            <a:off x="0" y="0"/>
+            <a:ext cx="12186315" cy="6858000"/>
+          </a:xfrm>
+          <a:prstGeom prst="rect">
+            <a:avLst/>
+          </a:prstGeom>
+          <a:ln>
+            <a:noFill/>
+          </a:ln>
+        </p:spPr>
+        <p:style>
+          <a:lnRef idx="2">
+            <a:schemeClr val="accent6">
+              <a:shade val="50000"/>
+            </a:schemeClr>
+          </a:lnRef>
+          <a:fillRef idx="1001">
+            <a:schemeClr val="lt1"/>
+          </a:fillRef>
+          <a:effectRef idx="0">
+            <a:schemeClr val="accent6"/>
+          </a:effectRef>
+          <a:fontRef idx="minor">
+            <a:schemeClr val="lt1"/>
+          </a:fontRef>
+        </p:style>
+        <p:txBody>
+          <a:bodyPr rtlCol="0" anchor="ctr"/>
+          <a:lstStyle/>
+          <a:p>
+            <a:pPr algn="ctr"/>
+            <a:endParaRPr lang="en-US"/>
+          </a:p>
+        </p:txBody>
+      </p:sp>
+      <p:sp>
+        <p:nvSpPr>
+          <p:cNvPr id="10" name="Rectangle 9">
+            <a:extLst>
+              <a:ext uri="{FF2B5EF4-FFF2-40B4-BE49-F238E27FC236}">
+                <a16:creationId xmlns:a16="http://schemas.microsoft.com/office/drawing/2014/main" id="{7AAC67C3-831B-4AB1-A259-DFB839CAFAFC}"/>
+              </a:ext>
+              <a:ext uri="{C183D7F6-B498-43B3-948B-1728B52AA6E4}">
+                <adec:decorative xmlns:adec="http://schemas.microsoft.com/office/drawing/2017/decorative" val="1"/>
+              </a:ext>
+            </a:extLst>
+          </p:cNvPr>
+          <p:cNvSpPr>
+            <a:spLocks noGrp="1" noRot="1" noChangeAspect="1" noMove="1" noResize="1" noEditPoints="1" noAdjustHandles="1" noChangeArrowheads="1" noChangeShapeType="1" noTextEdit="1"/>
+          </p:cNvSpPr>
+          <p:nvPr>
+            <p:extLst>
+              <p:ext uri="{386F3935-93C4-4BCD-93E2-E3B085C9AB24}">
+                <p16:designElem xmlns:p16="http://schemas.microsoft.com/office/powerpoint/2015/main" val="1"/>
+              </p:ext>
+            </p:extLst>
+          </p:nvPr>
+        </p:nvSpPr>
+        <p:spPr>
+          <a:xfrm>
+            <a:off x="16" y="0"/>
+            <a:ext cx="4050791" cy="6858000"/>
+          </a:xfrm>
+          <a:prstGeom prst="rect">
+            <a:avLst/>
+          </a:prstGeom>
+          <a:solidFill>
+            <a:schemeClr val="accent2"/>
+          </a:solidFill>
+          <a:ln>
+            <a:noFill/>
+          </a:ln>
+        </p:spPr>
+        <p:style>
+          <a:lnRef idx="2">
+            <a:schemeClr val="accent1">
+              <a:shade val="50000"/>
+            </a:schemeClr>
+          </a:lnRef>
+          <a:fillRef idx="1">
+            <a:schemeClr val="accent1"/>
+          </a:fillRef>
+          <a:effectRef idx="0">
+            <a:schemeClr val="accent1"/>
+          </a:effectRef>
+          <a:fontRef idx="minor">
+            <a:schemeClr val="lt1"/>
+          </a:fontRef>
+        </p:style>
+      </p:sp>
+      <p:sp>
+        <p:nvSpPr>
+          <p:cNvPr id="2" name="Title 1">
+            <a:extLst>
+              <a:ext uri="{FF2B5EF4-FFF2-40B4-BE49-F238E27FC236}">
+                <a16:creationId xmlns:a16="http://schemas.microsoft.com/office/drawing/2014/main" id="{0A5E5C2A-12AE-4F2F-83F8-338BB786D2C1}"/>
+              </a:ext>
+            </a:extLst>
+          </p:cNvPr>
+          <p:cNvSpPr>
+            <a:spLocks noGrp="1"/>
+          </p:cNvSpPr>
+          <p:nvPr>
+            <p:ph type="title"/>
+          </p:nvPr>
+        </p:nvSpPr>
+        <p:spPr>
+          <a:xfrm>
+            <a:off x="492370" y="605896"/>
+            <a:ext cx="3084844" cy="5646208"/>
+          </a:xfrm>
+        </p:spPr>
+        <p:txBody>
+          <a:bodyPr anchor="ctr">
+            <a:normAutofit/>
+          </a:bodyPr>
+          <a:lstStyle/>
+          <a:p>
+            <a:r>
+              <a:rPr lang="en-IN" sz="3600">
+                <a:solidFill>
+                  <a:srgbClr val="FFFFFF"/>
+                </a:solidFill>
+              </a:rPr>
+              <a:t>Introduction</a:t>
+            </a:r>
+          </a:p>
+        </p:txBody>
+      </p:sp>
+      <p:sp>
+        <p:nvSpPr>
+          <p:cNvPr id="12" name="Rectangle 11">
+            <a:extLst>
+              <a:ext uri="{FF2B5EF4-FFF2-40B4-BE49-F238E27FC236}">
+                <a16:creationId xmlns:a16="http://schemas.microsoft.com/office/drawing/2014/main" id="{054B3F04-9EAC-45C0-B3CE-0387EEA10A0C}"/>
+              </a:ext>
+              <a:ext uri="{C183D7F6-B498-43B3-948B-1728B52AA6E4}">
+                <adec:decorative xmlns:adec="http://schemas.microsoft.com/office/drawing/2017/decorative" val="1"/>
+              </a:ext>
+            </a:extLst>
+          </p:cNvPr>
+          <p:cNvSpPr>
+            <a:spLocks noGrp="1" noRot="1" noChangeAspect="1" noMove="1" noResize="1" noEditPoints="1" noAdjustHandles="1" noChangeArrowheads="1" noChangeShapeType="1" noTextEdit="1"/>
+          </p:cNvSpPr>
+          <p:nvPr>
+            <p:extLst>
+              <p:ext uri="{386F3935-93C4-4BCD-93E2-E3B085C9AB24}">
+                <p16:designElem xmlns:p16="http://schemas.microsoft.com/office/powerpoint/2015/main" val="1"/>
+              </p:ext>
+            </p:extLst>
+          </p:nvPr>
+        </p:nvSpPr>
+        <p:spPr>
+          <a:xfrm>
+            <a:off x="4040071" y="0"/>
+            <a:ext cx="64008" cy="6858000"/>
+          </a:xfrm>
+          <a:prstGeom prst="rect">
+            <a:avLst/>
+          </a:prstGeom>
+          <a:solidFill>
+            <a:schemeClr val="accent1"/>
+          </a:solidFill>
+          <a:ln>
+            <a:noFill/>
+          </a:ln>
+        </p:spPr>
+        <p:style>
+          <a:lnRef idx="2">
+            <a:schemeClr val="accent1">
+              <a:shade val="50000"/>
+            </a:schemeClr>
+          </a:lnRef>
+          <a:fillRef idx="1">
+            <a:schemeClr val="accent1"/>
+          </a:fillRef>
+          <a:effectRef idx="0">
+            <a:schemeClr val="accent1"/>
+          </a:effectRef>
+          <a:fontRef idx="minor">
+            <a:schemeClr val="lt1"/>
+          </a:fontRef>
+        </p:style>
+      </p:sp>
+      <p:sp>
+        <p:nvSpPr>
+          <p:cNvPr id="3" name="Content Placeholder 2">
+            <a:extLst>
+              <a:ext uri="{FF2B5EF4-FFF2-40B4-BE49-F238E27FC236}">
+                <a16:creationId xmlns:a16="http://schemas.microsoft.com/office/drawing/2014/main" id="{CE63FD34-36DF-4637-839F-A62E8F2F2E9B}"/>
+              </a:ext>
+            </a:extLst>
+          </p:cNvPr>
+          <p:cNvSpPr>
+            <a:spLocks noGrp="1"/>
+          </p:cNvSpPr>
+          <p:nvPr>
+            <p:ph idx="1"/>
+          </p:nvPr>
+        </p:nvSpPr>
+        <p:spPr>
+          <a:xfrm>
+            <a:off x="4742016" y="605896"/>
+            <a:ext cx="6413663" cy="5646208"/>
+          </a:xfrm>
+        </p:spPr>
+        <p:txBody>
+          <a:bodyPr anchor="ctr">
+            <a:normAutofit/>
+          </a:bodyPr>
+          <a:lstStyle/>
+          <a:p>
+            <a:r>
+              <a:rPr lang="en-IN" dirty="0"/>
+              <a:t>This Report is Made By:</a:t>
+            </a:r>
+          </a:p>
+          <a:p>
+            <a:pPr lvl="1"/>
+            <a:r>
+              <a:rPr lang="en-IN" dirty="0"/>
+              <a:t>Abhiroop Mukherjee 	(510519109)</a:t>
+            </a:r>
+          </a:p>
+          <a:p>
+            <a:pPr lvl="1"/>
+            <a:r>
+              <a:rPr lang="en-IN" dirty="0"/>
+              <a:t>Hritick Sharma 		(510519114)</a:t>
+            </a:r>
+          </a:p>
+          <a:p>
+            <a:pPr lvl="1"/>
+            <a:r>
+              <a:rPr lang="en-IN" dirty="0"/>
+              <a:t>Sayak Rana		(510519108)</a:t>
+            </a:r>
+          </a:p>
+          <a:p>
+            <a:pPr lvl="1"/>
+            <a:endParaRPr lang="en-IN" dirty="0"/>
+          </a:p>
+          <a:p>
+            <a:pPr marL="201168" lvl="1" indent="0">
+              <a:buNone/>
+            </a:pPr>
+            <a:r>
+              <a:rPr lang="en-IN" dirty="0"/>
+              <a:t>The Source codes for all the Assignments can be found here</a:t>
+            </a:r>
+            <a:r>
+              <a:rPr lang="en-IN"/>
+              <a:t>: </a:t>
+            </a:r>
+            <a:r>
+              <a:rPr lang="en-IN">
+                <a:hlinkClick r:id="rId2"/>
+              </a:rPr>
+              <a:t>https://github.com/Abhiroop25902/CS-2271-Algo-Lab</a:t>
+            </a:r>
+            <a:endParaRPr lang="en-IN" dirty="0"/>
+          </a:p>
+        </p:txBody>
+      </p:sp>
+    </p:spTree>
+    <p:extLst>
+      <p:ext uri="{BB962C8B-B14F-4D97-AF65-F5344CB8AC3E}">
+        <p14:creationId xmlns:p14="http://schemas.microsoft.com/office/powerpoint/2010/main" val="2033051608"/>
+      </p:ext>
+    </p:extLst>
+  </p:cSld>
+  <p:clrMapOvr>
+    <a:masterClrMapping/>
+  </p:clrMapOvr>
+</p:sld>
+</file>
+
+<file path=ppt/slides/slide20.xml><?xml version="1.0" encoding="utf-8"?>
+<p:sld xmlns:a="http://schemas.openxmlformats.org/drawingml/2006/main" xmlns:r="http://schemas.openxmlformats.org/officeDocument/2006/relationships" xmlns:p="http://schemas.openxmlformats.org/presentationml/2006/main">
+  <p:cSld>
+    <p:bg>
+      <p:bgPr>
+        <a:solidFill>
+          <a:schemeClr val="bg1"/>
+        </a:solidFill>
+        <a:effectLst/>
+      </p:bgPr>
+    </p:bg>
+    <p:spTree>
+      <p:nvGrpSpPr>
+        <p:cNvPr id="1" name=""/>
+        <p:cNvGrpSpPr/>
+        <p:nvPr/>
+      </p:nvGrpSpPr>
+      <p:grpSpPr>
+        <a:xfrm>
+          <a:off x="0" y="0"/>
+          <a:ext cx="0" cy="0"/>
+          <a:chOff x="0" y="0"/>
+          <a:chExt cx="0" cy="0"/>
+        </a:xfrm>
+      </p:grpSpPr>
+      <p:sp useBgFill="1">
+        <p:nvSpPr>
+          <p:cNvPr id="99" name="Rectangle 98">
+            <a:extLst>
+              <a:ext uri="{FF2B5EF4-FFF2-40B4-BE49-F238E27FC236}">
+                <a16:creationId xmlns:a16="http://schemas.microsoft.com/office/drawing/2014/main" id="{284B70D5-875B-433D-BDBD-1522A85D6C1D}"/>
+              </a:ext>
+              <a:ext uri="{C183D7F6-B498-43B3-948B-1728B52AA6E4}">
+                <adec:decorative xmlns:adec="http://schemas.microsoft.com/office/drawing/2017/decorative" val="1"/>
+              </a:ext>
+            </a:extLst>
+          </p:cNvPr>
+          <p:cNvSpPr>
+            <a:spLocks noGrp="1" noRot="1" noChangeAspect="1" noMove="1" noResize="1" noEditPoints="1" noAdjustHandles="1" noChangeArrowheads="1" noChangeShapeType="1" noTextEdit="1"/>
+          </p:cNvSpPr>
+          <p:nvPr>
+            <p:extLst>
+              <p:ext uri="{386F3935-93C4-4BCD-93E2-E3B085C9AB24}">
+                <p16:designElem xmlns:p16="http://schemas.microsoft.com/office/powerpoint/2015/main" val="1"/>
+              </p:ext>
+            </p:extLst>
+          </p:nvPr>
+        </p:nvSpPr>
+        <p:spPr>
+          <a:xfrm>
+            <a:off x="0" y="0"/>
+            <a:ext cx="12192001" cy="6334316"/>
+          </a:xfrm>
+          <a:prstGeom prst="rect">
+            <a:avLst/>
+          </a:prstGeom>
+          <a:ln>
+            <a:noFill/>
+          </a:ln>
+        </p:spPr>
+        <p:style>
+          <a:lnRef idx="2">
+            <a:schemeClr val="accent1">
+              <a:shade val="50000"/>
+            </a:schemeClr>
+          </a:lnRef>
+          <a:fillRef idx="1">
+            <a:schemeClr val="accent1"/>
+          </a:fillRef>
+          <a:effectRef idx="0">
+            <a:schemeClr val="accent1"/>
+          </a:effectRef>
+          <a:fontRef idx="minor">
+            <a:schemeClr val="lt1"/>
+          </a:fontRef>
+        </p:style>
+        <p:txBody>
+          <a:bodyPr rtlCol="0" anchor="ctr"/>
+          <a:lstStyle/>
+          <a:p>
+            <a:pPr algn="ctr"/>
+            <a:endParaRPr lang="en-US"/>
+          </a:p>
+        </p:txBody>
+      </p:sp>
+      <p:sp>
+        <p:nvSpPr>
+          <p:cNvPr id="2" name="Title 1">
+            <a:extLst>
+              <a:ext uri="{FF2B5EF4-FFF2-40B4-BE49-F238E27FC236}">
+                <a16:creationId xmlns:a16="http://schemas.microsoft.com/office/drawing/2014/main" id="{A2E81D72-EC99-4091-AA2C-660CCFAC39B6}"/>
+              </a:ext>
+            </a:extLst>
+          </p:cNvPr>
+          <p:cNvSpPr>
+            <a:spLocks noGrp="1"/>
+          </p:cNvSpPr>
+          <p:nvPr>
+            <p:ph type="title"/>
+          </p:nvPr>
+        </p:nvSpPr>
+        <p:spPr>
+          <a:xfrm>
+            <a:off x="7859485" y="634946"/>
+            <a:ext cx="3690257" cy="1450757"/>
+          </a:xfrm>
+        </p:spPr>
+        <p:txBody>
+          <a:bodyPr>
+            <a:normAutofit/>
+          </a:bodyPr>
+          <a:lstStyle/>
+          <a:p>
+            <a:r>
+              <a:rPr lang="en-IN" b="1"/>
+              <a:t>Time Analysis Quicksort </a:t>
+            </a:r>
+          </a:p>
+        </p:txBody>
+      </p:sp>
+      <p:pic>
+        <p:nvPicPr>
+          <p:cNvPr id="5" name="Content Placeholder 4">
+            <a:extLst>
+              <a:ext uri="{FF2B5EF4-FFF2-40B4-BE49-F238E27FC236}">
+                <a16:creationId xmlns:a16="http://schemas.microsoft.com/office/drawing/2014/main" id="{99059347-F5D1-41F7-B30A-23EE2BA4D650}"/>
+              </a:ext>
+            </a:extLst>
+          </p:cNvPr>
+          <p:cNvPicPr>
+            <a:picLocks noChangeAspect="1"/>
+          </p:cNvPicPr>
+          <p:nvPr/>
+        </p:nvPicPr>
+        <p:blipFill rotWithShape="1">
+          <a:blip r:embed="rId2">
+            <a:extLst>
+              <a:ext uri="{28A0092B-C50C-407E-A947-70E740481C1C}">
+                <a14:useLocalDpi xmlns:a14="http://schemas.microsoft.com/office/drawing/2010/main" val="0"/>
+              </a:ext>
+            </a:extLst>
+          </a:blip>
+          <a:srcRect l="621" r="7641" b="2"/>
+          <a:stretch/>
+        </p:blipFill>
+        <p:spPr>
+          <a:xfrm>
+            <a:off x="633999" y="943549"/>
+            <a:ext cx="6909801" cy="4707470"/>
+          </a:xfrm>
+          <a:prstGeom prst="rect">
+            <a:avLst/>
+          </a:prstGeom>
+        </p:spPr>
+      </p:pic>
+      <p:cxnSp>
+        <p:nvCxnSpPr>
+          <p:cNvPr id="101" name="Straight Connector 100">
+            <a:extLst>
+              <a:ext uri="{FF2B5EF4-FFF2-40B4-BE49-F238E27FC236}">
+                <a16:creationId xmlns:a16="http://schemas.microsoft.com/office/drawing/2014/main" id="{C947DF4A-614C-4B4C-8B80-E5B9D8E8CFED}"/>
+              </a:ext>
+              <a:ext uri="{C183D7F6-B498-43B3-948B-1728B52AA6E4}">
+                <adec:decorative xmlns:adec="http://schemas.microsoft.com/office/drawing/2017/decorative" val="1"/>
+              </a:ext>
+            </a:extLst>
+          </p:cNvPr>
+          <p:cNvCxnSpPr>
+            <a:cxnSpLocks noGrp="1" noRot="1" noChangeAspect="1" noMove="1" noResize="1" noEditPoints="1" noAdjustHandles="1" noChangeArrowheads="1" noChangeShapeType="1"/>
+          </p:cNvCxnSpPr>
+          <p:nvPr>
+            <p:extLst>
+              <p:ext uri="{386F3935-93C4-4BCD-93E2-E3B085C9AB24}">
+                <p16:designElem xmlns:p16="http://schemas.microsoft.com/office/powerpoint/2015/main" val="1"/>
+              </p:ext>
+            </p:extLst>
+          </p:nvPr>
+        </p:nvCxnSpPr>
+        <p:spPr>
+          <a:xfrm>
+            <a:off x="7892143" y="2085703"/>
+            <a:ext cx="3566160" cy="0"/>
+          </a:xfrm>
+          <a:prstGeom prst="line">
+            <a:avLst/>
+          </a:prstGeom>
+          <a:ln w="6350">
+            <a:solidFill>
+              <a:schemeClr val="tx1">
+                <a:lumMod val="50000"/>
+                <a:lumOff val="50000"/>
+                <a:alpha val="90000"/>
+              </a:schemeClr>
+            </a:solidFill>
+          </a:ln>
+        </p:spPr>
+        <p:style>
+          <a:lnRef idx="1">
+            <a:schemeClr val="accent1"/>
+          </a:lnRef>
+          <a:fillRef idx="0">
+            <a:schemeClr val="accent1"/>
+          </a:fillRef>
+          <a:effectRef idx="0">
+            <a:schemeClr val="accent1"/>
+          </a:effectRef>
+          <a:fontRef idx="minor">
+            <a:schemeClr val="tx1"/>
+          </a:fontRef>
+        </p:style>
+      </p:cxnSp>
+      <mc:AlternateContent xmlns:mc="http://schemas.openxmlformats.org/markup-compatibility/2006">
+        <mc:Choice xmlns:a14="http://schemas.microsoft.com/office/drawing/2010/main" Requires="a14">
+          <p:sp>
+            <p:nvSpPr>
+              <p:cNvPr id="10" name="Content Placeholder 8">
+                <a:extLst>
+                  <a:ext uri="{FF2B5EF4-FFF2-40B4-BE49-F238E27FC236}">
+                    <a16:creationId xmlns:a16="http://schemas.microsoft.com/office/drawing/2014/main" id="{B0DBBD15-5CB7-4758-94C6-9FCA6E3AA552}"/>
+                  </a:ext>
+                </a:extLst>
+              </p:cNvPr>
+              <p:cNvSpPr>
+                <a:spLocks noGrp="1"/>
+              </p:cNvSpPr>
+              <p:nvPr>
+                <p:ph idx="1"/>
+              </p:nvPr>
+            </p:nvSpPr>
+            <p:spPr>
+              <a:xfrm>
+                <a:off x="7859485" y="2198914"/>
+                <a:ext cx="3690257" cy="3670180"/>
+              </a:xfrm>
+            </p:spPr>
+            <p:txBody>
+              <a:bodyPr>
+                <a:normAutofit/>
+              </a:bodyPr>
+              <a:lstStyle/>
+              <a:p>
+                <a:r>
+                  <a:rPr lang="en-US" sz="1700" dirty="0"/>
+                  <a:t>Here we see very strange observations:</a:t>
+                </a:r>
+              </a:p>
+              <a:p>
+                <a:pPr marL="457200" indent="-457200">
+                  <a:buFont typeface="+mj-lt"/>
+                  <a:buAutoNum type="arabicPeriod"/>
+                </a:pPr>
+                <a:r>
+                  <a:rPr lang="en-US" sz="1700" dirty="0"/>
+                  <a:t>Even though Normal Distribution takes less comparison, it takes more time than Uniform. This could be since Time taken for comparison in Normal is more than that of Uniform</a:t>
+                </a:r>
+              </a:p>
+              <a:p>
+                <a:pPr marL="457200" indent="-457200">
+                  <a:buFont typeface="+mj-lt"/>
+                  <a:buAutoNum type="arabicPeriod"/>
+                </a:pPr>
+                <a:r>
+                  <a:rPr lang="en-US" sz="1700" dirty="0"/>
+                  <a:t>As array size goes too high, we see time taken by  algorithm breaks the </a:t>
+                </a:r>
+                <a14:m>
+                  <m:oMath xmlns:m="http://schemas.openxmlformats.org/officeDocument/2006/math">
+                    <m:r>
+                      <a:rPr lang="en-IN" sz="1700" b="0" i="1" smtClean="0">
+                        <a:latin typeface="Cambria Math" panose="02040503050406030204" pitchFamily="18" charset="0"/>
+                      </a:rPr>
+                      <m:t>𝑂</m:t>
+                    </m:r>
+                    <m:r>
+                      <a:rPr lang="en-IN" sz="1700" b="0" i="1" smtClean="0">
+                        <a:latin typeface="Cambria Math" panose="02040503050406030204" pitchFamily="18" charset="0"/>
+                      </a:rPr>
+                      <m:t>(</m:t>
+                    </m:r>
+                    <m:r>
+                      <a:rPr lang="en-IN" sz="1700" b="0" i="1" smtClean="0">
+                        <a:latin typeface="Cambria Math" panose="02040503050406030204" pitchFamily="18" charset="0"/>
+                      </a:rPr>
+                      <m:t>𝑛𝑙𝑔𝑛</m:t>
+                    </m:r>
+                    <m:r>
+                      <a:rPr lang="en-IN" sz="1700" b="0" i="1" smtClean="0">
+                        <a:latin typeface="Cambria Math" panose="02040503050406030204" pitchFamily="18" charset="0"/>
+                      </a:rPr>
+                      <m:t>)</m:t>
+                    </m:r>
+                  </m:oMath>
+                </a14:m>
+                <a:r>
+                  <a:rPr lang="en-US" sz="1700" dirty="0"/>
+                  <a:t> complexity, we don’t have any idea why this is happening </a:t>
+                </a:r>
+              </a:p>
+              <a:p>
+                <a:endParaRPr lang="en-US" sz="1700" dirty="0"/>
+              </a:p>
+            </p:txBody>
+          </p:sp>
+        </mc:Choice>
+        <mc:Fallback>
+          <p:sp>
+            <p:nvSpPr>
+              <p:cNvPr id="10" name="Content Placeholder 8">
+                <a:extLst>
+                  <a:ext uri="{FF2B5EF4-FFF2-40B4-BE49-F238E27FC236}">
+                    <a16:creationId xmlns:a16="http://schemas.microsoft.com/office/drawing/2014/main" id="{B0DBBD15-5CB7-4758-94C6-9FCA6E3AA552}"/>
+                  </a:ext>
+                </a:extLst>
+              </p:cNvPr>
+              <p:cNvSpPr>
+                <a:spLocks noGrp="1" noRot="1" noChangeAspect="1" noMove="1" noResize="1" noEditPoints="1" noAdjustHandles="1" noChangeArrowheads="1" noChangeShapeType="1" noTextEdit="1"/>
+              </p:cNvSpPr>
+              <p:nvPr>
+                <p:ph idx="1"/>
+              </p:nvPr>
+            </p:nvSpPr>
+            <p:spPr>
+              <a:xfrm>
+                <a:off x="7859485" y="2198914"/>
+                <a:ext cx="3690257" cy="3670180"/>
+              </a:xfrm>
+              <a:blipFill>
+                <a:blip r:embed="rId3"/>
+                <a:stretch>
+                  <a:fillRect l="-3465" t="-1329" r="-2805"/>
+                </a:stretch>
+              </a:blipFill>
+            </p:spPr>
+            <p:txBody>
+              <a:bodyPr/>
+              <a:lstStyle/>
+              <a:p>
+                <a:r>
+                  <a:rPr lang="en-IN">
+                    <a:noFill/>
+                  </a:rPr>
+                  <a:t> </a:t>
+                </a:r>
+              </a:p>
+            </p:txBody>
+          </p:sp>
+        </mc:Fallback>
+      </mc:AlternateContent>
+      <p:sp>
+        <p:nvSpPr>
+          <p:cNvPr id="103" name="Rectangle 102">
+            <a:extLst>
+              <a:ext uri="{FF2B5EF4-FFF2-40B4-BE49-F238E27FC236}">
+                <a16:creationId xmlns:a16="http://schemas.microsoft.com/office/drawing/2014/main" id="{1E299956-A9E7-4FC1-A0B1-D590CA9730E8}"/>
+              </a:ext>
+              <a:ext uri="{C183D7F6-B498-43B3-948B-1728B52AA6E4}">
+                <adec:decorative xmlns:adec="http://schemas.microsoft.com/office/drawing/2017/decorative" val="1"/>
+              </a:ext>
+            </a:extLst>
+          </p:cNvPr>
+          <p:cNvSpPr>
+            <a:spLocks noGrp="1" noRot="1" noChangeAspect="1" noMove="1" noResize="1" noEditPoints="1" noAdjustHandles="1" noChangeArrowheads="1" noChangeShapeType="1" noTextEdit="1"/>
+          </p:cNvSpPr>
+          <p:nvPr>
+            <p:extLst>
+              <p:ext uri="{386F3935-93C4-4BCD-93E2-E3B085C9AB24}">
+                <p16:designElem xmlns:p16="http://schemas.microsoft.com/office/powerpoint/2015/main" val="1"/>
+              </p:ext>
+            </p:extLst>
+          </p:nvPr>
+        </p:nvSpPr>
+        <p:spPr>
+          <a:xfrm>
+            <a:off x="15" y="6334316"/>
+            <a:ext cx="12191985" cy="66484"/>
+          </a:xfrm>
+          <a:prstGeom prst="rect">
+            <a:avLst/>
+          </a:prstGeom>
+          <a:solidFill>
+            <a:schemeClr val="accent1"/>
+          </a:solidFill>
+          <a:ln>
+            <a:noFill/>
+          </a:ln>
+        </p:spPr>
+        <p:style>
+          <a:lnRef idx="2">
+            <a:schemeClr val="accent1">
+              <a:shade val="50000"/>
+            </a:schemeClr>
+          </a:lnRef>
+          <a:fillRef idx="1">
+            <a:schemeClr val="accent1"/>
+          </a:fillRef>
+          <a:effectRef idx="0">
+            <a:schemeClr val="accent1"/>
+          </a:effectRef>
+          <a:fontRef idx="minor">
+            <a:schemeClr val="lt1"/>
+          </a:fontRef>
+        </p:style>
+      </p:sp>
+      <p:sp>
+        <p:nvSpPr>
+          <p:cNvPr id="105" name="Rectangle 104">
+            <a:extLst>
+              <a:ext uri="{FF2B5EF4-FFF2-40B4-BE49-F238E27FC236}">
+                <a16:creationId xmlns:a16="http://schemas.microsoft.com/office/drawing/2014/main" id="{17FC539C-B783-4B03-9F9E-D13430F3F64F}"/>
+              </a:ext>
+              <a:ext uri="{C183D7F6-B498-43B3-948B-1728B52AA6E4}">
+                <adec:decorative xmlns:adec="http://schemas.microsoft.com/office/drawing/2017/decorative" val="1"/>
+              </a:ext>
+            </a:extLst>
+          </p:cNvPr>
+          <p:cNvSpPr>
+            <a:spLocks noGrp="1" noRot="1" noChangeAspect="1" noMove="1" noResize="1" noEditPoints="1" noAdjustHandles="1" noChangeArrowheads="1" noChangeShapeType="1" noTextEdit="1"/>
+          </p:cNvSpPr>
+          <p:nvPr>
+            <p:extLst>
+              <p:ext uri="{386F3935-93C4-4BCD-93E2-E3B085C9AB24}">
+                <p16:designElem xmlns:p16="http://schemas.microsoft.com/office/powerpoint/2015/main" val="1"/>
+              </p:ext>
+            </p:extLst>
+          </p:nvPr>
+        </p:nvSpPr>
+        <p:spPr>
+          <a:xfrm>
+            <a:off x="1" y="6400800"/>
+            <a:ext cx="12192000" cy="457200"/>
+          </a:xfrm>
+          <a:prstGeom prst="rect">
+            <a:avLst/>
+          </a:prstGeom>
+          <a:solidFill>
+            <a:schemeClr val="accent2"/>
+          </a:solidFill>
+          <a:ln>
+            <a:noFill/>
+          </a:ln>
+        </p:spPr>
+        <p:style>
+          <a:lnRef idx="2">
+            <a:schemeClr val="accent1">
+              <a:shade val="50000"/>
+            </a:schemeClr>
+          </a:lnRef>
+          <a:fillRef idx="1">
+            <a:schemeClr val="accent1"/>
+          </a:fillRef>
+          <a:effectRef idx="0">
+            <a:schemeClr val="accent1"/>
+          </a:effectRef>
+          <a:fontRef idx="minor">
+            <a:schemeClr val="lt1"/>
+          </a:fontRef>
+        </p:style>
+      </p:sp>
+    </p:spTree>
+    <p:extLst>
+      <p:ext uri="{BB962C8B-B14F-4D97-AF65-F5344CB8AC3E}">
+        <p14:creationId xmlns:p14="http://schemas.microsoft.com/office/powerpoint/2010/main" val="898223925"/>
+      </p:ext>
+    </p:extLst>
+  </p:cSld>
+  <p:clrMapOvr>
+    <a:masterClrMapping/>
+  </p:clrMapOvr>
+</p:sld>
+</file>
+
+<file path=ppt/slides/slide21.xml><?xml version="1.0" encoding="utf-8"?>
+<p:sld xmlns:a="http://schemas.openxmlformats.org/drawingml/2006/main" xmlns:r="http://schemas.openxmlformats.org/officeDocument/2006/relationships" xmlns:p="http://schemas.openxmlformats.org/presentationml/2006/main">
+  <p:cSld>
+    <p:bg>
+      <p:bgPr>
+        <a:solidFill>
+          <a:schemeClr val="bg1"/>
+        </a:solidFill>
+        <a:effectLst/>
+      </p:bgPr>
+    </p:bg>
+    <p:spTree>
+      <p:nvGrpSpPr>
+        <p:cNvPr id="1" name=""/>
+        <p:cNvGrpSpPr/>
+        <p:nvPr/>
+      </p:nvGrpSpPr>
+      <p:grpSpPr>
+        <a:xfrm>
+          <a:off x="0" y="0"/>
+          <a:ext cx="0" cy="0"/>
+          <a:chOff x="0" y="0"/>
+          <a:chExt cx="0" cy="0"/>
+        </a:xfrm>
+      </p:grpSpPr>
       <p:pic>
         <p:nvPicPr>
           <p:cNvPr id="5" name="Picture 4" descr="Many question marks on black background">
@@ -22012,334 +23408,7 @@
 </p:sld>
 </file>
 
-<file path=ppt/slides/slide2.xml><?xml version="1.0" encoding="utf-8"?>
-<p:sld xmlns:a="http://schemas.openxmlformats.org/drawingml/2006/main" xmlns:r="http://schemas.openxmlformats.org/officeDocument/2006/relationships" xmlns:p="http://schemas.openxmlformats.org/presentationml/2006/main">
-  <p:cSld>
-    <p:bg>
-      <p:bgPr>
-        <a:solidFill>
-          <a:schemeClr val="bg1"/>
-        </a:solidFill>
-        <a:effectLst/>
-      </p:bgPr>
-    </p:bg>
-    <p:spTree>
-      <p:nvGrpSpPr>
-        <p:cNvPr id="1" name=""/>
-        <p:cNvGrpSpPr/>
-        <p:nvPr/>
-      </p:nvGrpSpPr>
-      <p:grpSpPr>
-        <a:xfrm>
-          <a:off x="0" y="0"/>
-          <a:ext cx="0" cy="0"/>
-          <a:chOff x="0" y="0"/>
-          <a:chExt cx="0" cy="0"/>
-        </a:xfrm>
-      </p:grpSpPr>
-      <p:sp useBgFill="1">
-        <p:nvSpPr>
-          <p:cNvPr id="8" name="Rectangle 7">
-            <a:extLst>
-              <a:ext uri="{FF2B5EF4-FFF2-40B4-BE49-F238E27FC236}">
-                <a16:creationId xmlns:a16="http://schemas.microsoft.com/office/drawing/2014/main" id="{3741B58E-3B65-4A01-A276-975AB2CF8A08}"/>
-              </a:ext>
-              <a:ext uri="{C183D7F6-B498-43B3-948B-1728B52AA6E4}">
-                <adec:decorative xmlns:adec="http://schemas.microsoft.com/office/drawing/2017/decorative" val="1"/>
-              </a:ext>
-            </a:extLst>
-          </p:cNvPr>
-          <p:cNvSpPr>
-            <a:spLocks noGrp="1" noRot="1" noChangeAspect="1" noMove="1" noResize="1" noEditPoints="1" noAdjustHandles="1" noChangeArrowheads="1" noChangeShapeType="1" noTextEdit="1"/>
-          </p:cNvSpPr>
-          <p:nvPr>
-            <p:extLst>
-              <p:ext uri="{386F3935-93C4-4BCD-93E2-E3B085C9AB24}">
-                <p16:designElem xmlns:p16="http://schemas.microsoft.com/office/powerpoint/2015/main" val="1"/>
-              </p:ext>
-            </p:extLst>
-          </p:nvPr>
-        </p:nvSpPr>
-        <p:spPr>
-          <a:xfrm>
-            <a:off x="0" y="0"/>
-            <a:ext cx="12186315" cy="6858000"/>
-          </a:xfrm>
-          <a:prstGeom prst="rect">
-            <a:avLst/>
-          </a:prstGeom>
-          <a:ln>
-            <a:noFill/>
-          </a:ln>
-        </p:spPr>
-        <p:style>
-          <a:lnRef idx="2">
-            <a:schemeClr val="accent6">
-              <a:shade val="50000"/>
-            </a:schemeClr>
-          </a:lnRef>
-          <a:fillRef idx="1001">
-            <a:schemeClr val="lt1"/>
-          </a:fillRef>
-          <a:effectRef idx="0">
-            <a:schemeClr val="accent6"/>
-          </a:effectRef>
-          <a:fontRef idx="minor">
-            <a:schemeClr val="lt1"/>
-          </a:fontRef>
-        </p:style>
-        <p:txBody>
-          <a:bodyPr rtlCol="0" anchor="ctr"/>
-          <a:lstStyle/>
-          <a:p>
-            <a:pPr algn="ctr"/>
-            <a:endParaRPr lang="en-US"/>
-          </a:p>
-        </p:txBody>
-      </p:sp>
-      <p:sp>
-        <p:nvSpPr>
-          <p:cNvPr id="10" name="Rectangle 9">
-            <a:extLst>
-              <a:ext uri="{FF2B5EF4-FFF2-40B4-BE49-F238E27FC236}">
-                <a16:creationId xmlns:a16="http://schemas.microsoft.com/office/drawing/2014/main" id="{7AAC67C3-831B-4AB1-A259-DFB839CAFAFC}"/>
-              </a:ext>
-              <a:ext uri="{C183D7F6-B498-43B3-948B-1728B52AA6E4}">
-                <adec:decorative xmlns:adec="http://schemas.microsoft.com/office/drawing/2017/decorative" val="1"/>
-              </a:ext>
-            </a:extLst>
-          </p:cNvPr>
-          <p:cNvSpPr>
-            <a:spLocks noGrp="1" noRot="1" noChangeAspect="1" noMove="1" noResize="1" noEditPoints="1" noAdjustHandles="1" noChangeArrowheads="1" noChangeShapeType="1" noTextEdit="1"/>
-          </p:cNvSpPr>
-          <p:nvPr>
-            <p:extLst>
-              <p:ext uri="{386F3935-93C4-4BCD-93E2-E3B085C9AB24}">
-                <p16:designElem xmlns:p16="http://schemas.microsoft.com/office/powerpoint/2015/main" val="1"/>
-              </p:ext>
-            </p:extLst>
-          </p:nvPr>
-        </p:nvSpPr>
-        <p:spPr>
-          <a:xfrm>
-            <a:off x="16" y="0"/>
-            <a:ext cx="4050791" cy="6858000"/>
-          </a:xfrm>
-          <a:prstGeom prst="rect">
-            <a:avLst/>
-          </a:prstGeom>
-          <a:solidFill>
-            <a:schemeClr val="accent2"/>
-          </a:solidFill>
-          <a:ln>
-            <a:noFill/>
-          </a:ln>
-        </p:spPr>
-        <p:style>
-          <a:lnRef idx="2">
-            <a:schemeClr val="accent1">
-              <a:shade val="50000"/>
-            </a:schemeClr>
-          </a:lnRef>
-          <a:fillRef idx="1">
-            <a:schemeClr val="accent1"/>
-          </a:fillRef>
-          <a:effectRef idx="0">
-            <a:schemeClr val="accent1"/>
-          </a:effectRef>
-          <a:fontRef idx="minor">
-            <a:schemeClr val="lt1"/>
-          </a:fontRef>
-        </p:style>
-      </p:sp>
-      <p:sp>
-        <p:nvSpPr>
-          <p:cNvPr id="2" name="Title 1">
-            <a:extLst>
-              <a:ext uri="{FF2B5EF4-FFF2-40B4-BE49-F238E27FC236}">
-                <a16:creationId xmlns:a16="http://schemas.microsoft.com/office/drawing/2014/main" id="{0A5E5C2A-12AE-4F2F-83F8-338BB786D2C1}"/>
-              </a:ext>
-            </a:extLst>
-          </p:cNvPr>
-          <p:cNvSpPr>
-            <a:spLocks noGrp="1"/>
-          </p:cNvSpPr>
-          <p:nvPr>
-            <p:ph type="title"/>
-          </p:nvPr>
-        </p:nvSpPr>
-        <p:spPr>
-          <a:xfrm>
-            <a:off x="492370" y="605896"/>
-            <a:ext cx="3084844" cy="5646208"/>
-          </a:xfrm>
-        </p:spPr>
-        <p:txBody>
-          <a:bodyPr anchor="ctr">
-            <a:normAutofit/>
-          </a:bodyPr>
-          <a:lstStyle/>
-          <a:p>
-            <a:r>
-              <a:rPr lang="en-IN" sz="3600">
-                <a:solidFill>
-                  <a:srgbClr val="FFFFFF"/>
-                </a:solidFill>
-              </a:rPr>
-              <a:t>Introduction</a:t>
-            </a:r>
-          </a:p>
-        </p:txBody>
-      </p:sp>
-      <p:sp>
-        <p:nvSpPr>
-          <p:cNvPr id="12" name="Rectangle 11">
-            <a:extLst>
-              <a:ext uri="{FF2B5EF4-FFF2-40B4-BE49-F238E27FC236}">
-                <a16:creationId xmlns:a16="http://schemas.microsoft.com/office/drawing/2014/main" id="{054B3F04-9EAC-45C0-B3CE-0387EEA10A0C}"/>
-              </a:ext>
-              <a:ext uri="{C183D7F6-B498-43B3-948B-1728B52AA6E4}">
-                <adec:decorative xmlns:adec="http://schemas.microsoft.com/office/drawing/2017/decorative" val="1"/>
-              </a:ext>
-            </a:extLst>
-          </p:cNvPr>
-          <p:cNvSpPr>
-            <a:spLocks noGrp="1" noRot="1" noChangeAspect="1" noMove="1" noResize="1" noEditPoints="1" noAdjustHandles="1" noChangeArrowheads="1" noChangeShapeType="1" noTextEdit="1"/>
-          </p:cNvSpPr>
-          <p:nvPr>
-            <p:extLst>
-              <p:ext uri="{386F3935-93C4-4BCD-93E2-E3B085C9AB24}">
-                <p16:designElem xmlns:p16="http://schemas.microsoft.com/office/powerpoint/2015/main" val="1"/>
-              </p:ext>
-            </p:extLst>
-          </p:nvPr>
-        </p:nvSpPr>
-        <p:spPr>
-          <a:xfrm>
-            <a:off x="4040071" y="0"/>
-            <a:ext cx="64008" cy="6858000"/>
-          </a:xfrm>
-          <a:prstGeom prst="rect">
-            <a:avLst/>
-          </a:prstGeom>
-          <a:solidFill>
-            <a:schemeClr val="accent1"/>
-          </a:solidFill>
-          <a:ln>
-            <a:noFill/>
-          </a:ln>
-        </p:spPr>
-        <p:style>
-          <a:lnRef idx="2">
-            <a:schemeClr val="accent1">
-              <a:shade val="50000"/>
-            </a:schemeClr>
-          </a:lnRef>
-          <a:fillRef idx="1">
-            <a:schemeClr val="accent1"/>
-          </a:fillRef>
-          <a:effectRef idx="0">
-            <a:schemeClr val="accent1"/>
-          </a:effectRef>
-          <a:fontRef idx="minor">
-            <a:schemeClr val="lt1"/>
-          </a:fontRef>
-        </p:style>
-      </p:sp>
-      <p:sp>
-        <p:nvSpPr>
-          <p:cNvPr id="3" name="Content Placeholder 2">
-            <a:extLst>
-              <a:ext uri="{FF2B5EF4-FFF2-40B4-BE49-F238E27FC236}">
-                <a16:creationId xmlns:a16="http://schemas.microsoft.com/office/drawing/2014/main" id="{CE63FD34-36DF-4637-839F-A62E8F2F2E9B}"/>
-              </a:ext>
-            </a:extLst>
-          </p:cNvPr>
-          <p:cNvSpPr>
-            <a:spLocks noGrp="1"/>
-          </p:cNvSpPr>
-          <p:nvPr>
-            <p:ph idx="1"/>
-          </p:nvPr>
-        </p:nvSpPr>
-        <p:spPr>
-          <a:xfrm>
-            <a:off x="4742016" y="605896"/>
-            <a:ext cx="6413663" cy="5646208"/>
-          </a:xfrm>
-        </p:spPr>
-        <p:txBody>
-          <a:bodyPr anchor="ctr">
-            <a:normAutofit/>
-          </a:bodyPr>
-          <a:lstStyle/>
-          <a:p>
-            <a:r>
-              <a:rPr lang="en-IN" dirty="0"/>
-              <a:t>This Report is Made By:</a:t>
-            </a:r>
-          </a:p>
-          <a:p>
-            <a:pPr lvl="1"/>
-            <a:r>
-              <a:rPr lang="en-IN" dirty="0"/>
-              <a:t>Abhiroop Mukherjee 	(510519109)</a:t>
-            </a:r>
-          </a:p>
-          <a:p>
-            <a:pPr lvl="1"/>
-            <a:r>
-              <a:rPr lang="en-IN" dirty="0"/>
-              <a:t>Hritick Sharma 		(510519114)</a:t>
-            </a:r>
-          </a:p>
-          <a:p>
-            <a:pPr lvl="1"/>
-            <a:r>
-              <a:rPr lang="en-IN" dirty="0"/>
-              <a:t>Sayak Rana		(510519108)</a:t>
-            </a:r>
-          </a:p>
-          <a:p>
-            <a:pPr lvl="1"/>
-            <a:endParaRPr lang="en-IN" dirty="0"/>
-          </a:p>
-          <a:p>
-            <a:pPr marL="201168" lvl="1" indent="0">
-              <a:buNone/>
-            </a:pPr>
-            <a:r>
-              <a:rPr lang="en-IN" dirty="0"/>
-              <a:t>The Source codes for all the Assignments can be found here</a:t>
-            </a:r>
-            <a:r>
-              <a:rPr lang="en-IN"/>
-              <a:t>: </a:t>
-            </a:r>
-            <a:r>
-              <a:rPr lang="en-IN">
-                <a:hlinkClick r:id="rId2"/>
-              </a:rPr>
-              <a:t>https://github.com/Abhiroop25902/CS-2271-Algo-Lab</a:t>
-            </a:r>
-            <a:endParaRPr lang="en-IN" dirty="0"/>
-          </a:p>
-        </p:txBody>
-      </p:sp>
-    </p:spTree>
-    <p:extLst>
-      <p:ext uri="{BB962C8B-B14F-4D97-AF65-F5344CB8AC3E}">
-        <p14:creationId xmlns:p14="http://schemas.microsoft.com/office/powerpoint/2010/main" val="2033051608"/>
-      </p:ext>
-    </p:extLst>
-  </p:cSld>
-  <p:clrMapOvr>
-    <a:masterClrMapping/>
-  </p:clrMapOvr>
-</p:sld>
-</file>
-
-<file path=ppt/slides/slide20.xml><?xml version="1.0" encoding="utf-8"?>
+<file path=ppt/slides/slide22.xml><?xml version="1.0" encoding="utf-8"?>
 <p:sld xmlns:a="http://schemas.openxmlformats.org/drawingml/2006/main" xmlns:r="http://schemas.openxmlformats.org/officeDocument/2006/relationships" xmlns:p="http://schemas.openxmlformats.org/presentationml/2006/main">
   <p:cSld>
     <p:bg>
@@ -22654,7 +23723,7 @@
 </p:sld>
 </file>
 
-<file path=ppt/slides/slide21.xml><?xml version="1.0" encoding="utf-8"?>
+<file path=ppt/slides/slide23.xml><?xml version="1.0" encoding="utf-8"?>
 <p:sld xmlns:a="http://schemas.openxmlformats.org/drawingml/2006/main" xmlns:r="http://schemas.openxmlformats.org/officeDocument/2006/relationships" xmlns:p="http://schemas.openxmlformats.org/presentationml/2006/main">
   <p:cSld>
     <p:bg>
@@ -23104,7 +24173,7 @@
 </p:sld>
 </file>
 
-<file path=ppt/slides/slide22.xml><?xml version="1.0" encoding="utf-8"?>
+<file path=ppt/slides/slide24.xml><?xml version="1.0" encoding="utf-8"?>
 <p:sld xmlns:a="http://schemas.openxmlformats.org/drawingml/2006/main" xmlns:r="http://schemas.openxmlformats.org/officeDocument/2006/relationships" xmlns:p="http://schemas.openxmlformats.org/presentationml/2006/main">
   <p:cSld>
     <p:bg>
@@ -23559,7 +24628,7 @@
 </p:sld>
 </file>
 
-<file path=ppt/slides/slide23.xml><?xml version="1.0" encoding="utf-8"?>
+<file path=ppt/slides/slide25.xml><?xml version="1.0" encoding="utf-8"?>
 <p:sld xmlns:a="http://schemas.openxmlformats.org/drawingml/2006/main" xmlns:r="http://schemas.openxmlformats.org/officeDocument/2006/relationships" xmlns:p="http://schemas.openxmlformats.org/presentationml/2006/main">
   <p:cSld>
     <p:bg>
@@ -23974,7 +25043,7 @@
 </p:sld>
 </file>
 
-<file path=ppt/slides/slide24.xml><?xml version="1.0" encoding="utf-8"?>
+<file path=ppt/slides/slide26.xml><?xml version="1.0" encoding="utf-8"?>
 <p:sld xmlns:a="http://schemas.openxmlformats.org/drawingml/2006/main" xmlns:r="http://schemas.openxmlformats.org/officeDocument/2006/relationships" xmlns:p="http://schemas.openxmlformats.org/presentationml/2006/main">
   <p:cSld>
     <p:bg>
@@ -24611,7 +25680,7 @@
 </p:sld>
 </file>
 
-<file path=ppt/slides/slide25.xml><?xml version="1.0" encoding="utf-8"?>
+<file path=ppt/slides/slide27.xml><?xml version="1.0" encoding="utf-8"?>
 <p:sld xmlns:a="http://schemas.openxmlformats.org/drawingml/2006/main" xmlns:r="http://schemas.openxmlformats.org/officeDocument/2006/relationships" xmlns:p="http://schemas.openxmlformats.org/presentationml/2006/main">
   <p:cSld>
     <p:bg>
@@ -25082,7 +26151,7 @@
 </p:sld>
 </file>
 
-<file path=ppt/slides/slide26.xml><?xml version="1.0" encoding="utf-8"?>
+<file path=ppt/slides/slide28.xml><?xml version="1.0" encoding="utf-8"?>
 <p:sld xmlns:a="http://schemas.openxmlformats.org/drawingml/2006/main" xmlns:r="http://schemas.openxmlformats.org/officeDocument/2006/relationships" xmlns:p="http://schemas.openxmlformats.org/presentationml/2006/main">
   <p:cSld>
     <p:bg>
@@ -25546,7 +26615,7 @@
 </p:sld>
 </file>
 
-<file path=ppt/slides/slide27.xml><?xml version="1.0" encoding="utf-8"?>
+<file path=ppt/slides/slide29.xml><?xml version="1.0" encoding="utf-8"?>
 <p:sld xmlns:a="http://schemas.openxmlformats.org/drawingml/2006/main" xmlns:r="http://schemas.openxmlformats.org/officeDocument/2006/relationships" xmlns:p="http://schemas.openxmlformats.org/presentationml/2006/main">
   <p:cSld>
     <p:bg>
@@ -25949,765 +27018,6 @@
     <p:extLst>
       <p:ext uri="{BB962C8B-B14F-4D97-AF65-F5344CB8AC3E}">
         <p14:creationId xmlns:p14="http://schemas.microsoft.com/office/powerpoint/2010/main" val="699669138"/>
-      </p:ext>
-    </p:extLst>
-  </p:cSld>
-  <p:clrMapOvr>
-    <a:masterClrMapping/>
-  </p:clrMapOvr>
-</p:sld>
-</file>
-
-<file path=ppt/slides/slide28.xml><?xml version="1.0" encoding="utf-8"?>
-<p:sld xmlns:a="http://schemas.openxmlformats.org/drawingml/2006/main" xmlns:r="http://schemas.openxmlformats.org/officeDocument/2006/relationships" xmlns:p="http://schemas.openxmlformats.org/presentationml/2006/main">
-  <p:cSld>
-    <p:bg>
-      <p:bgPr>
-        <a:solidFill>
-          <a:schemeClr val="bg1"/>
-        </a:solidFill>
-        <a:effectLst/>
-      </p:bgPr>
-    </p:bg>
-    <p:spTree>
-      <p:nvGrpSpPr>
-        <p:cNvPr id="1" name=""/>
-        <p:cNvGrpSpPr/>
-        <p:nvPr/>
-      </p:nvGrpSpPr>
-      <p:grpSpPr>
-        <a:xfrm>
-          <a:off x="0" y="0"/>
-          <a:ext cx="0" cy="0"/>
-          <a:chOff x="0" y="0"/>
-          <a:chExt cx="0" cy="0"/>
-        </a:xfrm>
-      </p:grpSpPr>
-      <p:sp useBgFill="1">
-        <p:nvSpPr>
-          <p:cNvPr id="50" name="Rectangle 49">
-            <a:extLst>
-              <a:ext uri="{FF2B5EF4-FFF2-40B4-BE49-F238E27FC236}">
-                <a16:creationId xmlns:a16="http://schemas.microsoft.com/office/drawing/2014/main" id="{284B70D5-875B-433D-BDBD-1522A85D6C1D}"/>
-              </a:ext>
-              <a:ext uri="{C183D7F6-B498-43B3-948B-1728B52AA6E4}">
-                <adec:decorative xmlns:adec="http://schemas.microsoft.com/office/drawing/2017/decorative" val="1"/>
-              </a:ext>
-            </a:extLst>
-          </p:cNvPr>
-          <p:cNvSpPr>
-            <a:spLocks noGrp="1" noRot="1" noChangeAspect="1" noMove="1" noResize="1" noEditPoints="1" noAdjustHandles="1" noChangeArrowheads="1" noChangeShapeType="1" noTextEdit="1"/>
-          </p:cNvSpPr>
-          <p:nvPr>
-            <p:extLst>
-              <p:ext uri="{386F3935-93C4-4BCD-93E2-E3B085C9AB24}">
-                <p16:designElem xmlns:p16="http://schemas.microsoft.com/office/powerpoint/2015/main" val="1"/>
-              </p:ext>
-            </p:extLst>
-          </p:nvPr>
-        </p:nvSpPr>
-        <p:spPr>
-          <a:xfrm>
-            <a:off x="0" y="0"/>
-            <a:ext cx="12192001" cy="6334316"/>
-          </a:xfrm>
-          <a:prstGeom prst="rect">
-            <a:avLst/>
-          </a:prstGeom>
-          <a:ln>
-            <a:noFill/>
-          </a:ln>
-        </p:spPr>
-        <p:style>
-          <a:lnRef idx="2">
-            <a:schemeClr val="accent1">
-              <a:shade val="50000"/>
-            </a:schemeClr>
-          </a:lnRef>
-          <a:fillRef idx="1">
-            <a:schemeClr val="accent1"/>
-          </a:fillRef>
-          <a:effectRef idx="0">
-            <a:schemeClr val="accent1"/>
-          </a:effectRef>
-          <a:fontRef idx="minor">
-            <a:schemeClr val="lt1"/>
-          </a:fontRef>
-        </p:style>
-        <p:txBody>
-          <a:bodyPr rtlCol="0" anchor="ctr"/>
-          <a:lstStyle/>
-          <a:p>
-            <a:pPr algn="ctr"/>
-            <a:endParaRPr lang="en-US" dirty="0"/>
-          </a:p>
-        </p:txBody>
-      </p:sp>
-      <p:sp>
-        <p:nvSpPr>
-          <p:cNvPr id="2" name="Title 1">
-            <a:extLst>
-              <a:ext uri="{FF2B5EF4-FFF2-40B4-BE49-F238E27FC236}">
-                <a16:creationId xmlns:a16="http://schemas.microsoft.com/office/drawing/2014/main" id="{6601A21F-EC20-448F-BB0A-CBF3B5067773}"/>
-              </a:ext>
-            </a:extLst>
-          </p:cNvPr>
-          <p:cNvSpPr>
-            <a:spLocks noGrp="1"/>
-          </p:cNvSpPr>
-          <p:nvPr>
-            <p:ph type="title"/>
-          </p:nvPr>
-        </p:nvSpPr>
-        <p:spPr>
-          <a:xfrm>
-            <a:off x="7859485" y="634946"/>
-            <a:ext cx="3690257" cy="1450757"/>
-          </a:xfrm>
-        </p:spPr>
-        <p:txBody>
-          <a:bodyPr vert="horz" lIns="91440" tIns="45720" rIns="91440" bIns="45720" rtlCol="0">
-            <a:normAutofit/>
-          </a:bodyPr>
-          <a:lstStyle/>
-          <a:p>
-            <a:r>
-              <a:rPr lang="en-US" sz="4400" b="1" dirty="0"/>
-              <a:t>Histogram for Normal Dataset</a:t>
-            </a:r>
-          </a:p>
-        </p:txBody>
-      </p:sp>
-      <p:pic>
-        <p:nvPicPr>
-          <p:cNvPr id="5" name="Content Placeholder 4">
-            <a:extLst>
-              <a:ext uri="{FF2B5EF4-FFF2-40B4-BE49-F238E27FC236}">
-                <a16:creationId xmlns:a16="http://schemas.microsoft.com/office/drawing/2014/main" id="{62BA1612-2B79-4CA5-A537-9B08501E3E45}"/>
-              </a:ext>
-            </a:extLst>
-          </p:cNvPr>
-          <p:cNvPicPr>
-            <a:picLocks noChangeAspect="1"/>
-          </p:cNvPicPr>
-          <p:nvPr/>
-        </p:nvPicPr>
-        <p:blipFill>
-          <a:blip r:embed="rId2">
-            <a:extLst>
-              <a:ext uri="{28A0092B-C50C-407E-A947-70E740481C1C}">
-                <a14:useLocalDpi xmlns:a14="http://schemas.microsoft.com/office/drawing/2010/main" val="0"/>
-              </a:ext>
-            </a:extLst>
-          </a:blip>
-          <a:stretch>
-            <a:fillRect/>
-          </a:stretch>
-        </p:blipFill>
-        <p:spPr>
-          <a:xfrm>
-            <a:off x="633999" y="1224344"/>
-            <a:ext cx="6909801" cy="4145880"/>
-          </a:xfrm>
-          <a:prstGeom prst="rect">
-            <a:avLst/>
-          </a:prstGeom>
-        </p:spPr>
-      </p:pic>
-      <p:cxnSp>
-        <p:nvCxnSpPr>
-          <p:cNvPr id="52" name="Straight Connector 51">
-            <a:extLst>
-              <a:ext uri="{FF2B5EF4-FFF2-40B4-BE49-F238E27FC236}">
-                <a16:creationId xmlns:a16="http://schemas.microsoft.com/office/drawing/2014/main" id="{C947DF4A-614C-4B4C-8B80-E5B9D8E8CFED}"/>
-              </a:ext>
-              <a:ext uri="{C183D7F6-B498-43B3-948B-1728B52AA6E4}">
-                <adec:decorative xmlns:adec="http://schemas.microsoft.com/office/drawing/2017/decorative" val="1"/>
-              </a:ext>
-            </a:extLst>
-          </p:cNvPr>
-          <p:cNvCxnSpPr>
-            <a:cxnSpLocks noGrp="1" noRot="1" noChangeAspect="1" noMove="1" noResize="1" noEditPoints="1" noAdjustHandles="1" noChangeArrowheads="1" noChangeShapeType="1"/>
-          </p:cNvCxnSpPr>
-          <p:nvPr>
-            <p:extLst>
-              <p:ext uri="{386F3935-93C4-4BCD-93E2-E3B085C9AB24}">
-                <p16:designElem xmlns:p16="http://schemas.microsoft.com/office/powerpoint/2015/main" val="1"/>
-              </p:ext>
-            </p:extLst>
-          </p:nvPr>
-        </p:nvCxnSpPr>
-        <p:spPr>
-          <a:xfrm>
-            <a:off x="7892143" y="2085703"/>
-            <a:ext cx="3566160" cy="0"/>
-          </a:xfrm>
-          <a:prstGeom prst="line">
-            <a:avLst/>
-          </a:prstGeom>
-          <a:ln w="6350">
-            <a:solidFill>
-              <a:schemeClr val="tx1">
-                <a:lumMod val="50000"/>
-                <a:lumOff val="50000"/>
-                <a:alpha val="90000"/>
-              </a:schemeClr>
-            </a:solidFill>
-          </a:ln>
-        </p:spPr>
-        <p:style>
-          <a:lnRef idx="1">
-            <a:schemeClr val="accent1"/>
-          </a:lnRef>
-          <a:fillRef idx="0">
-            <a:schemeClr val="accent1"/>
-          </a:fillRef>
-          <a:effectRef idx="0">
-            <a:schemeClr val="accent1"/>
-          </a:effectRef>
-          <a:fontRef idx="minor">
-            <a:schemeClr val="tx1"/>
-          </a:fontRef>
-        </p:style>
-      </p:cxnSp>
-      <p:sp>
-        <p:nvSpPr>
-          <p:cNvPr id="38" name="Content Placeholder 37">
-            <a:extLst>
-              <a:ext uri="{FF2B5EF4-FFF2-40B4-BE49-F238E27FC236}">
-                <a16:creationId xmlns:a16="http://schemas.microsoft.com/office/drawing/2014/main" id="{8459FDD1-3BEF-4EF5-80CC-3D5238454933}"/>
-              </a:ext>
-            </a:extLst>
-          </p:cNvPr>
-          <p:cNvSpPr>
-            <a:spLocks noGrp="1"/>
-          </p:cNvSpPr>
-          <p:nvPr>
-            <p:ph idx="1"/>
-          </p:nvPr>
-        </p:nvSpPr>
-        <p:spPr>
-          <a:xfrm>
-            <a:off x="7859485" y="2198914"/>
-            <a:ext cx="3690257" cy="3670180"/>
-          </a:xfrm>
-        </p:spPr>
-        <p:txBody>
-          <a:bodyPr>
-            <a:normAutofit/>
-          </a:bodyPr>
-          <a:lstStyle/>
-          <a:p>
-            <a:pPr lvl="1"/>
-            <a:r>
-              <a:rPr lang="en-US" dirty="0"/>
-              <a:t>As Expected, the histogram has the “bell” curve and max value of the dataset goes to 1.</a:t>
-            </a:r>
-          </a:p>
-          <a:p>
-            <a:pPr lvl="1"/>
-            <a:r>
-              <a:rPr lang="en-US" dirty="0"/>
-              <a:t>Hence, our conversion was successful</a:t>
-            </a:r>
-          </a:p>
-        </p:txBody>
-      </p:sp>
-      <p:sp>
-        <p:nvSpPr>
-          <p:cNvPr id="54" name="Rectangle 53">
-            <a:extLst>
-              <a:ext uri="{FF2B5EF4-FFF2-40B4-BE49-F238E27FC236}">
-                <a16:creationId xmlns:a16="http://schemas.microsoft.com/office/drawing/2014/main" id="{1E299956-A9E7-4FC1-A0B1-D590CA9730E8}"/>
-              </a:ext>
-              <a:ext uri="{C183D7F6-B498-43B3-948B-1728B52AA6E4}">
-                <adec:decorative xmlns:adec="http://schemas.microsoft.com/office/drawing/2017/decorative" val="1"/>
-              </a:ext>
-            </a:extLst>
-          </p:cNvPr>
-          <p:cNvSpPr>
-            <a:spLocks noGrp="1" noRot="1" noChangeAspect="1" noMove="1" noResize="1" noEditPoints="1" noAdjustHandles="1" noChangeArrowheads="1" noChangeShapeType="1" noTextEdit="1"/>
-          </p:cNvSpPr>
-          <p:nvPr>
-            <p:extLst>
-              <p:ext uri="{386F3935-93C4-4BCD-93E2-E3B085C9AB24}">
-                <p16:designElem xmlns:p16="http://schemas.microsoft.com/office/powerpoint/2015/main" val="1"/>
-              </p:ext>
-            </p:extLst>
-          </p:nvPr>
-        </p:nvSpPr>
-        <p:spPr>
-          <a:xfrm>
-            <a:off x="15" y="6334316"/>
-            <a:ext cx="12191985" cy="66484"/>
-          </a:xfrm>
-          <a:prstGeom prst="rect">
-            <a:avLst/>
-          </a:prstGeom>
-          <a:solidFill>
-            <a:schemeClr val="accent1"/>
-          </a:solidFill>
-          <a:ln>
-            <a:noFill/>
-          </a:ln>
-        </p:spPr>
-        <p:style>
-          <a:lnRef idx="2">
-            <a:schemeClr val="accent1">
-              <a:shade val="50000"/>
-            </a:schemeClr>
-          </a:lnRef>
-          <a:fillRef idx="1">
-            <a:schemeClr val="accent1"/>
-          </a:fillRef>
-          <a:effectRef idx="0">
-            <a:schemeClr val="accent1"/>
-          </a:effectRef>
-          <a:fontRef idx="minor">
-            <a:schemeClr val="lt1"/>
-          </a:fontRef>
-        </p:style>
-      </p:sp>
-      <p:sp>
-        <p:nvSpPr>
-          <p:cNvPr id="56" name="Rectangle 55">
-            <a:extLst>
-              <a:ext uri="{FF2B5EF4-FFF2-40B4-BE49-F238E27FC236}">
-                <a16:creationId xmlns:a16="http://schemas.microsoft.com/office/drawing/2014/main" id="{17FC539C-B783-4B03-9F9E-D13430F3F64F}"/>
-              </a:ext>
-              <a:ext uri="{C183D7F6-B498-43B3-948B-1728B52AA6E4}">
-                <adec:decorative xmlns:adec="http://schemas.microsoft.com/office/drawing/2017/decorative" val="1"/>
-              </a:ext>
-            </a:extLst>
-          </p:cNvPr>
-          <p:cNvSpPr>
-            <a:spLocks noGrp="1" noRot="1" noChangeAspect="1" noMove="1" noResize="1" noEditPoints="1" noAdjustHandles="1" noChangeArrowheads="1" noChangeShapeType="1" noTextEdit="1"/>
-          </p:cNvSpPr>
-          <p:nvPr>
-            <p:extLst>
-              <p:ext uri="{386F3935-93C4-4BCD-93E2-E3B085C9AB24}">
-                <p16:designElem xmlns:p16="http://schemas.microsoft.com/office/powerpoint/2015/main" val="1"/>
-              </p:ext>
-            </p:extLst>
-          </p:nvPr>
-        </p:nvSpPr>
-        <p:spPr>
-          <a:xfrm>
-            <a:off x="1" y="6400800"/>
-            <a:ext cx="12192000" cy="457200"/>
-          </a:xfrm>
-          <a:prstGeom prst="rect">
-            <a:avLst/>
-          </a:prstGeom>
-          <a:solidFill>
-            <a:schemeClr val="accent2"/>
-          </a:solidFill>
-          <a:ln>
-            <a:noFill/>
-          </a:ln>
-        </p:spPr>
-        <p:style>
-          <a:lnRef idx="2">
-            <a:schemeClr val="accent1">
-              <a:shade val="50000"/>
-            </a:schemeClr>
-          </a:lnRef>
-          <a:fillRef idx="1">
-            <a:schemeClr val="accent1"/>
-          </a:fillRef>
-          <a:effectRef idx="0">
-            <a:schemeClr val="accent1"/>
-          </a:effectRef>
-          <a:fontRef idx="minor">
-            <a:schemeClr val="lt1"/>
-          </a:fontRef>
-        </p:style>
-      </p:sp>
-    </p:spTree>
-    <p:extLst>
-      <p:ext uri="{BB962C8B-B14F-4D97-AF65-F5344CB8AC3E}">
-        <p14:creationId xmlns:p14="http://schemas.microsoft.com/office/powerpoint/2010/main" val="3232898989"/>
-      </p:ext>
-    </p:extLst>
-  </p:cSld>
-  <p:clrMapOvr>
-    <a:masterClrMapping/>
-  </p:clrMapOvr>
-</p:sld>
-</file>
-
-<file path=ppt/slides/slide29.xml><?xml version="1.0" encoding="utf-8"?>
-<p:sld xmlns:a="http://schemas.openxmlformats.org/drawingml/2006/main" xmlns:r="http://schemas.openxmlformats.org/officeDocument/2006/relationships" xmlns:p="http://schemas.openxmlformats.org/presentationml/2006/main">
-  <p:cSld>
-    <p:bg>
-      <p:bgPr>
-        <a:solidFill>
-          <a:schemeClr val="bg1"/>
-        </a:solidFill>
-        <a:effectLst/>
-      </p:bgPr>
-    </p:bg>
-    <p:spTree>
-      <p:nvGrpSpPr>
-        <p:cNvPr id="1" name=""/>
-        <p:cNvGrpSpPr/>
-        <p:nvPr/>
-      </p:nvGrpSpPr>
-      <p:grpSpPr>
-        <a:xfrm>
-          <a:off x="0" y="0"/>
-          <a:ext cx="0" cy="0"/>
-          <a:chOff x="0" y="0"/>
-          <a:chExt cx="0" cy="0"/>
-        </a:xfrm>
-      </p:grpSpPr>
-      <p:sp useBgFill="1">
-        <p:nvSpPr>
-          <p:cNvPr id="29" name="Rectangle 28">
-            <a:extLst>
-              <a:ext uri="{FF2B5EF4-FFF2-40B4-BE49-F238E27FC236}">
-                <a16:creationId xmlns:a16="http://schemas.microsoft.com/office/drawing/2014/main" id="{284B70D5-875B-433D-BDBD-1522A85D6C1D}"/>
-              </a:ext>
-              <a:ext uri="{C183D7F6-B498-43B3-948B-1728B52AA6E4}">
-                <adec:decorative xmlns:adec="http://schemas.microsoft.com/office/drawing/2017/decorative" val="1"/>
-              </a:ext>
-            </a:extLst>
-          </p:cNvPr>
-          <p:cNvSpPr>
-            <a:spLocks noGrp="1" noRot="1" noChangeAspect="1" noMove="1" noResize="1" noEditPoints="1" noAdjustHandles="1" noChangeArrowheads="1" noChangeShapeType="1" noTextEdit="1"/>
-          </p:cNvSpPr>
-          <p:nvPr>
-            <p:extLst>
-              <p:ext uri="{386F3935-93C4-4BCD-93E2-E3B085C9AB24}">
-                <p16:designElem xmlns:p16="http://schemas.microsoft.com/office/powerpoint/2015/main" val="1"/>
-              </p:ext>
-            </p:extLst>
-          </p:nvPr>
-        </p:nvSpPr>
-        <p:spPr>
-          <a:xfrm>
-            <a:off x="0" y="0"/>
-            <a:ext cx="12192001" cy="6334316"/>
-          </a:xfrm>
-          <a:prstGeom prst="rect">
-            <a:avLst/>
-          </a:prstGeom>
-          <a:ln>
-            <a:noFill/>
-          </a:ln>
-        </p:spPr>
-        <p:style>
-          <a:lnRef idx="2">
-            <a:schemeClr val="accent1">
-              <a:shade val="50000"/>
-            </a:schemeClr>
-          </a:lnRef>
-          <a:fillRef idx="1">
-            <a:schemeClr val="accent1"/>
-          </a:fillRef>
-          <a:effectRef idx="0">
-            <a:schemeClr val="accent1"/>
-          </a:effectRef>
-          <a:fontRef idx="minor">
-            <a:schemeClr val="lt1"/>
-          </a:fontRef>
-        </p:style>
-        <p:txBody>
-          <a:bodyPr rtlCol="0" anchor="ctr"/>
-          <a:lstStyle/>
-          <a:p>
-            <a:pPr algn="ctr"/>
-            <a:endParaRPr lang="en-US" dirty="0"/>
-          </a:p>
-        </p:txBody>
-      </p:sp>
-      <p:sp>
-        <p:nvSpPr>
-          <p:cNvPr id="2" name="Title 1">
-            <a:extLst>
-              <a:ext uri="{FF2B5EF4-FFF2-40B4-BE49-F238E27FC236}">
-                <a16:creationId xmlns:a16="http://schemas.microsoft.com/office/drawing/2014/main" id="{599A5827-52EB-4503-B93E-93FDF28C294E}"/>
-              </a:ext>
-            </a:extLst>
-          </p:cNvPr>
-          <p:cNvSpPr>
-            <a:spLocks noGrp="1"/>
-          </p:cNvSpPr>
-          <p:nvPr>
-            <p:ph type="title"/>
-          </p:nvPr>
-        </p:nvSpPr>
-        <p:spPr>
-          <a:xfrm>
-            <a:off x="7859485" y="634946"/>
-            <a:ext cx="3690257" cy="1450757"/>
-          </a:xfrm>
-        </p:spPr>
-        <p:txBody>
-          <a:bodyPr vert="horz" lIns="91440" tIns="45720" rIns="91440" bIns="45720" rtlCol="0">
-            <a:normAutofit/>
-          </a:bodyPr>
-          <a:lstStyle/>
-          <a:p>
-            <a:r>
-              <a:rPr lang="en-US" sz="4100" b="1" dirty="0"/>
-              <a:t>Histogram for Uniform Dataset</a:t>
-            </a:r>
-          </a:p>
-        </p:txBody>
-      </p:sp>
-      <p:pic>
-        <p:nvPicPr>
-          <p:cNvPr id="5" name="Content Placeholder 4">
-            <a:extLst>
-              <a:ext uri="{FF2B5EF4-FFF2-40B4-BE49-F238E27FC236}">
-                <a16:creationId xmlns:a16="http://schemas.microsoft.com/office/drawing/2014/main" id="{4C497ACA-DC67-4A9F-A0B8-459EE13FC699}"/>
-              </a:ext>
-            </a:extLst>
-          </p:cNvPr>
-          <p:cNvPicPr>
-            <a:picLocks noChangeAspect="1"/>
-          </p:cNvPicPr>
-          <p:nvPr/>
-        </p:nvPicPr>
-        <p:blipFill>
-          <a:blip r:embed="rId2">
-            <a:extLst>
-              <a:ext uri="{28A0092B-C50C-407E-A947-70E740481C1C}">
-                <a14:useLocalDpi xmlns:a14="http://schemas.microsoft.com/office/drawing/2010/main" val="0"/>
-              </a:ext>
-            </a:extLst>
-          </a:blip>
-          <a:stretch>
-            <a:fillRect/>
-          </a:stretch>
-        </p:blipFill>
-        <p:spPr>
-          <a:xfrm>
-            <a:off x="633999" y="1224344"/>
-            <a:ext cx="6909801" cy="4145880"/>
-          </a:xfrm>
-          <a:prstGeom prst="rect">
-            <a:avLst/>
-          </a:prstGeom>
-        </p:spPr>
-      </p:pic>
-      <p:cxnSp>
-        <p:nvCxnSpPr>
-          <p:cNvPr id="31" name="Straight Connector 30">
-            <a:extLst>
-              <a:ext uri="{FF2B5EF4-FFF2-40B4-BE49-F238E27FC236}">
-                <a16:creationId xmlns:a16="http://schemas.microsoft.com/office/drawing/2014/main" id="{C947DF4A-614C-4B4C-8B80-E5B9D8E8CFED}"/>
-              </a:ext>
-              <a:ext uri="{C183D7F6-B498-43B3-948B-1728B52AA6E4}">
-                <adec:decorative xmlns:adec="http://schemas.microsoft.com/office/drawing/2017/decorative" val="1"/>
-              </a:ext>
-            </a:extLst>
-          </p:cNvPr>
-          <p:cNvCxnSpPr>
-            <a:cxnSpLocks noGrp="1" noRot="1" noChangeAspect="1" noMove="1" noResize="1" noEditPoints="1" noAdjustHandles="1" noChangeArrowheads="1" noChangeShapeType="1"/>
-          </p:cNvCxnSpPr>
-          <p:nvPr>
-            <p:extLst>
-              <p:ext uri="{386F3935-93C4-4BCD-93E2-E3B085C9AB24}">
-                <p16:designElem xmlns:p16="http://schemas.microsoft.com/office/powerpoint/2015/main" val="1"/>
-              </p:ext>
-            </p:extLst>
-          </p:nvPr>
-        </p:nvCxnSpPr>
-        <p:spPr>
-          <a:xfrm>
-            <a:off x="7892143" y="2085703"/>
-            <a:ext cx="3566160" cy="0"/>
-          </a:xfrm>
-          <a:prstGeom prst="line">
-            <a:avLst/>
-          </a:prstGeom>
-          <a:ln w="6350">
-            <a:solidFill>
-              <a:schemeClr val="tx1">
-                <a:lumMod val="50000"/>
-                <a:lumOff val="50000"/>
-                <a:alpha val="90000"/>
-              </a:schemeClr>
-            </a:solidFill>
-          </a:ln>
-        </p:spPr>
-        <p:style>
-          <a:lnRef idx="1">
-            <a:schemeClr val="accent1"/>
-          </a:lnRef>
-          <a:fillRef idx="0">
-            <a:schemeClr val="accent1"/>
-          </a:fillRef>
-          <a:effectRef idx="0">
-            <a:schemeClr val="accent1"/>
-          </a:effectRef>
-          <a:fontRef idx="minor">
-            <a:schemeClr val="tx1"/>
-          </a:fontRef>
-        </p:style>
-      </p:cxnSp>
-      <p:sp>
-        <p:nvSpPr>
-          <p:cNvPr id="26" name="Content Placeholder 25">
-            <a:extLst>
-              <a:ext uri="{FF2B5EF4-FFF2-40B4-BE49-F238E27FC236}">
-                <a16:creationId xmlns:a16="http://schemas.microsoft.com/office/drawing/2014/main" id="{EB8091F3-6CBE-47DB-8651-DD9C298B089F}"/>
-              </a:ext>
-            </a:extLst>
-          </p:cNvPr>
-          <p:cNvSpPr>
-            <a:spLocks noGrp="1"/>
-          </p:cNvSpPr>
-          <p:nvPr>
-            <p:ph idx="1"/>
-          </p:nvPr>
-        </p:nvSpPr>
-        <p:spPr>
-          <a:xfrm>
-            <a:off x="7859485" y="2198914"/>
-            <a:ext cx="3690257" cy="3670180"/>
-          </a:xfrm>
-        </p:spPr>
-        <p:txBody>
-          <a:bodyPr>
-            <a:normAutofit/>
-          </a:bodyPr>
-          <a:lstStyle/>
-          <a:p>
-            <a:pPr lvl="1"/>
-            <a:r>
-              <a:rPr lang="en-US" dirty="0"/>
-              <a:t>As Expected, the histogram has the same number of occurrences for every numbers range and max value of the dataset goes to 1.</a:t>
-            </a:r>
-          </a:p>
-          <a:p>
-            <a:pPr lvl="1"/>
-            <a:r>
-              <a:rPr lang="en-US" dirty="0"/>
-              <a:t>Hence, our conversion was successful</a:t>
-            </a:r>
-          </a:p>
-          <a:p>
-            <a:endParaRPr lang="en-US" dirty="0"/>
-          </a:p>
-        </p:txBody>
-      </p:sp>
-      <p:sp>
-        <p:nvSpPr>
-          <p:cNvPr id="33" name="Rectangle 32">
-            <a:extLst>
-              <a:ext uri="{FF2B5EF4-FFF2-40B4-BE49-F238E27FC236}">
-                <a16:creationId xmlns:a16="http://schemas.microsoft.com/office/drawing/2014/main" id="{1E299956-A9E7-4FC1-A0B1-D590CA9730E8}"/>
-              </a:ext>
-              <a:ext uri="{C183D7F6-B498-43B3-948B-1728B52AA6E4}">
-                <adec:decorative xmlns:adec="http://schemas.microsoft.com/office/drawing/2017/decorative" val="1"/>
-              </a:ext>
-            </a:extLst>
-          </p:cNvPr>
-          <p:cNvSpPr>
-            <a:spLocks noGrp="1" noRot="1" noChangeAspect="1" noMove="1" noResize="1" noEditPoints="1" noAdjustHandles="1" noChangeArrowheads="1" noChangeShapeType="1" noTextEdit="1"/>
-          </p:cNvSpPr>
-          <p:nvPr>
-            <p:extLst>
-              <p:ext uri="{386F3935-93C4-4BCD-93E2-E3B085C9AB24}">
-                <p16:designElem xmlns:p16="http://schemas.microsoft.com/office/powerpoint/2015/main" val="1"/>
-              </p:ext>
-            </p:extLst>
-          </p:nvPr>
-        </p:nvSpPr>
-        <p:spPr>
-          <a:xfrm>
-            <a:off x="15" y="6334316"/>
-            <a:ext cx="12191985" cy="66484"/>
-          </a:xfrm>
-          <a:prstGeom prst="rect">
-            <a:avLst/>
-          </a:prstGeom>
-          <a:solidFill>
-            <a:schemeClr val="accent1"/>
-          </a:solidFill>
-          <a:ln>
-            <a:noFill/>
-          </a:ln>
-        </p:spPr>
-        <p:style>
-          <a:lnRef idx="2">
-            <a:schemeClr val="accent1">
-              <a:shade val="50000"/>
-            </a:schemeClr>
-          </a:lnRef>
-          <a:fillRef idx="1">
-            <a:schemeClr val="accent1"/>
-          </a:fillRef>
-          <a:effectRef idx="0">
-            <a:schemeClr val="accent1"/>
-          </a:effectRef>
-          <a:fontRef idx="minor">
-            <a:schemeClr val="lt1"/>
-          </a:fontRef>
-        </p:style>
-      </p:sp>
-      <p:sp>
-        <p:nvSpPr>
-          <p:cNvPr id="35" name="Rectangle 34">
-            <a:extLst>
-              <a:ext uri="{FF2B5EF4-FFF2-40B4-BE49-F238E27FC236}">
-                <a16:creationId xmlns:a16="http://schemas.microsoft.com/office/drawing/2014/main" id="{17FC539C-B783-4B03-9F9E-D13430F3F64F}"/>
-              </a:ext>
-              <a:ext uri="{C183D7F6-B498-43B3-948B-1728B52AA6E4}">
-                <adec:decorative xmlns:adec="http://schemas.microsoft.com/office/drawing/2017/decorative" val="1"/>
-              </a:ext>
-            </a:extLst>
-          </p:cNvPr>
-          <p:cNvSpPr>
-            <a:spLocks noGrp="1" noRot="1" noChangeAspect="1" noMove="1" noResize="1" noEditPoints="1" noAdjustHandles="1" noChangeArrowheads="1" noChangeShapeType="1" noTextEdit="1"/>
-          </p:cNvSpPr>
-          <p:nvPr>
-            <p:extLst>
-              <p:ext uri="{386F3935-93C4-4BCD-93E2-E3B085C9AB24}">
-                <p16:designElem xmlns:p16="http://schemas.microsoft.com/office/powerpoint/2015/main" val="1"/>
-              </p:ext>
-            </p:extLst>
-          </p:nvPr>
-        </p:nvSpPr>
-        <p:spPr>
-          <a:xfrm>
-            <a:off x="1" y="6400800"/>
-            <a:ext cx="12192000" cy="457200"/>
-          </a:xfrm>
-          <a:prstGeom prst="rect">
-            <a:avLst/>
-          </a:prstGeom>
-          <a:solidFill>
-            <a:schemeClr val="accent2"/>
-          </a:solidFill>
-          <a:ln>
-            <a:noFill/>
-          </a:ln>
-        </p:spPr>
-        <p:style>
-          <a:lnRef idx="2">
-            <a:schemeClr val="accent1">
-              <a:shade val="50000"/>
-            </a:schemeClr>
-          </a:lnRef>
-          <a:fillRef idx="1">
-            <a:schemeClr val="accent1"/>
-          </a:fillRef>
-          <a:effectRef idx="0">
-            <a:schemeClr val="accent1"/>
-          </a:effectRef>
-          <a:fontRef idx="minor">
-            <a:schemeClr val="lt1"/>
-          </a:fontRef>
-        </p:style>
-      </p:sp>
-    </p:spTree>
-    <p:extLst>
-      <p:ext uri="{BB962C8B-B14F-4D97-AF65-F5344CB8AC3E}">
-        <p14:creationId xmlns:p14="http://schemas.microsoft.com/office/powerpoint/2010/main" val="162693734"/>
       </p:ext>
     </p:extLst>
   </p:cSld>
@@ -27206,6 +27516,765 @@
           <a:chExt cx="0" cy="0"/>
         </a:xfrm>
       </p:grpSpPr>
+      <p:sp useBgFill="1">
+        <p:nvSpPr>
+          <p:cNvPr id="50" name="Rectangle 49">
+            <a:extLst>
+              <a:ext uri="{FF2B5EF4-FFF2-40B4-BE49-F238E27FC236}">
+                <a16:creationId xmlns:a16="http://schemas.microsoft.com/office/drawing/2014/main" id="{284B70D5-875B-433D-BDBD-1522A85D6C1D}"/>
+              </a:ext>
+              <a:ext uri="{C183D7F6-B498-43B3-948B-1728B52AA6E4}">
+                <adec:decorative xmlns:adec="http://schemas.microsoft.com/office/drawing/2017/decorative" val="1"/>
+              </a:ext>
+            </a:extLst>
+          </p:cNvPr>
+          <p:cNvSpPr>
+            <a:spLocks noGrp="1" noRot="1" noChangeAspect="1" noMove="1" noResize="1" noEditPoints="1" noAdjustHandles="1" noChangeArrowheads="1" noChangeShapeType="1" noTextEdit="1"/>
+          </p:cNvSpPr>
+          <p:nvPr>
+            <p:extLst>
+              <p:ext uri="{386F3935-93C4-4BCD-93E2-E3B085C9AB24}">
+                <p16:designElem xmlns:p16="http://schemas.microsoft.com/office/powerpoint/2015/main" val="1"/>
+              </p:ext>
+            </p:extLst>
+          </p:nvPr>
+        </p:nvSpPr>
+        <p:spPr>
+          <a:xfrm>
+            <a:off x="0" y="0"/>
+            <a:ext cx="12192001" cy="6334316"/>
+          </a:xfrm>
+          <a:prstGeom prst="rect">
+            <a:avLst/>
+          </a:prstGeom>
+          <a:ln>
+            <a:noFill/>
+          </a:ln>
+        </p:spPr>
+        <p:style>
+          <a:lnRef idx="2">
+            <a:schemeClr val="accent1">
+              <a:shade val="50000"/>
+            </a:schemeClr>
+          </a:lnRef>
+          <a:fillRef idx="1">
+            <a:schemeClr val="accent1"/>
+          </a:fillRef>
+          <a:effectRef idx="0">
+            <a:schemeClr val="accent1"/>
+          </a:effectRef>
+          <a:fontRef idx="minor">
+            <a:schemeClr val="lt1"/>
+          </a:fontRef>
+        </p:style>
+        <p:txBody>
+          <a:bodyPr rtlCol="0" anchor="ctr"/>
+          <a:lstStyle/>
+          <a:p>
+            <a:pPr algn="ctr"/>
+            <a:endParaRPr lang="en-US" dirty="0"/>
+          </a:p>
+        </p:txBody>
+      </p:sp>
+      <p:sp>
+        <p:nvSpPr>
+          <p:cNvPr id="2" name="Title 1">
+            <a:extLst>
+              <a:ext uri="{FF2B5EF4-FFF2-40B4-BE49-F238E27FC236}">
+                <a16:creationId xmlns:a16="http://schemas.microsoft.com/office/drawing/2014/main" id="{6601A21F-EC20-448F-BB0A-CBF3B5067773}"/>
+              </a:ext>
+            </a:extLst>
+          </p:cNvPr>
+          <p:cNvSpPr>
+            <a:spLocks noGrp="1"/>
+          </p:cNvSpPr>
+          <p:nvPr>
+            <p:ph type="title"/>
+          </p:nvPr>
+        </p:nvSpPr>
+        <p:spPr>
+          <a:xfrm>
+            <a:off x="7859485" y="634946"/>
+            <a:ext cx="3690257" cy="1450757"/>
+          </a:xfrm>
+        </p:spPr>
+        <p:txBody>
+          <a:bodyPr vert="horz" lIns="91440" tIns="45720" rIns="91440" bIns="45720" rtlCol="0">
+            <a:normAutofit/>
+          </a:bodyPr>
+          <a:lstStyle/>
+          <a:p>
+            <a:r>
+              <a:rPr lang="en-US" sz="4400" b="1" dirty="0"/>
+              <a:t>Histogram for Normal Dataset</a:t>
+            </a:r>
+          </a:p>
+        </p:txBody>
+      </p:sp>
+      <p:pic>
+        <p:nvPicPr>
+          <p:cNvPr id="5" name="Content Placeholder 4">
+            <a:extLst>
+              <a:ext uri="{FF2B5EF4-FFF2-40B4-BE49-F238E27FC236}">
+                <a16:creationId xmlns:a16="http://schemas.microsoft.com/office/drawing/2014/main" id="{62BA1612-2B79-4CA5-A537-9B08501E3E45}"/>
+              </a:ext>
+            </a:extLst>
+          </p:cNvPr>
+          <p:cNvPicPr>
+            <a:picLocks noChangeAspect="1"/>
+          </p:cNvPicPr>
+          <p:nvPr/>
+        </p:nvPicPr>
+        <p:blipFill>
+          <a:blip r:embed="rId2">
+            <a:extLst>
+              <a:ext uri="{28A0092B-C50C-407E-A947-70E740481C1C}">
+                <a14:useLocalDpi xmlns:a14="http://schemas.microsoft.com/office/drawing/2010/main" val="0"/>
+              </a:ext>
+            </a:extLst>
+          </a:blip>
+          <a:stretch>
+            <a:fillRect/>
+          </a:stretch>
+        </p:blipFill>
+        <p:spPr>
+          <a:xfrm>
+            <a:off x="633999" y="1224344"/>
+            <a:ext cx="6909801" cy="4145880"/>
+          </a:xfrm>
+          <a:prstGeom prst="rect">
+            <a:avLst/>
+          </a:prstGeom>
+        </p:spPr>
+      </p:pic>
+      <p:cxnSp>
+        <p:nvCxnSpPr>
+          <p:cNvPr id="52" name="Straight Connector 51">
+            <a:extLst>
+              <a:ext uri="{FF2B5EF4-FFF2-40B4-BE49-F238E27FC236}">
+                <a16:creationId xmlns:a16="http://schemas.microsoft.com/office/drawing/2014/main" id="{C947DF4A-614C-4B4C-8B80-E5B9D8E8CFED}"/>
+              </a:ext>
+              <a:ext uri="{C183D7F6-B498-43B3-948B-1728B52AA6E4}">
+                <adec:decorative xmlns:adec="http://schemas.microsoft.com/office/drawing/2017/decorative" val="1"/>
+              </a:ext>
+            </a:extLst>
+          </p:cNvPr>
+          <p:cNvCxnSpPr>
+            <a:cxnSpLocks noGrp="1" noRot="1" noChangeAspect="1" noMove="1" noResize="1" noEditPoints="1" noAdjustHandles="1" noChangeArrowheads="1" noChangeShapeType="1"/>
+          </p:cNvCxnSpPr>
+          <p:nvPr>
+            <p:extLst>
+              <p:ext uri="{386F3935-93C4-4BCD-93E2-E3B085C9AB24}">
+                <p16:designElem xmlns:p16="http://schemas.microsoft.com/office/powerpoint/2015/main" val="1"/>
+              </p:ext>
+            </p:extLst>
+          </p:nvPr>
+        </p:nvCxnSpPr>
+        <p:spPr>
+          <a:xfrm>
+            <a:off x="7892143" y="2085703"/>
+            <a:ext cx="3566160" cy="0"/>
+          </a:xfrm>
+          <a:prstGeom prst="line">
+            <a:avLst/>
+          </a:prstGeom>
+          <a:ln w="6350">
+            <a:solidFill>
+              <a:schemeClr val="tx1">
+                <a:lumMod val="50000"/>
+                <a:lumOff val="50000"/>
+                <a:alpha val="90000"/>
+              </a:schemeClr>
+            </a:solidFill>
+          </a:ln>
+        </p:spPr>
+        <p:style>
+          <a:lnRef idx="1">
+            <a:schemeClr val="accent1"/>
+          </a:lnRef>
+          <a:fillRef idx="0">
+            <a:schemeClr val="accent1"/>
+          </a:fillRef>
+          <a:effectRef idx="0">
+            <a:schemeClr val="accent1"/>
+          </a:effectRef>
+          <a:fontRef idx="minor">
+            <a:schemeClr val="tx1"/>
+          </a:fontRef>
+        </p:style>
+      </p:cxnSp>
+      <p:sp>
+        <p:nvSpPr>
+          <p:cNvPr id="38" name="Content Placeholder 37">
+            <a:extLst>
+              <a:ext uri="{FF2B5EF4-FFF2-40B4-BE49-F238E27FC236}">
+                <a16:creationId xmlns:a16="http://schemas.microsoft.com/office/drawing/2014/main" id="{8459FDD1-3BEF-4EF5-80CC-3D5238454933}"/>
+              </a:ext>
+            </a:extLst>
+          </p:cNvPr>
+          <p:cNvSpPr>
+            <a:spLocks noGrp="1"/>
+          </p:cNvSpPr>
+          <p:nvPr>
+            <p:ph idx="1"/>
+          </p:nvPr>
+        </p:nvSpPr>
+        <p:spPr>
+          <a:xfrm>
+            <a:off x="7859485" y="2198914"/>
+            <a:ext cx="3690257" cy="3670180"/>
+          </a:xfrm>
+        </p:spPr>
+        <p:txBody>
+          <a:bodyPr>
+            <a:normAutofit/>
+          </a:bodyPr>
+          <a:lstStyle/>
+          <a:p>
+            <a:pPr lvl="1"/>
+            <a:r>
+              <a:rPr lang="en-US" dirty="0"/>
+              <a:t>As Expected, the histogram has the “bell” curve and max value of the dataset goes to 1.</a:t>
+            </a:r>
+          </a:p>
+          <a:p>
+            <a:pPr lvl="1"/>
+            <a:r>
+              <a:rPr lang="en-US" dirty="0"/>
+              <a:t>Hence, our conversion was successful</a:t>
+            </a:r>
+          </a:p>
+        </p:txBody>
+      </p:sp>
+      <p:sp>
+        <p:nvSpPr>
+          <p:cNvPr id="54" name="Rectangle 53">
+            <a:extLst>
+              <a:ext uri="{FF2B5EF4-FFF2-40B4-BE49-F238E27FC236}">
+                <a16:creationId xmlns:a16="http://schemas.microsoft.com/office/drawing/2014/main" id="{1E299956-A9E7-4FC1-A0B1-D590CA9730E8}"/>
+              </a:ext>
+              <a:ext uri="{C183D7F6-B498-43B3-948B-1728B52AA6E4}">
+                <adec:decorative xmlns:adec="http://schemas.microsoft.com/office/drawing/2017/decorative" val="1"/>
+              </a:ext>
+            </a:extLst>
+          </p:cNvPr>
+          <p:cNvSpPr>
+            <a:spLocks noGrp="1" noRot="1" noChangeAspect="1" noMove="1" noResize="1" noEditPoints="1" noAdjustHandles="1" noChangeArrowheads="1" noChangeShapeType="1" noTextEdit="1"/>
+          </p:cNvSpPr>
+          <p:nvPr>
+            <p:extLst>
+              <p:ext uri="{386F3935-93C4-4BCD-93E2-E3B085C9AB24}">
+                <p16:designElem xmlns:p16="http://schemas.microsoft.com/office/powerpoint/2015/main" val="1"/>
+              </p:ext>
+            </p:extLst>
+          </p:nvPr>
+        </p:nvSpPr>
+        <p:spPr>
+          <a:xfrm>
+            <a:off x="15" y="6334316"/>
+            <a:ext cx="12191985" cy="66484"/>
+          </a:xfrm>
+          <a:prstGeom prst="rect">
+            <a:avLst/>
+          </a:prstGeom>
+          <a:solidFill>
+            <a:schemeClr val="accent1"/>
+          </a:solidFill>
+          <a:ln>
+            <a:noFill/>
+          </a:ln>
+        </p:spPr>
+        <p:style>
+          <a:lnRef idx="2">
+            <a:schemeClr val="accent1">
+              <a:shade val="50000"/>
+            </a:schemeClr>
+          </a:lnRef>
+          <a:fillRef idx="1">
+            <a:schemeClr val="accent1"/>
+          </a:fillRef>
+          <a:effectRef idx="0">
+            <a:schemeClr val="accent1"/>
+          </a:effectRef>
+          <a:fontRef idx="minor">
+            <a:schemeClr val="lt1"/>
+          </a:fontRef>
+        </p:style>
+      </p:sp>
+      <p:sp>
+        <p:nvSpPr>
+          <p:cNvPr id="56" name="Rectangle 55">
+            <a:extLst>
+              <a:ext uri="{FF2B5EF4-FFF2-40B4-BE49-F238E27FC236}">
+                <a16:creationId xmlns:a16="http://schemas.microsoft.com/office/drawing/2014/main" id="{17FC539C-B783-4B03-9F9E-D13430F3F64F}"/>
+              </a:ext>
+              <a:ext uri="{C183D7F6-B498-43B3-948B-1728B52AA6E4}">
+                <adec:decorative xmlns:adec="http://schemas.microsoft.com/office/drawing/2017/decorative" val="1"/>
+              </a:ext>
+            </a:extLst>
+          </p:cNvPr>
+          <p:cNvSpPr>
+            <a:spLocks noGrp="1" noRot="1" noChangeAspect="1" noMove="1" noResize="1" noEditPoints="1" noAdjustHandles="1" noChangeArrowheads="1" noChangeShapeType="1" noTextEdit="1"/>
+          </p:cNvSpPr>
+          <p:nvPr>
+            <p:extLst>
+              <p:ext uri="{386F3935-93C4-4BCD-93E2-E3B085C9AB24}">
+                <p16:designElem xmlns:p16="http://schemas.microsoft.com/office/powerpoint/2015/main" val="1"/>
+              </p:ext>
+            </p:extLst>
+          </p:nvPr>
+        </p:nvSpPr>
+        <p:spPr>
+          <a:xfrm>
+            <a:off x="1" y="6400800"/>
+            <a:ext cx="12192000" cy="457200"/>
+          </a:xfrm>
+          <a:prstGeom prst="rect">
+            <a:avLst/>
+          </a:prstGeom>
+          <a:solidFill>
+            <a:schemeClr val="accent2"/>
+          </a:solidFill>
+          <a:ln>
+            <a:noFill/>
+          </a:ln>
+        </p:spPr>
+        <p:style>
+          <a:lnRef idx="2">
+            <a:schemeClr val="accent1">
+              <a:shade val="50000"/>
+            </a:schemeClr>
+          </a:lnRef>
+          <a:fillRef idx="1">
+            <a:schemeClr val="accent1"/>
+          </a:fillRef>
+          <a:effectRef idx="0">
+            <a:schemeClr val="accent1"/>
+          </a:effectRef>
+          <a:fontRef idx="minor">
+            <a:schemeClr val="lt1"/>
+          </a:fontRef>
+        </p:style>
+      </p:sp>
+    </p:spTree>
+    <p:extLst>
+      <p:ext uri="{BB962C8B-B14F-4D97-AF65-F5344CB8AC3E}">
+        <p14:creationId xmlns:p14="http://schemas.microsoft.com/office/powerpoint/2010/main" val="3232898989"/>
+      </p:ext>
+    </p:extLst>
+  </p:cSld>
+  <p:clrMapOvr>
+    <a:masterClrMapping/>
+  </p:clrMapOvr>
+</p:sld>
+</file>
+
+<file path=ppt/slides/slide31.xml><?xml version="1.0" encoding="utf-8"?>
+<p:sld xmlns:a="http://schemas.openxmlformats.org/drawingml/2006/main" xmlns:r="http://schemas.openxmlformats.org/officeDocument/2006/relationships" xmlns:p="http://schemas.openxmlformats.org/presentationml/2006/main">
+  <p:cSld>
+    <p:bg>
+      <p:bgPr>
+        <a:solidFill>
+          <a:schemeClr val="bg1"/>
+        </a:solidFill>
+        <a:effectLst/>
+      </p:bgPr>
+    </p:bg>
+    <p:spTree>
+      <p:nvGrpSpPr>
+        <p:cNvPr id="1" name=""/>
+        <p:cNvGrpSpPr/>
+        <p:nvPr/>
+      </p:nvGrpSpPr>
+      <p:grpSpPr>
+        <a:xfrm>
+          <a:off x="0" y="0"/>
+          <a:ext cx="0" cy="0"/>
+          <a:chOff x="0" y="0"/>
+          <a:chExt cx="0" cy="0"/>
+        </a:xfrm>
+      </p:grpSpPr>
+      <p:sp useBgFill="1">
+        <p:nvSpPr>
+          <p:cNvPr id="29" name="Rectangle 28">
+            <a:extLst>
+              <a:ext uri="{FF2B5EF4-FFF2-40B4-BE49-F238E27FC236}">
+                <a16:creationId xmlns:a16="http://schemas.microsoft.com/office/drawing/2014/main" id="{284B70D5-875B-433D-BDBD-1522A85D6C1D}"/>
+              </a:ext>
+              <a:ext uri="{C183D7F6-B498-43B3-948B-1728B52AA6E4}">
+                <adec:decorative xmlns:adec="http://schemas.microsoft.com/office/drawing/2017/decorative" val="1"/>
+              </a:ext>
+            </a:extLst>
+          </p:cNvPr>
+          <p:cNvSpPr>
+            <a:spLocks noGrp="1" noRot="1" noChangeAspect="1" noMove="1" noResize="1" noEditPoints="1" noAdjustHandles="1" noChangeArrowheads="1" noChangeShapeType="1" noTextEdit="1"/>
+          </p:cNvSpPr>
+          <p:nvPr>
+            <p:extLst>
+              <p:ext uri="{386F3935-93C4-4BCD-93E2-E3B085C9AB24}">
+                <p16:designElem xmlns:p16="http://schemas.microsoft.com/office/powerpoint/2015/main" val="1"/>
+              </p:ext>
+            </p:extLst>
+          </p:nvPr>
+        </p:nvSpPr>
+        <p:spPr>
+          <a:xfrm>
+            <a:off x="0" y="0"/>
+            <a:ext cx="12192001" cy="6334316"/>
+          </a:xfrm>
+          <a:prstGeom prst="rect">
+            <a:avLst/>
+          </a:prstGeom>
+          <a:ln>
+            <a:noFill/>
+          </a:ln>
+        </p:spPr>
+        <p:style>
+          <a:lnRef idx="2">
+            <a:schemeClr val="accent1">
+              <a:shade val="50000"/>
+            </a:schemeClr>
+          </a:lnRef>
+          <a:fillRef idx="1">
+            <a:schemeClr val="accent1"/>
+          </a:fillRef>
+          <a:effectRef idx="0">
+            <a:schemeClr val="accent1"/>
+          </a:effectRef>
+          <a:fontRef idx="minor">
+            <a:schemeClr val="lt1"/>
+          </a:fontRef>
+        </p:style>
+        <p:txBody>
+          <a:bodyPr rtlCol="0" anchor="ctr"/>
+          <a:lstStyle/>
+          <a:p>
+            <a:pPr algn="ctr"/>
+            <a:endParaRPr lang="en-US" dirty="0"/>
+          </a:p>
+        </p:txBody>
+      </p:sp>
+      <p:sp>
+        <p:nvSpPr>
+          <p:cNvPr id="2" name="Title 1">
+            <a:extLst>
+              <a:ext uri="{FF2B5EF4-FFF2-40B4-BE49-F238E27FC236}">
+                <a16:creationId xmlns:a16="http://schemas.microsoft.com/office/drawing/2014/main" id="{599A5827-52EB-4503-B93E-93FDF28C294E}"/>
+              </a:ext>
+            </a:extLst>
+          </p:cNvPr>
+          <p:cNvSpPr>
+            <a:spLocks noGrp="1"/>
+          </p:cNvSpPr>
+          <p:nvPr>
+            <p:ph type="title"/>
+          </p:nvPr>
+        </p:nvSpPr>
+        <p:spPr>
+          <a:xfrm>
+            <a:off x="7859485" y="634946"/>
+            <a:ext cx="3690257" cy="1450757"/>
+          </a:xfrm>
+        </p:spPr>
+        <p:txBody>
+          <a:bodyPr vert="horz" lIns="91440" tIns="45720" rIns="91440" bIns="45720" rtlCol="0">
+            <a:normAutofit/>
+          </a:bodyPr>
+          <a:lstStyle/>
+          <a:p>
+            <a:r>
+              <a:rPr lang="en-US" sz="4100" b="1" dirty="0"/>
+              <a:t>Histogram for Uniform Dataset</a:t>
+            </a:r>
+          </a:p>
+        </p:txBody>
+      </p:sp>
+      <p:pic>
+        <p:nvPicPr>
+          <p:cNvPr id="5" name="Content Placeholder 4">
+            <a:extLst>
+              <a:ext uri="{FF2B5EF4-FFF2-40B4-BE49-F238E27FC236}">
+                <a16:creationId xmlns:a16="http://schemas.microsoft.com/office/drawing/2014/main" id="{4C497ACA-DC67-4A9F-A0B8-459EE13FC699}"/>
+              </a:ext>
+            </a:extLst>
+          </p:cNvPr>
+          <p:cNvPicPr>
+            <a:picLocks noChangeAspect="1"/>
+          </p:cNvPicPr>
+          <p:nvPr/>
+        </p:nvPicPr>
+        <p:blipFill>
+          <a:blip r:embed="rId2">
+            <a:extLst>
+              <a:ext uri="{28A0092B-C50C-407E-A947-70E740481C1C}">
+                <a14:useLocalDpi xmlns:a14="http://schemas.microsoft.com/office/drawing/2010/main" val="0"/>
+              </a:ext>
+            </a:extLst>
+          </a:blip>
+          <a:stretch>
+            <a:fillRect/>
+          </a:stretch>
+        </p:blipFill>
+        <p:spPr>
+          <a:xfrm>
+            <a:off x="633999" y="1224344"/>
+            <a:ext cx="6909801" cy="4145880"/>
+          </a:xfrm>
+          <a:prstGeom prst="rect">
+            <a:avLst/>
+          </a:prstGeom>
+        </p:spPr>
+      </p:pic>
+      <p:cxnSp>
+        <p:nvCxnSpPr>
+          <p:cNvPr id="31" name="Straight Connector 30">
+            <a:extLst>
+              <a:ext uri="{FF2B5EF4-FFF2-40B4-BE49-F238E27FC236}">
+                <a16:creationId xmlns:a16="http://schemas.microsoft.com/office/drawing/2014/main" id="{C947DF4A-614C-4B4C-8B80-E5B9D8E8CFED}"/>
+              </a:ext>
+              <a:ext uri="{C183D7F6-B498-43B3-948B-1728B52AA6E4}">
+                <adec:decorative xmlns:adec="http://schemas.microsoft.com/office/drawing/2017/decorative" val="1"/>
+              </a:ext>
+            </a:extLst>
+          </p:cNvPr>
+          <p:cNvCxnSpPr>
+            <a:cxnSpLocks noGrp="1" noRot="1" noChangeAspect="1" noMove="1" noResize="1" noEditPoints="1" noAdjustHandles="1" noChangeArrowheads="1" noChangeShapeType="1"/>
+          </p:cNvCxnSpPr>
+          <p:nvPr>
+            <p:extLst>
+              <p:ext uri="{386F3935-93C4-4BCD-93E2-E3B085C9AB24}">
+                <p16:designElem xmlns:p16="http://schemas.microsoft.com/office/powerpoint/2015/main" val="1"/>
+              </p:ext>
+            </p:extLst>
+          </p:nvPr>
+        </p:nvCxnSpPr>
+        <p:spPr>
+          <a:xfrm>
+            <a:off x="7892143" y="2085703"/>
+            <a:ext cx="3566160" cy="0"/>
+          </a:xfrm>
+          <a:prstGeom prst="line">
+            <a:avLst/>
+          </a:prstGeom>
+          <a:ln w="6350">
+            <a:solidFill>
+              <a:schemeClr val="tx1">
+                <a:lumMod val="50000"/>
+                <a:lumOff val="50000"/>
+                <a:alpha val="90000"/>
+              </a:schemeClr>
+            </a:solidFill>
+          </a:ln>
+        </p:spPr>
+        <p:style>
+          <a:lnRef idx="1">
+            <a:schemeClr val="accent1"/>
+          </a:lnRef>
+          <a:fillRef idx="0">
+            <a:schemeClr val="accent1"/>
+          </a:fillRef>
+          <a:effectRef idx="0">
+            <a:schemeClr val="accent1"/>
+          </a:effectRef>
+          <a:fontRef idx="minor">
+            <a:schemeClr val="tx1"/>
+          </a:fontRef>
+        </p:style>
+      </p:cxnSp>
+      <p:sp>
+        <p:nvSpPr>
+          <p:cNvPr id="26" name="Content Placeholder 25">
+            <a:extLst>
+              <a:ext uri="{FF2B5EF4-FFF2-40B4-BE49-F238E27FC236}">
+                <a16:creationId xmlns:a16="http://schemas.microsoft.com/office/drawing/2014/main" id="{EB8091F3-6CBE-47DB-8651-DD9C298B089F}"/>
+              </a:ext>
+            </a:extLst>
+          </p:cNvPr>
+          <p:cNvSpPr>
+            <a:spLocks noGrp="1"/>
+          </p:cNvSpPr>
+          <p:nvPr>
+            <p:ph idx="1"/>
+          </p:nvPr>
+        </p:nvSpPr>
+        <p:spPr>
+          <a:xfrm>
+            <a:off x="7859485" y="2198914"/>
+            <a:ext cx="3690257" cy="3670180"/>
+          </a:xfrm>
+        </p:spPr>
+        <p:txBody>
+          <a:bodyPr>
+            <a:normAutofit/>
+          </a:bodyPr>
+          <a:lstStyle/>
+          <a:p>
+            <a:pPr lvl="1"/>
+            <a:r>
+              <a:rPr lang="en-US" dirty="0"/>
+              <a:t>As Expected, the histogram has the same number of occurrences for every numbers range and max value of the dataset goes to 1.</a:t>
+            </a:r>
+          </a:p>
+          <a:p>
+            <a:pPr lvl="1"/>
+            <a:r>
+              <a:rPr lang="en-US" dirty="0"/>
+              <a:t>Hence, our conversion was successful</a:t>
+            </a:r>
+          </a:p>
+          <a:p>
+            <a:endParaRPr lang="en-US" dirty="0"/>
+          </a:p>
+        </p:txBody>
+      </p:sp>
+      <p:sp>
+        <p:nvSpPr>
+          <p:cNvPr id="33" name="Rectangle 32">
+            <a:extLst>
+              <a:ext uri="{FF2B5EF4-FFF2-40B4-BE49-F238E27FC236}">
+                <a16:creationId xmlns:a16="http://schemas.microsoft.com/office/drawing/2014/main" id="{1E299956-A9E7-4FC1-A0B1-D590CA9730E8}"/>
+              </a:ext>
+              <a:ext uri="{C183D7F6-B498-43B3-948B-1728B52AA6E4}">
+                <adec:decorative xmlns:adec="http://schemas.microsoft.com/office/drawing/2017/decorative" val="1"/>
+              </a:ext>
+            </a:extLst>
+          </p:cNvPr>
+          <p:cNvSpPr>
+            <a:spLocks noGrp="1" noRot="1" noChangeAspect="1" noMove="1" noResize="1" noEditPoints="1" noAdjustHandles="1" noChangeArrowheads="1" noChangeShapeType="1" noTextEdit="1"/>
+          </p:cNvSpPr>
+          <p:nvPr>
+            <p:extLst>
+              <p:ext uri="{386F3935-93C4-4BCD-93E2-E3B085C9AB24}">
+                <p16:designElem xmlns:p16="http://schemas.microsoft.com/office/powerpoint/2015/main" val="1"/>
+              </p:ext>
+            </p:extLst>
+          </p:nvPr>
+        </p:nvSpPr>
+        <p:spPr>
+          <a:xfrm>
+            <a:off x="15" y="6334316"/>
+            <a:ext cx="12191985" cy="66484"/>
+          </a:xfrm>
+          <a:prstGeom prst="rect">
+            <a:avLst/>
+          </a:prstGeom>
+          <a:solidFill>
+            <a:schemeClr val="accent1"/>
+          </a:solidFill>
+          <a:ln>
+            <a:noFill/>
+          </a:ln>
+        </p:spPr>
+        <p:style>
+          <a:lnRef idx="2">
+            <a:schemeClr val="accent1">
+              <a:shade val="50000"/>
+            </a:schemeClr>
+          </a:lnRef>
+          <a:fillRef idx="1">
+            <a:schemeClr val="accent1"/>
+          </a:fillRef>
+          <a:effectRef idx="0">
+            <a:schemeClr val="accent1"/>
+          </a:effectRef>
+          <a:fontRef idx="minor">
+            <a:schemeClr val="lt1"/>
+          </a:fontRef>
+        </p:style>
+      </p:sp>
+      <p:sp>
+        <p:nvSpPr>
+          <p:cNvPr id="35" name="Rectangle 34">
+            <a:extLst>
+              <a:ext uri="{FF2B5EF4-FFF2-40B4-BE49-F238E27FC236}">
+                <a16:creationId xmlns:a16="http://schemas.microsoft.com/office/drawing/2014/main" id="{17FC539C-B783-4B03-9F9E-D13430F3F64F}"/>
+              </a:ext>
+              <a:ext uri="{C183D7F6-B498-43B3-948B-1728B52AA6E4}">
+                <adec:decorative xmlns:adec="http://schemas.microsoft.com/office/drawing/2017/decorative" val="1"/>
+              </a:ext>
+            </a:extLst>
+          </p:cNvPr>
+          <p:cNvSpPr>
+            <a:spLocks noGrp="1" noRot="1" noChangeAspect="1" noMove="1" noResize="1" noEditPoints="1" noAdjustHandles="1" noChangeArrowheads="1" noChangeShapeType="1" noTextEdit="1"/>
+          </p:cNvSpPr>
+          <p:nvPr>
+            <p:extLst>
+              <p:ext uri="{386F3935-93C4-4BCD-93E2-E3B085C9AB24}">
+                <p16:designElem xmlns:p16="http://schemas.microsoft.com/office/powerpoint/2015/main" val="1"/>
+              </p:ext>
+            </p:extLst>
+          </p:nvPr>
+        </p:nvSpPr>
+        <p:spPr>
+          <a:xfrm>
+            <a:off x="1" y="6400800"/>
+            <a:ext cx="12192000" cy="457200"/>
+          </a:xfrm>
+          <a:prstGeom prst="rect">
+            <a:avLst/>
+          </a:prstGeom>
+          <a:solidFill>
+            <a:schemeClr val="accent2"/>
+          </a:solidFill>
+          <a:ln>
+            <a:noFill/>
+          </a:ln>
+        </p:spPr>
+        <p:style>
+          <a:lnRef idx="2">
+            <a:schemeClr val="accent1">
+              <a:shade val="50000"/>
+            </a:schemeClr>
+          </a:lnRef>
+          <a:fillRef idx="1">
+            <a:schemeClr val="accent1"/>
+          </a:fillRef>
+          <a:effectRef idx="0">
+            <a:schemeClr val="accent1"/>
+          </a:effectRef>
+          <a:fontRef idx="minor">
+            <a:schemeClr val="lt1"/>
+          </a:fontRef>
+        </p:style>
+      </p:sp>
+    </p:spTree>
+    <p:extLst>
+      <p:ext uri="{BB962C8B-B14F-4D97-AF65-F5344CB8AC3E}">
+        <p14:creationId xmlns:p14="http://schemas.microsoft.com/office/powerpoint/2010/main" val="162693734"/>
+      </p:ext>
+    </p:extLst>
+  </p:cSld>
+  <p:clrMapOvr>
+    <a:masterClrMapping/>
+  </p:clrMapOvr>
+</p:sld>
+</file>
+
+<file path=ppt/slides/slide32.xml><?xml version="1.0" encoding="utf-8"?>
+<p:sld xmlns:a="http://schemas.openxmlformats.org/drawingml/2006/main" xmlns:r="http://schemas.openxmlformats.org/officeDocument/2006/relationships" xmlns:p="http://schemas.openxmlformats.org/presentationml/2006/main">
+  <p:cSld>
+    <p:bg>
+      <p:bgPr>
+        <a:solidFill>
+          <a:schemeClr val="bg1"/>
+        </a:solidFill>
+        <a:effectLst/>
+      </p:bgPr>
+    </p:bg>
+    <p:spTree>
+      <p:nvGrpSpPr>
+        <p:cNvPr id="1" name=""/>
+        <p:cNvGrpSpPr/>
+        <p:nvPr/>
+      </p:nvGrpSpPr>
+      <p:grpSpPr>
+        <a:xfrm>
+          <a:off x="0" y="0"/>
+          <a:ext cx="0" cy="0"/>
+          <a:chOff x="0" y="0"/>
+          <a:chExt cx="0" cy="0"/>
+        </a:xfrm>
+      </p:grpSpPr>
       <p:pic>
         <p:nvPicPr>
           <p:cNvPr id="5" name="Picture 4" descr="Many question marks on black background">
@@ -27645,7 +28714,7 @@
 </p:sld>
 </file>
 
-<file path=ppt/slides/slide31.xml><?xml version="1.0" encoding="utf-8"?>
+<file path=ppt/slides/slide33.xml><?xml version="1.0" encoding="utf-8"?>
 <p:sld xmlns:a="http://schemas.openxmlformats.org/drawingml/2006/main" xmlns:r="http://schemas.openxmlformats.org/officeDocument/2006/relationships" xmlns:p="http://schemas.openxmlformats.org/presentationml/2006/main">
   <p:cSld>
     <p:bg>
@@ -28027,7 +29096,7 @@
 </p:sld>
 </file>
 
-<file path=ppt/slides/slide32.xml><?xml version="1.0" encoding="utf-8"?>
+<file path=ppt/slides/slide34.xml><?xml version="1.0" encoding="utf-8"?>
 <p:sld xmlns:a="http://schemas.openxmlformats.org/drawingml/2006/main" xmlns:r="http://schemas.openxmlformats.org/officeDocument/2006/relationships" xmlns:p="http://schemas.openxmlformats.org/presentationml/2006/main">
   <p:cSld>
     <p:bg>
@@ -28309,7 +29378,7 @@
 </p:sld>
 </file>
 
-<file path=ppt/slides/slide33.xml><?xml version="1.0" encoding="utf-8"?>
+<file path=ppt/slides/slide35.xml><?xml version="1.0" encoding="utf-8"?>
 <p:sld xmlns:a="http://schemas.openxmlformats.org/drawingml/2006/main" xmlns:r="http://schemas.openxmlformats.org/officeDocument/2006/relationships" xmlns:p="http://schemas.openxmlformats.org/presentationml/2006/main">
   <p:cSld>
     <p:bg>
@@ -28770,7 +29839,7 @@
 </p:sld>
 </file>
 
-<file path=ppt/slides/slide34.xml><?xml version="1.0" encoding="utf-8"?>
+<file path=ppt/slides/slide36.xml><?xml version="1.0" encoding="utf-8"?>
 <p:sld xmlns:a="http://schemas.openxmlformats.org/drawingml/2006/main" xmlns:r="http://schemas.openxmlformats.org/officeDocument/2006/relationships" xmlns:p="http://schemas.openxmlformats.org/presentationml/2006/main">
   <p:cSld>
     <p:bg>
@@ -29097,7 +30166,7 @@
 </p:sld>
 </file>
 
-<file path=ppt/slides/slide35.xml><?xml version="1.0" encoding="utf-8"?>
+<file path=ppt/slides/slide37.xml><?xml version="1.0" encoding="utf-8"?>
 <p:sld xmlns:a="http://schemas.openxmlformats.org/drawingml/2006/main" xmlns:r="http://schemas.openxmlformats.org/officeDocument/2006/relationships" xmlns:p="http://schemas.openxmlformats.org/presentationml/2006/main">
   <p:cSld>
     <p:bg>
@@ -29723,7 +30792,7 @@
 </p:sld>
 </file>
 
-<file path=ppt/slides/slide36.xml><?xml version="1.0" encoding="utf-8"?>
+<file path=ppt/slides/slide38.xml><?xml version="1.0" encoding="utf-8"?>
 <p:sld xmlns:a="http://schemas.openxmlformats.org/drawingml/2006/main" xmlns:r="http://schemas.openxmlformats.org/officeDocument/2006/relationships" xmlns:p="http://schemas.openxmlformats.org/presentationml/2006/main">
   <p:cSld>
     <p:bg>
@@ -30268,7 +31337,7 @@
 </p:sld>
 </file>
 
-<file path=ppt/slides/slide37.xml><?xml version="1.0" encoding="utf-8"?>
+<file path=ppt/slides/slide39.xml><?xml version="1.0" encoding="utf-8"?>
 <p:sld xmlns:a="http://schemas.openxmlformats.org/drawingml/2006/main" xmlns:r="http://schemas.openxmlformats.org/officeDocument/2006/relationships" xmlns:p="http://schemas.openxmlformats.org/presentationml/2006/main">
   <p:cSld>
     <p:bg>
@@ -30732,7 +31801,435 @@
 </p:sld>
 </file>
 
-<file path=ppt/slides/slide38.xml><?xml version="1.0" encoding="utf-8"?>
+<file path=ppt/slides/slide4.xml><?xml version="1.0" encoding="utf-8"?>
+<p:sld xmlns:a="http://schemas.openxmlformats.org/drawingml/2006/main" xmlns:r="http://schemas.openxmlformats.org/officeDocument/2006/relationships" xmlns:p="http://schemas.openxmlformats.org/presentationml/2006/main">
+  <p:cSld>
+    <p:bg>
+      <p:bgPr>
+        <a:solidFill>
+          <a:schemeClr val="bg1"/>
+        </a:solidFill>
+        <a:effectLst/>
+      </p:bgPr>
+    </p:bg>
+    <p:spTree>
+      <p:nvGrpSpPr>
+        <p:cNvPr id="1" name=""/>
+        <p:cNvGrpSpPr/>
+        <p:nvPr/>
+      </p:nvGrpSpPr>
+      <p:grpSpPr>
+        <a:xfrm>
+          <a:off x="0" y="0"/>
+          <a:ext cx="0" cy="0"/>
+          <a:chOff x="0" y="0"/>
+          <a:chExt cx="0" cy="0"/>
+        </a:xfrm>
+      </p:grpSpPr>
+      <p:sp useBgFill="1">
+        <p:nvSpPr>
+          <p:cNvPr id="17" name="Rectangle 16">
+            <a:extLst>
+              <a:ext uri="{FF2B5EF4-FFF2-40B4-BE49-F238E27FC236}">
+                <a16:creationId xmlns:a16="http://schemas.microsoft.com/office/drawing/2014/main" id="{3741B58E-3B65-4A01-A276-975AB2CF8A08}"/>
+              </a:ext>
+              <a:ext uri="{C183D7F6-B498-43B3-948B-1728B52AA6E4}">
+                <adec:decorative xmlns:adec="http://schemas.microsoft.com/office/drawing/2017/decorative" val="1"/>
+              </a:ext>
+            </a:extLst>
+          </p:cNvPr>
+          <p:cNvSpPr>
+            <a:spLocks noGrp="1" noRot="1" noChangeAspect="1" noMove="1" noResize="1" noEditPoints="1" noAdjustHandles="1" noChangeArrowheads="1" noChangeShapeType="1" noTextEdit="1"/>
+          </p:cNvSpPr>
+          <p:nvPr>
+            <p:extLst>
+              <p:ext uri="{386F3935-93C4-4BCD-93E2-E3B085C9AB24}">
+                <p16:designElem xmlns:p16="http://schemas.microsoft.com/office/powerpoint/2015/main" val="1"/>
+              </p:ext>
+            </p:extLst>
+          </p:nvPr>
+        </p:nvSpPr>
+        <p:spPr>
+          <a:xfrm>
+            <a:off x="0" y="0"/>
+            <a:ext cx="12186315" cy="6858000"/>
+          </a:xfrm>
+          <a:prstGeom prst="rect">
+            <a:avLst/>
+          </a:prstGeom>
+          <a:ln>
+            <a:noFill/>
+          </a:ln>
+        </p:spPr>
+        <p:style>
+          <a:lnRef idx="2">
+            <a:schemeClr val="accent6">
+              <a:shade val="50000"/>
+            </a:schemeClr>
+          </a:lnRef>
+          <a:fillRef idx="1001">
+            <a:schemeClr val="lt1"/>
+          </a:fillRef>
+          <a:effectRef idx="0">
+            <a:schemeClr val="accent6"/>
+          </a:effectRef>
+          <a:fontRef idx="minor">
+            <a:schemeClr val="lt1"/>
+          </a:fontRef>
+        </p:style>
+        <p:txBody>
+          <a:bodyPr rtlCol="0" anchor="ctr"/>
+          <a:lstStyle/>
+          <a:p>
+            <a:pPr algn="ctr"/>
+            <a:endParaRPr lang="en-US" dirty="0"/>
+          </a:p>
+        </p:txBody>
+      </p:sp>
+      <p:sp>
+        <p:nvSpPr>
+          <p:cNvPr id="19" name="Rectangle 18">
+            <a:extLst>
+              <a:ext uri="{FF2B5EF4-FFF2-40B4-BE49-F238E27FC236}">
+                <a16:creationId xmlns:a16="http://schemas.microsoft.com/office/drawing/2014/main" id="{7AAC67C3-831B-4AB1-A259-DFB839CAFAFC}"/>
+              </a:ext>
+              <a:ext uri="{C183D7F6-B498-43B3-948B-1728B52AA6E4}">
+                <adec:decorative xmlns:adec="http://schemas.microsoft.com/office/drawing/2017/decorative" val="1"/>
+              </a:ext>
+            </a:extLst>
+          </p:cNvPr>
+          <p:cNvSpPr>
+            <a:spLocks noGrp="1" noRot="1" noChangeAspect="1" noMove="1" noResize="1" noEditPoints="1" noAdjustHandles="1" noChangeArrowheads="1" noChangeShapeType="1" noTextEdit="1"/>
+          </p:cNvSpPr>
+          <p:nvPr>
+            <p:extLst>
+              <p:ext uri="{386F3935-93C4-4BCD-93E2-E3B085C9AB24}">
+                <p16:designElem xmlns:p16="http://schemas.microsoft.com/office/powerpoint/2015/main" val="1"/>
+              </p:ext>
+            </p:extLst>
+          </p:nvPr>
+        </p:nvSpPr>
+        <p:spPr>
+          <a:xfrm>
+            <a:off x="16" y="0"/>
+            <a:ext cx="4050791" cy="6858000"/>
+          </a:xfrm>
+          <a:prstGeom prst="rect">
+            <a:avLst/>
+          </a:prstGeom>
+          <a:solidFill>
+            <a:schemeClr val="accent2"/>
+          </a:solidFill>
+          <a:ln>
+            <a:noFill/>
+          </a:ln>
+        </p:spPr>
+        <p:style>
+          <a:lnRef idx="2">
+            <a:schemeClr val="accent1">
+              <a:shade val="50000"/>
+            </a:schemeClr>
+          </a:lnRef>
+          <a:fillRef idx="1">
+            <a:schemeClr val="accent1"/>
+          </a:fillRef>
+          <a:effectRef idx="0">
+            <a:schemeClr val="accent1"/>
+          </a:effectRef>
+          <a:fontRef idx="minor">
+            <a:schemeClr val="lt1"/>
+          </a:fontRef>
+        </p:style>
+      </p:sp>
+      <p:sp>
+        <p:nvSpPr>
+          <p:cNvPr id="2" name="Title 1">
+            <a:extLst>
+              <a:ext uri="{FF2B5EF4-FFF2-40B4-BE49-F238E27FC236}">
+                <a16:creationId xmlns:a16="http://schemas.microsoft.com/office/drawing/2014/main" id="{D595B95A-705A-4D49-A704-0108F2F33E09}"/>
+              </a:ext>
+            </a:extLst>
+          </p:cNvPr>
+          <p:cNvSpPr>
+            <a:spLocks noGrp="1"/>
+          </p:cNvSpPr>
+          <p:nvPr>
+            <p:ph type="title"/>
+          </p:nvPr>
+        </p:nvSpPr>
+        <p:spPr>
+          <a:xfrm>
+            <a:off x="492370" y="605896"/>
+            <a:ext cx="3084844" cy="5646208"/>
+          </a:xfrm>
+        </p:spPr>
+        <p:txBody>
+          <a:bodyPr anchor="ctr">
+            <a:normAutofit/>
+          </a:bodyPr>
+          <a:lstStyle/>
+          <a:p>
+            <a:r>
+              <a:rPr lang="en-IN" sz="3600" b="1" dirty="0">
+                <a:solidFill>
+                  <a:srgbClr val="FFFFFF"/>
+                </a:solidFill>
+              </a:rPr>
+              <a:t>Procedure</a:t>
+            </a:r>
+          </a:p>
+        </p:txBody>
+      </p:sp>
+      <p:sp>
+        <p:nvSpPr>
+          <p:cNvPr id="21" name="Rectangle 20">
+            <a:extLst>
+              <a:ext uri="{FF2B5EF4-FFF2-40B4-BE49-F238E27FC236}">
+                <a16:creationId xmlns:a16="http://schemas.microsoft.com/office/drawing/2014/main" id="{054B3F04-9EAC-45C0-B3CE-0387EEA10A0C}"/>
+              </a:ext>
+              <a:ext uri="{C183D7F6-B498-43B3-948B-1728B52AA6E4}">
+                <adec:decorative xmlns:adec="http://schemas.microsoft.com/office/drawing/2017/decorative" val="1"/>
+              </a:ext>
+            </a:extLst>
+          </p:cNvPr>
+          <p:cNvSpPr>
+            <a:spLocks noGrp="1" noRot="1" noChangeAspect="1" noMove="1" noResize="1" noEditPoints="1" noAdjustHandles="1" noChangeArrowheads="1" noChangeShapeType="1" noTextEdit="1"/>
+          </p:cNvSpPr>
+          <p:nvPr>
+            <p:extLst>
+              <p:ext uri="{386F3935-93C4-4BCD-93E2-E3B085C9AB24}">
+                <p16:designElem xmlns:p16="http://schemas.microsoft.com/office/powerpoint/2015/main" val="1"/>
+              </p:ext>
+            </p:extLst>
+          </p:nvPr>
+        </p:nvSpPr>
+        <p:spPr>
+          <a:xfrm>
+            <a:off x="4040071" y="0"/>
+            <a:ext cx="64008" cy="6858000"/>
+          </a:xfrm>
+          <a:prstGeom prst="rect">
+            <a:avLst/>
+          </a:prstGeom>
+          <a:solidFill>
+            <a:schemeClr val="accent1"/>
+          </a:solidFill>
+          <a:ln>
+            <a:noFill/>
+          </a:ln>
+        </p:spPr>
+        <p:style>
+          <a:lnRef idx="2">
+            <a:schemeClr val="accent1">
+              <a:shade val="50000"/>
+            </a:schemeClr>
+          </a:lnRef>
+          <a:fillRef idx="1">
+            <a:schemeClr val="accent1"/>
+          </a:fillRef>
+          <a:effectRef idx="0">
+            <a:schemeClr val="accent1"/>
+          </a:effectRef>
+          <a:fontRef idx="minor">
+            <a:schemeClr val="lt1"/>
+          </a:fontRef>
+        </p:style>
+      </p:sp>
+      <mc:AlternateContent xmlns:mc="http://schemas.openxmlformats.org/markup-compatibility/2006" xmlns:a14="http://schemas.microsoft.com/office/drawing/2010/main">
+        <mc:Choice Requires="a14">
+          <p:sp>
+            <p:nvSpPr>
+              <p:cNvPr id="3" name="Content Placeholder 2">
+                <a:extLst>
+                  <a:ext uri="{FF2B5EF4-FFF2-40B4-BE49-F238E27FC236}">
+                    <a16:creationId xmlns:a16="http://schemas.microsoft.com/office/drawing/2014/main" id="{4B817802-A38C-4038-895E-B8B15F8D564B}"/>
+                  </a:ext>
+                </a:extLst>
+              </p:cNvPr>
+              <p:cNvSpPr>
+                <a:spLocks noGrp="1"/>
+              </p:cNvSpPr>
+              <p:nvPr>
+                <p:ph idx="1"/>
+              </p:nvPr>
+            </p:nvSpPr>
+            <p:spPr>
+              <a:xfrm>
+                <a:off x="4742016" y="605896"/>
+                <a:ext cx="6413663" cy="5646208"/>
+              </a:xfrm>
+            </p:spPr>
+            <p:txBody>
+              <a:bodyPr anchor="ctr">
+                <a:normAutofit/>
+              </a:bodyPr>
+              <a:lstStyle/>
+              <a:p>
+                <a:pPr lvl="1">
+                  <a:buFont typeface="Arial" panose="020B0604020202020204" pitchFamily="34" charset="0"/>
+                  <a:buChar char="•"/>
+                </a:pPr>
+                <a:r>
+                  <a:rPr lang="en-IN" dirty="0"/>
+                  <a:t>The inbuilt C function </a:t>
+                </a:r>
+                <a:r>
+                  <a:rPr lang="en-IN" dirty="0">
+                    <a:latin typeface="Courier New" panose="02070309020205020404" pitchFamily="49" charset="0"/>
+                    <a:cs typeface="Courier New" panose="02070309020205020404" pitchFamily="49" charset="0"/>
+                  </a:rPr>
+                  <a:t>rand()</a:t>
+                </a:r>
+                <a:r>
+                  <a:rPr lang="en-IN" dirty="0">
+                    <a:cs typeface="Courier New" panose="02070309020205020404" pitchFamily="49" charset="0"/>
+                  </a:rPr>
+                  <a:t>generates random numbers distributed uniformly.</a:t>
+                </a:r>
+              </a:p>
+              <a:p>
+                <a:pPr lvl="1">
+                  <a:buFont typeface="Arial" panose="020B0604020202020204" pitchFamily="34" charset="0"/>
+                  <a:buChar char="•"/>
+                </a:pPr>
+                <a:r>
+                  <a:rPr lang="en-IN" dirty="0">
+                    <a:cs typeface="Courier New" panose="02070309020205020404" pitchFamily="49" charset="0"/>
+                  </a:rPr>
+                  <a:t>Using </a:t>
+                </a:r>
+                <a:r>
+                  <a:rPr lang="en-IN" dirty="0">
+                    <a:latin typeface="Courier New" panose="02070309020205020404" pitchFamily="49" charset="0"/>
+                    <a:cs typeface="Courier New" panose="02070309020205020404" pitchFamily="49" charset="0"/>
+                  </a:rPr>
+                  <a:t>rand()</a:t>
+                </a:r>
+                <a:r>
+                  <a:rPr lang="en-IN" dirty="0">
+                    <a:cs typeface="Courier New" panose="02070309020205020404" pitchFamily="49" charset="0"/>
+                  </a:rPr>
+                  <a:t> we generated </a:t>
+                </a:r>
+                <a14:m>
+                  <m:oMath xmlns:m="http://schemas.openxmlformats.org/officeDocument/2006/math">
+                    <m:sSup>
+                      <m:sSupPr>
+                        <m:ctrlPr>
+                          <a:rPr lang="en-IN" i="1" smtClean="0">
+                            <a:latin typeface="Cambria Math" panose="02040503050406030204" pitchFamily="18" charset="0"/>
+                            <a:cs typeface="Courier New" panose="02070309020205020404" pitchFamily="49" charset="0"/>
+                          </a:rPr>
+                        </m:ctrlPr>
+                      </m:sSupPr>
+                      <m:e>
+                        <m:r>
+                          <a:rPr lang="en-IN" b="0" i="1" smtClean="0">
+                            <a:latin typeface="Cambria Math" panose="02040503050406030204" pitchFamily="18" charset="0"/>
+                            <a:cs typeface="Courier New" panose="02070309020205020404" pitchFamily="49" charset="0"/>
+                          </a:rPr>
+                          <m:t>10</m:t>
+                        </m:r>
+                      </m:e>
+                      <m:sup>
+                        <m:r>
+                          <a:rPr lang="en-IN" b="0" i="1" smtClean="0">
+                            <a:latin typeface="Cambria Math" panose="02040503050406030204" pitchFamily="18" charset="0"/>
+                            <a:cs typeface="Courier New" panose="02070309020205020404" pitchFamily="49" charset="0"/>
+                          </a:rPr>
+                          <m:t>6</m:t>
+                        </m:r>
+                      </m:sup>
+                    </m:sSup>
+                  </m:oMath>
+                </a14:m>
+                <a:r>
+                  <a:rPr lang="en-IN" dirty="0"/>
+                  <a:t> uniformly distributed random numbers between 0 to 100 and stored it in </a:t>
+                </a:r>
+                <a:r>
+                  <a:rPr lang="en-IN" dirty="0">
+                    <a:latin typeface="Courier New" panose="02070309020205020404" pitchFamily="49" charset="0"/>
+                    <a:cs typeface="Courier New" panose="02070309020205020404" pitchFamily="49" charset="0"/>
+                  </a:rPr>
+                  <a:t>uniform_distribution.csv </a:t>
+                </a:r>
+                <a:r>
+                  <a:rPr lang="en-IN" dirty="0"/>
+                  <a:t>which will act as uniformly distributed dataset for further works.</a:t>
+                </a:r>
+              </a:p>
+              <a:p>
+                <a:pPr lvl="1">
+                  <a:buFont typeface="Arial" panose="020B0604020202020204" pitchFamily="34" charset="0"/>
+                  <a:buChar char="•"/>
+                </a:pPr>
+                <a:r>
+                  <a:rPr lang="en-IN" dirty="0"/>
+                  <a:t>We also plotted a histogram of the dataset to make sure that the dataset generation worked well or not…</a:t>
+                </a:r>
+              </a:p>
+            </p:txBody>
+          </p:sp>
+        </mc:Choice>
+        <mc:Fallback xmlns="">
+          <p:sp>
+            <p:nvSpPr>
+              <p:cNvPr id="3" name="Content Placeholder 2">
+                <a:extLst>
+                  <a:ext uri="{FF2B5EF4-FFF2-40B4-BE49-F238E27FC236}">
+                    <a16:creationId xmlns:a16="http://schemas.microsoft.com/office/drawing/2014/main" id="{4B817802-A38C-4038-895E-B8B15F8D564B}"/>
+                  </a:ext>
+                </a:extLst>
+              </p:cNvPr>
+              <p:cNvSpPr>
+                <a:spLocks noGrp="1" noRot="1" noChangeAspect="1" noMove="1" noResize="1" noEditPoints="1" noAdjustHandles="1" noChangeArrowheads="1" noChangeShapeType="1" noTextEdit="1"/>
+              </p:cNvSpPr>
+              <p:nvPr>
+                <p:ph idx="1"/>
+              </p:nvPr>
+            </p:nvSpPr>
+            <p:spPr>
+              <a:xfrm>
+                <a:off x="4742016" y="605896"/>
+                <a:ext cx="6413663" cy="5646208"/>
+              </a:xfrm>
+              <a:blipFill>
+                <a:blip r:embed="rId2"/>
+                <a:stretch>
+                  <a:fillRect r="-2567"/>
+                </a:stretch>
+              </a:blipFill>
+            </p:spPr>
+            <p:txBody>
+              <a:bodyPr/>
+              <a:lstStyle/>
+              <a:p>
+                <a:r>
+                  <a:rPr lang="en-IN">
+                    <a:noFill/>
+                  </a:rPr>
+                  <a:t> </a:t>
+                </a:r>
+              </a:p>
+            </p:txBody>
+          </p:sp>
+        </mc:Fallback>
+      </mc:AlternateContent>
+    </p:spTree>
+    <p:extLst>
+      <p:ext uri="{BB962C8B-B14F-4D97-AF65-F5344CB8AC3E}">
+        <p14:creationId xmlns:p14="http://schemas.microsoft.com/office/powerpoint/2010/main" val="2594329012"/>
+      </p:ext>
+    </p:extLst>
+  </p:cSld>
+  <p:clrMapOvr>
+    <a:masterClrMapping/>
+  </p:clrMapOvr>
+</p:sld>
+</file>
+
+<file path=ppt/slides/slide40.xml><?xml version="1.0" encoding="utf-8"?>
 <p:sld xmlns:a="http://schemas.openxmlformats.org/drawingml/2006/main" xmlns:r="http://schemas.openxmlformats.org/officeDocument/2006/relationships" xmlns:p="http://schemas.openxmlformats.org/presentationml/2006/main">
   <p:cSld>
     <p:bg>
@@ -31234,7 +32731,7 @@
 </p:sld>
 </file>
 
-<file path=ppt/slides/slide39.xml><?xml version="1.0" encoding="utf-8"?>
+<file path=ppt/slides/slide41.xml><?xml version="1.0" encoding="utf-8"?>
 <p:sld xmlns:a="http://schemas.openxmlformats.org/drawingml/2006/main" xmlns:r="http://schemas.openxmlformats.org/officeDocument/2006/relationships" xmlns:p="http://schemas.openxmlformats.org/presentationml/2006/main">
   <p:cSld>
     <p:bg>
@@ -31807,435 +33304,7 @@
 </p:sld>
 </file>
 
-<file path=ppt/slides/slide4.xml><?xml version="1.0" encoding="utf-8"?>
-<p:sld xmlns:a="http://schemas.openxmlformats.org/drawingml/2006/main" xmlns:r="http://schemas.openxmlformats.org/officeDocument/2006/relationships" xmlns:p="http://schemas.openxmlformats.org/presentationml/2006/main">
-  <p:cSld>
-    <p:bg>
-      <p:bgPr>
-        <a:solidFill>
-          <a:schemeClr val="bg1"/>
-        </a:solidFill>
-        <a:effectLst/>
-      </p:bgPr>
-    </p:bg>
-    <p:spTree>
-      <p:nvGrpSpPr>
-        <p:cNvPr id="1" name=""/>
-        <p:cNvGrpSpPr/>
-        <p:nvPr/>
-      </p:nvGrpSpPr>
-      <p:grpSpPr>
-        <a:xfrm>
-          <a:off x="0" y="0"/>
-          <a:ext cx="0" cy="0"/>
-          <a:chOff x="0" y="0"/>
-          <a:chExt cx="0" cy="0"/>
-        </a:xfrm>
-      </p:grpSpPr>
-      <p:sp useBgFill="1">
-        <p:nvSpPr>
-          <p:cNvPr id="17" name="Rectangle 16">
-            <a:extLst>
-              <a:ext uri="{FF2B5EF4-FFF2-40B4-BE49-F238E27FC236}">
-                <a16:creationId xmlns:a16="http://schemas.microsoft.com/office/drawing/2014/main" id="{3741B58E-3B65-4A01-A276-975AB2CF8A08}"/>
-              </a:ext>
-              <a:ext uri="{C183D7F6-B498-43B3-948B-1728B52AA6E4}">
-                <adec:decorative xmlns:adec="http://schemas.microsoft.com/office/drawing/2017/decorative" val="1"/>
-              </a:ext>
-            </a:extLst>
-          </p:cNvPr>
-          <p:cNvSpPr>
-            <a:spLocks noGrp="1" noRot="1" noChangeAspect="1" noMove="1" noResize="1" noEditPoints="1" noAdjustHandles="1" noChangeArrowheads="1" noChangeShapeType="1" noTextEdit="1"/>
-          </p:cNvSpPr>
-          <p:nvPr>
-            <p:extLst>
-              <p:ext uri="{386F3935-93C4-4BCD-93E2-E3B085C9AB24}">
-                <p16:designElem xmlns:p16="http://schemas.microsoft.com/office/powerpoint/2015/main" val="1"/>
-              </p:ext>
-            </p:extLst>
-          </p:nvPr>
-        </p:nvSpPr>
-        <p:spPr>
-          <a:xfrm>
-            <a:off x="0" y="0"/>
-            <a:ext cx="12186315" cy="6858000"/>
-          </a:xfrm>
-          <a:prstGeom prst="rect">
-            <a:avLst/>
-          </a:prstGeom>
-          <a:ln>
-            <a:noFill/>
-          </a:ln>
-        </p:spPr>
-        <p:style>
-          <a:lnRef idx="2">
-            <a:schemeClr val="accent6">
-              <a:shade val="50000"/>
-            </a:schemeClr>
-          </a:lnRef>
-          <a:fillRef idx="1001">
-            <a:schemeClr val="lt1"/>
-          </a:fillRef>
-          <a:effectRef idx="0">
-            <a:schemeClr val="accent6"/>
-          </a:effectRef>
-          <a:fontRef idx="minor">
-            <a:schemeClr val="lt1"/>
-          </a:fontRef>
-        </p:style>
-        <p:txBody>
-          <a:bodyPr rtlCol="0" anchor="ctr"/>
-          <a:lstStyle/>
-          <a:p>
-            <a:pPr algn="ctr"/>
-            <a:endParaRPr lang="en-US" dirty="0"/>
-          </a:p>
-        </p:txBody>
-      </p:sp>
-      <p:sp>
-        <p:nvSpPr>
-          <p:cNvPr id="19" name="Rectangle 18">
-            <a:extLst>
-              <a:ext uri="{FF2B5EF4-FFF2-40B4-BE49-F238E27FC236}">
-                <a16:creationId xmlns:a16="http://schemas.microsoft.com/office/drawing/2014/main" id="{7AAC67C3-831B-4AB1-A259-DFB839CAFAFC}"/>
-              </a:ext>
-              <a:ext uri="{C183D7F6-B498-43B3-948B-1728B52AA6E4}">
-                <adec:decorative xmlns:adec="http://schemas.microsoft.com/office/drawing/2017/decorative" val="1"/>
-              </a:ext>
-            </a:extLst>
-          </p:cNvPr>
-          <p:cNvSpPr>
-            <a:spLocks noGrp="1" noRot="1" noChangeAspect="1" noMove="1" noResize="1" noEditPoints="1" noAdjustHandles="1" noChangeArrowheads="1" noChangeShapeType="1" noTextEdit="1"/>
-          </p:cNvSpPr>
-          <p:nvPr>
-            <p:extLst>
-              <p:ext uri="{386F3935-93C4-4BCD-93E2-E3B085C9AB24}">
-                <p16:designElem xmlns:p16="http://schemas.microsoft.com/office/powerpoint/2015/main" val="1"/>
-              </p:ext>
-            </p:extLst>
-          </p:nvPr>
-        </p:nvSpPr>
-        <p:spPr>
-          <a:xfrm>
-            <a:off x="16" y="0"/>
-            <a:ext cx="4050791" cy="6858000"/>
-          </a:xfrm>
-          <a:prstGeom prst="rect">
-            <a:avLst/>
-          </a:prstGeom>
-          <a:solidFill>
-            <a:schemeClr val="accent2"/>
-          </a:solidFill>
-          <a:ln>
-            <a:noFill/>
-          </a:ln>
-        </p:spPr>
-        <p:style>
-          <a:lnRef idx="2">
-            <a:schemeClr val="accent1">
-              <a:shade val="50000"/>
-            </a:schemeClr>
-          </a:lnRef>
-          <a:fillRef idx="1">
-            <a:schemeClr val="accent1"/>
-          </a:fillRef>
-          <a:effectRef idx="0">
-            <a:schemeClr val="accent1"/>
-          </a:effectRef>
-          <a:fontRef idx="minor">
-            <a:schemeClr val="lt1"/>
-          </a:fontRef>
-        </p:style>
-      </p:sp>
-      <p:sp>
-        <p:nvSpPr>
-          <p:cNvPr id="2" name="Title 1">
-            <a:extLst>
-              <a:ext uri="{FF2B5EF4-FFF2-40B4-BE49-F238E27FC236}">
-                <a16:creationId xmlns:a16="http://schemas.microsoft.com/office/drawing/2014/main" id="{D595B95A-705A-4D49-A704-0108F2F33E09}"/>
-              </a:ext>
-            </a:extLst>
-          </p:cNvPr>
-          <p:cNvSpPr>
-            <a:spLocks noGrp="1"/>
-          </p:cNvSpPr>
-          <p:nvPr>
-            <p:ph type="title"/>
-          </p:nvPr>
-        </p:nvSpPr>
-        <p:spPr>
-          <a:xfrm>
-            <a:off x="492370" y="605896"/>
-            <a:ext cx="3084844" cy="5646208"/>
-          </a:xfrm>
-        </p:spPr>
-        <p:txBody>
-          <a:bodyPr anchor="ctr">
-            <a:normAutofit/>
-          </a:bodyPr>
-          <a:lstStyle/>
-          <a:p>
-            <a:r>
-              <a:rPr lang="en-IN" sz="3600" b="1" dirty="0">
-                <a:solidFill>
-                  <a:srgbClr val="FFFFFF"/>
-                </a:solidFill>
-              </a:rPr>
-              <a:t>Procedure</a:t>
-            </a:r>
-          </a:p>
-        </p:txBody>
-      </p:sp>
-      <p:sp>
-        <p:nvSpPr>
-          <p:cNvPr id="21" name="Rectangle 20">
-            <a:extLst>
-              <a:ext uri="{FF2B5EF4-FFF2-40B4-BE49-F238E27FC236}">
-                <a16:creationId xmlns:a16="http://schemas.microsoft.com/office/drawing/2014/main" id="{054B3F04-9EAC-45C0-B3CE-0387EEA10A0C}"/>
-              </a:ext>
-              <a:ext uri="{C183D7F6-B498-43B3-948B-1728B52AA6E4}">
-                <adec:decorative xmlns:adec="http://schemas.microsoft.com/office/drawing/2017/decorative" val="1"/>
-              </a:ext>
-            </a:extLst>
-          </p:cNvPr>
-          <p:cNvSpPr>
-            <a:spLocks noGrp="1" noRot="1" noChangeAspect="1" noMove="1" noResize="1" noEditPoints="1" noAdjustHandles="1" noChangeArrowheads="1" noChangeShapeType="1" noTextEdit="1"/>
-          </p:cNvSpPr>
-          <p:nvPr>
-            <p:extLst>
-              <p:ext uri="{386F3935-93C4-4BCD-93E2-E3B085C9AB24}">
-                <p16:designElem xmlns:p16="http://schemas.microsoft.com/office/powerpoint/2015/main" val="1"/>
-              </p:ext>
-            </p:extLst>
-          </p:nvPr>
-        </p:nvSpPr>
-        <p:spPr>
-          <a:xfrm>
-            <a:off x="4040071" y="0"/>
-            <a:ext cx="64008" cy="6858000"/>
-          </a:xfrm>
-          <a:prstGeom prst="rect">
-            <a:avLst/>
-          </a:prstGeom>
-          <a:solidFill>
-            <a:schemeClr val="accent1"/>
-          </a:solidFill>
-          <a:ln>
-            <a:noFill/>
-          </a:ln>
-        </p:spPr>
-        <p:style>
-          <a:lnRef idx="2">
-            <a:schemeClr val="accent1">
-              <a:shade val="50000"/>
-            </a:schemeClr>
-          </a:lnRef>
-          <a:fillRef idx="1">
-            <a:schemeClr val="accent1"/>
-          </a:fillRef>
-          <a:effectRef idx="0">
-            <a:schemeClr val="accent1"/>
-          </a:effectRef>
-          <a:fontRef idx="minor">
-            <a:schemeClr val="lt1"/>
-          </a:fontRef>
-        </p:style>
-      </p:sp>
-      <mc:AlternateContent xmlns:mc="http://schemas.openxmlformats.org/markup-compatibility/2006" xmlns:a14="http://schemas.microsoft.com/office/drawing/2010/main">
-        <mc:Choice Requires="a14">
-          <p:sp>
-            <p:nvSpPr>
-              <p:cNvPr id="3" name="Content Placeholder 2">
-                <a:extLst>
-                  <a:ext uri="{FF2B5EF4-FFF2-40B4-BE49-F238E27FC236}">
-                    <a16:creationId xmlns:a16="http://schemas.microsoft.com/office/drawing/2014/main" id="{4B817802-A38C-4038-895E-B8B15F8D564B}"/>
-                  </a:ext>
-                </a:extLst>
-              </p:cNvPr>
-              <p:cNvSpPr>
-                <a:spLocks noGrp="1"/>
-              </p:cNvSpPr>
-              <p:nvPr>
-                <p:ph idx="1"/>
-              </p:nvPr>
-            </p:nvSpPr>
-            <p:spPr>
-              <a:xfrm>
-                <a:off x="4742016" y="605896"/>
-                <a:ext cx="6413663" cy="5646208"/>
-              </a:xfrm>
-            </p:spPr>
-            <p:txBody>
-              <a:bodyPr anchor="ctr">
-                <a:normAutofit/>
-              </a:bodyPr>
-              <a:lstStyle/>
-              <a:p>
-                <a:pPr lvl="1">
-                  <a:buFont typeface="Arial" panose="020B0604020202020204" pitchFamily="34" charset="0"/>
-                  <a:buChar char="•"/>
-                </a:pPr>
-                <a:r>
-                  <a:rPr lang="en-IN" dirty="0"/>
-                  <a:t>The inbuilt C function </a:t>
-                </a:r>
-                <a:r>
-                  <a:rPr lang="en-IN" dirty="0">
-                    <a:latin typeface="Courier New" panose="02070309020205020404" pitchFamily="49" charset="0"/>
-                    <a:cs typeface="Courier New" panose="02070309020205020404" pitchFamily="49" charset="0"/>
-                  </a:rPr>
-                  <a:t>rand()</a:t>
-                </a:r>
-                <a:r>
-                  <a:rPr lang="en-IN" dirty="0">
-                    <a:cs typeface="Courier New" panose="02070309020205020404" pitchFamily="49" charset="0"/>
-                  </a:rPr>
-                  <a:t>generates random numbers distributed uniformly.</a:t>
-                </a:r>
-              </a:p>
-              <a:p>
-                <a:pPr lvl="1">
-                  <a:buFont typeface="Arial" panose="020B0604020202020204" pitchFamily="34" charset="0"/>
-                  <a:buChar char="•"/>
-                </a:pPr>
-                <a:r>
-                  <a:rPr lang="en-IN" dirty="0">
-                    <a:cs typeface="Courier New" panose="02070309020205020404" pitchFamily="49" charset="0"/>
-                  </a:rPr>
-                  <a:t>Using </a:t>
-                </a:r>
-                <a:r>
-                  <a:rPr lang="en-IN" dirty="0">
-                    <a:latin typeface="Courier New" panose="02070309020205020404" pitchFamily="49" charset="0"/>
-                    <a:cs typeface="Courier New" panose="02070309020205020404" pitchFamily="49" charset="0"/>
-                  </a:rPr>
-                  <a:t>rand()</a:t>
-                </a:r>
-                <a:r>
-                  <a:rPr lang="en-IN" dirty="0">
-                    <a:cs typeface="Courier New" panose="02070309020205020404" pitchFamily="49" charset="0"/>
-                  </a:rPr>
-                  <a:t> we generated </a:t>
-                </a:r>
-                <a14:m>
-                  <m:oMath xmlns:m="http://schemas.openxmlformats.org/officeDocument/2006/math">
-                    <m:sSup>
-                      <m:sSupPr>
-                        <m:ctrlPr>
-                          <a:rPr lang="en-IN" i="1" smtClean="0">
-                            <a:latin typeface="Cambria Math" panose="02040503050406030204" pitchFamily="18" charset="0"/>
-                            <a:cs typeface="Courier New" panose="02070309020205020404" pitchFamily="49" charset="0"/>
-                          </a:rPr>
-                        </m:ctrlPr>
-                      </m:sSupPr>
-                      <m:e>
-                        <m:r>
-                          <a:rPr lang="en-IN" b="0" i="1" smtClean="0">
-                            <a:latin typeface="Cambria Math" panose="02040503050406030204" pitchFamily="18" charset="0"/>
-                            <a:cs typeface="Courier New" panose="02070309020205020404" pitchFamily="49" charset="0"/>
-                          </a:rPr>
-                          <m:t>10</m:t>
-                        </m:r>
-                      </m:e>
-                      <m:sup>
-                        <m:r>
-                          <a:rPr lang="en-IN" b="0" i="1" smtClean="0">
-                            <a:latin typeface="Cambria Math" panose="02040503050406030204" pitchFamily="18" charset="0"/>
-                            <a:cs typeface="Courier New" panose="02070309020205020404" pitchFamily="49" charset="0"/>
-                          </a:rPr>
-                          <m:t>6</m:t>
-                        </m:r>
-                      </m:sup>
-                    </m:sSup>
-                  </m:oMath>
-                </a14:m>
-                <a:r>
-                  <a:rPr lang="en-IN" dirty="0"/>
-                  <a:t> uniformly distributed random numbers between 0 to 100 and stored it in </a:t>
-                </a:r>
-                <a:r>
-                  <a:rPr lang="en-IN" dirty="0">
-                    <a:latin typeface="Courier New" panose="02070309020205020404" pitchFamily="49" charset="0"/>
-                    <a:cs typeface="Courier New" panose="02070309020205020404" pitchFamily="49" charset="0"/>
-                  </a:rPr>
-                  <a:t>uniform_distribution.csv </a:t>
-                </a:r>
-                <a:r>
-                  <a:rPr lang="en-IN" dirty="0"/>
-                  <a:t>which will act as uniformly distributed dataset for further works.</a:t>
-                </a:r>
-              </a:p>
-              <a:p>
-                <a:pPr lvl="1">
-                  <a:buFont typeface="Arial" panose="020B0604020202020204" pitchFamily="34" charset="0"/>
-                  <a:buChar char="•"/>
-                </a:pPr>
-                <a:r>
-                  <a:rPr lang="en-IN" dirty="0"/>
-                  <a:t>We also plotted a histogram of the dataset to make sure that the dataset generation worked well or not…</a:t>
-                </a:r>
-              </a:p>
-            </p:txBody>
-          </p:sp>
-        </mc:Choice>
-        <mc:Fallback xmlns="">
-          <p:sp>
-            <p:nvSpPr>
-              <p:cNvPr id="3" name="Content Placeholder 2">
-                <a:extLst>
-                  <a:ext uri="{FF2B5EF4-FFF2-40B4-BE49-F238E27FC236}">
-                    <a16:creationId xmlns:a16="http://schemas.microsoft.com/office/drawing/2014/main" id="{4B817802-A38C-4038-895E-B8B15F8D564B}"/>
-                  </a:ext>
-                </a:extLst>
-              </p:cNvPr>
-              <p:cNvSpPr>
-                <a:spLocks noGrp="1" noRot="1" noChangeAspect="1" noMove="1" noResize="1" noEditPoints="1" noAdjustHandles="1" noChangeArrowheads="1" noChangeShapeType="1" noTextEdit="1"/>
-              </p:cNvSpPr>
-              <p:nvPr>
-                <p:ph idx="1"/>
-              </p:nvPr>
-            </p:nvSpPr>
-            <p:spPr>
-              <a:xfrm>
-                <a:off x="4742016" y="605896"/>
-                <a:ext cx="6413663" cy="5646208"/>
-              </a:xfrm>
-              <a:blipFill>
-                <a:blip r:embed="rId2"/>
-                <a:stretch>
-                  <a:fillRect r="-2567"/>
-                </a:stretch>
-              </a:blipFill>
-            </p:spPr>
-            <p:txBody>
-              <a:bodyPr/>
-              <a:lstStyle/>
-              <a:p>
-                <a:r>
-                  <a:rPr lang="en-IN">
-                    <a:noFill/>
-                  </a:rPr>
-                  <a:t> </a:t>
-                </a:r>
-              </a:p>
-            </p:txBody>
-          </p:sp>
-        </mc:Fallback>
-      </mc:AlternateContent>
-    </p:spTree>
-    <p:extLst>
-      <p:ext uri="{BB962C8B-B14F-4D97-AF65-F5344CB8AC3E}">
-        <p14:creationId xmlns:p14="http://schemas.microsoft.com/office/powerpoint/2010/main" val="2594329012"/>
-      </p:ext>
-    </p:extLst>
-  </p:cSld>
-  <p:clrMapOvr>
-    <a:masterClrMapping/>
-  </p:clrMapOvr>
-</p:sld>
-</file>
-
-<file path=ppt/slides/slide40.xml><?xml version="1.0" encoding="utf-8"?>
+<file path=ppt/slides/slide42.xml><?xml version="1.0" encoding="utf-8"?>
 <p:sld xmlns:a="http://schemas.openxmlformats.org/drawingml/2006/main" xmlns:r="http://schemas.openxmlformats.org/officeDocument/2006/relationships" xmlns:p="http://schemas.openxmlformats.org/presentationml/2006/main">
   <p:cSld>
     <p:bg>
@@ -32562,7 +33631,7 @@
 </p:sld>
 </file>
 
-<file path=ppt/slides/slide41.xml><?xml version="1.0" encoding="utf-8"?>
+<file path=ppt/slides/slide43.xml><?xml version="1.0" encoding="utf-8"?>
 <p:sld xmlns:a="http://schemas.openxmlformats.org/drawingml/2006/main" xmlns:r="http://schemas.openxmlformats.org/officeDocument/2006/relationships" xmlns:p="http://schemas.openxmlformats.org/presentationml/2006/main">
   <p:cSld>
     <p:bg>
@@ -33026,7 +34095,7 @@
 </p:sld>
 </file>
 
-<file path=ppt/slides/slide42.xml><?xml version="1.0" encoding="utf-8"?>
+<file path=ppt/slides/slide44.xml><?xml version="1.0" encoding="utf-8"?>
 <p:sld xmlns:a="http://schemas.openxmlformats.org/drawingml/2006/main" xmlns:r="http://schemas.openxmlformats.org/officeDocument/2006/relationships" xmlns:p="http://schemas.openxmlformats.org/presentationml/2006/main">
   <p:cSld>
     <p:bg>
@@ -33441,7 +34510,7 @@
 </p:sld>
 </file>
 
-<file path=ppt/slides/slide43.xml><?xml version="1.0" encoding="utf-8"?>
+<file path=ppt/slides/slide45.xml><?xml version="1.0" encoding="utf-8"?>
 <p:sld xmlns:a="http://schemas.openxmlformats.org/drawingml/2006/main" xmlns:r="http://schemas.openxmlformats.org/officeDocument/2006/relationships" xmlns:p="http://schemas.openxmlformats.org/presentationml/2006/main">
   <p:cSld>
     <p:bg>
@@ -33812,7 +34881,7 @@
 </p:sld>
 </file>
 
-<file path=ppt/slides/slide44.xml><?xml version="1.0" encoding="utf-8"?>
+<file path=ppt/slides/slide46.xml><?xml version="1.0" encoding="utf-8"?>
 <p:sld xmlns:a="http://schemas.openxmlformats.org/drawingml/2006/main" xmlns:r="http://schemas.openxmlformats.org/officeDocument/2006/relationships" xmlns:p="http://schemas.openxmlformats.org/presentationml/2006/main">
   <p:cSld>
     <p:bg>
@@ -34276,7 +35345,7 @@
 </p:sld>
 </file>
 
-<file path=ppt/slides/slide45.xml><?xml version="1.0" encoding="utf-8"?>
+<file path=ppt/slides/slide47.xml><?xml version="1.0" encoding="utf-8"?>
 <p:sld xmlns:a="http://schemas.openxmlformats.org/drawingml/2006/main" xmlns:r="http://schemas.openxmlformats.org/officeDocument/2006/relationships" xmlns:p="http://schemas.openxmlformats.org/presentationml/2006/main">
   <p:cSld>
     <p:bg>
@@ -34734,7 +35803,7 @@
 </p:sld>
 </file>
 
-<file path=ppt/slides/slide46.xml><?xml version="1.0" encoding="utf-8"?>
+<file path=ppt/slides/slide48.xml><?xml version="1.0" encoding="utf-8"?>
 <p:sld xmlns:a="http://schemas.openxmlformats.org/drawingml/2006/main" xmlns:r="http://schemas.openxmlformats.org/officeDocument/2006/relationships" xmlns:p="http://schemas.openxmlformats.org/presentationml/2006/main">
   <p:cSld>
     <p:bg>
@@ -35232,7 +36301,7 @@
 </p:sld>
 </file>
 
-<file path=ppt/slides/slide47.xml><?xml version="1.0" encoding="utf-8"?>
+<file path=ppt/slides/slide49.xml><?xml version="1.0" encoding="utf-8"?>
 <p:sld xmlns:a="http://schemas.openxmlformats.org/drawingml/2006/main" xmlns:r="http://schemas.openxmlformats.org/officeDocument/2006/relationships" xmlns:p="http://schemas.openxmlformats.org/presentationml/2006/main">
   <p:cSld>
     <p:bg>

</xml_diff>

<commit_message>
problem 3 coding done
</commit_message>
<xml_diff>
--- a/Assignment 1/Assignment Presentation.pptx
+++ b/Assignment 1/Assignment Presentation.pptx
@@ -170,7 +170,7 @@
 <p1510:revInfo xmlns:a="http://schemas.openxmlformats.org/drawingml/2006/main" xmlns:r="http://schemas.openxmlformats.org/officeDocument/2006/relationships" xmlns:p1510="http://schemas.microsoft.com/office/powerpoint/2015/10/main">
   <p1510:revLst>
     <p1510:client id="{B5950655-B52F-4C4A-8D4C-2CA8B2A214A1}" v="2005" dt="2021-04-06T19:15:56.565"/>
-    <p1510:client id="{BA04AB18-81BA-44F6-8A17-E30D392E2E82}" v="2143" dt="2021-04-07T16:10:53.608"/>
+    <p1510:client id="{BA04AB18-81BA-44F6-8A17-E30D392E2E82}" v="2158" dt="2021-04-07T17:06:23.531"/>
   </p1510:revLst>
 </p1510:revInfo>
 </file>
@@ -1811,7 +1811,7 @@
   <pc:docChgLst>
     <pc:chgData name="Abhiroop Mukherjee" userId="5fbc6062963ca2c0" providerId="LiveId" clId="{BA04AB18-81BA-44F6-8A17-E30D392E2E82}"/>
     <pc:docChg chg="undo redo custSel addSld delSld modSld sldOrd">
-      <pc:chgData name="Abhiroop Mukherjee" userId="5fbc6062963ca2c0" providerId="LiveId" clId="{BA04AB18-81BA-44F6-8A17-E30D392E2E82}" dt="2021-04-07T16:12:55.338" v="4103" actId="26606"/>
+      <pc:chgData name="Abhiroop Mukherjee" userId="5fbc6062963ca2c0" providerId="LiveId" clId="{BA04AB18-81BA-44F6-8A17-E30D392E2E82}" dt="2021-04-07T17:07:06.107" v="4128" actId="732"/>
       <pc:docMkLst>
         <pc:docMk/>
       </pc:docMkLst>
@@ -1965,6 +1965,84 @@
             <ac:cxnSpMk id="77" creationId="{C947DF4A-614C-4B4C-8B80-E5B9D8E8CFED}"/>
           </ac:cxnSpMkLst>
         </pc:cxnChg>
+      </pc:sldChg>
+      <pc:sldChg chg="modSp mod">
+        <pc:chgData name="Abhiroop Mukherjee" userId="5fbc6062963ca2c0" providerId="LiveId" clId="{BA04AB18-81BA-44F6-8A17-E30D392E2E82}" dt="2021-04-07T17:07:06.107" v="4128" actId="732"/>
+        <pc:sldMkLst>
+          <pc:docMk/>
+          <pc:sldMk cId="3066035579" sldId="266"/>
+        </pc:sldMkLst>
+        <pc:picChg chg="mod modCrop">
+          <ac:chgData name="Abhiroop Mukherjee" userId="5fbc6062963ca2c0" providerId="LiveId" clId="{BA04AB18-81BA-44F6-8A17-E30D392E2E82}" dt="2021-04-07T17:07:06.107" v="4128" actId="732"/>
+          <ac:picMkLst>
+            <pc:docMk/>
+            <pc:sldMk cId="3066035579" sldId="266"/>
+            <ac:picMk id="5" creationId="{66ACF5EE-B012-4BDB-A31F-C5EBFB1ECF9F}"/>
+          </ac:picMkLst>
+        </pc:picChg>
+      </pc:sldChg>
+      <pc:sldChg chg="addSp delSp modSp mod">
+        <pc:chgData name="Abhiroop Mukherjee" userId="5fbc6062963ca2c0" providerId="LiveId" clId="{BA04AB18-81BA-44F6-8A17-E30D392E2E82}" dt="2021-04-07T17:03:10.262" v="4126" actId="26606"/>
+        <pc:sldMkLst>
+          <pc:docMk/>
+          <pc:sldMk cId="2940843886" sldId="277"/>
+        </pc:sldMkLst>
+        <pc:spChg chg="mod">
+          <ac:chgData name="Abhiroop Mukherjee" userId="5fbc6062963ca2c0" providerId="LiveId" clId="{BA04AB18-81BA-44F6-8A17-E30D392E2E82}" dt="2021-04-07T17:02:59.508" v="4125" actId="20577"/>
+          <ac:spMkLst>
+            <pc:docMk/>
+            <pc:sldMk cId="2940843886" sldId="277"/>
+            <ac:spMk id="3" creationId="{4B817802-A38C-4038-895E-B8B15F8D564B}"/>
+          </ac:spMkLst>
+        </pc:spChg>
+        <pc:spChg chg="del">
+          <ac:chgData name="Abhiroop Mukherjee" userId="5fbc6062963ca2c0" providerId="LiveId" clId="{BA04AB18-81BA-44F6-8A17-E30D392E2E82}" dt="2021-04-07T17:03:10.262" v="4126" actId="26606"/>
+          <ac:spMkLst>
+            <pc:docMk/>
+            <pc:sldMk cId="2940843886" sldId="277"/>
+            <ac:spMk id="24" creationId="{3741B58E-3B65-4A01-A276-975AB2CF8A08}"/>
+          </ac:spMkLst>
+        </pc:spChg>
+        <pc:spChg chg="del">
+          <ac:chgData name="Abhiroop Mukherjee" userId="5fbc6062963ca2c0" providerId="LiveId" clId="{BA04AB18-81BA-44F6-8A17-E30D392E2E82}" dt="2021-04-07T17:03:10.262" v="4126" actId="26606"/>
+          <ac:spMkLst>
+            <pc:docMk/>
+            <pc:sldMk cId="2940843886" sldId="277"/>
+            <ac:spMk id="25" creationId="{7AAC67C3-831B-4AB1-A259-DFB839CAFAFC}"/>
+          </ac:spMkLst>
+        </pc:spChg>
+        <pc:spChg chg="del">
+          <ac:chgData name="Abhiroop Mukherjee" userId="5fbc6062963ca2c0" providerId="LiveId" clId="{BA04AB18-81BA-44F6-8A17-E30D392E2E82}" dt="2021-04-07T17:03:10.262" v="4126" actId="26606"/>
+          <ac:spMkLst>
+            <pc:docMk/>
+            <pc:sldMk cId="2940843886" sldId="277"/>
+            <ac:spMk id="26" creationId="{054B3F04-9EAC-45C0-B3CE-0387EEA10A0C}"/>
+          </ac:spMkLst>
+        </pc:spChg>
+        <pc:spChg chg="add">
+          <ac:chgData name="Abhiroop Mukherjee" userId="5fbc6062963ca2c0" providerId="LiveId" clId="{BA04AB18-81BA-44F6-8A17-E30D392E2E82}" dt="2021-04-07T17:03:10.262" v="4126" actId="26606"/>
+          <ac:spMkLst>
+            <pc:docMk/>
+            <pc:sldMk cId="2940843886" sldId="277"/>
+            <ac:spMk id="31" creationId="{3741B58E-3B65-4A01-A276-975AB2CF8A08}"/>
+          </ac:spMkLst>
+        </pc:spChg>
+        <pc:spChg chg="add">
+          <ac:chgData name="Abhiroop Mukherjee" userId="5fbc6062963ca2c0" providerId="LiveId" clId="{BA04AB18-81BA-44F6-8A17-E30D392E2E82}" dt="2021-04-07T17:03:10.262" v="4126" actId="26606"/>
+          <ac:spMkLst>
+            <pc:docMk/>
+            <pc:sldMk cId="2940843886" sldId="277"/>
+            <ac:spMk id="33" creationId="{7AAC67C3-831B-4AB1-A259-DFB839CAFAFC}"/>
+          </ac:spMkLst>
+        </pc:spChg>
+        <pc:spChg chg="add">
+          <ac:chgData name="Abhiroop Mukherjee" userId="5fbc6062963ca2c0" providerId="LiveId" clId="{BA04AB18-81BA-44F6-8A17-E30D392E2E82}" dt="2021-04-07T17:03:10.262" v="4126" actId="26606"/>
+          <ac:spMkLst>
+            <pc:docMk/>
+            <pc:sldMk cId="2940843886" sldId="277"/>
+            <ac:spMk id="35" creationId="{054B3F04-9EAC-45C0-B3CE-0387EEA10A0C}"/>
+          </ac:spMkLst>
+        </pc:spChg>
       </pc:sldChg>
       <pc:sldChg chg="addSp modSp new mod ord setBg addAnim">
         <pc:chgData name="Abhiroop Mukherjee" userId="5fbc6062963ca2c0" providerId="LiveId" clId="{BA04AB18-81BA-44F6-8A17-E30D392E2E82}" dt="2021-04-06T19:27:29.745" v="62" actId="20577"/>
@@ -34414,7 +34492,7 @@
       </p:grpSpPr>
       <p:sp useBgFill="1">
         <p:nvSpPr>
-          <p:cNvPr id="24" name="Rectangle 16">
+          <p:cNvPr id="31" name="Rectangle 30">
             <a:extLst>
               <a:ext uri="{FF2B5EF4-FFF2-40B4-BE49-F238E27FC236}">
                 <a16:creationId xmlns:a16="http://schemas.microsoft.com/office/drawing/2014/main" id="{3741B58E-3B65-4A01-A276-975AB2CF8A08}"/>
@@ -34468,13 +34546,13 @@
           <a:lstStyle/>
           <a:p>
             <a:pPr algn="ctr"/>
-            <a:endParaRPr lang="en-US" dirty="0"/>
+            <a:endParaRPr lang="en-US"/>
           </a:p>
         </p:txBody>
       </p:sp>
       <p:sp>
         <p:nvSpPr>
-          <p:cNvPr id="25" name="Rectangle 18">
+          <p:cNvPr id="33" name="Rectangle 32">
             <a:extLst>
               <a:ext uri="{FF2B5EF4-FFF2-40B4-BE49-F238E27FC236}">
                 <a16:creationId xmlns:a16="http://schemas.microsoft.com/office/drawing/2014/main" id="{7AAC67C3-831B-4AB1-A259-DFB839CAFAFC}"/>
@@ -34568,7 +34646,7 @@
       </p:sp>
       <p:sp>
         <p:nvSpPr>
-          <p:cNvPr id="26" name="Rectangle 20">
+          <p:cNvPr id="35" name="Rectangle 34">
             <a:extLst>
               <a:ext uri="{FF2B5EF4-FFF2-40B4-BE49-F238E27FC236}">
                 <a16:creationId xmlns:a16="http://schemas.microsoft.com/office/drawing/2014/main" id="{054B3F04-9EAC-45C0-B3CE-0387EEA10A0C}"/>
@@ -34621,8 +34699,8 @@
           </a:fontRef>
         </p:style>
       </p:sp>
-      <mc:AlternateContent xmlns:mc="http://schemas.openxmlformats.org/markup-compatibility/2006" xmlns:a14="http://schemas.microsoft.com/office/drawing/2010/main">
-        <mc:Choice Requires="a14">
+      <mc:AlternateContent xmlns:mc="http://schemas.openxmlformats.org/markup-compatibility/2006">
+        <mc:Choice xmlns:a14="http://schemas.microsoft.com/office/drawing/2010/main" Requires="a14">
           <p:sp>
             <p:nvSpPr>
               <p:cNvPr id="3" name="Content Placeholder 2">
@@ -34657,31 +34735,7 @@
                 </a:pPr>
                 <a:r>
                   <a:rPr lang="en-IN" dirty="0"/>
-                  <a:t>We did Bucket Sort for different array size, which starts from 2 and increments in powers of 2 till our system gives Error due to Huge Size</a:t>
-                </a:r>
-              </a:p>
-              <a:p>
-                <a:pPr lvl="2">
-                  <a:buFont typeface="Arial" panose="020B0604020202020204" pitchFamily="34" charset="0"/>
-                  <a:buChar char="•"/>
-                </a:pPr>
-                <a:r>
-                  <a:rPr lang="en-IN" dirty="0"/>
-                  <a:t>We were able to record observation from array size </a:t>
-                </a:r>
-                <a14:m>
-                  <m:oMath xmlns:m="http://schemas.openxmlformats.org/officeDocument/2006/math">
-                    <m:r>
-                      <a:rPr lang="en-IN" b="0" i="1" smtClean="0">
-                        <a:latin typeface="Cambria Math" panose="02040503050406030204" pitchFamily="18" charset="0"/>
-                      </a:rPr>
-                      <m:t>2</m:t>
-                    </m:r>
-                  </m:oMath>
-                </a14:m>
-                <a:r>
-                  <a:rPr lang="en-IN" dirty="0"/>
-                  <a:t> to array size </a:t>
+                  <a:t>We did Bucket Sort for different array size, which starts from 2 and increments in powers of 2 till </a:t>
                 </a:r>
                 <a14:m>
                   <m:oMath xmlns:m="http://schemas.openxmlformats.org/officeDocument/2006/math">
@@ -34706,7 +34760,7 @@
                           <a:rPr lang="en-IN" b="0" i="1" smtClean="0">
                             <a:latin typeface="Cambria Math" panose="02040503050406030204" pitchFamily="18" charset="0"/>
                           </a:rPr>
-                          <m:t>19</m:t>
+                          <m:t>15</m:t>
                         </m:r>
                       </m:sup>
                     </m:sSup>
@@ -34739,7 +34793,7 @@
                 </a14:m>
                 <a:r>
                   <a:rPr lang="en-IN" dirty="0"/>
-                  <a:t>, we sorted 100 different arrays of size </a:t>
+                  <a:t>, we sorted 10 different arrays of size </a:t>
                 </a:r>
                 <a14:m>
                   <m:oMath xmlns:m="http://schemas.openxmlformats.org/officeDocument/2006/math">
@@ -34956,7 +35010,7 @@
             </p:txBody>
           </p:sp>
         </mc:Choice>
-        <mc:Fallback xmlns="">
+        <mc:Fallback>
           <p:sp>
             <p:nvSpPr>
               <p:cNvPr id="3" name="Content Placeholder 2">
@@ -35155,12 +35209,12 @@
               </a:ext>
             </a:extLst>
           </a:blip>
-          <a:srcRect l="2293" r="6693"/>
+          <a:srcRect l="2397" t="-97" r="6589" b="97"/>
           <a:stretch/>
         </p:blipFill>
         <p:spPr>
           <a:xfrm>
-            <a:off x="633999" y="640081"/>
+            <a:off x="474842" y="634946"/>
             <a:ext cx="6909801" cy="5314406"/>
           </a:xfrm>
           <a:prstGeom prst="rect">

</xml_diff>

<commit_message>
Problem 3 sortof done?
</commit_message>
<xml_diff>
--- a/Assignment 1/Assignment Presentation.pptx
+++ b/Assignment 1/Assignment Presentation.pptx
@@ -169,8 +169,7 @@
 <file path=ppt/revisionInfo.xml><?xml version="1.0" encoding="utf-8"?>
 <p1510:revInfo xmlns:a="http://schemas.openxmlformats.org/drawingml/2006/main" xmlns:r="http://schemas.openxmlformats.org/officeDocument/2006/relationships" xmlns:p1510="http://schemas.microsoft.com/office/powerpoint/2015/10/main">
   <p1510:revLst>
-    <p1510:client id="{B5950655-B52F-4C4A-8D4C-2CA8B2A214A1}" v="2005" dt="2021-04-06T19:15:56.565"/>
-    <p1510:client id="{BA04AB18-81BA-44F6-8A17-E30D392E2E82}" v="2158" dt="2021-04-07T17:06:23.531"/>
+    <p1510:client id="{BA04AB18-81BA-44F6-8A17-E30D392E2E82}" v="2237" dt="2021-04-07T19:15:32.023"/>
   </p1510:revLst>
 </p1510:revInfo>
 </file>
@@ -1811,7 +1810,7 @@
   <pc:docChgLst>
     <pc:chgData name="Abhiroop Mukherjee" userId="5fbc6062963ca2c0" providerId="LiveId" clId="{BA04AB18-81BA-44F6-8A17-E30D392E2E82}"/>
     <pc:docChg chg="undo redo custSel addSld delSld modSld sldOrd">
-      <pc:chgData name="Abhiroop Mukherjee" userId="5fbc6062963ca2c0" providerId="LiveId" clId="{BA04AB18-81BA-44F6-8A17-E30D392E2E82}" dt="2021-04-07T17:07:06.107" v="4128" actId="732"/>
+      <pc:chgData name="Abhiroop Mukherjee" userId="5fbc6062963ca2c0" providerId="LiveId" clId="{BA04AB18-81BA-44F6-8A17-E30D392E2E82}" dt="2021-04-07T19:15:43.042" v="4653" actId="26606"/>
       <pc:docMkLst>
         <pc:docMk/>
       </pc:docMkLst>
@@ -1966,29 +1965,197 @@
           </ac:cxnSpMkLst>
         </pc:cxnChg>
       </pc:sldChg>
-      <pc:sldChg chg="modSp mod">
-        <pc:chgData name="Abhiroop Mukherjee" userId="5fbc6062963ca2c0" providerId="LiveId" clId="{BA04AB18-81BA-44F6-8A17-E30D392E2E82}" dt="2021-04-07T17:07:06.107" v="4128" actId="732"/>
+      <pc:sldChg chg="addSp delSp modSp mod">
+        <pc:chgData name="Abhiroop Mukherjee" userId="5fbc6062963ca2c0" providerId="LiveId" clId="{BA04AB18-81BA-44F6-8A17-E30D392E2E82}" dt="2021-04-07T19:13:23.377" v="4582" actId="20577"/>
         <pc:sldMkLst>
           <pc:docMk/>
           <pc:sldMk cId="3066035579" sldId="266"/>
         </pc:sldMkLst>
-        <pc:picChg chg="mod modCrop">
-          <ac:chgData name="Abhiroop Mukherjee" userId="5fbc6062963ca2c0" providerId="LiveId" clId="{BA04AB18-81BA-44F6-8A17-E30D392E2E82}" dt="2021-04-07T17:07:06.107" v="4128" actId="732"/>
+        <pc:spChg chg="mod">
+          <ac:chgData name="Abhiroop Mukherjee" userId="5fbc6062963ca2c0" providerId="LiveId" clId="{BA04AB18-81BA-44F6-8A17-E30D392E2E82}" dt="2021-04-07T19:11:57.457" v="4316" actId="26606"/>
+          <ac:spMkLst>
+            <pc:docMk/>
+            <pc:sldMk cId="3066035579" sldId="266"/>
+            <ac:spMk id="2" creationId="{0CF820E1-E514-4B58-98AB-89F302D91E31}"/>
+          </ac:spMkLst>
+        </pc:spChg>
+        <pc:spChg chg="mod">
+          <ac:chgData name="Abhiroop Mukherjee" userId="5fbc6062963ca2c0" providerId="LiveId" clId="{BA04AB18-81BA-44F6-8A17-E30D392E2E82}" dt="2021-04-07T19:13:23.377" v="4582" actId="20577"/>
+          <ac:spMkLst>
+            <pc:docMk/>
+            <pc:sldMk cId="3066035579" sldId="266"/>
+            <ac:spMk id="9" creationId="{FB3ADEF1-B48E-4597-8478-E89F81BA647C}"/>
+          </ac:spMkLst>
+        </pc:spChg>
+        <pc:spChg chg="add del">
+          <ac:chgData name="Abhiroop Mukherjee" userId="5fbc6062963ca2c0" providerId="LiveId" clId="{BA04AB18-81BA-44F6-8A17-E30D392E2E82}" dt="2021-04-07T19:11:57.457" v="4316" actId="26606"/>
+          <ac:spMkLst>
+            <pc:docMk/>
+            <pc:sldMk cId="3066035579" sldId="266"/>
+            <ac:spMk id="41" creationId="{10162E77-11AD-44A7-84EC-40C59EEFBD2E}"/>
+          </ac:spMkLst>
+        </pc:spChg>
+        <pc:spChg chg="add del">
+          <ac:chgData name="Abhiroop Mukherjee" userId="5fbc6062963ca2c0" providerId="LiveId" clId="{BA04AB18-81BA-44F6-8A17-E30D392E2E82}" dt="2021-04-07T19:11:57.457" v="4316" actId="26606"/>
+          <ac:spMkLst>
+            <pc:docMk/>
+            <pc:sldMk cId="3066035579" sldId="266"/>
+            <ac:spMk id="43" creationId="{6329CBCE-21AE-419D-AC1F-8ACF510A6670}"/>
+          </ac:spMkLst>
+        </pc:spChg>
+        <pc:spChg chg="add del">
+          <ac:chgData name="Abhiroop Mukherjee" userId="5fbc6062963ca2c0" providerId="LiveId" clId="{BA04AB18-81BA-44F6-8A17-E30D392E2E82}" dt="2021-04-07T19:11:57.457" v="4316" actId="26606"/>
+          <ac:spMkLst>
+            <pc:docMk/>
+            <pc:sldMk cId="3066035579" sldId="266"/>
+            <ac:spMk id="44" creationId="{FF2DA012-1414-493D-888F-5D99D0BDA322}"/>
+          </ac:spMkLst>
+        </pc:spChg>
+        <pc:spChg chg="add del">
+          <ac:chgData name="Abhiroop Mukherjee" userId="5fbc6062963ca2c0" providerId="LiveId" clId="{BA04AB18-81BA-44F6-8A17-E30D392E2E82}" dt="2021-04-07T19:11:54.603" v="4313" actId="26606"/>
+          <ac:spMkLst>
+            <pc:docMk/>
+            <pc:sldMk cId="3066035579" sldId="266"/>
+            <ac:spMk id="49" creationId="{52ABB703-2B0E-4C3B-B4A2-F3973548E561}"/>
+          </ac:spMkLst>
+        </pc:spChg>
+        <pc:spChg chg="add del">
+          <ac:chgData name="Abhiroop Mukherjee" userId="5fbc6062963ca2c0" providerId="LiveId" clId="{BA04AB18-81BA-44F6-8A17-E30D392E2E82}" dt="2021-04-07T19:11:54.603" v="4313" actId="26606"/>
+          <ac:spMkLst>
+            <pc:docMk/>
+            <pc:sldMk cId="3066035579" sldId="266"/>
+            <ac:spMk id="53" creationId="{E95DA498-D9A2-4DA9-B9DA-B3776E08CF7E}"/>
+          </ac:spMkLst>
+        </pc:spChg>
+        <pc:spChg chg="add del">
+          <ac:chgData name="Abhiroop Mukherjee" userId="5fbc6062963ca2c0" providerId="LiveId" clId="{BA04AB18-81BA-44F6-8A17-E30D392E2E82}" dt="2021-04-07T19:11:54.603" v="4313" actId="26606"/>
+          <ac:spMkLst>
+            <pc:docMk/>
+            <pc:sldMk cId="3066035579" sldId="266"/>
+            <ac:spMk id="55" creationId="{82A73093-4B9D-420D-B17E-52293703A1D4}"/>
+          </ac:spMkLst>
+        </pc:spChg>
+        <pc:spChg chg="add del">
+          <ac:chgData name="Abhiroop Mukherjee" userId="5fbc6062963ca2c0" providerId="LiveId" clId="{BA04AB18-81BA-44F6-8A17-E30D392E2E82}" dt="2021-04-07T19:11:57.457" v="4315" actId="26606"/>
+          <ac:spMkLst>
+            <pc:docMk/>
+            <pc:sldMk cId="3066035579" sldId="266"/>
+            <ac:spMk id="57" creationId="{990D0034-F768-41E7-85D4-F38C4DE85770}"/>
+          </ac:spMkLst>
+        </pc:spChg>
+        <pc:spChg chg="add del">
+          <ac:chgData name="Abhiroop Mukherjee" userId="5fbc6062963ca2c0" providerId="LiveId" clId="{BA04AB18-81BA-44F6-8A17-E30D392E2E82}" dt="2021-04-07T19:11:57.457" v="4315" actId="26606"/>
+          <ac:spMkLst>
+            <pc:docMk/>
+            <pc:sldMk cId="3066035579" sldId="266"/>
+            <ac:spMk id="58" creationId="{C4F7E42D-8B5A-4FC8-81CD-9E60171F7FA8}"/>
+          </ac:spMkLst>
+        </pc:spChg>
+        <pc:spChg chg="add del">
+          <ac:chgData name="Abhiroop Mukherjee" userId="5fbc6062963ca2c0" providerId="LiveId" clId="{BA04AB18-81BA-44F6-8A17-E30D392E2E82}" dt="2021-04-07T19:11:57.457" v="4315" actId="26606"/>
+          <ac:spMkLst>
+            <pc:docMk/>
+            <pc:sldMk cId="3066035579" sldId="266"/>
+            <ac:spMk id="59" creationId="{8C04651D-B9F4-4935-A02D-364153FBDF54}"/>
+          </ac:spMkLst>
+        </pc:spChg>
+        <pc:spChg chg="add del">
+          <ac:chgData name="Abhiroop Mukherjee" userId="5fbc6062963ca2c0" providerId="LiveId" clId="{BA04AB18-81BA-44F6-8A17-E30D392E2E82}" dt="2021-04-07T19:12:04.943" v="4318" actId="26606"/>
+          <ac:spMkLst>
+            <pc:docMk/>
+            <pc:sldMk cId="3066035579" sldId="266"/>
+            <ac:spMk id="61" creationId="{52ABB703-2B0E-4C3B-B4A2-F3973548E561}"/>
+          </ac:spMkLst>
+        </pc:spChg>
+        <pc:spChg chg="add del">
+          <ac:chgData name="Abhiroop Mukherjee" userId="5fbc6062963ca2c0" providerId="LiveId" clId="{BA04AB18-81BA-44F6-8A17-E30D392E2E82}" dt="2021-04-07T19:12:04.943" v="4318" actId="26606"/>
+          <ac:spMkLst>
+            <pc:docMk/>
+            <pc:sldMk cId="3066035579" sldId="266"/>
+            <ac:spMk id="63" creationId="{E95DA498-D9A2-4DA9-B9DA-B3776E08CF7E}"/>
+          </ac:spMkLst>
+        </pc:spChg>
+        <pc:spChg chg="add del">
+          <ac:chgData name="Abhiroop Mukherjee" userId="5fbc6062963ca2c0" providerId="LiveId" clId="{BA04AB18-81BA-44F6-8A17-E30D392E2E82}" dt="2021-04-07T19:12:04.943" v="4318" actId="26606"/>
+          <ac:spMkLst>
+            <pc:docMk/>
+            <pc:sldMk cId="3066035579" sldId="266"/>
+            <ac:spMk id="64" creationId="{82A73093-4B9D-420D-B17E-52293703A1D4}"/>
+          </ac:spMkLst>
+        </pc:spChg>
+        <pc:spChg chg="add">
+          <ac:chgData name="Abhiroop Mukherjee" userId="5fbc6062963ca2c0" providerId="LiveId" clId="{BA04AB18-81BA-44F6-8A17-E30D392E2E82}" dt="2021-04-07T19:12:04.943" v="4318" actId="26606"/>
+          <ac:spMkLst>
+            <pc:docMk/>
+            <pc:sldMk cId="3066035579" sldId="266"/>
+            <ac:spMk id="69" creationId="{52ABB703-2B0E-4C3B-B4A2-F3973548E561}"/>
+          </ac:spMkLst>
+        </pc:spChg>
+        <pc:spChg chg="add">
+          <ac:chgData name="Abhiroop Mukherjee" userId="5fbc6062963ca2c0" providerId="LiveId" clId="{BA04AB18-81BA-44F6-8A17-E30D392E2E82}" dt="2021-04-07T19:12:04.943" v="4318" actId="26606"/>
+          <ac:spMkLst>
+            <pc:docMk/>
+            <pc:sldMk cId="3066035579" sldId="266"/>
+            <ac:spMk id="73" creationId="{E95DA498-D9A2-4DA9-B9DA-B3776E08CF7E}"/>
+          </ac:spMkLst>
+        </pc:spChg>
+        <pc:spChg chg="add">
+          <ac:chgData name="Abhiroop Mukherjee" userId="5fbc6062963ca2c0" providerId="LiveId" clId="{BA04AB18-81BA-44F6-8A17-E30D392E2E82}" dt="2021-04-07T19:12:04.943" v="4318" actId="26606"/>
+          <ac:spMkLst>
+            <pc:docMk/>
+            <pc:sldMk cId="3066035579" sldId="266"/>
+            <ac:spMk id="75" creationId="{82A73093-4B9D-420D-B17E-52293703A1D4}"/>
+          </ac:spMkLst>
+        </pc:spChg>
+        <pc:picChg chg="mod ord modCrop">
+          <ac:chgData name="Abhiroop Mukherjee" userId="5fbc6062963ca2c0" providerId="LiveId" clId="{BA04AB18-81BA-44F6-8A17-E30D392E2E82}" dt="2021-04-07T19:12:04.943" v="4318" actId="26606"/>
           <ac:picMkLst>
             <pc:docMk/>
             <pc:sldMk cId="3066035579" sldId="266"/>
             <ac:picMk id="5" creationId="{66ACF5EE-B012-4BDB-A31F-C5EBFB1ECF9F}"/>
           </ac:picMkLst>
         </pc:picChg>
+        <pc:cxnChg chg="add del">
+          <ac:chgData name="Abhiroop Mukherjee" userId="5fbc6062963ca2c0" providerId="LiveId" clId="{BA04AB18-81BA-44F6-8A17-E30D392E2E82}" dt="2021-04-07T19:11:57.457" v="4316" actId="26606"/>
+          <ac:cxnSpMkLst>
+            <pc:docMk/>
+            <pc:sldMk cId="3066035579" sldId="266"/>
+            <ac:cxnSpMk id="42" creationId="{5AB158E9-1B40-4CD6-95F0-95CA11DF7B7A}"/>
+          </ac:cxnSpMkLst>
+        </pc:cxnChg>
+        <pc:cxnChg chg="add del">
+          <ac:chgData name="Abhiroop Mukherjee" userId="5fbc6062963ca2c0" providerId="LiveId" clId="{BA04AB18-81BA-44F6-8A17-E30D392E2E82}" dt="2021-04-07T19:11:54.603" v="4313" actId="26606"/>
+          <ac:cxnSpMkLst>
+            <pc:docMk/>
+            <pc:sldMk cId="3066035579" sldId="266"/>
+            <ac:cxnSpMk id="51" creationId="{9C21570E-E159-49A6-9891-FA397B7A92D3}"/>
+          </ac:cxnSpMkLst>
+        </pc:cxnChg>
+        <pc:cxnChg chg="add del">
+          <ac:chgData name="Abhiroop Mukherjee" userId="5fbc6062963ca2c0" providerId="LiveId" clId="{BA04AB18-81BA-44F6-8A17-E30D392E2E82}" dt="2021-04-07T19:12:04.943" v="4318" actId="26606"/>
+          <ac:cxnSpMkLst>
+            <pc:docMk/>
+            <pc:sldMk cId="3066035579" sldId="266"/>
+            <ac:cxnSpMk id="62" creationId="{9C21570E-E159-49A6-9891-FA397B7A92D3}"/>
+          </ac:cxnSpMkLst>
+        </pc:cxnChg>
+        <pc:cxnChg chg="add">
+          <ac:chgData name="Abhiroop Mukherjee" userId="5fbc6062963ca2c0" providerId="LiveId" clId="{BA04AB18-81BA-44F6-8A17-E30D392E2E82}" dt="2021-04-07T19:12:04.943" v="4318" actId="26606"/>
+          <ac:cxnSpMkLst>
+            <pc:docMk/>
+            <pc:sldMk cId="3066035579" sldId="266"/>
+            <ac:cxnSpMk id="71" creationId="{9C21570E-E159-49A6-9891-FA397B7A92D3}"/>
+          </ac:cxnSpMkLst>
+        </pc:cxnChg>
       </pc:sldChg>
       <pc:sldChg chg="addSp delSp modSp mod">
-        <pc:chgData name="Abhiroop Mukherjee" userId="5fbc6062963ca2c0" providerId="LiveId" clId="{BA04AB18-81BA-44F6-8A17-E30D392E2E82}" dt="2021-04-07T17:03:10.262" v="4126" actId="26606"/>
+        <pc:chgData name="Abhiroop Mukherjee" userId="5fbc6062963ca2c0" providerId="LiveId" clId="{BA04AB18-81BA-44F6-8A17-E30D392E2E82}" dt="2021-04-07T19:15:43.042" v="4653" actId="26606"/>
         <pc:sldMkLst>
           <pc:docMk/>
           <pc:sldMk cId="2940843886" sldId="277"/>
         </pc:sldMkLst>
         <pc:spChg chg="mod">
-          <ac:chgData name="Abhiroop Mukherjee" userId="5fbc6062963ca2c0" providerId="LiveId" clId="{BA04AB18-81BA-44F6-8A17-E30D392E2E82}" dt="2021-04-07T17:02:59.508" v="4125" actId="20577"/>
+          <ac:chgData name="Abhiroop Mukherjee" userId="5fbc6062963ca2c0" providerId="LiveId" clId="{BA04AB18-81BA-44F6-8A17-E30D392E2E82}" dt="2021-04-07T19:15:32.023" v="4652" actId="15"/>
           <ac:spMkLst>
             <pc:docMk/>
             <pc:sldMk cId="2940843886" sldId="277"/>
@@ -2019,28 +2186,52 @@
             <ac:spMk id="26" creationId="{054B3F04-9EAC-45C0-B3CE-0387EEA10A0C}"/>
           </ac:spMkLst>
         </pc:spChg>
-        <pc:spChg chg="add">
-          <ac:chgData name="Abhiroop Mukherjee" userId="5fbc6062963ca2c0" providerId="LiveId" clId="{BA04AB18-81BA-44F6-8A17-E30D392E2E82}" dt="2021-04-07T17:03:10.262" v="4126" actId="26606"/>
+        <pc:spChg chg="add del">
+          <ac:chgData name="Abhiroop Mukherjee" userId="5fbc6062963ca2c0" providerId="LiveId" clId="{BA04AB18-81BA-44F6-8A17-E30D392E2E82}" dt="2021-04-07T19:15:43.042" v="4653" actId="26606"/>
           <ac:spMkLst>
             <pc:docMk/>
             <pc:sldMk cId="2940843886" sldId="277"/>
             <ac:spMk id="31" creationId="{3741B58E-3B65-4A01-A276-975AB2CF8A08}"/>
           </ac:spMkLst>
         </pc:spChg>
-        <pc:spChg chg="add">
-          <ac:chgData name="Abhiroop Mukherjee" userId="5fbc6062963ca2c0" providerId="LiveId" clId="{BA04AB18-81BA-44F6-8A17-E30D392E2E82}" dt="2021-04-07T17:03:10.262" v="4126" actId="26606"/>
+        <pc:spChg chg="add del">
+          <ac:chgData name="Abhiroop Mukherjee" userId="5fbc6062963ca2c0" providerId="LiveId" clId="{BA04AB18-81BA-44F6-8A17-E30D392E2E82}" dt="2021-04-07T19:15:43.042" v="4653" actId="26606"/>
           <ac:spMkLst>
             <pc:docMk/>
             <pc:sldMk cId="2940843886" sldId="277"/>
             <ac:spMk id="33" creationId="{7AAC67C3-831B-4AB1-A259-DFB839CAFAFC}"/>
           </ac:spMkLst>
         </pc:spChg>
-        <pc:spChg chg="add">
-          <ac:chgData name="Abhiroop Mukherjee" userId="5fbc6062963ca2c0" providerId="LiveId" clId="{BA04AB18-81BA-44F6-8A17-E30D392E2E82}" dt="2021-04-07T17:03:10.262" v="4126" actId="26606"/>
+        <pc:spChg chg="add del">
+          <ac:chgData name="Abhiroop Mukherjee" userId="5fbc6062963ca2c0" providerId="LiveId" clId="{BA04AB18-81BA-44F6-8A17-E30D392E2E82}" dt="2021-04-07T19:15:43.042" v="4653" actId="26606"/>
           <ac:spMkLst>
             <pc:docMk/>
             <pc:sldMk cId="2940843886" sldId="277"/>
             <ac:spMk id="35" creationId="{054B3F04-9EAC-45C0-B3CE-0387EEA10A0C}"/>
+          </ac:spMkLst>
+        </pc:spChg>
+        <pc:spChg chg="add">
+          <ac:chgData name="Abhiroop Mukherjee" userId="5fbc6062963ca2c0" providerId="LiveId" clId="{BA04AB18-81BA-44F6-8A17-E30D392E2E82}" dt="2021-04-07T19:15:43.042" v="4653" actId="26606"/>
+          <ac:spMkLst>
+            <pc:docMk/>
+            <pc:sldMk cId="2940843886" sldId="277"/>
+            <ac:spMk id="40" creationId="{3741B58E-3B65-4A01-A276-975AB2CF8A08}"/>
+          </ac:spMkLst>
+        </pc:spChg>
+        <pc:spChg chg="add">
+          <ac:chgData name="Abhiroop Mukherjee" userId="5fbc6062963ca2c0" providerId="LiveId" clId="{BA04AB18-81BA-44F6-8A17-E30D392E2E82}" dt="2021-04-07T19:15:43.042" v="4653" actId="26606"/>
+          <ac:spMkLst>
+            <pc:docMk/>
+            <pc:sldMk cId="2940843886" sldId="277"/>
+            <ac:spMk id="42" creationId="{7AAC67C3-831B-4AB1-A259-DFB839CAFAFC}"/>
+          </ac:spMkLst>
+        </pc:spChg>
+        <pc:spChg chg="add">
+          <ac:chgData name="Abhiroop Mukherjee" userId="5fbc6062963ca2c0" providerId="LiveId" clId="{BA04AB18-81BA-44F6-8A17-E30D392E2E82}" dt="2021-04-07T19:15:43.042" v="4653" actId="26606"/>
+          <ac:spMkLst>
+            <pc:docMk/>
+            <pc:sldMk cId="2940843886" sldId="277"/>
+            <ac:spMk id="44" creationId="{054B3F04-9EAC-45C0-B3CE-0387EEA10A0C}"/>
           </ac:spMkLst>
         </pc:spChg>
       </pc:sldChg>
@@ -34492,7 +34683,7 @@
       </p:grpSpPr>
       <p:sp useBgFill="1">
         <p:nvSpPr>
-          <p:cNvPr id="31" name="Rectangle 30">
+          <p:cNvPr id="40" name="Rectangle 39">
             <a:extLst>
               <a:ext uri="{FF2B5EF4-FFF2-40B4-BE49-F238E27FC236}">
                 <a16:creationId xmlns:a16="http://schemas.microsoft.com/office/drawing/2014/main" id="{3741B58E-3B65-4A01-A276-975AB2CF8A08}"/>
@@ -34552,7 +34743,7 @@
       </p:sp>
       <p:sp>
         <p:nvSpPr>
-          <p:cNvPr id="33" name="Rectangle 32">
+          <p:cNvPr id="42" name="Rectangle 41">
             <a:extLst>
               <a:ext uri="{FF2B5EF4-FFF2-40B4-BE49-F238E27FC236}">
                 <a16:creationId xmlns:a16="http://schemas.microsoft.com/office/drawing/2014/main" id="{7AAC67C3-831B-4AB1-A259-DFB839CAFAFC}"/>
@@ -34646,7 +34837,7 @@
       </p:sp>
       <p:sp>
         <p:nvSpPr>
-          <p:cNvPr id="35" name="Rectangle 34">
+          <p:cNvPr id="44" name="Rectangle 43">
             <a:extLst>
               <a:ext uri="{FF2B5EF4-FFF2-40B4-BE49-F238E27FC236}">
                 <a16:creationId xmlns:a16="http://schemas.microsoft.com/office/drawing/2014/main" id="{054B3F04-9EAC-45C0-B3CE-0387EEA10A0C}"/>
@@ -34817,91 +35008,8 @@
                 </a:pPr>
                 <a:r>
                   <a:rPr lang="en-IN" dirty="0"/>
-                  <a:t>We then Plotted the following graphs for both datasets</a:t>
+                  <a:t>We then Plotted the following graph</a:t>
                 </a:r>
-              </a:p>
-              <a:p>
-                <a:pPr lvl="2"/>
-                <a14:m>
-                  <m:oMath xmlns:m="http://schemas.openxmlformats.org/officeDocument/2006/math">
-                    <m:r>
-                      <a:rPr lang="en-IN" b="0" i="1" smtClean="0">
-                        <a:latin typeface="Cambria Math" panose="02040503050406030204" pitchFamily="18" charset="0"/>
-                      </a:rPr>
-                      <m:t>𝑐𝑜𝑚𝑝𝑎𝑟𝑖𝑠𝑖𝑜𝑛</m:t>
-                    </m:r>
-                    <m:r>
-                      <a:rPr lang="en-IN" b="0" i="1" smtClean="0">
-                        <a:latin typeface="Cambria Math" panose="02040503050406030204" pitchFamily="18" charset="0"/>
-                      </a:rPr>
-                      <m:t> </m:t>
-                    </m:r>
-                    <m:r>
-                      <a:rPr lang="en-IN" b="0" i="1" smtClean="0">
-                        <a:latin typeface="Cambria Math" panose="02040503050406030204" pitchFamily="18" charset="0"/>
-                      </a:rPr>
-                      <m:t>𝑟𝑎𝑡𝑖𝑜</m:t>
-                    </m:r>
-                    <m:r>
-                      <a:rPr lang="en-IN" b="0" i="1" smtClean="0">
-                        <a:latin typeface="Cambria Math" panose="02040503050406030204" pitchFamily="18" charset="0"/>
-                      </a:rPr>
-                      <m:t>= </m:t>
-                    </m:r>
-                    <m:f>
-                      <m:fPr>
-                        <m:ctrlPr>
-                          <a:rPr lang="en-IN" i="1" smtClean="0">
-                            <a:latin typeface="Cambria Math" panose="02040503050406030204" pitchFamily="18" charset="0"/>
-                          </a:rPr>
-                        </m:ctrlPr>
-                      </m:fPr>
-                      <m:num>
-                        <m:r>
-                          <a:rPr lang="en-IN" b="0" i="1" smtClean="0">
-                            <a:latin typeface="Cambria Math" panose="02040503050406030204" pitchFamily="18" charset="0"/>
-                          </a:rPr>
-                          <m:t>𝑎𝑣𝑔</m:t>
-                        </m:r>
-                        <m:r>
-                          <a:rPr lang="en-IN" b="0" i="1" smtClean="0">
-                            <a:latin typeface="Cambria Math" panose="02040503050406030204" pitchFamily="18" charset="0"/>
-                          </a:rPr>
-                          <m:t>_</m:t>
-                        </m:r>
-                        <m:r>
-                          <a:rPr lang="en-IN" b="0" i="1" smtClean="0">
-                            <a:latin typeface="Cambria Math" panose="02040503050406030204" pitchFamily="18" charset="0"/>
-                          </a:rPr>
-                          <m:t>𝑐𝑜𝑚𝑝</m:t>
-                        </m:r>
-                      </m:num>
-                      <m:den>
-                        <m:r>
-                          <a:rPr lang="en-IN" b="0" i="1" smtClean="0">
-                            <a:latin typeface="Cambria Math" panose="02040503050406030204" pitchFamily="18" charset="0"/>
-                          </a:rPr>
-                          <m:t>𝑛</m:t>
-                        </m:r>
-                      </m:den>
-                    </m:f>
-                  </m:oMath>
-                </a14:m>
-                <a:r>
-                  <a:rPr lang="en-IN" dirty="0"/>
-                  <a:t> vs </a:t>
-                </a:r>
-                <a14:m>
-                  <m:oMath xmlns:m="http://schemas.openxmlformats.org/officeDocument/2006/math">
-                    <m:r>
-                      <a:rPr lang="en-IN" b="0" i="1" smtClean="0">
-                        <a:latin typeface="Cambria Math" panose="02040503050406030204" pitchFamily="18" charset="0"/>
-                      </a:rPr>
-                      <m:t>𝑛</m:t>
-                    </m:r>
-                  </m:oMath>
-                </a14:m>
-                <a:endParaRPr lang="en-IN" dirty="0"/>
               </a:p>
               <a:p>
                 <a:pPr lvl="2">
@@ -35094,10 +35202,10 @@
       </p:grpSpPr>
       <p:sp useBgFill="1">
         <p:nvSpPr>
-          <p:cNvPr id="41" name="Rectangle 22">
+          <p:cNvPr id="69" name="Rectangle 68">
             <a:extLst>
               <a:ext uri="{FF2B5EF4-FFF2-40B4-BE49-F238E27FC236}">
-                <a16:creationId xmlns:a16="http://schemas.microsoft.com/office/drawing/2014/main" id="{10162E77-11AD-44A7-84EC-40C59EEFBD2E}"/>
+                <a16:creationId xmlns:a16="http://schemas.microsoft.com/office/drawing/2014/main" id="{52ABB703-2B0E-4C3B-B4A2-F3973548E561}"/>
               </a:ext>
               <a:ext uri="{C183D7F6-B498-43B3-948B-1728B52AA6E4}">
                 <adec:decorative xmlns:adec="http://schemas.microsoft.com/office/drawing/2017/decorative" val="1"/>
@@ -35148,7 +35256,7 @@
           <a:lstStyle/>
           <a:p>
             <a:pPr algn="ctr"/>
-            <a:endParaRPr lang="en-US" dirty="0"/>
+            <a:endParaRPr lang="en-US"/>
           </a:p>
         </p:txBody>
       </p:sp>
@@ -35170,8 +35278,8 @@
         </p:nvSpPr>
         <p:spPr>
           <a:xfrm>
-            <a:off x="7859485" y="634946"/>
-            <a:ext cx="3690257" cy="1450757"/>
+            <a:off x="6411685" y="634946"/>
+            <a:ext cx="5127171" cy="1450757"/>
           </a:xfrm>
         </p:spPr>
         <p:txBody>
@@ -35181,9 +35289,10 @@
           <a:lstStyle/>
           <a:p>
             <a:r>
-              <a:rPr lang="en-IN" b="1" dirty="0"/>
+              <a:rPr lang="en-IN" b="1"/>
               <a:t>Observation</a:t>
             </a:r>
+            <a:endParaRPr lang="en-IN" b="1" dirty="0"/>
           </a:p>
         </p:txBody>
       </p:sp>
@@ -35209,13 +35318,13 @@
               </a:ext>
             </a:extLst>
           </a:blip>
-          <a:srcRect l="2397" t="-97" r="6589" b="97"/>
+          <a:srcRect t="6737" b="1472"/>
           <a:stretch/>
         </p:blipFill>
         <p:spPr>
           <a:xfrm>
-            <a:off x="474842" y="634946"/>
-            <a:ext cx="6909801" cy="5314406"/>
+            <a:off x="643192" y="1042154"/>
+            <a:ext cx="5451627" cy="4453651"/>
           </a:xfrm>
           <a:prstGeom prst="rect">
             <a:avLst/>
@@ -35224,10 +35333,10 @@
       </p:pic>
       <p:cxnSp>
         <p:nvCxnSpPr>
-          <p:cNvPr id="42" name="Straight Connector 24">
+          <p:cNvPr id="71" name="Straight Connector 70">
             <a:extLst>
               <a:ext uri="{FF2B5EF4-FFF2-40B4-BE49-F238E27FC236}">
-                <a16:creationId xmlns:a16="http://schemas.microsoft.com/office/drawing/2014/main" id="{5AB158E9-1B40-4CD6-95F0-95CA11DF7B7A}"/>
+                <a16:creationId xmlns:a16="http://schemas.microsoft.com/office/drawing/2014/main" id="{9C21570E-E159-49A6-9891-FA397B7A92D3}"/>
               </a:ext>
               <a:ext uri="{C183D7F6-B498-43B3-948B-1728B52AA6E4}">
                 <adec:decorative xmlns:adec="http://schemas.microsoft.com/office/drawing/2017/decorative" val="1"/>
@@ -35247,8 +35356,8 @@
         </p:nvCxnSpPr>
         <p:spPr>
           <a:xfrm>
-            <a:off x="7892143" y="2085703"/>
-            <a:ext cx="3566160" cy="0"/>
+            <a:off x="6411684" y="2086188"/>
+            <a:ext cx="4748808" cy="0"/>
           </a:xfrm>
           <a:prstGeom prst="line">
             <a:avLst/>
@@ -35278,223 +35387,56 @@
           </a:fontRef>
         </p:style>
       </p:cxnSp>
-      <mc:AlternateContent xmlns:mc="http://schemas.openxmlformats.org/markup-compatibility/2006" xmlns:a14="http://schemas.microsoft.com/office/drawing/2010/main">
-        <mc:Choice Requires="a14">
-          <p:sp>
-            <p:nvSpPr>
-              <p:cNvPr id="9" name="Content Placeholder 8">
-                <a:extLst>
-                  <a:ext uri="{FF2B5EF4-FFF2-40B4-BE49-F238E27FC236}">
-                    <a16:creationId xmlns:a16="http://schemas.microsoft.com/office/drawing/2014/main" id="{FB3ADEF1-B48E-4597-8478-E89F81BA647C}"/>
-                  </a:ext>
-                </a:extLst>
-              </p:cNvPr>
-              <p:cNvSpPr>
-                <a:spLocks noGrp="1"/>
-              </p:cNvSpPr>
-              <p:nvPr>
-                <p:ph idx="1"/>
-              </p:nvPr>
-            </p:nvSpPr>
-            <p:spPr>
-              <a:xfrm>
-                <a:off x="7859485" y="2198913"/>
-                <a:ext cx="3690257" cy="3755565"/>
-              </a:xfrm>
-            </p:spPr>
-            <p:txBody>
-              <a:bodyPr>
-                <a:normAutofit/>
-              </a:bodyPr>
-              <a:lstStyle/>
-              <a:p>
-                <a:pPr lvl="1"/>
-                <a:r>
-                  <a:rPr lang="en-US" dirty="0"/>
-                  <a:t>For big array size, the both plots for both datasets converges to a constant, which means that the algorithm implemented is 𝑂</a:t>
-                </a:r>
-                <a14:m>
-                  <m:oMath xmlns:m="http://schemas.openxmlformats.org/officeDocument/2006/math">
-                    <m:d>
-                      <m:dPr>
-                        <m:ctrlPr>
-                          <a:rPr lang="en-IN" b="0" i="1" smtClean="0">
-                            <a:latin typeface="Cambria Math" panose="02040503050406030204" pitchFamily="18" charset="0"/>
-                          </a:rPr>
-                        </m:ctrlPr>
-                      </m:dPr>
-                      <m:e>
-                        <m:r>
-                          <a:rPr lang="en-IN" b="0" i="1" smtClean="0">
-                            <a:latin typeface="Cambria Math" panose="02040503050406030204" pitchFamily="18" charset="0"/>
-                          </a:rPr>
-                          <m:t>𝑛</m:t>
-                        </m:r>
-                      </m:e>
-                    </m:d>
-                    <m:r>
-                      <a:rPr lang="en-IN" b="0" i="0" smtClean="0">
-                        <a:latin typeface="Cambria Math" panose="02040503050406030204" pitchFamily="18" charset="0"/>
-                      </a:rPr>
-                      <m:t>.</m:t>
-                    </m:r>
-                  </m:oMath>
-                </a14:m>
-                <a:endParaRPr lang="en-IN" b="0" dirty="0"/>
-              </a:p>
-              <a:p>
-                <a:pPr lvl="1"/>
-                <a:r>
-                  <a:rPr lang="en-US" dirty="0"/>
-                  <a:t>There are deviations for small n, this could be due to more overhead of file read and write compared to actual sort.</a:t>
-                </a:r>
-              </a:p>
-              <a:p>
-                <a:pPr lvl="1"/>
-                <a:r>
-                  <a:rPr lang="en-US" dirty="0"/>
-                  <a:t>Theoretically for Normal dataset, the complexity should be more towards </a:t>
-                </a:r>
-                <a14:m>
-                  <m:oMath xmlns:m="http://schemas.openxmlformats.org/officeDocument/2006/math">
-                    <m:r>
-                      <m:rPr>
-                        <m:sty m:val="p"/>
-                      </m:rPr>
-                      <a:rPr lang="en-IN">
-                        <a:latin typeface="Cambria Math" panose="02040503050406030204" pitchFamily="18" charset="0"/>
-                      </a:rPr>
-                      <m:t>O</m:t>
-                    </m:r>
-                    <m:r>
-                      <a:rPr lang="en-IN" b="0" i="1" smtClean="0">
-                        <a:latin typeface="Cambria Math" panose="02040503050406030204" pitchFamily="18" charset="0"/>
-                      </a:rPr>
-                      <m:t>(</m:t>
-                    </m:r>
-                    <m:sSup>
-                      <m:sSupPr>
-                        <m:ctrlPr>
-                          <a:rPr lang="en-US" i="1" dirty="0" smtClean="0">
-                            <a:latin typeface="Cambria Math" panose="02040503050406030204" pitchFamily="18" charset="0"/>
-                          </a:rPr>
-                        </m:ctrlPr>
-                      </m:sSupPr>
-                      <m:e>
-                        <m:r>
-                          <a:rPr lang="en-IN" b="0" i="1" dirty="0" smtClean="0">
-                            <a:latin typeface="Cambria Math" panose="02040503050406030204" pitchFamily="18" charset="0"/>
-                          </a:rPr>
-                          <m:t>𝑛</m:t>
-                        </m:r>
-                      </m:e>
-                      <m:sup>
-                        <m:r>
-                          <a:rPr lang="en-IN" b="0" i="1" dirty="0" smtClean="0">
-                            <a:latin typeface="Cambria Math" panose="02040503050406030204" pitchFamily="18" charset="0"/>
-                          </a:rPr>
-                          <m:t>2</m:t>
-                        </m:r>
-                      </m:sup>
-                    </m:sSup>
-                    <m:r>
-                      <a:rPr lang="en-IN" b="0" i="1" smtClean="0">
-                        <a:latin typeface="Cambria Math" panose="02040503050406030204" pitchFamily="18" charset="0"/>
-                      </a:rPr>
-                      <m:t>)</m:t>
-                    </m:r>
-                  </m:oMath>
-                </a14:m>
-                <a:r>
-                  <a:rPr lang="en-US" dirty="0"/>
-                  <a:t>, but as we averaged it out, it became </a:t>
-                </a:r>
-                <a14:m>
-                  <m:oMath xmlns:m="http://schemas.openxmlformats.org/officeDocument/2006/math">
-                    <m:r>
-                      <m:rPr>
-                        <m:sty m:val="p"/>
-                      </m:rPr>
-                      <a:rPr lang="en-IN" b="0" i="0" smtClean="0">
-                        <a:latin typeface="Cambria Math" panose="02040503050406030204" pitchFamily="18" charset="0"/>
-                      </a:rPr>
-                      <m:t>O</m:t>
-                    </m:r>
-                    <m:r>
-                      <a:rPr lang="en-IN" b="0" i="1" smtClean="0">
-                        <a:latin typeface="Cambria Math" panose="02040503050406030204" pitchFamily="18" charset="0"/>
-                      </a:rPr>
-                      <m:t>(</m:t>
-                    </m:r>
-                    <m:r>
-                      <a:rPr lang="en-IN" b="0" i="1" smtClean="0">
-                        <a:latin typeface="Cambria Math" panose="02040503050406030204" pitchFamily="18" charset="0"/>
-                      </a:rPr>
-                      <m:t>𝑛</m:t>
-                    </m:r>
-                    <m:r>
-                      <a:rPr lang="en-IN" b="0" i="1" smtClean="0">
-                        <a:latin typeface="Cambria Math" panose="02040503050406030204" pitchFamily="18" charset="0"/>
-                      </a:rPr>
-                      <m:t>)</m:t>
-                    </m:r>
-                  </m:oMath>
-                </a14:m>
-                <a:endParaRPr lang="en-US" dirty="0"/>
-              </a:p>
-            </p:txBody>
-          </p:sp>
-        </mc:Choice>
-        <mc:Fallback xmlns="">
-          <p:sp>
-            <p:nvSpPr>
-              <p:cNvPr id="9" name="Content Placeholder 8">
-                <a:extLst>
-                  <a:ext uri="{FF2B5EF4-FFF2-40B4-BE49-F238E27FC236}">
-                    <a16:creationId xmlns:a16="http://schemas.microsoft.com/office/drawing/2014/main" id="{FB3ADEF1-B48E-4597-8478-E89F81BA647C}"/>
-                  </a:ext>
-                </a:extLst>
-              </p:cNvPr>
-              <p:cNvSpPr>
-                <a:spLocks noGrp="1" noRot="1" noChangeAspect="1" noMove="1" noResize="1" noEditPoints="1" noAdjustHandles="1" noChangeArrowheads="1" noChangeShapeType="1" noTextEdit="1"/>
-              </p:cNvSpPr>
-              <p:nvPr>
-                <p:ph idx="1"/>
-              </p:nvPr>
-            </p:nvSpPr>
-            <p:spPr>
-              <a:xfrm>
-                <a:off x="7859485" y="2198913"/>
-                <a:ext cx="3690257" cy="3755565"/>
-              </a:xfrm>
-              <a:blipFill>
-                <a:blip r:embed="rId3"/>
-                <a:stretch>
-                  <a:fillRect t="-1623" r="-4950"/>
-                </a:stretch>
-              </a:blipFill>
-            </p:spPr>
-            <p:txBody>
-              <a:bodyPr/>
-              <a:lstStyle/>
-              <a:p>
-                <a:r>
-                  <a:rPr lang="en-IN">
-                    <a:noFill/>
-                  </a:rPr>
-                  <a:t> </a:t>
-                </a:r>
-              </a:p>
-            </p:txBody>
-          </p:sp>
-        </mc:Fallback>
-      </mc:AlternateContent>
       <p:sp>
         <p:nvSpPr>
-          <p:cNvPr id="43" name="Rectangle 26">
+          <p:cNvPr id="9" name="Content Placeholder 8">
             <a:extLst>
               <a:ext uri="{FF2B5EF4-FFF2-40B4-BE49-F238E27FC236}">
-                <a16:creationId xmlns:a16="http://schemas.microsoft.com/office/drawing/2014/main" id="{6329CBCE-21AE-419D-AC1F-8ACF510A6670}"/>
+                <a16:creationId xmlns:a16="http://schemas.microsoft.com/office/drawing/2014/main" id="{FB3ADEF1-B48E-4597-8478-E89F81BA647C}"/>
+              </a:ext>
+            </a:extLst>
+          </p:cNvPr>
+          <p:cNvSpPr>
+            <a:spLocks noGrp="1"/>
+          </p:cNvSpPr>
+          <p:nvPr>
+            <p:ph idx="1"/>
+          </p:nvPr>
+        </p:nvSpPr>
+        <p:spPr>
+          <a:xfrm>
+            <a:off x="6411684" y="2198914"/>
+            <a:ext cx="5127172" cy="3670180"/>
+          </a:xfrm>
+        </p:spPr>
+        <p:txBody>
+          <a:bodyPr>
+            <a:normAutofit/>
+          </a:bodyPr>
+          <a:lstStyle/>
+          <a:p>
+            <a:pPr lvl="1"/>
+            <a:r>
+              <a:rPr lang="en-IN" dirty="0"/>
+              <a:t>Here we see that time taken by the Normal Distribution is way more than that of Uniform Distribution</a:t>
+            </a:r>
+          </a:p>
+          <a:p>
+            <a:pPr lvl="1"/>
+            <a:r>
+              <a:rPr lang="en-IN" dirty="0"/>
+              <a:t>This is happening because  in Normal Distribution more elements are concentrated around mean, due to which a lot of elements gets inserted on a same bin, and sorting that large linked list is very costly with respect to time.</a:t>
+            </a:r>
+            <a:endParaRPr lang="en-US" dirty="0"/>
+          </a:p>
+        </p:txBody>
+      </p:sp>
+      <p:sp>
+        <p:nvSpPr>
+          <p:cNvPr id="73" name="Rectangle 72">
+            <a:extLst>
+              <a:ext uri="{FF2B5EF4-FFF2-40B4-BE49-F238E27FC236}">
+                <a16:creationId xmlns:a16="http://schemas.microsoft.com/office/drawing/2014/main" id="{E95DA498-D9A2-4DA9-B9DA-B3776E08CF7E}"/>
               </a:ext>
               <a:ext uri="{C183D7F6-B498-43B3-948B-1728B52AA6E4}">
                 <adec:decorative xmlns:adec="http://schemas.microsoft.com/office/drawing/2017/decorative" val="1"/>
@@ -35546,10 +35488,10 @@
       </p:sp>
       <p:sp>
         <p:nvSpPr>
-          <p:cNvPr id="44" name="Rectangle 28">
+          <p:cNvPr id="75" name="Rectangle 74">
             <a:extLst>
               <a:ext uri="{FF2B5EF4-FFF2-40B4-BE49-F238E27FC236}">
-                <a16:creationId xmlns:a16="http://schemas.microsoft.com/office/drawing/2014/main" id="{FF2DA012-1414-493D-888F-5D99D0BDA322}"/>
+                <a16:creationId xmlns:a16="http://schemas.microsoft.com/office/drawing/2014/main" id="{82A73093-4B9D-420D-B17E-52293703A1D4}"/>
               </a:ext>
               <a:ext uri="{C183D7F6-B498-43B3-948B-1728B52AA6E4}">
                 <adec:decorative xmlns:adec="http://schemas.microsoft.com/office/drawing/2017/decorative" val="1"/>

</xml_diff>

<commit_message>
Problem 4 done, work completed wohoo
</commit_message>
<xml_diff>
--- a/Assignment 1/Assignment Presentation.pptx
+++ b/Assignment 1/Assignment Presentation.pptx
@@ -59,7 +59,11 @@
     <p:sldId id="285" r:id="rId53"/>
     <p:sldId id="286" r:id="rId54"/>
     <p:sldId id="287" r:id="rId55"/>
-    <p:sldId id="288" r:id="rId56"/>
+    <p:sldId id="317" r:id="rId56"/>
+    <p:sldId id="318" r:id="rId57"/>
+    <p:sldId id="319" r:id="rId58"/>
+    <p:sldId id="320" r:id="rId59"/>
+    <p:sldId id="288" r:id="rId60"/>
   </p:sldIdLst>
   <p:sldSz cx="12192000" cy="6858000"/>
   <p:notesSz cx="6858000" cy="9144000"/>
@@ -169,7 +173,7 @@
 <file path=ppt/revisionInfo.xml><?xml version="1.0" encoding="utf-8"?>
 <p1510:revInfo xmlns:a="http://schemas.openxmlformats.org/drawingml/2006/main" xmlns:r="http://schemas.openxmlformats.org/officeDocument/2006/relationships" xmlns:p1510="http://schemas.microsoft.com/office/powerpoint/2015/10/main">
   <p1510:revLst>
-    <p1510:client id="{BA04AB18-81BA-44F6-8A17-E30D392E2E82}" v="2237" dt="2021-04-07T19:15:32.023"/>
+    <p1510:client id="{BA04AB18-81BA-44F6-8A17-E30D392E2E82}" v="2250" dt="2021-04-07T20:26:22.257"/>
   </p1510:revLst>
 </p1510:revInfo>
 </file>
@@ -1810,7 +1814,7 @@
   <pc:docChgLst>
     <pc:chgData name="Abhiroop Mukherjee" userId="5fbc6062963ca2c0" providerId="LiveId" clId="{BA04AB18-81BA-44F6-8A17-E30D392E2E82}"/>
     <pc:docChg chg="undo redo custSel addSld delSld modSld sldOrd">
-      <pc:chgData name="Abhiroop Mukherjee" userId="5fbc6062963ca2c0" providerId="LiveId" clId="{BA04AB18-81BA-44F6-8A17-E30D392E2E82}" dt="2021-04-07T19:15:43.042" v="4653" actId="26606"/>
+      <pc:chgData name="Abhiroop Mukherjee" userId="5fbc6062963ca2c0" providerId="LiveId" clId="{BA04AB18-81BA-44F6-8A17-E30D392E2E82}" dt="2021-04-07T20:29:34.385" v="7101" actId="33524"/>
       <pc:docMkLst>
         <pc:docMk/>
       </pc:docMkLst>
@@ -2234,6 +2238,165 @@
             <ac:spMk id="44" creationId="{054B3F04-9EAC-45C0-B3CE-0387EEA10A0C}"/>
           </ac:spMkLst>
         </pc:spChg>
+      </pc:sldChg>
+      <pc:sldChg chg="addSp delSp modSp mod">
+        <pc:chgData name="Abhiroop Mukherjee" userId="5fbc6062963ca2c0" providerId="LiveId" clId="{BA04AB18-81BA-44F6-8A17-E30D392E2E82}" dt="2021-04-07T20:20:01.164" v="5975" actId="26606"/>
+        <pc:sldMkLst>
+          <pc:docMk/>
+          <pc:sldMk cId="1262432482" sldId="287"/>
+        </pc:sldMkLst>
+        <pc:spChg chg="mod">
+          <ac:chgData name="Abhiroop Mukherjee" userId="5fbc6062963ca2c0" providerId="LiveId" clId="{BA04AB18-81BA-44F6-8A17-E30D392E2E82}" dt="2021-04-07T20:20:01.164" v="5975" actId="26606"/>
+          <ac:spMkLst>
+            <pc:docMk/>
+            <pc:sldMk cId="1262432482" sldId="287"/>
+            <ac:spMk id="2" creationId="{0CF820E1-E514-4B58-98AB-89F302D91E31}"/>
+          </ac:spMkLst>
+        </pc:spChg>
+        <pc:spChg chg="mod">
+          <ac:chgData name="Abhiroop Mukherjee" userId="5fbc6062963ca2c0" providerId="LiveId" clId="{BA04AB18-81BA-44F6-8A17-E30D392E2E82}" dt="2021-04-07T20:20:01.164" v="5975" actId="26606"/>
+          <ac:spMkLst>
+            <pc:docMk/>
+            <pc:sldMk cId="1262432482" sldId="287"/>
+            <ac:spMk id="9" creationId="{FB3ADEF1-B48E-4597-8478-E89F81BA647C}"/>
+          </ac:spMkLst>
+        </pc:spChg>
+        <pc:spChg chg="add del">
+          <ac:chgData name="Abhiroop Mukherjee" userId="5fbc6062963ca2c0" providerId="LiveId" clId="{BA04AB18-81BA-44F6-8A17-E30D392E2E82}" dt="2021-04-07T20:20:01.164" v="5975" actId="26606"/>
+          <ac:spMkLst>
+            <pc:docMk/>
+            <pc:sldMk cId="1262432482" sldId="287"/>
+            <ac:spMk id="185" creationId="{284B70D5-875B-433D-BDBD-1522A85D6C1D}"/>
+          </ac:spMkLst>
+        </pc:spChg>
+        <pc:spChg chg="add del">
+          <ac:chgData name="Abhiroop Mukherjee" userId="5fbc6062963ca2c0" providerId="LiveId" clId="{BA04AB18-81BA-44F6-8A17-E30D392E2E82}" dt="2021-04-07T20:20:01.164" v="5975" actId="26606"/>
+          <ac:spMkLst>
+            <pc:docMk/>
+            <pc:sldMk cId="1262432482" sldId="287"/>
+            <ac:spMk id="187" creationId="{1E299956-A9E7-4FC1-A0B1-D590CA9730E8}"/>
+          </ac:spMkLst>
+        </pc:spChg>
+        <pc:spChg chg="add del">
+          <ac:chgData name="Abhiroop Mukherjee" userId="5fbc6062963ca2c0" providerId="LiveId" clId="{BA04AB18-81BA-44F6-8A17-E30D392E2E82}" dt="2021-04-07T20:20:01.164" v="5975" actId="26606"/>
+          <ac:spMkLst>
+            <pc:docMk/>
+            <pc:sldMk cId="1262432482" sldId="287"/>
+            <ac:spMk id="188" creationId="{17FC539C-B783-4B03-9F9E-D13430F3F64F}"/>
+          </ac:spMkLst>
+        </pc:spChg>
+        <pc:spChg chg="add del">
+          <ac:chgData name="Abhiroop Mukherjee" userId="5fbc6062963ca2c0" providerId="LiveId" clId="{BA04AB18-81BA-44F6-8A17-E30D392E2E82}" dt="2021-04-07T20:19:59.772" v="5972" actId="26606"/>
+          <ac:spMkLst>
+            <pc:docMk/>
+            <pc:sldMk cId="1262432482" sldId="287"/>
+            <ac:spMk id="193" creationId="{52ABB703-2B0E-4C3B-B4A2-F3973548E561}"/>
+          </ac:spMkLst>
+        </pc:spChg>
+        <pc:spChg chg="add del">
+          <ac:chgData name="Abhiroop Mukherjee" userId="5fbc6062963ca2c0" providerId="LiveId" clId="{BA04AB18-81BA-44F6-8A17-E30D392E2E82}" dt="2021-04-07T20:19:59.772" v="5972" actId="26606"/>
+          <ac:spMkLst>
+            <pc:docMk/>
+            <pc:sldMk cId="1262432482" sldId="287"/>
+            <ac:spMk id="197" creationId="{E95DA498-D9A2-4DA9-B9DA-B3776E08CF7E}"/>
+          </ac:spMkLst>
+        </pc:spChg>
+        <pc:spChg chg="add del">
+          <ac:chgData name="Abhiroop Mukherjee" userId="5fbc6062963ca2c0" providerId="LiveId" clId="{BA04AB18-81BA-44F6-8A17-E30D392E2E82}" dt="2021-04-07T20:19:59.772" v="5972" actId="26606"/>
+          <ac:spMkLst>
+            <pc:docMk/>
+            <pc:sldMk cId="1262432482" sldId="287"/>
+            <ac:spMk id="199" creationId="{82A73093-4B9D-420D-B17E-52293703A1D4}"/>
+          </ac:spMkLst>
+        </pc:spChg>
+        <pc:spChg chg="add del">
+          <ac:chgData name="Abhiroop Mukherjee" userId="5fbc6062963ca2c0" providerId="LiveId" clId="{BA04AB18-81BA-44F6-8A17-E30D392E2E82}" dt="2021-04-07T20:20:01.133" v="5974" actId="26606"/>
+          <ac:spMkLst>
+            <pc:docMk/>
+            <pc:sldMk cId="1262432482" sldId="287"/>
+            <ac:spMk id="201" creationId="{284B70D5-875B-433D-BDBD-1522A85D6C1D}"/>
+          </ac:spMkLst>
+        </pc:spChg>
+        <pc:spChg chg="add del">
+          <ac:chgData name="Abhiroop Mukherjee" userId="5fbc6062963ca2c0" providerId="LiveId" clId="{BA04AB18-81BA-44F6-8A17-E30D392E2E82}" dt="2021-04-07T20:20:01.133" v="5974" actId="26606"/>
+          <ac:spMkLst>
+            <pc:docMk/>
+            <pc:sldMk cId="1262432482" sldId="287"/>
+            <ac:spMk id="203" creationId="{1E299956-A9E7-4FC1-A0B1-D590CA9730E8}"/>
+          </ac:spMkLst>
+        </pc:spChg>
+        <pc:spChg chg="add del">
+          <ac:chgData name="Abhiroop Mukherjee" userId="5fbc6062963ca2c0" providerId="LiveId" clId="{BA04AB18-81BA-44F6-8A17-E30D392E2E82}" dt="2021-04-07T20:20:01.133" v="5974" actId="26606"/>
+          <ac:spMkLst>
+            <pc:docMk/>
+            <pc:sldMk cId="1262432482" sldId="287"/>
+            <ac:spMk id="204" creationId="{17FC539C-B783-4B03-9F9E-D13430F3F64F}"/>
+          </ac:spMkLst>
+        </pc:spChg>
+        <pc:spChg chg="add">
+          <ac:chgData name="Abhiroop Mukherjee" userId="5fbc6062963ca2c0" providerId="LiveId" clId="{BA04AB18-81BA-44F6-8A17-E30D392E2E82}" dt="2021-04-07T20:20:01.164" v="5975" actId="26606"/>
+          <ac:spMkLst>
+            <pc:docMk/>
+            <pc:sldMk cId="1262432482" sldId="287"/>
+            <ac:spMk id="206" creationId="{52ABB703-2B0E-4C3B-B4A2-F3973548E561}"/>
+          </ac:spMkLst>
+        </pc:spChg>
+        <pc:spChg chg="add">
+          <ac:chgData name="Abhiroop Mukherjee" userId="5fbc6062963ca2c0" providerId="LiveId" clId="{BA04AB18-81BA-44F6-8A17-E30D392E2E82}" dt="2021-04-07T20:20:01.164" v="5975" actId="26606"/>
+          <ac:spMkLst>
+            <pc:docMk/>
+            <pc:sldMk cId="1262432482" sldId="287"/>
+            <ac:spMk id="208" creationId="{E95DA498-D9A2-4DA9-B9DA-B3776E08CF7E}"/>
+          </ac:spMkLst>
+        </pc:spChg>
+        <pc:spChg chg="add">
+          <ac:chgData name="Abhiroop Mukherjee" userId="5fbc6062963ca2c0" providerId="LiveId" clId="{BA04AB18-81BA-44F6-8A17-E30D392E2E82}" dt="2021-04-07T20:20:01.164" v="5975" actId="26606"/>
+          <ac:spMkLst>
+            <pc:docMk/>
+            <pc:sldMk cId="1262432482" sldId="287"/>
+            <ac:spMk id="209" creationId="{82A73093-4B9D-420D-B17E-52293703A1D4}"/>
+          </ac:spMkLst>
+        </pc:spChg>
+        <pc:picChg chg="mod">
+          <ac:chgData name="Abhiroop Mukherjee" userId="5fbc6062963ca2c0" providerId="LiveId" clId="{BA04AB18-81BA-44F6-8A17-E30D392E2E82}" dt="2021-04-07T20:20:01.164" v="5975" actId="26606"/>
+          <ac:picMkLst>
+            <pc:docMk/>
+            <pc:sldMk cId="1262432482" sldId="287"/>
+            <ac:picMk id="5" creationId="{66ACF5EE-B012-4BDB-A31F-C5EBFB1ECF9F}"/>
+          </ac:picMkLst>
+        </pc:picChg>
+        <pc:cxnChg chg="add del">
+          <ac:chgData name="Abhiroop Mukherjee" userId="5fbc6062963ca2c0" providerId="LiveId" clId="{BA04AB18-81BA-44F6-8A17-E30D392E2E82}" dt="2021-04-07T20:20:01.164" v="5975" actId="26606"/>
+          <ac:cxnSpMkLst>
+            <pc:docMk/>
+            <pc:sldMk cId="1262432482" sldId="287"/>
+            <ac:cxnSpMk id="186" creationId="{C947DF4A-614C-4B4C-8B80-E5B9D8E8CFED}"/>
+          </ac:cxnSpMkLst>
+        </pc:cxnChg>
+        <pc:cxnChg chg="add del">
+          <ac:chgData name="Abhiroop Mukherjee" userId="5fbc6062963ca2c0" providerId="LiveId" clId="{BA04AB18-81BA-44F6-8A17-E30D392E2E82}" dt="2021-04-07T20:19:59.772" v="5972" actId="26606"/>
+          <ac:cxnSpMkLst>
+            <pc:docMk/>
+            <pc:sldMk cId="1262432482" sldId="287"/>
+            <ac:cxnSpMk id="195" creationId="{9C21570E-E159-49A6-9891-FA397B7A92D3}"/>
+          </ac:cxnSpMkLst>
+        </pc:cxnChg>
+        <pc:cxnChg chg="add del">
+          <ac:chgData name="Abhiroop Mukherjee" userId="5fbc6062963ca2c0" providerId="LiveId" clId="{BA04AB18-81BA-44F6-8A17-E30D392E2E82}" dt="2021-04-07T20:20:01.133" v="5974" actId="26606"/>
+          <ac:cxnSpMkLst>
+            <pc:docMk/>
+            <pc:sldMk cId="1262432482" sldId="287"/>
+            <ac:cxnSpMk id="202" creationId="{C947DF4A-614C-4B4C-8B80-E5B9D8E8CFED}"/>
+          </ac:cxnSpMkLst>
+        </pc:cxnChg>
+        <pc:cxnChg chg="add">
+          <ac:chgData name="Abhiroop Mukherjee" userId="5fbc6062963ca2c0" providerId="LiveId" clId="{BA04AB18-81BA-44F6-8A17-E30D392E2E82}" dt="2021-04-07T20:20:01.164" v="5975" actId="26606"/>
+          <ac:cxnSpMkLst>
+            <pc:docMk/>
+            <pc:sldMk cId="1262432482" sldId="287"/>
+            <ac:cxnSpMk id="207" creationId="{9C21570E-E159-49A6-9891-FA397B7A92D3}"/>
+          </ac:cxnSpMkLst>
+        </pc:cxnChg>
       </pc:sldChg>
       <pc:sldChg chg="addSp modSp new mod ord setBg addAnim">
         <pc:chgData name="Abhiroop Mukherjee" userId="5fbc6062963ca2c0" providerId="LiveId" clId="{BA04AB18-81BA-44F6-8A17-E30D392E2E82}" dt="2021-04-06T19:27:29.745" v="62" actId="20577"/>
@@ -3437,6 +3600,936 @@
             <ac:cxnSpMk id="144" creationId="{C947DF4A-614C-4B4C-8B80-E5B9D8E8CFED}"/>
           </ac:cxnSpMkLst>
         </pc:cxnChg>
+      </pc:sldChg>
+      <pc:sldChg chg="addSp delSp modSp add mod">
+        <pc:chgData name="Abhiroop Mukherjee" userId="5fbc6062963ca2c0" providerId="LiveId" clId="{BA04AB18-81BA-44F6-8A17-E30D392E2E82}" dt="2021-04-07T20:20:04.723" v="5976" actId="26606"/>
+        <pc:sldMkLst>
+          <pc:docMk/>
+          <pc:sldMk cId="723312773" sldId="317"/>
+        </pc:sldMkLst>
+        <pc:spChg chg="mod">
+          <ac:chgData name="Abhiroop Mukherjee" userId="5fbc6062963ca2c0" providerId="LiveId" clId="{BA04AB18-81BA-44F6-8A17-E30D392E2E82}" dt="2021-04-07T20:15:05.449" v="5227" actId="26606"/>
+          <ac:spMkLst>
+            <pc:docMk/>
+            <pc:sldMk cId="723312773" sldId="317"/>
+            <ac:spMk id="2" creationId="{0CF820E1-E514-4B58-98AB-89F302D91E31}"/>
+          </ac:spMkLst>
+        </pc:spChg>
+        <pc:spChg chg="mod">
+          <ac:chgData name="Abhiroop Mukherjee" userId="5fbc6062963ca2c0" providerId="LiveId" clId="{BA04AB18-81BA-44F6-8A17-E30D392E2E82}" dt="2021-04-07T20:15:05.449" v="5227" actId="26606"/>
+          <ac:spMkLst>
+            <pc:docMk/>
+            <pc:sldMk cId="723312773" sldId="317"/>
+            <ac:spMk id="9" creationId="{FB3ADEF1-B48E-4597-8478-E89F81BA647C}"/>
+          </ac:spMkLst>
+        </pc:spChg>
+        <pc:spChg chg="add">
+          <ac:chgData name="Abhiroop Mukherjee" userId="5fbc6062963ca2c0" providerId="LiveId" clId="{BA04AB18-81BA-44F6-8A17-E30D392E2E82}" dt="2021-04-07T20:20:04.723" v="5976" actId="26606"/>
+          <ac:spMkLst>
+            <pc:docMk/>
+            <pc:sldMk cId="723312773" sldId="317"/>
+            <ac:spMk id="76" creationId="{52ABB703-2B0E-4C3B-B4A2-F3973548E561}"/>
+          </ac:spMkLst>
+        </pc:spChg>
+        <pc:spChg chg="add">
+          <ac:chgData name="Abhiroop Mukherjee" userId="5fbc6062963ca2c0" providerId="LiveId" clId="{BA04AB18-81BA-44F6-8A17-E30D392E2E82}" dt="2021-04-07T20:20:04.723" v="5976" actId="26606"/>
+          <ac:spMkLst>
+            <pc:docMk/>
+            <pc:sldMk cId="723312773" sldId="317"/>
+            <ac:spMk id="80" creationId="{E95DA498-D9A2-4DA9-B9DA-B3776E08CF7E}"/>
+          </ac:spMkLst>
+        </pc:spChg>
+        <pc:spChg chg="add">
+          <ac:chgData name="Abhiroop Mukherjee" userId="5fbc6062963ca2c0" providerId="LiveId" clId="{BA04AB18-81BA-44F6-8A17-E30D392E2E82}" dt="2021-04-07T20:20:04.723" v="5976" actId="26606"/>
+          <ac:spMkLst>
+            <pc:docMk/>
+            <pc:sldMk cId="723312773" sldId="317"/>
+            <ac:spMk id="82" creationId="{82A73093-4B9D-420D-B17E-52293703A1D4}"/>
+          </ac:spMkLst>
+        </pc:spChg>
+        <pc:spChg chg="del">
+          <ac:chgData name="Abhiroop Mukherjee" userId="5fbc6062963ca2c0" providerId="LiveId" clId="{BA04AB18-81BA-44F6-8A17-E30D392E2E82}" dt="2021-04-07T20:15:05.449" v="5227" actId="26606"/>
+          <ac:spMkLst>
+            <pc:docMk/>
+            <pc:sldMk cId="723312773" sldId="317"/>
+            <ac:spMk id="185" creationId="{284B70D5-875B-433D-BDBD-1522A85D6C1D}"/>
+          </ac:spMkLst>
+        </pc:spChg>
+        <pc:spChg chg="del">
+          <ac:chgData name="Abhiroop Mukherjee" userId="5fbc6062963ca2c0" providerId="LiveId" clId="{BA04AB18-81BA-44F6-8A17-E30D392E2E82}" dt="2021-04-07T20:15:05.449" v="5227" actId="26606"/>
+          <ac:spMkLst>
+            <pc:docMk/>
+            <pc:sldMk cId="723312773" sldId="317"/>
+            <ac:spMk id="187" creationId="{1E299956-A9E7-4FC1-A0B1-D590CA9730E8}"/>
+          </ac:spMkLst>
+        </pc:spChg>
+        <pc:spChg chg="del">
+          <ac:chgData name="Abhiroop Mukherjee" userId="5fbc6062963ca2c0" providerId="LiveId" clId="{BA04AB18-81BA-44F6-8A17-E30D392E2E82}" dt="2021-04-07T20:15:05.449" v="5227" actId="26606"/>
+          <ac:spMkLst>
+            <pc:docMk/>
+            <pc:sldMk cId="723312773" sldId="317"/>
+            <ac:spMk id="188" creationId="{17FC539C-B783-4B03-9F9E-D13430F3F64F}"/>
+          </ac:spMkLst>
+        </pc:spChg>
+        <pc:spChg chg="add del">
+          <ac:chgData name="Abhiroop Mukherjee" userId="5fbc6062963ca2c0" providerId="LiveId" clId="{BA04AB18-81BA-44F6-8A17-E30D392E2E82}" dt="2021-04-07T20:20:04.723" v="5976" actId="26606"/>
+          <ac:spMkLst>
+            <pc:docMk/>
+            <pc:sldMk cId="723312773" sldId="317"/>
+            <ac:spMk id="193" creationId="{52ABB703-2B0E-4C3B-B4A2-F3973548E561}"/>
+          </ac:spMkLst>
+        </pc:spChg>
+        <pc:spChg chg="add del">
+          <ac:chgData name="Abhiroop Mukherjee" userId="5fbc6062963ca2c0" providerId="LiveId" clId="{BA04AB18-81BA-44F6-8A17-E30D392E2E82}" dt="2021-04-07T20:20:04.723" v="5976" actId="26606"/>
+          <ac:spMkLst>
+            <pc:docMk/>
+            <pc:sldMk cId="723312773" sldId="317"/>
+            <ac:spMk id="197" creationId="{E95DA498-D9A2-4DA9-B9DA-B3776E08CF7E}"/>
+          </ac:spMkLst>
+        </pc:spChg>
+        <pc:spChg chg="add del">
+          <ac:chgData name="Abhiroop Mukherjee" userId="5fbc6062963ca2c0" providerId="LiveId" clId="{BA04AB18-81BA-44F6-8A17-E30D392E2E82}" dt="2021-04-07T20:20:04.723" v="5976" actId="26606"/>
+          <ac:spMkLst>
+            <pc:docMk/>
+            <pc:sldMk cId="723312773" sldId="317"/>
+            <ac:spMk id="199" creationId="{82A73093-4B9D-420D-B17E-52293703A1D4}"/>
+          </ac:spMkLst>
+        </pc:spChg>
+        <pc:picChg chg="mod">
+          <ac:chgData name="Abhiroop Mukherjee" userId="5fbc6062963ca2c0" providerId="LiveId" clId="{BA04AB18-81BA-44F6-8A17-E30D392E2E82}" dt="2021-04-07T20:19:49.367" v="5969" actId="14826"/>
+          <ac:picMkLst>
+            <pc:docMk/>
+            <pc:sldMk cId="723312773" sldId="317"/>
+            <ac:picMk id="5" creationId="{66ACF5EE-B012-4BDB-A31F-C5EBFB1ECF9F}"/>
+          </ac:picMkLst>
+        </pc:picChg>
+        <pc:cxnChg chg="add">
+          <ac:chgData name="Abhiroop Mukherjee" userId="5fbc6062963ca2c0" providerId="LiveId" clId="{BA04AB18-81BA-44F6-8A17-E30D392E2E82}" dt="2021-04-07T20:20:04.723" v="5976" actId="26606"/>
+          <ac:cxnSpMkLst>
+            <pc:docMk/>
+            <pc:sldMk cId="723312773" sldId="317"/>
+            <ac:cxnSpMk id="78" creationId="{9C21570E-E159-49A6-9891-FA397B7A92D3}"/>
+          </ac:cxnSpMkLst>
+        </pc:cxnChg>
+        <pc:cxnChg chg="del">
+          <ac:chgData name="Abhiroop Mukherjee" userId="5fbc6062963ca2c0" providerId="LiveId" clId="{BA04AB18-81BA-44F6-8A17-E30D392E2E82}" dt="2021-04-07T20:15:05.449" v="5227" actId="26606"/>
+          <ac:cxnSpMkLst>
+            <pc:docMk/>
+            <pc:sldMk cId="723312773" sldId="317"/>
+            <ac:cxnSpMk id="186" creationId="{C947DF4A-614C-4B4C-8B80-E5B9D8E8CFED}"/>
+          </ac:cxnSpMkLst>
+        </pc:cxnChg>
+        <pc:cxnChg chg="add del">
+          <ac:chgData name="Abhiroop Mukherjee" userId="5fbc6062963ca2c0" providerId="LiveId" clId="{BA04AB18-81BA-44F6-8A17-E30D392E2E82}" dt="2021-04-07T20:20:04.723" v="5976" actId="26606"/>
+          <ac:cxnSpMkLst>
+            <pc:docMk/>
+            <pc:sldMk cId="723312773" sldId="317"/>
+            <ac:cxnSpMk id="195" creationId="{9C21570E-E159-49A6-9891-FA397B7A92D3}"/>
+          </ac:cxnSpMkLst>
+        </pc:cxnChg>
+      </pc:sldChg>
+      <pc:sldChg chg="addSp delSp modSp add mod">
+        <pc:chgData name="Abhiroop Mukherjee" userId="5fbc6062963ca2c0" providerId="LiveId" clId="{BA04AB18-81BA-44F6-8A17-E30D392E2E82}" dt="2021-04-07T20:20:07.680" v="5977" actId="26606"/>
+        <pc:sldMkLst>
+          <pc:docMk/>
+          <pc:sldMk cId="249877674" sldId="318"/>
+        </pc:sldMkLst>
+        <pc:spChg chg="mod">
+          <ac:chgData name="Abhiroop Mukherjee" userId="5fbc6062963ca2c0" providerId="LiveId" clId="{BA04AB18-81BA-44F6-8A17-E30D392E2E82}" dt="2021-04-07T20:15:18.148" v="5245" actId="20577"/>
+          <ac:spMkLst>
+            <pc:docMk/>
+            <pc:sldMk cId="249877674" sldId="318"/>
+            <ac:spMk id="2" creationId="{0CF820E1-E514-4B58-98AB-89F302D91E31}"/>
+          </ac:spMkLst>
+        </pc:spChg>
+        <pc:spChg chg="mod">
+          <ac:chgData name="Abhiroop Mukherjee" userId="5fbc6062963ca2c0" providerId="LiveId" clId="{BA04AB18-81BA-44F6-8A17-E30D392E2E82}" dt="2021-04-07T20:19:12.910" v="5951" actId="33524"/>
+          <ac:spMkLst>
+            <pc:docMk/>
+            <pc:sldMk cId="249877674" sldId="318"/>
+            <ac:spMk id="9" creationId="{FB3ADEF1-B48E-4597-8478-E89F81BA647C}"/>
+          </ac:spMkLst>
+        </pc:spChg>
+        <pc:spChg chg="add del">
+          <ac:chgData name="Abhiroop Mukherjee" userId="5fbc6062963ca2c0" providerId="LiveId" clId="{BA04AB18-81BA-44F6-8A17-E30D392E2E82}" dt="2021-04-07T20:20:07.680" v="5977" actId="26606"/>
+          <ac:spMkLst>
+            <pc:docMk/>
+            <pc:sldMk cId="249877674" sldId="318"/>
+            <ac:spMk id="76" creationId="{52ABB703-2B0E-4C3B-B4A2-F3973548E561}"/>
+          </ac:spMkLst>
+        </pc:spChg>
+        <pc:spChg chg="add del">
+          <ac:chgData name="Abhiroop Mukherjee" userId="5fbc6062963ca2c0" providerId="LiveId" clId="{BA04AB18-81BA-44F6-8A17-E30D392E2E82}" dt="2021-04-07T20:20:07.680" v="5977" actId="26606"/>
+          <ac:spMkLst>
+            <pc:docMk/>
+            <pc:sldMk cId="249877674" sldId="318"/>
+            <ac:spMk id="80" creationId="{E95DA498-D9A2-4DA9-B9DA-B3776E08CF7E}"/>
+          </ac:spMkLst>
+        </pc:spChg>
+        <pc:spChg chg="add del">
+          <ac:chgData name="Abhiroop Mukherjee" userId="5fbc6062963ca2c0" providerId="LiveId" clId="{BA04AB18-81BA-44F6-8A17-E30D392E2E82}" dt="2021-04-07T20:20:07.680" v="5977" actId="26606"/>
+          <ac:spMkLst>
+            <pc:docMk/>
+            <pc:sldMk cId="249877674" sldId="318"/>
+            <ac:spMk id="82" creationId="{82A73093-4B9D-420D-B17E-52293703A1D4}"/>
+          </ac:spMkLst>
+        </pc:spChg>
+        <pc:spChg chg="add">
+          <ac:chgData name="Abhiroop Mukherjee" userId="5fbc6062963ca2c0" providerId="LiveId" clId="{BA04AB18-81BA-44F6-8A17-E30D392E2E82}" dt="2021-04-07T20:20:07.680" v="5977" actId="26606"/>
+          <ac:spMkLst>
+            <pc:docMk/>
+            <pc:sldMk cId="249877674" sldId="318"/>
+            <ac:spMk id="87" creationId="{52ABB703-2B0E-4C3B-B4A2-F3973548E561}"/>
+          </ac:spMkLst>
+        </pc:spChg>
+        <pc:spChg chg="add">
+          <ac:chgData name="Abhiroop Mukherjee" userId="5fbc6062963ca2c0" providerId="LiveId" clId="{BA04AB18-81BA-44F6-8A17-E30D392E2E82}" dt="2021-04-07T20:20:07.680" v="5977" actId="26606"/>
+          <ac:spMkLst>
+            <pc:docMk/>
+            <pc:sldMk cId="249877674" sldId="318"/>
+            <ac:spMk id="91" creationId="{E95DA498-D9A2-4DA9-B9DA-B3776E08CF7E}"/>
+          </ac:spMkLst>
+        </pc:spChg>
+        <pc:spChg chg="add">
+          <ac:chgData name="Abhiroop Mukherjee" userId="5fbc6062963ca2c0" providerId="LiveId" clId="{BA04AB18-81BA-44F6-8A17-E30D392E2E82}" dt="2021-04-07T20:20:07.680" v="5977" actId="26606"/>
+          <ac:spMkLst>
+            <pc:docMk/>
+            <pc:sldMk cId="249877674" sldId="318"/>
+            <ac:spMk id="93" creationId="{82A73093-4B9D-420D-B17E-52293703A1D4}"/>
+          </ac:spMkLst>
+        </pc:spChg>
+        <pc:spChg chg="del">
+          <ac:chgData name="Abhiroop Mukherjee" userId="5fbc6062963ca2c0" providerId="LiveId" clId="{BA04AB18-81BA-44F6-8A17-E30D392E2E82}" dt="2021-04-07T20:19:15.627" v="5952" actId="26606"/>
+          <ac:spMkLst>
+            <pc:docMk/>
+            <pc:sldMk cId="249877674" sldId="318"/>
+            <ac:spMk id="193" creationId="{52ABB703-2B0E-4C3B-B4A2-F3973548E561}"/>
+          </ac:spMkLst>
+        </pc:spChg>
+        <pc:spChg chg="del">
+          <ac:chgData name="Abhiroop Mukherjee" userId="5fbc6062963ca2c0" providerId="LiveId" clId="{BA04AB18-81BA-44F6-8A17-E30D392E2E82}" dt="2021-04-07T20:19:15.627" v="5952" actId="26606"/>
+          <ac:spMkLst>
+            <pc:docMk/>
+            <pc:sldMk cId="249877674" sldId="318"/>
+            <ac:spMk id="197" creationId="{E95DA498-D9A2-4DA9-B9DA-B3776E08CF7E}"/>
+          </ac:spMkLst>
+        </pc:spChg>
+        <pc:spChg chg="del">
+          <ac:chgData name="Abhiroop Mukherjee" userId="5fbc6062963ca2c0" providerId="LiveId" clId="{BA04AB18-81BA-44F6-8A17-E30D392E2E82}" dt="2021-04-07T20:19:15.627" v="5952" actId="26606"/>
+          <ac:spMkLst>
+            <pc:docMk/>
+            <pc:sldMk cId="249877674" sldId="318"/>
+            <ac:spMk id="199" creationId="{82A73093-4B9D-420D-B17E-52293703A1D4}"/>
+          </ac:spMkLst>
+        </pc:spChg>
+        <pc:picChg chg="mod">
+          <ac:chgData name="Abhiroop Mukherjee" userId="5fbc6062963ca2c0" providerId="LiveId" clId="{BA04AB18-81BA-44F6-8A17-E30D392E2E82}" dt="2021-04-07T20:19:44.708" v="5968" actId="14826"/>
+          <ac:picMkLst>
+            <pc:docMk/>
+            <pc:sldMk cId="249877674" sldId="318"/>
+            <ac:picMk id="5" creationId="{66ACF5EE-B012-4BDB-A31F-C5EBFB1ECF9F}"/>
+          </ac:picMkLst>
+        </pc:picChg>
+        <pc:cxnChg chg="add del">
+          <ac:chgData name="Abhiroop Mukherjee" userId="5fbc6062963ca2c0" providerId="LiveId" clId="{BA04AB18-81BA-44F6-8A17-E30D392E2E82}" dt="2021-04-07T20:20:07.680" v="5977" actId="26606"/>
+          <ac:cxnSpMkLst>
+            <pc:docMk/>
+            <pc:sldMk cId="249877674" sldId="318"/>
+            <ac:cxnSpMk id="78" creationId="{9C21570E-E159-49A6-9891-FA397B7A92D3}"/>
+          </ac:cxnSpMkLst>
+        </pc:cxnChg>
+        <pc:cxnChg chg="add">
+          <ac:chgData name="Abhiroop Mukherjee" userId="5fbc6062963ca2c0" providerId="LiveId" clId="{BA04AB18-81BA-44F6-8A17-E30D392E2E82}" dt="2021-04-07T20:20:07.680" v="5977" actId="26606"/>
+          <ac:cxnSpMkLst>
+            <pc:docMk/>
+            <pc:sldMk cId="249877674" sldId="318"/>
+            <ac:cxnSpMk id="89" creationId="{9C21570E-E159-49A6-9891-FA397B7A92D3}"/>
+          </ac:cxnSpMkLst>
+        </pc:cxnChg>
+        <pc:cxnChg chg="del">
+          <ac:chgData name="Abhiroop Mukherjee" userId="5fbc6062963ca2c0" providerId="LiveId" clId="{BA04AB18-81BA-44F6-8A17-E30D392E2E82}" dt="2021-04-07T20:19:15.627" v="5952" actId="26606"/>
+          <ac:cxnSpMkLst>
+            <pc:docMk/>
+            <pc:sldMk cId="249877674" sldId="318"/>
+            <ac:cxnSpMk id="195" creationId="{9C21570E-E159-49A6-9891-FA397B7A92D3}"/>
+          </ac:cxnSpMkLst>
+        </pc:cxnChg>
+      </pc:sldChg>
+      <pc:sldChg chg="addSp delSp modSp add del mod">
+        <pc:chgData name="Abhiroop Mukherjee" userId="5fbc6062963ca2c0" providerId="LiveId" clId="{BA04AB18-81BA-44F6-8A17-E30D392E2E82}" dt="2021-04-07T20:22:08.172" v="6199" actId="47"/>
+        <pc:sldMkLst>
+          <pc:docMk/>
+          <pc:sldMk cId="284166941" sldId="319"/>
+        </pc:sldMkLst>
+        <pc:spChg chg="mod">
+          <ac:chgData name="Abhiroop Mukherjee" userId="5fbc6062963ca2c0" providerId="LiveId" clId="{BA04AB18-81BA-44F6-8A17-E30D392E2E82}" dt="2021-04-07T20:22:00.048" v="6198" actId="20577"/>
+          <ac:spMkLst>
+            <pc:docMk/>
+            <pc:sldMk cId="284166941" sldId="319"/>
+            <ac:spMk id="2" creationId="{0CF820E1-E514-4B58-98AB-89F302D91E31}"/>
+          </ac:spMkLst>
+        </pc:spChg>
+        <pc:spChg chg="del mod">
+          <ac:chgData name="Abhiroop Mukherjee" userId="5fbc6062963ca2c0" providerId="LiveId" clId="{BA04AB18-81BA-44F6-8A17-E30D392E2E82}" dt="2021-04-07T20:21:00.682" v="6175"/>
+          <ac:spMkLst>
+            <pc:docMk/>
+            <pc:sldMk cId="284166941" sldId="319"/>
+            <ac:spMk id="9" creationId="{FB3ADEF1-B48E-4597-8478-E89F81BA647C}"/>
+          </ac:spMkLst>
+        </pc:spChg>
+        <pc:spChg chg="del">
+          <ac:chgData name="Abhiroop Mukherjee" userId="5fbc6062963ca2c0" providerId="LiveId" clId="{BA04AB18-81BA-44F6-8A17-E30D392E2E82}" dt="2021-04-07T20:21:07.406" v="6179" actId="26606"/>
+          <ac:spMkLst>
+            <pc:docMk/>
+            <pc:sldMk cId="284166941" sldId="319"/>
+            <ac:spMk id="76" creationId="{52ABB703-2B0E-4C3B-B4A2-F3973548E561}"/>
+          </ac:spMkLst>
+        </pc:spChg>
+        <pc:spChg chg="add">
+          <ac:chgData name="Abhiroop Mukherjee" userId="5fbc6062963ca2c0" providerId="LiveId" clId="{BA04AB18-81BA-44F6-8A17-E30D392E2E82}" dt="2021-04-07T20:21:57.151" v="6197" actId="26606"/>
+          <ac:spMkLst>
+            <pc:docMk/>
+            <pc:sldMk cId="284166941" sldId="319"/>
+            <ac:spMk id="79" creationId="{3F87243A-F810-42AD-AA74-3FA38B1D8A8F}"/>
+          </ac:spMkLst>
+        </pc:spChg>
+        <pc:spChg chg="del">
+          <ac:chgData name="Abhiroop Mukherjee" userId="5fbc6062963ca2c0" providerId="LiveId" clId="{BA04AB18-81BA-44F6-8A17-E30D392E2E82}" dt="2021-04-07T20:21:07.406" v="6179" actId="26606"/>
+          <ac:spMkLst>
+            <pc:docMk/>
+            <pc:sldMk cId="284166941" sldId="319"/>
+            <ac:spMk id="80" creationId="{E95DA498-D9A2-4DA9-B9DA-B3776E08CF7E}"/>
+          </ac:spMkLst>
+        </pc:spChg>
+        <pc:spChg chg="add">
+          <ac:chgData name="Abhiroop Mukherjee" userId="5fbc6062963ca2c0" providerId="LiveId" clId="{BA04AB18-81BA-44F6-8A17-E30D392E2E82}" dt="2021-04-07T20:21:57.151" v="6197" actId="26606"/>
+          <ac:spMkLst>
+            <pc:docMk/>
+            <pc:sldMk cId="284166941" sldId="319"/>
+            <ac:spMk id="81" creationId="{E4710C0A-057C-4274-BA2D-001F1025E83E}"/>
+          </ac:spMkLst>
+        </pc:spChg>
+        <pc:spChg chg="del">
+          <ac:chgData name="Abhiroop Mukherjee" userId="5fbc6062963ca2c0" providerId="LiveId" clId="{BA04AB18-81BA-44F6-8A17-E30D392E2E82}" dt="2021-04-07T20:21:07.406" v="6179" actId="26606"/>
+          <ac:spMkLst>
+            <pc:docMk/>
+            <pc:sldMk cId="284166941" sldId="319"/>
+            <ac:spMk id="82" creationId="{82A73093-4B9D-420D-B17E-52293703A1D4}"/>
+          </ac:spMkLst>
+        </pc:spChg>
+        <pc:spChg chg="add">
+          <ac:chgData name="Abhiroop Mukherjee" userId="5fbc6062963ca2c0" providerId="LiveId" clId="{BA04AB18-81BA-44F6-8A17-E30D392E2E82}" dt="2021-04-07T20:21:57.151" v="6197" actId="26606"/>
+          <ac:spMkLst>
+            <pc:docMk/>
+            <pc:sldMk cId="284166941" sldId="319"/>
+            <ac:spMk id="85" creationId="{7527CA15-1C7B-4C0C-86EE-385C1D6C98C0}"/>
+          </ac:spMkLst>
+        </pc:spChg>
+        <pc:spChg chg="add del">
+          <ac:chgData name="Abhiroop Mukherjee" userId="5fbc6062963ca2c0" providerId="LiveId" clId="{BA04AB18-81BA-44F6-8A17-E30D392E2E82}" dt="2021-04-07T20:21:40.097" v="6196" actId="26606"/>
+          <ac:spMkLst>
+            <pc:docMk/>
+            <pc:sldMk cId="284166941" sldId="319"/>
+            <ac:spMk id="87" creationId="{3F87243A-F810-42AD-AA74-3FA38B1D8A8F}"/>
+          </ac:spMkLst>
+        </pc:spChg>
+        <pc:spChg chg="add del">
+          <ac:chgData name="Abhiroop Mukherjee" userId="5fbc6062963ca2c0" providerId="LiveId" clId="{BA04AB18-81BA-44F6-8A17-E30D392E2E82}" dt="2021-04-07T20:21:40.097" v="6196" actId="26606"/>
+          <ac:spMkLst>
+            <pc:docMk/>
+            <pc:sldMk cId="284166941" sldId="319"/>
+            <ac:spMk id="89" creationId="{E4710C0A-057C-4274-BA2D-001F1025E83E}"/>
+          </ac:spMkLst>
+        </pc:spChg>
+        <pc:spChg chg="add del">
+          <ac:chgData name="Abhiroop Mukherjee" userId="5fbc6062963ca2c0" providerId="LiveId" clId="{BA04AB18-81BA-44F6-8A17-E30D392E2E82}" dt="2021-04-07T20:21:40.097" v="6196" actId="26606"/>
+          <ac:spMkLst>
+            <pc:docMk/>
+            <pc:sldMk cId="284166941" sldId="319"/>
+            <ac:spMk id="93" creationId="{401AB748-B9E7-4AEC-AAB9-0EABDE63F84B}"/>
+          </ac:spMkLst>
+        </pc:spChg>
+        <pc:spChg chg="add del">
+          <ac:chgData name="Abhiroop Mukherjee" userId="5fbc6062963ca2c0" providerId="LiveId" clId="{BA04AB18-81BA-44F6-8A17-E30D392E2E82}" dt="2021-04-07T20:21:40.097" v="6196" actId="26606"/>
+          <ac:spMkLst>
+            <pc:docMk/>
+            <pc:sldMk cId="284166941" sldId="319"/>
+            <ac:spMk id="95" creationId="{E0954B38-9C23-4C8B-AC5D-0E80CEA3BD48}"/>
+          </ac:spMkLst>
+        </pc:spChg>
+        <pc:spChg chg="add del">
+          <ac:chgData name="Abhiroop Mukherjee" userId="5fbc6062963ca2c0" providerId="LiveId" clId="{BA04AB18-81BA-44F6-8A17-E30D392E2E82}" dt="2021-04-07T20:21:40.097" v="6196" actId="26606"/>
+          <ac:spMkLst>
+            <pc:docMk/>
+            <pc:sldMk cId="284166941" sldId="319"/>
+            <ac:spMk id="97" creationId="{791376A8-6B7C-49D5-B3B0-B1D81BC15C2C}"/>
+          </ac:spMkLst>
+        </pc:spChg>
+        <pc:spChg chg="add del">
+          <ac:chgData name="Abhiroop Mukherjee" userId="5fbc6062963ca2c0" providerId="LiveId" clId="{BA04AB18-81BA-44F6-8A17-E30D392E2E82}" dt="2021-04-07T20:21:40.097" v="6196" actId="26606"/>
+          <ac:spMkLst>
+            <pc:docMk/>
+            <pc:sldMk cId="284166941" sldId="319"/>
+            <ac:spMk id="101" creationId="{3B0D8F16-5F3B-465F-9D06-983E2E8267E5}"/>
+          </ac:spMkLst>
+        </pc:spChg>
+        <pc:spChg chg="add del">
+          <ac:chgData name="Abhiroop Mukherjee" userId="5fbc6062963ca2c0" providerId="LiveId" clId="{BA04AB18-81BA-44F6-8A17-E30D392E2E82}" dt="2021-04-07T20:21:40.097" v="6196" actId="26606"/>
+          <ac:spMkLst>
+            <pc:docMk/>
+            <pc:sldMk cId="284166941" sldId="319"/>
+            <ac:spMk id="103" creationId="{5DED356E-7923-4393-BAEA-0116D9D7635D}"/>
+          </ac:spMkLst>
+        </pc:spChg>
+        <pc:spChg chg="add del">
+          <ac:chgData name="Abhiroop Mukherjee" userId="5fbc6062963ca2c0" providerId="LiveId" clId="{BA04AB18-81BA-44F6-8A17-E30D392E2E82}" dt="2021-04-07T20:21:40.082" v="6195" actId="26606"/>
+          <ac:spMkLst>
+            <pc:docMk/>
+            <pc:sldMk cId="284166941" sldId="319"/>
+            <ac:spMk id="107" creationId="{28B12BE3-B5CE-4459-919E-A3851AA02859}"/>
+          </ac:spMkLst>
+        </pc:spChg>
+        <pc:spChg chg="add del">
+          <ac:chgData name="Abhiroop Mukherjee" userId="5fbc6062963ca2c0" providerId="LiveId" clId="{BA04AB18-81BA-44F6-8A17-E30D392E2E82}" dt="2021-04-07T20:21:34.956" v="6193" actId="26606"/>
+          <ac:spMkLst>
+            <pc:docMk/>
+            <pc:sldMk cId="284166941" sldId="319"/>
+            <ac:spMk id="108" creationId="{3F87243A-F810-42AD-AA74-3FA38B1D8A8F}"/>
+          </ac:spMkLst>
+        </pc:spChg>
+        <pc:spChg chg="add del">
+          <ac:chgData name="Abhiroop Mukherjee" userId="5fbc6062963ca2c0" providerId="LiveId" clId="{BA04AB18-81BA-44F6-8A17-E30D392E2E82}" dt="2021-04-07T20:21:34.956" v="6193" actId="26606"/>
+          <ac:spMkLst>
+            <pc:docMk/>
+            <pc:sldMk cId="284166941" sldId="319"/>
+            <ac:spMk id="110" creationId="{E4710C0A-057C-4274-BA2D-001F1025E83E}"/>
+          </ac:spMkLst>
+        </pc:spChg>
+        <pc:spChg chg="add del">
+          <ac:chgData name="Abhiroop Mukherjee" userId="5fbc6062963ca2c0" providerId="LiveId" clId="{BA04AB18-81BA-44F6-8A17-E30D392E2E82}" dt="2021-04-07T20:21:34.956" v="6193" actId="26606"/>
+          <ac:spMkLst>
+            <pc:docMk/>
+            <pc:sldMk cId="284166941" sldId="319"/>
+            <ac:spMk id="114" creationId="{7527CA15-1C7B-4C0C-86EE-385C1D6C98C0}"/>
+          </ac:spMkLst>
+        </pc:spChg>
+        <pc:spChg chg="add del">
+          <ac:chgData name="Abhiroop Mukherjee" userId="5fbc6062963ca2c0" providerId="LiveId" clId="{BA04AB18-81BA-44F6-8A17-E30D392E2E82}" dt="2021-04-07T20:21:34.956" v="6193" actId="26606"/>
+          <ac:spMkLst>
+            <pc:docMk/>
+            <pc:sldMk cId="284166941" sldId="319"/>
+            <ac:spMk id="116" creationId="{ED643915-9209-40AB-8194-9D9125C0A3F3}"/>
+          </ac:spMkLst>
+        </pc:spChg>
+        <pc:spChg chg="add del">
+          <ac:chgData name="Abhiroop Mukherjee" userId="5fbc6062963ca2c0" providerId="LiveId" clId="{BA04AB18-81BA-44F6-8A17-E30D392E2E82}" dt="2021-04-07T20:21:34.956" v="6193" actId="26606"/>
+          <ac:spMkLst>
+            <pc:docMk/>
+            <pc:sldMk cId="284166941" sldId="319"/>
+            <ac:spMk id="118" creationId="{8A54198A-4950-48AB-BDD3-16D7F9084A50}"/>
+          </ac:spMkLst>
+        </pc:spChg>
+        <pc:spChg chg="add del">
+          <ac:chgData name="Abhiroop Mukherjee" userId="5fbc6062963ca2c0" providerId="LiveId" clId="{BA04AB18-81BA-44F6-8A17-E30D392E2E82}" dt="2021-04-07T20:21:34.956" v="6193" actId="26606"/>
+          <ac:spMkLst>
+            <pc:docMk/>
+            <pc:sldMk cId="284166941" sldId="319"/>
+            <ac:spMk id="120" creationId="{30F05B05-D1D0-4D96-A6C6-E0095E789EF8}"/>
+          </ac:spMkLst>
+        </pc:spChg>
+        <pc:spChg chg="add del">
+          <ac:chgData name="Abhiroop Mukherjee" userId="5fbc6062963ca2c0" providerId="LiveId" clId="{BA04AB18-81BA-44F6-8A17-E30D392E2E82}" dt="2021-04-07T20:21:34.956" v="6193" actId="26606"/>
+          <ac:spMkLst>
+            <pc:docMk/>
+            <pc:sldMk cId="284166941" sldId="319"/>
+            <ac:spMk id="122" creationId="{6561554E-8EEC-420C-93A0-4E77A8A0EB7B}"/>
+          </ac:spMkLst>
+        </pc:spChg>
+        <pc:spChg chg="add del">
+          <ac:chgData name="Abhiroop Mukherjee" userId="5fbc6062963ca2c0" providerId="LiveId" clId="{BA04AB18-81BA-44F6-8A17-E30D392E2E82}" dt="2021-04-07T20:21:40.082" v="6195" actId="26606"/>
+          <ac:spMkLst>
+            <pc:docMk/>
+            <pc:sldMk cId="284166941" sldId="319"/>
+            <ac:spMk id="124" creationId="{2EB56A1A-8685-45C8-A64C-D5045ACB42B0}"/>
+          </ac:spMkLst>
+        </pc:spChg>
+        <pc:spChg chg="add del">
+          <ac:chgData name="Abhiroop Mukherjee" userId="5fbc6062963ca2c0" providerId="LiveId" clId="{BA04AB18-81BA-44F6-8A17-E30D392E2E82}" dt="2021-04-07T20:21:40.082" v="6195" actId="26606"/>
+          <ac:spMkLst>
+            <pc:docMk/>
+            <pc:sldMk cId="284166941" sldId="319"/>
+            <ac:spMk id="125" creationId="{79DF55E6-8C71-4381-81E4-31D3EBC96DFC}"/>
+          </ac:spMkLst>
+        </pc:spChg>
+        <pc:spChg chg="add del">
+          <ac:chgData name="Abhiroop Mukherjee" userId="5fbc6062963ca2c0" providerId="LiveId" clId="{BA04AB18-81BA-44F6-8A17-E30D392E2E82}" dt="2021-04-07T20:21:40.082" v="6195" actId="26606"/>
+          <ac:spMkLst>
+            <pc:docMk/>
+            <pc:sldMk cId="284166941" sldId="319"/>
+            <ac:spMk id="127" creationId="{19DE44C1-A00E-40B3-B723-D1199BD4EB72}"/>
+          </ac:spMkLst>
+        </pc:spChg>
+        <pc:spChg chg="add del">
+          <ac:chgData name="Abhiroop Mukherjee" userId="5fbc6062963ca2c0" providerId="LiveId" clId="{BA04AB18-81BA-44F6-8A17-E30D392E2E82}" dt="2021-04-07T20:21:40.082" v="6195" actId="26606"/>
+          <ac:spMkLst>
+            <pc:docMk/>
+            <pc:sldMk cId="284166941" sldId="319"/>
+            <ac:spMk id="128" creationId="{5DD14EB9-7D82-468B-B45D-876BE90A5EAF}"/>
+          </ac:spMkLst>
+        </pc:spChg>
+        <pc:spChg chg="add del">
+          <ac:chgData name="Abhiroop Mukherjee" userId="5fbc6062963ca2c0" providerId="LiveId" clId="{BA04AB18-81BA-44F6-8A17-E30D392E2E82}" dt="2021-04-07T20:21:40.082" v="6195" actId="26606"/>
+          <ac:spMkLst>
+            <pc:docMk/>
+            <pc:sldMk cId="284166941" sldId="319"/>
+            <ac:spMk id="129" creationId="{88302865-9184-47F8-9D42-09980A3E5D1C}"/>
+          </ac:spMkLst>
+        </pc:spChg>
+        <pc:spChg chg="add del">
+          <ac:chgData name="Abhiroop Mukherjee" userId="5fbc6062963ca2c0" providerId="LiveId" clId="{BA04AB18-81BA-44F6-8A17-E30D392E2E82}" dt="2021-04-07T20:21:57.151" v="6197" actId="26606"/>
+          <ac:spMkLst>
+            <pc:docMk/>
+            <pc:sldMk cId="284166941" sldId="319"/>
+            <ac:spMk id="131" creationId="{3F87243A-F810-42AD-AA74-3FA38B1D8A8F}"/>
+          </ac:spMkLst>
+        </pc:spChg>
+        <pc:spChg chg="add del">
+          <ac:chgData name="Abhiroop Mukherjee" userId="5fbc6062963ca2c0" providerId="LiveId" clId="{BA04AB18-81BA-44F6-8A17-E30D392E2E82}" dt="2021-04-07T20:21:57.151" v="6197" actId="26606"/>
+          <ac:spMkLst>
+            <pc:docMk/>
+            <pc:sldMk cId="284166941" sldId="319"/>
+            <ac:spMk id="132" creationId="{E4710C0A-057C-4274-BA2D-001F1025E83E}"/>
+          </ac:spMkLst>
+        </pc:spChg>
+        <pc:spChg chg="add del">
+          <ac:chgData name="Abhiroop Mukherjee" userId="5fbc6062963ca2c0" providerId="LiveId" clId="{BA04AB18-81BA-44F6-8A17-E30D392E2E82}" dt="2021-04-07T20:21:57.151" v="6197" actId="26606"/>
+          <ac:spMkLst>
+            <pc:docMk/>
+            <pc:sldMk cId="284166941" sldId="319"/>
+            <ac:spMk id="134" creationId="{7527CA15-1C7B-4C0C-86EE-385C1D6C98C0}"/>
+          </ac:spMkLst>
+        </pc:spChg>
+        <pc:spChg chg="add del">
+          <ac:chgData name="Abhiroop Mukherjee" userId="5fbc6062963ca2c0" providerId="LiveId" clId="{BA04AB18-81BA-44F6-8A17-E30D392E2E82}" dt="2021-04-07T20:21:57.151" v="6197" actId="26606"/>
+          <ac:spMkLst>
+            <pc:docMk/>
+            <pc:sldMk cId="284166941" sldId="319"/>
+            <ac:spMk id="135" creationId="{ED643915-9209-40AB-8194-9D9125C0A3F3}"/>
+          </ac:spMkLst>
+        </pc:spChg>
+        <pc:spChg chg="add del">
+          <ac:chgData name="Abhiroop Mukherjee" userId="5fbc6062963ca2c0" providerId="LiveId" clId="{BA04AB18-81BA-44F6-8A17-E30D392E2E82}" dt="2021-04-07T20:21:57.151" v="6197" actId="26606"/>
+          <ac:spMkLst>
+            <pc:docMk/>
+            <pc:sldMk cId="284166941" sldId="319"/>
+            <ac:spMk id="136" creationId="{8A54198A-4950-48AB-BDD3-16D7F9084A50}"/>
+          </ac:spMkLst>
+        </pc:spChg>
+        <pc:spChg chg="add del">
+          <ac:chgData name="Abhiroop Mukherjee" userId="5fbc6062963ca2c0" providerId="LiveId" clId="{BA04AB18-81BA-44F6-8A17-E30D392E2E82}" dt="2021-04-07T20:21:57.151" v="6197" actId="26606"/>
+          <ac:spMkLst>
+            <pc:docMk/>
+            <pc:sldMk cId="284166941" sldId="319"/>
+            <ac:spMk id="137" creationId="{30F05B05-D1D0-4D96-A6C6-E0095E789EF8}"/>
+          </ac:spMkLst>
+        </pc:spChg>
+        <pc:spChg chg="add del">
+          <ac:chgData name="Abhiroop Mukherjee" userId="5fbc6062963ca2c0" providerId="LiveId" clId="{BA04AB18-81BA-44F6-8A17-E30D392E2E82}" dt="2021-04-07T20:21:57.151" v="6197" actId="26606"/>
+          <ac:spMkLst>
+            <pc:docMk/>
+            <pc:sldMk cId="284166941" sldId="319"/>
+            <ac:spMk id="138" creationId="{6561554E-8EEC-420C-93A0-4E77A8A0EB7B}"/>
+          </ac:spMkLst>
+        </pc:spChg>
+        <pc:spChg chg="add">
+          <ac:chgData name="Abhiroop Mukherjee" userId="5fbc6062963ca2c0" providerId="LiveId" clId="{BA04AB18-81BA-44F6-8A17-E30D392E2E82}" dt="2021-04-07T20:21:57.151" v="6197" actId="26606"/>
+          <ac:spMkLst>
+            <pc:docMk/>
+            <pc:sldMk cId="284166941" sldId="319"/>
+            <ac:spMk id="140" creationId="{ED643915-9209-40AB-8194-9D9125C0A3F3}"/>
+          </ac:spMkLst>
+        </pc:spChg>
+        <pc:spChg chg="add">
+          <ac:chgData name="Abhiroop Mukherjee" userId="5fbc6062963ca2c0" providerId="LiveId" clId="{BA04AB18-81BA-44F6-8A17-E30D392E2E82}" dt="2021-04-07T20:21:57.151" v="6197" actId="26606"/>
+          <ac:spMkLst>
+            <pc:docMk/>
+            <pc:sldMk cId="284166941" sldId="319"/>
+            <ac:spMk id="141" creationId="{8A54198A-4950-48AB-BDD3-16D7F9084A50}"/>
+          </ac:spMkLst>
+        </pc:spChg>
+        <pc:spChg chg="add">
+          <ac:chgData name="Abhiroop Mukherjee" userId="5fbc6062963ca2c0" providerId="LiveId" clId="{BA04AB18-81BA-44F6-8A17-E30D392E2E82}" dt="2021-04-07T20:21:57.151" v="6197" actId="26606"/>
+          <ac:spMkLst>
+            <pc:docMk/>
+            <pc:sldMk cId="284166941" sldId="319"/>
+            <ac:spMk id="142" creationId="{30F05B05-D1D0-4D96-A6C6-E0095E789EF8}"/>
+          </ac:spMkLst>
+        </pc:spChg>
+        <pc:spChg chg="add">
+          <ac:chgData name="Abhiroop Mukherjee" userId="5fbc6062963ca2c0" providerId="LiveId" clId="{BA04AB18-81BA-44F6-8A17-E30D392E2E82}" dt="2021-04-07T20:21:57.151" v="6197" actId="26606"/>
+          <ac:spMkLst>
+            <pc:docMk/>
+            <pc:sldMk cId="284166941" sldId="319"/>
+            <ac:spMk id="143" creationId="{6561554E-8EEC-420C-93A0-4E77A8A0EB7B}"/>
+          </ac:spMkLst>
+        </pc:spChg>
+        <pc:picChg chg="add mod ord">
+          <ac:chgData name="Abhiroop Mukherjee" userId="5fbc6062963ca2c0" providerId="LiveId" clId="{BA04AB18-81BA-44F6-8A17-E30D392E2E82}" dt="2021-04-07T20:21:57.151" v="6197" actId="26606"/>
+          <ac:picMkLst>
+            <pc:docMk/>
+            <pc:sldMk cId="284166941" sldId="319"/>
+            <ac:picMk id="4" creationId="{DFC52A24-90EB-4BFE-9E4B-A2F3169F4373}"/>
+          </ac:picMkLst>
+        </pc:picChg>
+        <pc:picChg chg="mod ord">
+          <ac:chgData name="Abhiroop Mukherjee" userId="5fbc6062963ca2c0" providerId="LiveId" clId="{BA04AB18-81BA-44F6-8A17-E30D392E2E82}" dt="2021-04-07T20:21:57.151" v="6197" actId="26606"/>
+          <ac:picMkLst>
+            <pc:docMk/>
+            <pc:sldMk cId="284166941" sldId="319"/>
+            <ac:picMk id="5" creationId="{66ACF5EE-B012-4BDB-A31F-C5EBFB1ECF9F}"/>
+          </ac:picMkLst>
+        </pc:picChg>
+        <pc:picChg chg="add del mod">
+          <ac:chgData name="Abhiroop Mukherjee" userId="5fbc6062963ca2c0" providerId="LiveId" clId="{BA04AB18-81BA-44F6-8A17-E30D392E2E82}" dt="2021-04-07T20:21:24.152" v="6188" actId="478"/>
+          <ac:picMkLst>
+            <pc:docMk/>
+            <pc:sldMk cId="284166941" sldId="319"/>
+            <ac:picMk id="7" creationId="{37826F5E-8226-4303-B9CA-47A9DC2067FA}"/>
+          </ac:picMkLst>
+        </pc:picChg>
+        <pc:picChg chg="add mod">
+          <ac:chgData name="Abhiroop Mukherjee" userId="5fbc6062963ca2c0" providerId="LiveId" clId="{BA04AB18-81BA-44F6-8A17-E30D392E2E82}" dt="2021-04-07T20:21:40.097" v="6196" actId="26606"/>
+          <ac:picMkLst>
+            <pc:docMk/>
+            <pc:sldMk cId="284166941" sldId="319"/>
+            <ac:picMk id="10" creationId="{1616CB35-F1CC-409A-8FEE-5DB5CFDF23E7}"/>
+          </ac:picMkLst>
+        </pc:picChg>
+        <pc:cxnChg chg="del">
+          <ac:chgData name="Abhiroop Mukherjee" userId="5fbc6062963ca2c0" providerId="LiveId" clId="{BA04AB18-81BA-44F6-8A17-E30D392E2E82}" dt="2021-04-07T20:21:07.406" v="6179" actId="26606"/>
+          <ac:cxnSpMkLst>
+            <pc:docMk/>
+            <pc:sldMk cId="284166941" sldId="319"/>
+            <ac:cxnSpMk id="78" creationId="{9C21570E-E159-49A6-9891-FA397B7A92D3}"/>
+          </ac:cxnSpMkLst>
+        </pc:cxnChg>
+        <pc:cxnChg chg="add">
+          <ac:chgData name="Abhiroop Mukherjee" userId="5fbc6062963ca2c0" providerId="LiveId" clId="{BA04AB18-81BA-44F6-8A17-E30D392E2E82}" dt="2021-04-07T20:21:57.151" v="6197" actId="26606"/>
+          <ac:cxnSpMkLst>
+            <pc:docMk/>
+            <pc:sldMk cId="284166941" sldId="319"/>
+            <ac:cxnSpMk id="83" creationId="{BEFAE2A0-B30D-40C7-BB2F-AE3D6D5D001F}"/>
+          </ac:cxnSpMkLst>
+        </pc:cxnChg>
+        <pc:cxnChg chg="add del">
+          <ac:chgData name="Abhiroop Mukherjee" userId="5fbc6062963ca2c0" providerId="LiveId" clId="{BA04AB18-81BA-44F6-8A17-E30D392E2E82}" dt="2021-04-07T20:21:40.097" v="6196" actId="26606"/>
+          <ac:cxnSpMkLst>
+            <pc:docMk/>
+            <pc:sldMk cId="284166941" sldId="319"/>
+            <ac:cxnSpMk id="91" creationId="{BEFAE2A0-B30D-40C7-BB2F-AE3D6D5D001F}"/>
+          </ac:cxnSpMkLst>
+        </pc:cxnChg>
+        <pc:cxnChg chg="add del">
+          <ac:chgData name="Abhiroop Mukherjee" userId="5fbc6062963ca2c0" providerId="LiveId" clId="{BA04AB18-81BA-44F6-8A17-E30D392E2E82}" dt="2021-04-07T20:21:40.097" v="6196" actId="26606"/>
+          <ac:cxnSpMkLst>
+            <pc:docMk/>
+            <pc:sldMk cId="284166941" sldId="319"/>
+            <ac:cxnSpMk id="99" creationId="{73A16B78-E8EF-4C99-BDA5-80142980AE93}"/>
+          </ac:cxnSpMkLst>
+        </pc:cxnChg>
+        <pc:cxnChg chg="add del">
+          <ac:chgData name="Abhiroop Mukherjee" userId="5fbc6062963ca2c0" providerId="LiveId" clId="{BA04AB18-81BA-44F6-8A17-E30D392E2E82}" dt="2021-04-07T20:21:34.956" v="6193" actId="26606"/>
+          <ac:cxnSpMkLst>
+            <pc:docMk/>
+            <pc:sldMk cId="284166941" sldId="319"/>
+            <ac:cxnSpMk id="112" creationId="{BEFAE2A0-B30D-40C7-BB2F-AE3D6D5D001F}"/>
+          </ac:cxnSpMkLst>
+        </pc:cxnChg>
+        <pc:cxnChg chg="add del">
+          <ac:chgData name="Abhiroop Mukherjee" userId="5fbc6062963ca2c0" providerId="LiveId" clId="{BA04AB18-81BA-44F6-8A17-E30D392E2E82}" dt="2021-04-07T20:21:40.082" v="6195" actId="26606"/>
+          <ac:cxnSpMkLst>
+            <pc:docMk/>
+            <pc:sldMk cId="284166941" sldId="319"/>
+            <ac:cxnSpMk id="126" creationId="{D6E0AD8B-255F-4090-B0E4-668B3F32FCDD}"/>
+          </ac:cxnSpMkLst>
+        </pc:cxnChg>
+        <pc:cxnChg chg="add del">
+          <ac:chgData name="Abhiroop Mukherjee" userId="5fbc6062963ca2c0" providerId="LiveId" clId="{BA04AB18-81BA-44F6-8A17-E30D392E2E82}" dt="2021-04-07T20:21:57.151" v="6197" actId="26606"/>
+          <ac:cxnSpMkLst>
+            <pc:docMk/>
+            <pc:sldMk cId="284166941" sldId="319"/>
+            <ac:cxnSpMk id="133" creationId="{BEFAE2A0-B30D-40C7-BB2F-AE3D6D5D001F}"/>
+          </ac:cxnSpMkLst>
+        </pc:cxnChg>
+      </pc:sldChg>
+      <pc:sldChg chg="addSp delSp modSp new del mod ord setBg">
+        <pc:chgData name="Abhiroop Mukherjee" userId="5fbc6062963ca2c0" providerId="LiveId" clId="{BA04AB18-81BA-44F6-8A17-E30D392E2E82}" dt="2021-04-07T20:23:35.273" v="6238" actId="47"/>
+        <pc:sldMkLst>
+          <pc:docMk/>
+          <pc:sldMk cId="1186642355" sldId="319"/>
+        </pc:sldMkLst>
+        <pc:spChg chg="add del">
+          <ac:chgData name="Abhiroop Mukherjee" userId="5fbc6062963ca2c0" providerId="LiveId" clId="{BA04AB18-81BA-44F6-8A17-E30D392E2E82}" dt="2021-04-07T20:22:59.673" v="6227" actId="26606"/>
+          <ac:spMkLst>
+            <pc:docMk/>
+            <pc:sldMk cId="1186642355" sldId="319"/>
+            <ac:spMk id="30" creationId="{D7D9F91F-72C9-4DB9-ABD0-A8180D8262D5}"/>
+          </ac:spMkLst>
+        </pc:spChg>
+        <pc:spChg chg="add del">
+          <ac:chgData name="Abhiroop Mukherjee" userId="5fbc6062963ca2c0" providerId="LiveId" clId="{BA04AB18-81BA-44F6-8A17-E30D392E2E82}" dt="2021-04-07T20:22:59.673" v="6227" actId="26606"/>
+          <ac:spMkLst>
+            <pc:docMk/>
+            <pc:sldMk cId="1186642355" sldId="319"/>
+            <ac:spMk id="31" creationId="{9527FCEA-6143-4C5E-8C45-8AC9237ADE89}"/>
+          </ac:spMkLst>
+        </pc:spChg>
+        <pc:spChg chg="add del">
+          <ac:chgData name="Abhiroop Mukherjee" userId="5fbc6062963ca2c0" providerId="LiveId" clId="{BA04AB18-81BA-44F6-8A17-E30D392E2E82}" dt="2021-04-07T20:22:59.673" v="6227" actId="26606"/>
+          <ac:spMkLst>
+            <pc:docMk/>
+            <pc:sldMk cId="1186642355" sldId="319"/>
+            <ac:spMk id="32" creationId="{BE016956-CE9F-4946-8834-A8BC3529D0F6}"/>
+          </ac:spMkLst>
+        </pc:spChg>
+        <pc:spChg chg="add del">
+          <ac:chgData name="Abhiroop Mukherjee" userId="5fbc6062963ca2c0" providerId="LiveId" clId="{BA04AB18-81BA-44F6-8A17-E30D392E2E82}" dt="2021-04-07T20:22:59.673" v="6227" actId="26606"/>
+          <ac:spMkLst>
+            <pc:docMk/>
+            <pc:sldMk cId="1186642355" sldId="319"/>
+            <ac:spMk id="33" creationId="{1A9F23AD-7A55-49F3-A3EC-743F47F36B0E}"/>
+          </ac:spMkLst>
+        </pc:spChg>
+        <pc:spChg chg="add del">
+          <ac:chgData name="Abhiroop Mukherjee" userId="5fbc6062963ca2c0" providerId="LiveId" clId="{BA04AB18-81BA-44F6-8A17-E30D392E2E82}" dt="2021-04-07T20:23:00.663" v="6231" actId="26606"/>
+          <ac:spMkLst>
+            <pc:docMk/>
+            <pc:sldMk cId="1186642355" sldId="319"/>
+            <ac:spMk id="38" creationId="{9527FCEA-6143-4C5E-8C45-8AC9237ADE89}"/>
+          </ac:spMkLst>
+        </pc:spChg>
+        <pc:spChg chg="add del">
+          <ac:chgData name="Abhiroop Mukherjee" userId="5fbc6062963ca2c0" providerId="LiveId" clId="{BA04AB18-81BA-44F6-8A17-E30D392E2E82}" dt="2021-04-07T20:23:00.663" v="6231" actId="26606"/>
+          <ac:spMkLst>
+            <pc:docMk/>
+            <pc:sldMk cId="1186642355" sldId="319"/>
+            <ac:spMk id="39" creationId="{1A9F23AD-7A55-49F3-A3EC-743F47F36B0E}"/>
+          </ac:spMkLst>
+        </pc:spChg>
+        <pc:spChg chg="add del">
+          <ac:chgData name="Abhiroop Mukherjee" userId="5fbc6062963ca2c0" providerId="LiveId" clId="{BA04AB18-81BA-44F6-8A17-E30D392E2E82}" dt="2021-04-07T20:23:00.663" v="6231" actId="26606"/>
+          <ac:spMkLst>
+            <pc:docMk/>
+            <pc:sldMk cId="1186642355" sldId="319"/>
+            <ac:spMk id="40" creationId="{D7D9F91F-72C9-4DB9-ABD0-A8180D8262D5}"/>
+          </ac:spMkLst>
+        </pc:spChg>
+        <pc:spChg chg="add del">
+          <ac:chgData name="Abhiroop Mukherjee" userId="5fbc6062963ca2c0" providerId="LiveId" clId="{BA04AB18-81BA-44F6-8A17-E30D392E2E82}" dt="2021-04-07T20:23:00.663" v="6231" actId="26606"/>
+          <ac:spMkLst>
+            <pc:docMk/>
+            <pc:sldMk cId="1186642355" sldId="319"/>
+            <ac:spMk id="41" creationId="{BE016956-CE9F-4946-8834-A8BC3529D0F6}"/>
+          </ac:spMkLst>
+        </pc:spChg>
+        <pc:picChg chg="add mod ord">
+          <ac:chgData name="Abhiroop Mukherjee" userId="5fbc6062963ca2c0" providerId="LiveId" clId="{BA04AB18-81BA-44F6-8A17-E30D392E2E82}" dt="2021-04-07T20:23:00.663" v="6231" actId="26606"/>
+          <ac:picMkLst>
+            <pc:docMk/>
+            <pc:sldMk cId="1186642355" sldId="319"/>
+            <ac:picMk id="3" creationId="{D58D5E8A-E674-4D92-A7A5-C184A5419FD4}"/>
+          </ac:picMkLst>
+        </pc:picChg>
+        <pc:picChg chg="add mod ord">
+          <ac:chgData name="Abhiroop Mukherjee" userId="5fbc6062963ca2c0" providerId="LiveId" clId="{BA04AB18-81BA-44F6-8A17-E30D392E2E82}" dt="2021-04-07T20:23:18.512" v="6237" actId="26606"/>
+          <ac:picMkLst>
+            <pc:docMk/>
+            <pc:sldMk cId="1186642355" sldId="319"/>
+            <ac:picMk id="5" creationId="{02830E8C-D795-46AE-BDBC-E2574AE7A5E5}"/>
+          </ac:picMkLst>
+        </pc:picChg>
+        <pc:picChg chg="add del mod ord">
+          <ac:chgData name="Abhiroop Mukherjee" userId="5fbc6062963ca2c0" providerId="LiveId" clId="{BA04AB18-81BA-44F6-8A17-E30D392E2E82}" dt="2021-04-07T20:22:20.209" v="6210" actId="478"/>
+          <ac:picMkLst>
+            <pc:docMk/>
+            <pc:sldMk cId="1186642355" sldId="319"/>
+            <ac:picMk id="7" creationId="{AD88C5EC-EBC1-4551-BAD8-54D8BAE18B54}"/>
+          </ac:picMkLst>
+        </pc:picChg>
+        <pc:picChg chg="add del mod ord">
+          <ac:chgData name="Abhiroop Mukherjee" userId="5fbc6062963ca2c0" providerId="LiveId" clId="{BA04AB18-81BA-44F6-8A17-E30D392E2E82}" dt="2021-04-07T20:22:51.331" v="6220" actId="478"/>
+          <ac:picMkLst>
+            <pc:docMk/>
+            <pc:sldMk cId="1186642355" sldId="319"/>
+            <ac:picMk id="9" creationId="{0B933CA6-5047-4388-BD11-6FB678D2F520}"/>
+          </ac:picMkLst>
+        </pc:picChg>
+        <pc:picChg chg="add mod ord">
+          <ac:chgData name="Abhiroop Mukherjee" userId="5fbc6062963ca2c0" providerId="LiveId" clId="{BA04AB18-81BA-44F6-8A17-E30D392E2E82}" dt="2021-04-07T20:23:18.512" v="6237" actId="26606"/>
+          <ac:picMkLst>
+            <pc:docMk/>
+            <pc:sldMk cId="1186642355" sldId="319"/>
+            <ac:picMk id="11" creationId="{C493A254-EFAF-40CB-AD76-544438920196}"/>
+          </ac:picMkLst>
+        </pc:picChg>
+        <pc:cxnChg chg="add del">
+          <ac:chgData name="Abhiroop Mukherjee" userId="5fbc6062963ca2c0" providerId="LiveId" clId="{BA04AB18-81BA-44F6-8A17-E30D392E2E82}" dt="2021-04-07T20:22:33.710" v="6214" actId="26606"/>
+          <ac:cxnSpMkLst>
+            <pc:docMk/>
+            <pc:sldMk cId="1186642355" sldId="319"/>
+            <ac:cxnSpMk id="12" creationId="{DCD67800-37AC-4E14-89B0-F79DCB3FB86D}"/>
+          </ac:cxnSpMkLst>
+        </pc:cxnChg>
+        <pc:cxnChg chg="add del">
+          <ac:chgData name="Abhiroop Mukherjee" userId="5fbc6062963ca2c0" providerId="LiveId" clId="{BA04AB18-81BA-44F6-8A17-E30D392E2E82}" dt="2021-04-07T20:22:33.710" v="6214" actId="26606"/>
+          <ac:cxnSpMkLst>
+            <pc:docMk/>
+            <pc:sldMk cId="1186642355" sldId="319"/>
+            <ac:cxnSpMk id="14" creationId="{20F1788F-A5AE-4188-8274-F7F2E3833ECD}"/>
+          </ac:cxnSpMkLst>
+        </pc:cxnChg>
+        <pc:cxnChg chg="add del">
+          <ac:chgData name="Abhiroop Mukherjee" userId="5fbc6062963ca2c0" providerId="LiveId" clId="{BA04AB18-81BA-44F6-8A17-E30D392E2E82}" dt="2021-04-07T20:23:00.679" v="6232" actId="26606"/>
+          <ac:cxnSpMkLst>
+            <pc:docMk/>
+            <pc:sldMk cId="1186642355" sldId="319"/>
+            <ac:cxnSpMk id="19" creationId="{DCD67800-37AC-4E14-89B0-F79DCB3FB86D}"/>
+          </ac:cxnSpMkLst>
+        </pc:cxnChg>
+        <pc:cxnChg chg="add del">
+          <ac:chgData name="Abhiroop Mukherjee" userId="5fbc6062963ca2c0" providerId="LiveId" clId="{BA04AB18-81BA-44F6-8A17-E30D392E2E82}" dt="2021-04-07T20:23:00.679" v="6232" actId="26606"/>
+          <ac:cxnSpMkLst>
+            <pc:docMk/>
+            <pc:sldMk cId="1186642355" sldId="319"/>
+            <ac:cxnSpMk id="21" creationId="{20F1788F-A5AE-4188-8274-F7F2E3833ECD}"/>
+          </ac:cxnSpMkLst>
+        </pc:cxnChg>
+        <pc:cxnChg chg="add del">
+          <ac:chgData name="Abhiroop Mukherjee" userId="5fbc6062963ca2c0" providerId="LiveId" clId="{BA04AB18-81BA-44F6-8A17-E30D392E2E82}" dt="2021-04-07T20:22:58.721" v="6225" actId="26606"/>
+          <ac:cxnSpMkLst>
+            <pc:docMk/>
+            <pc:sldMk cId="1186642355" sldId="319"/>
+            <ac:cxnSpMk id="26" creationId="{DCD67800-37AC-4E14-89B0-F79DCB3FB86D}"/>
+          </ac:cxnSpMkLst>
+        </pc:cxnChg>
+        <pc:cxnChg chg="add del">
+          <ac:chgData name="Abhiroop Mukherjee" userId="5fbc6062963ca2c0" providerId="LiveId" clId="{BA04AB18-81BA-44F6-8A17-E30D392E2E82}" dt="2021-04-07T20:22:58.721" v="6225" actId="26606"/>
+          <ac:cxnSpMkLst>
+            <pc:docMk/>
+            <pc:sldMk cId="1186642355" sldId="319"/>
+            <ac:cxnSpMk id="28" creationId="{20F1788F-A5AE-4188-8274-F7F2E3833ECD}"/>
+          </ac:cxnSpMkLst>
+        </pc:cxnChg>
+        <pc:cxnChg chg="add del">
+          <ac:chgData name="Abhiroop Mukherjee" userId="5fbc6062963ca2c0" providerId="LiveId" clId="{BA04AB18-81BA-44F6-8A17-E30D392E2E82}" dt="2021-04-07T20:23:00.261" v="6229" actId="26606"/>
+          <ac:cxnSpMkLst>
+            <pc:docMk/>
+            <pc:sldMk cId="1186642355" sldId="319"/>
+            <ac:cxnSpMk id="35" creationId="{DCD67800-37AC-4E14-89B0-F79DCB3FB86D}"/>
+          </ac:cxnSpMkLst>
+        </pc:cxnChg>
+        <pc:cxnChg chg="add del">
+          <ac:chgData name="Abhiroop Mukherjee" userId="5fbc6062963ca2c0" providerId="LiveId" clId="{BA04AB18-81BA-44F6-8A17-E30D392E2E82}" dt="2021-04-07T20:23:00.261" v="6229" actId="26606"/>
+          <ac:cxnSpMkLst>
+            <pc:docMk/>
+            <pc:sldMk cId="1186642355" sldId="319"/>
+            <ac:cxnSpMk id="36" creationId="{20F1788F-A5AE-4188-8274-F7F2E3833ECD}"/>
+          </ac:cxnSpMkLst>
+        </pc:cxnChg>
+        <pc:cxnChg chg="add del">
+          <ac:chgData name="Abhiroop Mukherjee" userId="5fbc6062963ca2c0" providerId="LiveId" clId="{BA04AB18-81BA-44F6-8A17-E30D392E2E82}" dt="2021-04-07T20:23:18.512" v="6237" actId="26606"/>
+          <ac:cxnSpMkLst>
+            <pc:docMk/>
+            <pc:sldMk cId="1186642355" sldId="319"/>
+            <ac:cxnSpMk id="43" creationId="{DCD67800-37AC-4E14-89B0-F79DCB3FB86D}"/>
+          </ac:cxnSpMkLst>
+        </pc:cxnChg>
+        <pc:cxnChg chg="add del">
+          <ac:chgData name="Abhiroop Mukherjee" userId="5fbc6062963ca2c0" providerId="LiveId" clId="{BA04AB18-81BA-44F6-8A17-E30D392E2E82}" dt="2021-04-07T20:23:18.512" v="6237" actId="26606"/>
+          <ac:cxnSpMkLst>
+            <pc:docMk/>
+            <pc:sldMk cId="1186642355" sldId="319"/>
+            <ac:cxnSpMk id="44" creationId="{20F1788F-A5AE-4188-8274-F7F2E3833ECD}"/>
+          </ac:cxnSpMkLst>
+        </pc:cxnChg>
+        <pc:cxnChg chg="add">
+          <ac:chgData name="Abhiroop Mukherjee" userId="5fbc6062963ca2c0" providerId="LiveId" clId="{BA04AB18-81BA-44F6-8A17-E30D392E2E82}" dt="2021-04-07T20:23:18.512" v="6237" actId="26606"/>
+          <ac:cxnSpMkLst>
+            <pc:docMk/>
+            <pc:sldMk cId="1186642355" sldId="319"/>
+            <ac:cxnSpMk id="49" creationId="{DCD67800-37AC-4E14-89B0-F79DCB3FB86D}"/>
+          </ac:cxnSpMkLst>
+        </pc:cxnChg>
+        <pc:cxnChg chg="add">
+          <ac:chgData name="Abhiroop Mukherjee" userId="5fbc6062963ca2c0" providerId="LiveId" clId="{BA04AB18-81BA-44F6-8A17-E30D392E2E82}" dt="2021-04-07T20:23:18.512" v="6237" actId="26606"/>
+          <ac:cxnSpMkLst>
+            <pc:docMk/>
+            <pc:sldMk cId="1186642355" sldId="319"/>
+            <ac:cxnSpMk id="51" creationId="{20F1788F-A5AE-4188-8274-F7F2E3833ECD}"/>
+          </ac:cxnSpMkLst>
+        </pc:cxnChg>
+      </pc:sldChg>
+      <pc:sldChg chg="modSp add mod">
+        <pc:chgData name="Abhiroop Mukherjee" userId="5fbc6062963ca2c0" providerId="LiveId" clId="{BA04AB18-81BA-44F6-8A17-E30D392E2E82}" dt="2021-04-07T20:26:11.035" v="6656" actId="20577"/>
+        <pc:sldMkLst>
+          <pc:docMk/>
+          <pc:sldMk cId="1997043204" sldId="319"/>
+        </pc:sldMkLst>
+        <pc:spChg chg="mod">
+          <ac:chgData name="Abhiroop Mukherjee" userId="5fbc6062963ca2c0" providerId="LiveId" clId="{BA04AB18-81BA-44F6-8A17-E30D392E2E82}" dt="2021-04-07T20:23:52.447" v="6253" actId="20577"/>
+          <ac:spMkLst>
+            <pc:docMk/>
+            <pc:sldMk cId="1997043204" sldId="319"/>
+            <ac:spMk id="2" creationId="{0CF820E1-E514-4B58-98AB-89F302D91E31}"/>
+          </ac:spMkLst>
+        </pc:spChg>
+        <pc:spChg chg="mod">
+          <ac:chgData name="Abhiroop Mukherjee" userId="5fbc6062963ca2c0" providerId="LiveId" clId="{BA04AB18-81BA-44F6-8A17-E30D392E2E82}" dt="2021-04-07T20:26:11.035" v="6656" actId="20577"/>
+          <ac:spMkLst>
+            <pc:docMk/>
+            <pc:sldMk cId="1997043204" sldId="319"/>
+            <ac:spMk id="9" creationId="{FB3ADEF1-B48E-4597-8478-E89F81BA647C}"/>
+          </ac:spMkLst>
+        </pc:spChg>
+        <pc:picChg chg="mod">
+          <ac:chgData name="Abhiroop Mukherjee" userId="5fbc6062963ca2c0" providerId="LiveId" clId="{BA04AB18-81BA-44F6-8A17-E30D392E2E82}" dt="2021-04-07T20:23:47.541" v="6240" actId="14826"/>
+          <ac:picMkLst>
+            <pc:docMk/>
+            <pc:sldMk cId="1997043204" sldId="319"/>
+            <ac:picMk id="5" creationId="{66ACF5EE-B012-4BDB-A31F-C5EBFB1ECF9F}"/>
+          </ac:picMkLst>
+        </pc:picChg>
+      </pc:sldChg>
+      <pc:sldChg chg="modSp add mod">
+        <pc:chgData name="Abhiroop Mukherjee" userId="5fbc6062963ca2c0" providerId="LiveId" clId="{BA04AB18-81BA-44F6-8A17-E30D392E2E82}" dt="2021-04-07T20:29:34.385" v="7101" actId="33524"/>
+        <pc:sldMkLst>
+          <pc:docMk/>
+          <pc:sldMk cId="3663795224" sldId="320"/>
+        </pc:sldMkLst>
+        <pc:spChg chg="mod">
+          <ac:chgData name="Abhiroop Mukherjee" userId="5fbc6062963ca2c0" providerId="LiveId" clId="{BA04AB18-81BA-44F6-8A17-E30D392E2E82}" dt="2021-04-07T20:26:24.787" v="6660" actId="20577"/>
+          <ac:spMkLst>
+            <pc:docMk/>
+            <pc:sldMk cId="3663795224" sldId="320"/>
+            <ac:spMk id="2" creationId="{0CF820E1-E514-4B58-98AB-89F302D91E31}"/>
+          </ac:spMkLst>
+        </pc:spChg>
+        <pc:spChg chg="mod">
+          <ac:chgData name="Abhiroop Mukherjee" userId="5fbc6062963ca2c0" providerId="LiveId" clId="{BA04AB18-81BA-44F6-8A17-E30D392E2E82}" dt="2021-04-07T20:29:34.385" v="7101" actId="33524"/>
+          <ac:spMkLst>
+            <pc:docMk/>
+            <pc:sldMk cId="3663795224" sldId="320"/>
+            <ac:spMk id="9" creationId="{FB3ADEF1-B48E-4597-8478-E89F81BA647C}"/>
+          </ac:spMkLst>
+        </pc:spChg>
+        <pc:picChg chg="mod">
+          <ac:chgData name="Abhiroop Mukherjee" userId="5fbc6062963ca2c0" providerId="LiveId" clId="{BA04AB18-81BA-44F6-8A17-E30D392E2E82}" dt="2021-04-07T20:26:22.257" v="6658" actId="14826"/>
+          <ac:picMkLst>
+            <pc:docMk/>
+            <pc:sldMk cId="3663795224" sldId="320"/>
+            <ac:picMk id="5" creationId="{66ACF5EE-B012-4BDB-A31F-C5EBFB1ECF9F}"/>
+          </ac:picMkLst>
+        </pc:picChg>
       </pc:sldChg>
     </pc:docChg>
   </pc:docChgLst>
@@ -39991,10 +41084,10 @@
       </p:grpSpPr>
       <p:sp useBgFill="1">
         <p:nvSpPr>
-          <p:cNvPr id="185" name="Rectangle 118">
+          <p:cNvPr id="206" name="Rectangle 192">
             <a:extLst>
               <a:ext uri="{FF2B5EF4-FFF2-40B4-BE49-F238E27FC236}">
-                <a16:creationId xmlns:a16="http://schemas.microsoft.com/office/drawing/2014/main" id="{284B70D5-875B-433D-BDBD-1522A85D6C1D}"/>
+                <a16:creationId xmlns:a16="http://schemas.microsoft.com/office/drawing/2014/main" id="{52ABB703-2B0E-4C3B-B4A2-F3973548E561}"/>
               </a:ext>
               <a:ext uri="{C183D7F6-B498-43B3-948B-1728B52AA6E4}">
                 <adec:decorative xmlns:adec="http://schemas.microsoft.com/office/drawing/2017/decorative" val="1"/>
@@ -40045,7 +41138,7 @@
           <a:lstStyle/>
           <a:p>
             <a:pPr algn="ctr"/>
-            <a:endParaRPr lang="en-US" dirty="0"/>
+            <a:endParaRPr lang="en-US"/>
           </a:p>
         </p:txBody>
       </p:sp>
@@ -40067,8 +41160,8 @@
         </p:nvSpPr>
         <p:spPr>
           <a:xfrm>
-            <a:off x="7859485" y="634946"/>
-            <a:ext cx="3690257" cy="1450757"/>
+            <a:off x="6411685" y="634946"/>
+            <a:ext cx="5127171" cy="1450757"/>
           </a:xfrm>
         </p:spPr>
         <p:txBody>
@@ -40086,7 +41179,7 @@
       </p:sp>
       <p:pic>
         <p:nvPicPr>
-          <p:cNvPr id="5" name="Content Placeholder 4" descr="Chart, scatter chart&#10;&#10;Description automatically generated">
+          <p:cNvPr id="5" name="Content Placeholder 4">
             <a:extLst>
               <a:ext uri="{FF2B5EF4-FFF2-40B4-BE49-F238E27FC236}">
                 <a16:creationId xmlns:a16="http://schemas.microsoft.com/office/drawing/2014/main" id="{66ACF5EE-B012-4BDB-A31F-C5EBFB1ECF9F}"/>
@@ -40111,8 +41204,8 @@
         </p:blipFill>
         <p:spPr>
           <a:xfrm>
-            <a:off x="1271733" y="640081"/>
-            <a:ext cx="5634332" cy="5314406"/>
+            <a:off x="643192" y="697942"/>
+            <a:ext cx="5451627" cy="5142074"/>
           </a:xfrm>
           <a:prstGeom prst="rect">
             <a:avLst/>
@@ -40121,10 +41214,10 @@
       </p:pic>
       <p:cxnSp>
         <p:nvCxnSpPr>
-          <p:cNvPr id="186" name="Straight Connector 120">
+          <p:cNvPr id="207" name="Straight Connector 194">
             <a:extLst>
               <a:ext uri="{FF2B5EF4-FFF2-40B4-BE49-F238E27FC236}">
-                <a16:creationId xmlns:a16="http://schemas.microsoft.com/office/drawing/2014/main" id="{C947DF4A-614C-4B4C-8B80-E5B9D8E8CFED}"/>
+                <a16:creationId xmlns:a16="http://schemas.microsoft.com/office/drawing/2014/main" id="{9C21570E-E159-49A6-9891-FA397B7A92D3}"/>
               </a:ext>
               <a:ext uri="{C183D7F6-B498-43B3-948B-1728B52AA6E4}">
                 <adec:decorative xmlns:adec="http://schemas.microsoft.com/office/drawing/2017/decorative" val="1"/>
@@ -40144,8 +41237,8 @@
         </p:nvCxnSpPr>
         <p:spPr>
           <a:xfrm>
-            <a:off x="7892143" y="2085703"/>
-            <a:ext cx="3566160" cy="0"/>
+            <a:off x="6411684" y="2086188"/>
+            <a:ext cx="4748808" cy="0"/>
           </a:xfrm>
           <a:prstGeom prst="line">
             <a:avLst/>
@@ -40175,8 +41268,8 @@
           </a:fontRef>
         </p:style>
       </p:cxnSp>
-      <mc:AlternateContent xmlns:mc="http://schemas.openxmlformats.org/markup-compatibility/2006" xmlns:a14="http://schemas.microsoft.com/office/drawing/2010/main">
-        <mc:Choice Requires="a14">
+      <mc:AlternateContent xmlns:mc="http://schemas.openxmlformats.org/markup-compatibility/2006">
+        <mc:Choice xmlns:a14="http://schemas.microsoft.com/office/drawing/2010/main" Requires="a14">
           <p:sp>
             <p:nvSpPr>
               <p:cNvPr id="9" name="Content Placeholder 8">
@@ -40195,8 +41288,8 @@
             </p:nvSpPr>
             <p:spPr>
               <a:xfrm>
-                <a:off x="7859485" y="2198914"/>
-                <a:ext cx="3690257" cy="3670180"/>
+                <a:off x="6411684" y="2198914"/>
+                <a:ext cx="5127172" cy="3670180"/>
               </a:xfrm>
             </p:spPr>
             <p:txBody>
@@ -40205,11 +41298,7 @@
               </a:bodyPr>
               <a:lstStyle/>
               <a:p>
-                <a:pPr lvl="1">
-                  <a:lnSpc>
-                    <a:spcPct val="150000"/>
-                  </a:lnSpc>
-                </a:pPr>
+                <a:pPr lvl="1"/>
                 <a:r>
                   <a:rPr lang="en-IN" dirty="0"/>
                   <a:t>As we can see the </a:t>
@@ -40284,6 +41373,7 @@
                   <a:rPr lang="en-US" dirty="0"/>
                   <a:t> with majority of cases around 0.5.</a:t>
                 </a:r>
+                <a:endParaRPr lang="en-US"/>
               </a:p>
               <a:p>
                 <a:pPr lvl="1"/>
@@ -40295,7 +41385,7 @@
             </p:txBody>
           </p:sp>
         </mc:Choice>
-        <mc:Fallback xmlns="">
+        <mc:Fallback>
           <p:sp>
             <p:nvSpPr>
               <p:cNvPr id="9" name="Content Placeholder 8">
@@ -40314,13 +41404,13 @@
             </p:nvSpPr>
             <p:spPr>
               <a:xfrm>
-                <a:off x="7859485" y="2198914"/>
-                <a:ext cx="3690257" cy="3670180"/>
+                <a:off x="6411684" y="2198914"/>
+                <a:ext cx="5127172" cy="3670180"/>
               </a:xfrm>
               <a:blipFill>
                 <a:blip r:embed="rId3"/>
                 <a:stretch>
-                  <a:fillRect r="-2970"/>
+                  <a:fillRect t="-166"/>
                 </a:stretch>
               </a:blipFill>
             </p:spPr>
@@ -40341,10 +41431,10 @@
       </mc:AlternateContent>
       <p:sp>
         <p:nvSpPr>
-          <p:cNvPr id="187" name="Rectangle 122">
+          <p:cNvPr id="208" name="Rectangle 196">
             <a:extLst>
               <a:ext uri="{FF2B5EF4-FFF2-40B4-BE49-F238E27FC236}">
-                <a16:creationId xmlns:a16="http://schemas.microsoft.com/office/drawing/2014/main" id="{1E299956-A9E7-4FC1-A0B1-D590CA9730E8}"/>
+                <a16:creationId xmlns:a16="http://schemas.microsoft.com/office/drawing/2014/main" id="{E95DA498-D9A2-4DA9-B9DA-B3776E08CF7E}"/>
               </a:ext>
               <a:ext uri="{C183D7F6-B498-43B3-948B-1728B52AA6E4}">
                 <adec:decorative xmlns:adec="http://schemas.microsoft.com/office/drawing/2017/decorative" val="1"/>
@@ -40396,10 +41486,10 @@
       </p:sp>
       <p:sp>
         <p:nvSpPr>
-          <p:cNvPr id="188" name="Rectangle 124">
+          <p:cNvPr id="209" name="Rectangle 198">
             <a:extLst>
               <a:ext uri="{FF2B5EF4-FFF2-40B4-BE49-F238E27FC236}">
-                <a16:creationId xmlns:a16="http://schemas.microsoft.com/office/drawing/2014/main" id="{17FC539C-B783-4B03-9F9E-D13430F3F64F}"/>
+                <a16:creationId xmlns:a16="http://schemas.microsoft.com/office/drawing/2014/main" id="{82A73093-4B9D-420D-B17E-52293703A1D4}"/>
               </a:ext>
               <a:ext uri="{C183D7F6-B498-43B3-948B-1728B52AA6E4}">
                 <adec:decorative xmlns:adec="http://schemas.microsoft.com/office/drawing/2017/decorative" val="1"/>
@@ -40463,6 +41553,1528 @@
 </file>
 
 <file path=ppt/slides/slide55.xml><?xml version="1.0" encoding="utf-8"?>
+<p:sld xmlns:a="http://schemas.openxmlformats.org/drawingml/2006/main" xmlns:r="http://schemas.openxmlformats.org/officeDocument/2006/relationships" xmlns:p="http://schemas.openxmlformats.org/presentationml/2006/main">
+  <p:cSld>
+    <p:bg>
+      <p:bgPr>
+        <a:solidFill>
+          <a:schemeClr val="bg1"/>
+        </a:solidFill>
+        <a:effectLst/>
+      </p:bgPr>
+    </p:bg>
+    <p:spTree>
+      <p:nvGrpSpPr>
+        <p:cNvPr id="1" name=""/>
+        <p:cNvGrpSpPr/>
+        <p:nvPr/>
+      </p:nvGrpSpPr>
+      <p:grpSpPr>
+        <a:xfrm>
+          <a:off x="0" y="0"/>
+          <a:ext cx="0" cy="0"/>
+          <a:chOff x="0" y="0"/>
+          <a:chExt cx="0" cy="0"/>
+        </a:xfrm>
+      </p:grpSpPr>
+      <p:sp useBgFill="1">
+        <p:nvSpPr>
+          <p:cNvPr id="76" name="Rectangle 75">
+            <a:extLst>
+              <a:ext uri="{FF2B5EF4-FFF2-40B4-BE49-F238E27FC236}">
+                <a16:creationId xmlns:a16="http://schemas.microsoft.com/office/drawing/2014/main" id="{52ABB703-2B0E-4C3B-B4A2-F3973548E561}"/>
+              </a:ext>
+              <a:ext uri="{C183D7F6-B498-43B3-948B-1728B52AA6E4}">
+                <adec:decorative xmlns:adec="http://schemas.microsoft.com/office/drawing/2017/decorative" val="1"/>
+              </a:ext>
+            </a:extLst>
+          </p:cNvPr>
+          <p:cNvSpPr>
+            <a:spLocks noGrp="1" noRot="1" noChangeAspect="1" noMove="1" noResize="1" noEditPoints="1" noAdjustHandles="1" noChangeArrowheads="1" noChangeShapeType="1" noTextEdit="1"/>
+          </p:cNvSpPr>
+          <p:nvPr>
+            <p:extLst>
+              <p:ext uri="{386F3935-93C4-4BCD-93E2-E3B085C9AB24}">
+                <p16:designElem xmlns:p16="http://schemas.microsoft.com/office/powerpoint/2015/main" val="1"/>
+              </p:ext>
+            </p:extLst>
+          </p:nvPr>
+        </p:nvSpPr>
+        <p:spPr>
+          <a:xfrm>
+            <a:off x="0" y="0"/>
+            <a:ext cx="12192001" cy="6334316"/>
+          </a:xfrm>
+          <a:prstGeom prst="rect">
+            <a:avLst/>
+          </a:prstGeom>
+          <a:ln>
+            <a:noFill/>
+          </a:ln>
+        </p:spPr>
+        <p:style>
+          <a:lnRef idx="2">
+            <a:schemeClr val="accent1">
+              <a:shade val="50000"/>
+            </a:schemeClr>
+          </a:lnRef>
+          <a:fillRef idx="1">
+            <a:schemeClr val="accent1"/>
+          </a:fillRef>
+          <a:effectRef idx="0">
+            <a:schemeClr val="accent1"/>
+          </a:effectRef>
+          <a:fontRef idx="minor">
+            <a:schemeClr val="lt1"/>
+          </a:fontRef>
+        </p:style>
+        <p:txBody>
+          <a:bodyPr rtlCol="0" anchor="ctr"/>
+          <a:lstStyle/>
+          <a:p>
+            <a:pPr algn="ctr"/>
+            <a:endParaRPr lang="en-US"/>
+          </a:p>
+        </p:txBody>
+      </p:sp>
+      <p:sp>
+        <p:nvSpPr>
+          <p:cNvPr id="2" name="Title 1">
+            <a:extLst>
+              <a:ext uri="{FF2B5EF4-FFF2-40B4-BE49-F238E27FC236}">
+                <a16:creationId xmlns:a16="http://schemas.microsoft.com/office/drawing/2014/main" id="{0CF820E1-E514-4B58-98AB-89F302D91E31}"/>
+              </a:ext>
+            </a:extLst>
+          </p:cNvPr>
+          <p:cNvSpPr>
+            <a:spLocks noGrp="1"/>
+          </p:cNvSpPr>
+          <p:nvPr>
+            <p:ph type="title"/>
+          </p:nvPr>
+        </p:nvSpPr>
+        <p:spPr>
+          <a:xfrm>
+            <a:off x="6411685" y="634946"/>
+            <a:ext cx="5127171" cy="1450757"/>
+          </a:xfrm>
+        </p:spPr>
+        <p:txBody>
+          <a:bodyPr>
+            <a:normAutofit/>
+          </a:bodyPr>
+          <a:lstStyle/>
+          <a:p>
+            <a:r>
+              <a:rPr lang="en-IN" b="1" dirty="0"/>
+              <a:t>Peculiar Observation</a:t>
+            </a:r>
+          </a:p>
+        </p:txBody>
+      </p:sp>
+      <p:pic>
+        <p:nvPicPr>
+          <p:cNvPr id="5" name="Content Placeholder 4">
+            <a:extLst>
+              <a:ext uri="{FF2B5EF4-FFF2-40B4-BE49-F238E27FC236}">
+                <a16:creationId xmlns:a16="http://schemas.microsoft.com/office/drawing/2014/main" id="{66ACF5EE-B012-4BDB-A31F-C5EBFB1ECF9F}"/>
+              </a:ext>
+            </a:extLst>
+          </p:cNvPr>
+          <p:cNvPicPr>
+            <a:picLocks noChangeAspect="1"/>
+          </p:cNvPicPr>
+          <p:nvPr/>
+        </p:nvPicPr>
+        <p:blipFill>
+          <a:blip r:embed="rId2">
+            <a:extLst>
+              <a:ext uri="{28A0092B-C50C-407E-A947-70E740481C1C}">
+                <a14:useLocalDpi xmlns:a14="http://schemas.microsoft.com/office/drawing/2010/main" val="0"/>
+              </a:ext>
+            </a:extLst>
+          </a:blip>
+          <a:srcRect l="7592" r="7592"/>
+          <a:stretch/>
+        </p:blipFill>
+        <p:spPr>
+          <a:xfrm>
+            <a:off x="643192" y="697942"/>
+            <a:ext cx="5451627" cy="5142074"/>
+          </a:xfrm>
+          <a:prstGeom prst="rect">
+            <a:avLst/>
+          </a:prstGeom>
+        </p:spPr>
+      </p:pic>
+      <p:cxnSp>
+        <p:nvCxnSpPr>
+          <p:cNvPr id="78" name="Straight Connector 77">
+            <a:extLst>
+              <a:ext uri="{FF2B5EF4-FFF2-40B4-BE49-F238E27FC236}">
+                <a16:creationId xmlns:a16="http://schemas.microsoft.com/office/drawing/2014/main" id="{9C21570E-E159-49A6-9891-FA397B7A92D3}"/>
+              </a:ext>
+              <a:ext uri="{C183D7F6-B498-43B3-948B-1728B52AA6E4}">
+                <adec:decorative xmlns:adec="http://schemas.microsoft.com/office/drawing/2017/decorative" val="1"/>
+              </a:ext>
+            </a:extLst>
+          </p:cNvPr>
+          <p:cNvCxnSpPr>
+            <a:cxnSpLocks noGrp="1" noRot="1" noChangeAspect="1" noMove="1" noResize="1" noEditPoints="1" noAdjustHandles="1" noChangeArrowheads="1" noChangeShapeType="1"/>
+          </p:cNvCxnSpPr>
+          <p:nvPr>
+            <p:extLst>
+              <p:ext uri="{386F3935-93C4-4BCD-93E2-E3B085C9AB24}">
+                <p16:designElem xmlns:p16="http://schemas.microsoft.com/office/powerpoint/2015/main" val="1"/>
+              </p:ext>
+            </p:extLst>
+          </p:nvPr>
+        </p:nvCxnSpPr>
+        <p:spPr>
+          <a:xfrm>
+            <a:off x="6411684" y="2086188"/>
+            <a:ext cx="4748808" cy="0"/>
+          </a:xfrm>
+          <a:prstGeom prst="line">
+            <a:avLst/>
+          </a:prstGeom>
+          <a:ln w="6350">
+            <a:solidFill>
+              <a:schemeClr val="tx1">
+                <a:lumMod val="50000"/>
+                <a:lumOff val="50000"/>
+                <a:alpha val="90000"/>
+              </a:schemeClr>
+            </a:solidFill>
+          </a:ln>
+        </p:spPr>
+        <p:style>
+          <a:lnRef idx="1">
+            <a:schemeClr val="accent1"/>
+          </a:lnRef>
+          <a:fillRef idx="0">
+            <a:schemeClr val="accent1"/>
+          </a:fillRef>
+          <a:effectRef idx="0">
+            <a:schemeClr val="accent1"/>
+          </a:effectRef>
+          <a:fontRef idx="minor">
+            <a:schemeClr val="tx1"/>
+          </a:fontRef>
+        </p:style>
+      </p:cxnSp>
+      <p:sp>
+        <p:nvSpPr>
+          <p:cNvPr id="9" name="Content Placeholder 8">
+            <a:extLst>
+              <a:ext uri="{FF2B5EF4-FFF2-40B4-BE49-F238E27FC236}">
+                <a16:creationId xmlns:a16="http://schemas.microsoft.com/office/drawing/2014/main" id="{FB3ADEF1-B48E-4597-8478-E89F81BA647C}"/>
+              </a:ext>
+            </a:extLst>
+          </p:cNvPr>
+          <p:cNvSpPr>
+            <a:spLocks noGrp="1"/>
+          </p:cNvSpPr>
+          <p:nvPr>
+            <p:ph idx="1"/>
+          </p:nvPr>
+        </p:nvSpPr>
+        <p:spPr>
+          <a:xfrm>
+            <a:off x="6411684" y="2198914"/>
+            <a:ext cx="5127172" cy="3670180"/>
+          </a:xfrm>
+        </p:spPr>
+        <p:txBody>
+          <a:bodyPr>
+            <a:normAutofit/>
+          </a:bodyPr>
+          <a:lstStyle/>
+          <a:p>
+            <a:pPr lvl="1"/>
+            <a:r>
+              <a:rPr lang="en-US" dirty="0"/>
+              <a:t>We observed two peculiar observations</a:t>
+            </a:r>
+          </a:p>
+          <a:p>
+            <a:pPr lvl="2"/>
+            <a:r>
+              <a:rPr lang="en-US" dirty="0"/>
+              <a:t>There is a strange dip in the ratio in some places.</a:t>
+            </a:r>
+          </a:p>
+          <a:p>
+            <a:pPr lvl="2"/>
+            <a:r>
+              <a:rPr lang="en-US" dirty="0"/>
+              <a:t>We also see a stark difference between Uniform and Normal Distribution</a:t>
+            </a:r>
+          </a:p>
+        </p:txBody>
+      </p:sp>
+      <p:sp>
+        <p:nvSpPr>
+          <p:cNvPr id="80" name="Rectangle 79">
+            <a:extLst>
+              <a:ext uri="{FF2B5EF4-FFF2-40B4-BE49-F238E27FC236}">
+                <a16:creationId xmlns:a16="http://schemas.microsoft.com/office/drawing/2014/main" id="{E95DA498-D9A2-4DA9-B9DA-B3776E08CF7E}"/>
+              </a:ext>
+              <a:ext uri="{C183D7F6-B498-43B3-948B-1728B52AA6E4}">
+                <adec:decorative xmlns:adec="http://schemas.microsoft.com/office/drawing/2017/decorative" val="1"/>
+              </a:ext>
+            </a:extLst>
+          </p:cNvPr>
+          <p:cNvSpPr>
+            <a:spLocks noGrp="1" noRot="1" noChangeAspect="1" noMove="1" noResize="1" noEditPoints="1" noAdjustHandles="1" noChangeArrowheads="1" noChangeShapeType="1" noTextEdit="1"/>
+          </p:cNvSpPr>
+          <p:nvPr>
+            <p:extLst>
+              <p:ext uri="{386F3935-93C4-4BCD-93E2-E3B085C9AB24}">
+                <p16:designElem xmlns:p16="http://schemas.microsoft.com/office/powerpoint/2015/main" val="1"/>
+              </p:ext>
+            </p:extLst>
+          </p:nvPr>
+        </p:nvSpPr>
+        <p:spPr>
+          <a:xfrm>
+            <a:off x="15" y="6334316"/>
+            <a:ext cx="12191985" cy="66484"/>
+          </a:xfrm>
+          <a:prstGeom prst="rect">
+            <a:avLst/>
+          </a:prstGeom>
+          <a:solidFill>
+            <a:schemeClr val="accent1"/>
+          </a:solidFill>
+          <a:ln>
+            <a:noFill/>
+          </a:ln>
+        </p:spPr>
+        <p:style>
+          <a:lnRef idx="2">
+            <a:schemeClr val="accent1">
+              <a:shade val="50000"/>
+            </a:schemeClr>
+          </a:lnRef>
+          <a:fillRef idx="1">
+            <a:schemeClr val="accent1"/>
+          </a:fillRef>
+          <a:effectRef idx="0">
+            <a:schemeClr val="accent1"/>
+          </a:effectRef>
+          <a:fontRef idx="minor">
+            <a:schemeClr val="lt1"/>
+          </a:fontRef>
+        </p:style>
+      </p:sp>
+      <p:sp>
+        <p:nvSpPr>
+          <p:cNvPr id="82" name="Rectangle 81">
+            <a:extLst>
+              <a:ext uri="{FF2B5EF4-FFF2-40B4-BE49-F238E27FC236}">
+                <a16:creationId xmlns:a16="http://schemas.microsoft.com/office/drawing/2014/main" id="{82A73093-4B9D-420D-B17E-52293703A1D4}"/>
+              </a:ext>
+              <a:ext uri="{C183D7F6-B498-43B3-948B-1728B52AA6E4}">
+                <adec:decorative xmlns:adec="http://schemas.microsoft.com/office/drawing/2017/decorative" val="1"/>
+              </a:ext>
+            </a:extLst>
+          </p:cNvPr>
+          <p:cNvSpPr>
+            <a:spLocks noGrp="1" noRot="1" noChangeAspect="1" noMove="1" noResize="1" noEditPoints="1" noAdjustHandles="1" noChangeArrowheads="1" noChangeShapeType="1" noTextEdit="1"/>
+          </p:cNvSpPr>
+          <p:nvPr>
+            <p:extLst>
+              <p:ext uri="{386F3935-93C4-4BCD-93E2-E3B085C9AB24}">
+                <p16:designElem xmlns:p16="http://schemas.microsoft.com/office/powerpoint/2015/main" val="1"/>
+              </p:ext>
+            </p:extLst>
+          </p:nvPr>
+        </p:nvSpPr>
+        <p:spPr>
+          <a:xfrm>
+            <a:off x="1" y="6400800"/>
+            <a:ext cx="12192000" cy="457200"/>
+          </a:xfrm>
+          <a:prstGeom prst="rect">
+            <a:avLst/>
+          </a:prstGeom>
+          <a:solidFill>
+            <a:schemeClr val="accent2"/>
+          </a:solidFill>
+          <a:ln>
+            <a:noFill/>
+          </a:ln>
+        </p:spPr>
+        <p:style>
+          <a:lnRef idx="2">
+            <a:schemeClr val="accent1">
+              <a:shade val="50000"/>
+            </a:schemeClr>
+          </a:lnRef>
+          <a:fillRef idx="1">
+            <a:schemeClr val="accent1"/>
+          </a:fillRef>
+          <a:effectRef idx="0">
+            <a:schemeClr val="accent1"/>
+          </a:effectRef>
+          <a:fontRef idx="minor">
+            <a:schemeClr val="lt1"/>
+          </a:fontRef>
+        </p:style>
+      </p:sp>
+    </p:spTree>
+    <p:extLst>
+      <p:ext uri="{BB962C8B-B14F-4D97-AF65-F5344CB8AC3E}">
+        <p14:creationId xmlns:p14="http://schemas.microsoft.com/office/powerpoint/2010/main" val="723312773"/>
+      </p:ext>
+    </p:extLst>
+  </p:cSld>
+  <p:clrMapOvr>
+    <a:masterClrMapping/>
+  </p:clrMapOvr>
+</p:sld>
+</file>
+
+<file path=ppt/slides/slide56.xml><?xml version="1.0" encoding="utf-8"?>
+<p:sld xmlns:a="http://schemas.openxmlformats.org/drawingml/2006/main" xmlns:r="http://schemas.openxmlformats.org/officeDocument/2006/relationships" xmlns:p="http://schemas.openxmlformats.org/presentationml/2006/main">
+  <p:cSld>
+    <p:bg>
+      <p:bgPr>
+        <a:solidFill>
+          <a:schemeClr val="bg1"/>
+        </a:solidFill>
+        <a:effectLst/>
+      </p:bgPr>
+    </p:bg>
+    <p:spTree>
+      <p:nvGrpSpPr>
+        <p:cNvPr id="1" name=""/>
+        <p:cNvGrpSpPr/>
+        <p:nvPr/>
+      </p:nvGrpSpPr>
+      <p:grpSpPr>
+        <a:xfrm>
+          <a:off x="0" y="0"/>
+          <a:ext cx="0" cy="0"/>
+          <a:chOff x="0" y="0"/>
+          <a:chExt cx="0" cy="0"/>
+        </a:xfrm>
+      </p:grpSpPr>
+      <p:sp useBgFill="1">
+        <p:nvSpPr>
+          <p:cNvPr id="87" name="Rectangle 86">
+            <a:extLst>
+              <a:ext uri="{FF2B5EF4-FFF2-40B4-BE49-F238E27FC236}">
+                <a16:creationId xmlns:a16="http://schemas.microsoft.com/office/drawing/2014/main" id="{52ABB703-2B0E-4C3B-B4A2-F3973548E561}"/>
+              </a:ext>
+              <a:ext uri="{C183D7F6-B498-43B3-948B-1728B52AA6E4}">
+                <adec:decorative xmlns:adec="http://schemas.microsoft.com/office/drawing/2017/decorative" val="1"/>
+              </a:ext>
+            </a:extLst>
+          </p:cNvPr>
+          <p:cNvSpPr>
+            <a:spLocks noGrp="1" noRot="1" noChangeAspect="1" noMove="1" noResize="1" noEditPoints="1" noAdjustHandles="1" noChangeArrowheads="1" noChangeShapeType="1" noTextEdit="1"/>
+          </p:cNvSpPr>
+          <p:nvPr>
+            <p:extLst>
+              <p:ext uri="{386F3935-93C4-4BCD-93E2-E3B085C9AB24}">
+                <p16:designElem xmlns:p16="http://schemas.microsoft.com/office/powerpoint/2015/main" val="1"/>
+              </p:ext>
+            </p:extLst>
+          </p:nvPr>
+        </p:nvSpPr>
+        <p:spPr>
+          <a:xfrm>
+            <a:off x="0" y="0"/>
+            <a:ext cx="12192001" cy="6334316"/>
+          </a:xfrm>
+          <a:prstGeom prst="rect">
+            <a:avLst/>
+          </a:prstGeom>
+          <a:ln>
+            <a:noFill/>
+          </a:ln>
+        </p:spPr>
+        <p:style>
+          <a:lnRef idx="2">
+            <a:schemeClr val="accent1">
+              <a:shade val="50000"/>
+            </a:schemeClr>
+          </a:lnRef>
+          <a:fillRef idx="1">
+            <a:schemeClr val="accent1"/>
+          </a:fillRef>
+          <a:effectRef idx="0">
+            <a:schemeClr val="accent1"/>
+          </a:effectRef>
+          <a:fontRef idx="minor">
+            <a:schemeClr val="lt1"/>
+          </a:fontRef>
+        </p:style>
+        <p:txBody>
+          <a:bodyPr rtlCol="0" anchor="ctr"/>
+          <a:lstStyle/>
+          <a:p>
+            <a:pPr algn="ctr"/>
+            <a:endParaRPr lang="en-US"/>
+          </a:p>
+        </p:txBody>
+      </p:sp>
+      <p:sp>
+        <p:nvSpPr>
+          <p:cNvPr id="2" name="Title 1">
+            <a:extLst>
+              <a:ext uri="{FF2B5EF4-FFF2-40B4-BE49-F238E27FC236}">
+                <a16:creationId xmlns:a16="http://schemas.microsoft.com/office/drawing/2014/main" id="{0CF820E1-E514-4B58-98AB-89F302D91E31}"/>
+              </a:ext>
+            </a:extLst>
+          </p:cNvPr>
+          <p:cNvSpPr>
+            <a:spLocks noGrp="1"/>
+          </p:cNvSpPr>
+          <p:nvPr>
+            <p:ph type="title"/>
+          </p:nvPr>
+        </p:nvSpPr>
+        <p:spPr>
+          <a:xfrm>
+            <a:off x="6411685" y="634946"/>
+            <a:ext cx="5127171" cy="1450757"/>
+          </a:xfrm>
+        </p:spPr>
+        <p:txBody>
+          <a:bodyPr>
+            <a:normAutofit/>
+          </a:bodyPr>
+          <a:lstStyle/>
+          <a:p>
+            <a:r>
+              <a:rPr lang="en-IN" b="1" dirty="0"/>
+              <a:t>Uniform vs Normal</a:t>
+            </a:r>
+          </a:p>
+        </p:txBody>
+      </p:sp>
+      <p:pic>
+        <p:nvPicPr>
+          <p:cNvPr id="5" name="Content Placeholder 4">
+            <a:extLst>
+              <a:ext uri="{FF2B5EF4-FFF2-40B4-BE49-F238E27FC236}">
+                <a16:creationId xmlns:a16="http://schemas.microsoft.com/office/drawing/2014/main" id="{66ACF5EE-B012-4BDB-A31F-C5EBFB1ECF9F}"/>
+              </a:ext>
+            </a:extLst>
+          </p:cNvPr>
+          <p:cNvPicPr>
+            <a:picLocks noChangeAspect="1"/>
+          </p:cNvPicPr>
+          <p:nvPr/>
+        </p:nvPicPr>
+        <p:blipFill>
+          <a:blip r:embed="rId2">
+            <a:extLst>
+              <a:ext uri="{28A0092B-C50C-407E-A947-70E740481C1C}">
+                <a14:useLocalDpi xmlns:a14="http://schemas.microsoft.com/office/drawing/2010/main" val="0"/>
+              </a:ext>
+            </a:extLst>
+          </a:blip>
+          <a:srcRect l="7592" r="7592"/>
+          <a:stretch/>
+        </p:blipFill>
+        <p:spPr>
+          <a:xfrm>
+            <a:off x="643192" y="697942"/>
+            <a:ext cx="5451627" cy="5142074"/>
+          </a:xfrm>
+          <a:prstGeom prst="rect">
+            <a:avLst/>
+          </a:prstGeom>
+        </p:spPr>
+      </p:pic>
+      <p:cxnSp>
+        <p:nvCxnSpPr>
+          <p:cNvPr id="89" name="Straight Connector 88">
+            <a:extLst>
+              <a:ext uri="{FF2B5EF4-FFF2-40B4-BE49-F238E27FC236}">
+                <a16:creationId xmlns:a16="http://schemas.microsoft.com/office/drawing/2014/main" id="{9C21570E-E159-49A6-9891-FA397B7A92D3}"/>
+              </a:ext>
+              <a:ext uri="{C183D7F6-B498-43B3-948B-1728B52AA6E4}">
+                <adec:decorative xmlns:adec="http://schemas.microsoft.com/office/drawing/2017/decorative" val="1"/>
+              </a:ext>
+            </a:extLst>
+          </p:cNvPr>
+          <p:cNvCxnSpPr>
+            <a:cxnSpLocks noGrp="1" noRot="1" noChangeAspect="1" noMove="1" noResize="1" noEditPoints="1" noAdjustHandles="1" noChangeArrowheads="1" noChangeShapeType="1"/>
+          </p:cNvCxnSpPr>
+          <p:nvPr>
+            <p:extLst>
+              <p:ext uri="{386F3935-93C4-4BCD-93E2-E3B085C9AB24}">
+                <p16:designElem xmlns:p16="http://schemas.microsoft.com/office/powerpoint/2015/main" val="1"/>
+              </p:ext>
+            </p:extLst>
+          </p:nvPr>
+        </p:nvCxnSpPr>
+        <p:spPr>
+          <a:xfrm>
+            <a:off x="6411684" y="2086188"/>
+            <a:ext cx="4748808" cy="0"/>
+          </a:xfrm>
+          <a:prstGeom prst="line">
+            <a:avLst/>
+          </a:prstGeom>
+          <a:ln w="6350">
+            <a:solidFill>
+              <a:schemeClr val="tx1">
+                <a:lumMod val="50000"/>
+                <a:lumOff val="50000"/>
+                <a:alpha val="90000"/>
+              </a:schemeClr>
+            </a:solidFill>
+          </a:ln>
+        </p:spPr>
+        <p:style>
+          <a:lnRef idx="1">
+            <a:schemeClr val="accent1"/>
+          </a:lnRef>
+          <a:fillRef idx="0">
+            <a:schemeClr val="accent1"/>
+          </a:fillRef>
+          <a:effectRef idx="0">
+            <a:schemeClr val="accent1"/>
+          </a:effectRef>
+          <a:fontRef idx="minor">
+            <a:schemeClr val="tx1"/>
+          </a:fontRef>
+        </p:style>
+      </p:cxnSp>
+      <p:sp>
+        <p:nvSpPr>
+          <p:cNvPr id="9" name="Content Placeholder 8">
+            <a:extLst>
+              <a:ext uri="{FF2B5EF4-FFF2-40B4-BE49-F238E27FC236}">
+                <a16:creationId xmlns:a16="http://schemas.microsoft.com/office/drawing/2014/main" id="{FB3ADEF1-B48E-4597-8478-E89F81BA647C}"/>
+              </a:ext>
+            </a:extLst>
+          </p:cNvPr>
+          <p:cNvSpPr>
+            <a:spLocks noGrp="1"/>
+          </p:cNvSpPr>
+          <p:nvPr>
+            <p:ph idx="1"/>
+          </p:nvPr>
+        </p:nvSpPr>
+        <p:spPr>
+          <a:xfrm>
+            <a:off x="6411684" y="2198914"/>
+            <a:ext cx="5127172" cy="3670180"/>
+          </a:xfrm>
+        </p:spPr>
+        <p:txBody>
+          <a:bodyPr>
+            <a:normAutofit/>
+          </a:bodyPr>
+          <a:lstStyle/>
+          <a:p>
+            <a:pPr lvl="1"/>
+            <a:r>
+              <a:rPr lang="en-US" dirty="0"/>
+              <a:t>The Stark difference between Uniform and Normal could be because MoM doesn’t give exact median but approximates the median. And as Normal Distribution has more elements concentrated in the median; we will have decreased accuracy in case of normal</a:t>
+            </a:r>
+          </a:p>
+          <a:p>
+            <a:pPr lvl="1"/>
+            <a:r>
+              <a:rPr lang="en-US" dirty="0"/>
+              <a:t>To test this hypothesis, we did the same experiment with divide size 3 and 7</a:t>
+            </a:r>
+          </a:p>
+          <a:p>
+            <a:pPr lvl="1"/>
+            <a:r>
+              <a:rPr lang="en-US" dirty="0"/>
+              <a:t>If our hypothesis comes out to be true, the difference between uniform and normal should increase for divide size 7 and should decrease for divide size 3.</a:t>
+            </a:r>
+          </a:p>
+        </p:txBody>
+      </p:sp>
+      <p:sp>
+        <p:nvSpPr>
+          <p:cNvPr id="91" name="Rectangle 90">
+            <a:extLst>
+              <a:ext uri="{FF2B5EF4-FFF2-40B4-BE49-F238E27FC236}">
+                <a16:creationId xmlns:a16="http://schemas.microsoft.com/office/drawing/2014/main" id="{E95DA498-D9A2-4DA9-B9DA-B3776E08CF7E}"/>
+              </a:ext>
+              <a:ext uri="{C183D7F6-B498-43B3-948B-1728B52AA6E4}">
+                <adec:decorative xmlns:adec="http://schemas.microsoft.com/office/drawing/2017/decorative" val="1"/>
+              </a:ext>
+            </a:extLst>
+          </p:cNvPr>
+          <p:cNvSpPr>
+            <a:spLocks noGrp="1" noRot="1" noChangeAspect="1" noMove="1" noResize="1" noEditPoints="1" noAdjustHandles="1" noChangeArrowheads="1" noChangeShapeType="1" noTextEdit="1"/>
+          </p:cNvSpPr>
+          <p:nvPr>
+            <p:extLst>
+              <p:ext uri="{386F3935-93C4-4BCD-93E2-E3B085C9AB24}">
+                <p16:designElem xmlns:p16="http://schemas.microsoft.com/office/powerpoint/2015/main" val="1"/>
+              </p:ext>
+            </p:extLst>
+          </p:nvPr>
+        </p:nvSpPr>
+        <p:spPr>
+          <a:xfrm>
+            <a:off x="15" y="6334316"/>
+            <a:ext cx="12191985" cy="66484"/>
+          </a:xfrm>
+          <a:prstGeom prst="rect">
+            <a:avLst/>
+          </a:prstGeom>
+          <a:solidFill>
+            <a:schemeClr val="accent1"/>
+          </a:solidFill>
+          <a:ln>
+            <a:noFill/>
+          </a:ln>
+        </p:spPr>
+        <p:style>
+          <a:lnRef idx="2">
+            <a:schemeClr val="accent1">
+              <a:shade val="50000"/>
+            </a:schemeClr>
+          </a:lnRef>
+          <a:fillRef idx="1">
+            <a:schemeClr val="accent1"/>
+          </a:fillRef>
+          <a:effectRef idx="0">
+            <a:schemeClr val="accent1"/>
+          </a:effectRef>
+          <a:fontRef idx="minor">
+            <a:schemeClr val="lt1"/>
+          </a:fontRef>
+        </p:style>
+      </p:sp>
+      <p:sp>
+        <p:nvSpPr>
+          <p:cNvPr id="93" name="Rectangle 92">
+            <a:extLst>
+              <a:ext uri="{FF2B5EF4-FFF2-40B4-BE49-F238E27FC236}">
+                <a16:creationId xmlns:a16="http://schemas.microsoft.com/office/drawing/2014/main" id="{82A73093-4B9D-420D-B17E-52293703A1D4}"/>
+              </a:ext>
+              <a:ext uri="{C183D7F6-B498-43B3-948B-1728B52AA6E4}">
+                <adec:decorative xmlns:adec="http://schemas.microsoft.com/office/drawing/2017/decorative" val="1"/>
+              </a:ext>
+            </a:extLst>
+          </p:cNvPr>
+          <p:cNvSpPr>
+            <a:spLocks noGrp="1" noRot="1" noChangeAspect="1" noMove="1" noResize="1" noEditPoints="1" noAdjustHandles="1" noChangeArrowheads="1" noChangeShapeType="1" noTextEdit="1"/>
+          </p:cNvSpPr>
+          <p:nvPr>
+            <p:extLst>
+              <p:ext uri="{386F3935-93C4-4BCD-93E2-E3B085C9AB24}">
+                <p16:designElem xmlns:p16="http://schemas.microsoft.com/office/powerpoint/2015/main" val="1"/>
+              </p:ext>
+            </p:extLst>
+          </p:nvPr>
+        </p:nvSpPr>
+        <p:spPr>
+          <a:xfrm>
+            <a:off x="1" y="6400800"/>
+            <a:ext cx="12192000" cy="457200"/>
+          </a:xfrm>
+          <a:prstGeom prst="rect">
+            <a:avLst/>
+          </a:prstGeom>
+          <a:solidFill>
+            <a:schemeClr val="accent2"/>
+          </a:solidFill>
+          <a:ln>
+            <a:noFill/>
+          </a:ln>
+        </p:spPr>
+        <p:style>
+          <a:lnRef idx="2">
+            <a:schemeClr val="accent1">
+              <a:shade val="50000"/>
+            </a:schemeClr>
+          </a:lnRef>
+          <a:fillRef idx="1">
+            <a:schemeClr val="accent1"/>
+          </a:fillRef>
+          <a:effectRef idx="0">
+            <a:schemeClr val="accent1"/>
+          </a:effectRef>
+          <a:fontRef idx="minor">
+            <a:schemeClr val="lt1"/>
+          </a:fontRef>
+        </p:style>
+      </p:sp>
+    </p:spTree>
+    <p:extLst>
+      <p:ext uri="{BB962C8B-B14F-4D97-AF65-F5344CB8AC3E}">
+        <p14:creationId xmlns:p14="http://schemas.microsoft.com/office/powerpoint/2010/main" val="249877674"/>
+      </p:ext>
+    </p:extLst>
+  </p:cSld>
+  <p:clrMapOvr>
+    <a:masterClrMapping/>
+  </p:clrMapOvr>
+</p:sld>
+</file>
+
+<file path=ppt/slides/slide57.xml><?xml version="1.0" encoding="utf-8"?>
+<p:sld xmlns:a="http://schemas.openxmlformats.org/drawingml/2006/main" xmlns:r="http://schemas.openxmlformats.org/officeDocument/2006/relationships" xmlns:p="http://schemas.openxmlformats.org/presentationml/2006/main">
+  <p:cSld>
+    <p:bg>
+      <p:bgPr>
+        <a:solidFill>
+          <a:schemeClr val="bg1"/>
+        </a:solidFill>
+        <a:effectLst/>
+      </p:bgPr>
+    </p:bg>
+    <p:spTree>
+      <p:nvGrpSpPr>
+        <p:cNvPr id="1" name=""/>
+        <p:cNvGrpSpPr/>
+        <p:nvPr/>
+      </p:nvGrpSpPr>
+      <p:grpSpPr>
+        <a:xfrm>
+          <a:off x="0" y="0"/>
+          <a:ext cx="0" cy="0"/>
+          <a:chOff x="0" y="0"/>
+          <a:chExt cx="0" cy="0"/>
+        </a:xfrm>
+      </p:grpSpPr>
+      <p:sp useBgFill="1">
+        <p:nvSpPr>
+          <p:cNvPr id="87" name="Rectangle 86">
+            <a:extLst>
+              <a:ext uri="{FF2B5EF4-FFF2-40B4-BE49-F238E27FC236}">
+                <a16:creationId xmlns:a16="http://schemas.microsoft.com/office/drawing/2014/main" id="{52ABB703-2B0E-4C3B-B4A2-F3973548E561}"/>
+              </a:ext>
+              <a:ext uri="{C183D7F6-B498-43B3-948B-1728B52AA6E4}">
+                <adec:decorative xmlns:adec="http://schemas.microsoft.com/office/drawing/2017/decorative" val="1"/>
+              </a:ext>
+            </a:extLst>
+          </p:cNvPr>
+          <p:cNvSpPr>
+            <a:spLocks noGrp="1" noRot="1" noChangeAspect="1" noMove="1" noResize="1" noEditPoints="1" noAdjustHandles="1" noChangeArrowheads="1" noChangeShapeType="1" noTextEdit="1"/>
+          </p:cNvSpPr>
+          <p:nvPr>
+            <p:extLst>
+              <p:ext uri="{386F3935-93C4-4BCD-93E2-E3B085C9AB24}">
+                <p16:designElem xmlns:p16="http://schemas.microsoft.com/office/powerpoint/2015/main" val="1"/>
+              </p:ext>
+            </p:extLst>
+          </p:nvPr>
+        </p:nvSpPr>
+        <p:spPr>
+          <a:xfrm>
+            <a:off x="0" y="0"/>
+            <a:ext cx="12192001" cy="6334316"/>
+          </a:xfrm>
+          <a:prstGeom prst="rect">
+            <a:avLst/>
+          </a:prstGeom>
+          <a:ln>
+            <a:noFill/>
+          </a:ln>
+        </p:spPr>
+        <p:style>
+          <a:lnRef idx="2">
+            <a:schemeClr val="accent1">
+              <a:shade val="50000"/>
+            </a:schemeClr>
+          </a:lnRef>
+          <a:fillRef idx="1">
+            <a:schemeClr val="accent1"/>
+          </a:fillRef>
+          <a:effectRef idx="0">
+            <a:schemeClr val="accent1"/>
+          </a:effectRef>
+          <a:fontRef idx="minor">
+            <a:schemeClr val="lt1"/>
+          </a:fontRef>
+        </p:style>
+        <p:txBody>
+          <a:bodyPr rtlCol="0" anchor="ctr"/>
+          <a:lstStyle/>
+          <a:p>
+            <a:pPr algn="ctr"/>
+            <a:endParaRPr lang="en-US"/>
+          </a:p>
+        </p:txBody>
+      </p:sp>
+      <p:sp>
+        <p:nvSpPr>
+          <p:cNvPr id="2" name="Title 1">
+            <a:extLst>
+              <a:ext uri="{FF2B5EF4-FFF2-40B4-BE49-F238E27FC236}">
+                <a16:creationId xmlns:a16="http://schemas.microsoft.com/office/drawing/2014/main" id="{0CF820E1-E514-4B58-98AB-89F302D91E31}"/>
+              </a:ext>
+            </a:extLst>
+          </p:cNvPr>
+          <p:cNvSpPr>
+            <a:spLocks noGrp="1"/>
+          </p:cNvSpPr>
+          <p:nvPr>
+            <p:ph type="title"/>
+          </p:nvPr>
+        </p:nvSpPr>
+        <p:spPr>
+          <a:xfrm>
+            <a:off x="6411685" y="634946"/>
+            <a:ext cx="5127171" cy="1450757"/>
+          </a:xfrm>
+        </p:spPr>
+        <p:txBody>
+          <a:bodyPr>
+            <a:normAutofit/>
+          </a:bodyPr>
+          <a:lstStyle/>
+          <a:p>
+            <a:r>
+              <a:rPr lang="en-IN" b="1" dirty="0"/>
+              <a:t>Divide Size 3</a:t>
+            </a:r>
+          </a:p>
+        </p:txBody>
+      </p:sp>
+      <p:pic>
+        <p:nvPicPr>
+          <p:cNvPr id="5" name="Content Placeholder 4">
+            <a:extLst>
+              <a:ext uri="{FF2B5EF4-FFF2-40B4-BE49-F238E27FC236}">
+                <a16:creationId xmlns:a16="http://schemas.microsoft.com/office/drawing/2014/main" id="{66ACF5EE-B012-4BDB-A31F-C5EBFB1ECF9F}"/>
+              </a:ext>
+            </a:extLst>
+          </p:cNvPr>
+          <p:cNvPicPr>
+            <a:picLocks noChangeAspect="1"/>
+          </p:cNvPicPr>
+          <p:nvPr/>
+        </p:nvPicPr>
+        <p:blipFill>
+          <a:blip r:embed="rId2">
+            <a:extLst>
+              <a:ext uri="{28A0092B-C50C-407E-A947-70E740481C1C}">
+                <a14:useLocalDpi xmlns:a14="http://schemas.microsoft.com/office/drawing/2010/main" val="0"/>
+              </a:ext>
+            </a:extLst>
+          </a:blip>
+          <a:srcRect l="7592" r="7592"/>
+          <a:stretch/>
+        </p:blipFill>
+        <p:spPr>
+          <a:xfrm>
+            <a:off x="643192" y="697942"/>
+            <a:ext cx="5451627" cy="5142074"/>
+          </a:xfrm>
+          <a:prstGeom prst="rect">
+            <a:avLst/>
+          </a:prstGeom>
+        </p:spPr>
+      </p:pic>
+      <p:cxnSp>
+        <p:nvCxnSpPr>
+          <p:cNvPr id="89" name="Straight Connector 88">
+            <a:extLst>
+              <a:ext uri="{FF2B5EF4-FFF2-40B4-BE49-F238E27FC236}">
+                <a16:creationId xmlns:a16="http://schemas.microsoft.com/office/drawing/2014/main" id="{9C21570E-E159-49A6-9891-FA397B7A92D3}"/>
+              </a:ext>
+              <a:ext uri="{C183D7F6-B498-43B3-948B-1728B52AA6E4}">
+                <adec:decorative xmlns:adec="http://schemas.microsoft.com/office/drawing/2017/decorative" val="1"/>
+              </a:ext>
+            </a:extLst>
+          </p:cNvPr>
+          <p:cNvCxnSpPr>
+            <a:cxnSpLocks noGrp="1" noRot="1" noChangeAspect="1" noMove="1" noResize="1" noEditPoints="1" noAdjustHandles="1" noChangeArrowheads="1" noChangeShapeType="1"/>
+          </p:cNvCxnSpPr>
+          <p:nvPr>
+            <p:extLst>
+              <p:ext uri="{386F3935-93C4-4BCD-93E2-E3B085C9AB24}">
+                <p16:designElem xmlns:p16="http://schemas.microsoft.com/office/powerpoint/2015/main" val="1"/>
+              </p:ext>
+            </p:extLst>
+          </p:nvPr>
+        </p:nvCxnSpPr>
+        <p:spPr>
+          <a:xfrm>
+            <a:off x="6411684" y="2086188"/>
+            <a:ext cx="4748808" cy="0"/>
+          </a:xfrm>
+          <a:prstGeom prst="line">
+            <a:avLst/>
+          </a:prstGeom>
+          <a:ln w="6350">
+            <a:solidFill>
+              <a:schemeClr val="tx1">
+                <a:lumMod val="50000"/>
+                <a:lumOff val="50000"/>
+                <a:alpha val="90000"/>
+              </a:schemeClr>
+            </a:solidFill>
+          </a:ln>
+        </p:spPr>
+        <p:style>
+          <a:lnRef idx="1">
+            <a:schemeClr val="accent1"/>
+          </a:lnRef>
+          <a:fillRef idx="0">
+            <a:schemeClr val="accent1"/>
+          </a:fillRef>
+          <a:effectRef idx="0">
+            <a:schemeClr val="accent1"/>
+          </a:effectRef>
+          <a:fontRef idx="minor">
+            <a:schemeClr val="tx1"/>
+          </a:fontRef>
+        </p:style>
+      </p:cxnSp>
+      <p:sp>
+        <p:nvSpPr>
+          <p:cNvPr id="9" name="Content Placeholder 8">
+            <a:extLst>
+              <a:ext uri="{FF2B5EF4-FFF2-40B4-BE49-F238E27FC236}">
+                <a16:creationId xmlns:a16="http://schemas.microsoft.com/office/drawing/2014/main" id="{FB3ADEF1-B48E-4597-8478-E89F81BA647C}"/>
+              </a:ext>
+            </a:extLst>
+          </p:cNvPr>
+          <p:cNvSpPr>
+            <a:spLocks noGrp="1"/>
+          </p:cNvSpPr>
+          <p:nvPr>
+            <p:ph idx="1"/>
+          </p:nvPr>
+        </p:nvSpPr>
+        <p:spPr>
+          <a:xfrm>
+            <a:off x="6411684" y="2198914"/>
+            <a:ext cx="5127172" cy="3670180"/>
+          </a:xfrm>
+        </p:spPr>
+        <p:txBody>
+          <a:bodyPr>
+            <a:normAutofit/>
+          </a:bodyPr>
+          <a:lstStyle/>
+          <a:p>
+            <a:pPr lvl="1"/>
+            <a:r>
+              <a:rPr lang="en-US" dirty="0"/>
+              <a:t>Here we see that if we decrease the divide size to 3, the difference between Uniform and Normal Dataset decreases quite a lot.</a:t>
+            </a:r>
+          </a:p>
+          <a:p>
+            <a:pPr lvl="1"/>
+            <a:r>
+              <a:rPr lang="en-US" dirty="0"/>
+              <a:t>This is happening as the region of approx. median has decreased, giving better accuracy for Normal Distribution.</a:t>
+            </a:r>
+          </a:p>
+        </p:txBody>
+      </p:sp>
+      <p:sp>
+        <p:nvSpPr>
+          <p:cNvPr id="91" name="Rectangle 90">
+            <a:extLst>
+              <a:ext uri="{FF2B5EF4-FFF2-40B4-BE49-F238E27FC236}">
+                <a16:creationId xmlns:a16="http://schemas.microsoft.com/office/drawing/2014/main" id="{E95DA498-D9A2-4DA9-B9DA-B3776E08CF7E}"/>
+              </a:ext>
+              <a:ext uri="{C183D7F6-B498-43B3-948B-1728B52AA6E4}">
+                <adec:decorative xmlns:adec="http://schemas.microsoft.com/office/drawing/2017/decorative" val="1"/>
+              </a:ext>
+            </a:extLst>
+          </p:cNvPr>
+          <p:cNvSpPr>
+            <a:spLocks noGrp="1" noRot="1" noChangeAspect="1" noMove="1" noResize="1" noEditPoints="1" noAdjustHandles="1" noChangeArrowheads="1" noChangeShapeType="1" noTextEdit="1"/>
+          </p:cNvSpPr>
+          <p:nvPr>
+            <p:extLst>
+              <p:ext uri="{386F3935-93C4-4BCD-93E2-E3B085C9AB24}">
+                <p16:designElem xmlns:p16="http://schemas.microsoft.com/office/powerpoint/2015/main" val="1"/>
+              </p:ext>
+            </p:extLst>
+          </p:nvPr>
+        </p:nvSpPr>
+        <p:spPr>
+          <a:xfrm>
+            <a:off x="15" y="6334316"/>
+            <a:ext cx="12191985" cy="66484"/>
+          </a:xfrm>
+          <a:prstGeom prst="rect">
+            <a:avLst/>
+          </a:prstGeom>
+          <a:solidFill>
+            <a:schemeClr val="accent1"/>
+          </a:solidFill>
+          <a:ln>
+            <a:noFill/>
+          </a:ln>
+        </p:spPr>
+        <p:style>
+          <a:lnRef idx="2">
+            <a:schemeClr val="accent1">
+              <a:shade val="50000"/>
+            </a:schemeClr>
+          </a:lnRef>
+          <a:fillRef idx="1">
+            <a:schemeClr val="accent1"/>
+          </a:fillRef>
+          <a:effectRef idx="0">
+            <a:schemeClr val="accent1"/>
+          </a:effectRef>
+          <a:fontRef idx="minor">
+            <a:schemeClr val="lt1"/>
+          </a:fontRef>
+        </p:style>
+      </p:sp>
+      <p:sp>
+        <p:nvSpPr>
+          <p:cNvPr id="93" name="Rectangle 92">
+            <a:extLst>
+              <a:ext uri="{FF2B5EF4-FFF2-40B4-BE49-F238E27FC236}">
+                <a16:creationId xmlns:a16="http://schemas.microsoft.com/office/drawing/2014/main" id="{82A73093-4B9D-420D-B17E-52293703A1D4}"/>
+              </a:ext>
+              <a:ext uri="{C183D7F6-B498-43B3-948B-1728B52AA6E4}">
+                <adec:decorative xmlns:adec="http://schemas.microsoft.com/office/drawing/2017/decorative" val="1"/>
+              </a:ext>
+            </a:extLst>
+          </p:cNvPr>
+          <p:cNvSpPr>
+            <a:spLocks noGrp="1" noRot="1" noChangeAspect="1" noMove="1" noResize="1" noEditPoints="1" noAdjustHandles="1" noChangeArrowheads="1" noChangeShapeType="1" noTextEdit="1"/>
+          </p:cNvSpPr>
+          <p:nvPr>
+            <p:extLst>
+              <p:ext uri="{386F3935-93C4-4BCD-93E2-E3B085C9AB24}">
+                <p16:designElem xmlns:p16="http://schemas.microsoft.com/office/powerpoint/2015/main" val="1"/>
+              </p:ext>
+            </p:extLst>
+          </p:nvPr>
+        </p:nvSpPr>
+        <p:spPr>
+          <a:xfrm>
+            <a:off x="1" y="6400800"/>
+            <a:ext cx="12192000" cy="457200"/>
+          </a:xfrm>
+          <a:prstGeom prst="rect">
+            <a:avLst/>
+          </a:prstGeom>
+          <a:solidFill>
+            <a:schemeClr val="accent2"/>
+          </a:solidFill>
+          <a:ln>
+            <a:noFill/>
+          </a:ln>
+        </p:spPr>
+        <p:style>
+          <a:lnRef idx="2">
+            <a:schemeClr val="accent1">
+              <a:shade val="50000"/>
+            </a:schemeClr>
+          </a:lnRef>
+          <a:fillRef idx="1">
+            <a:schemeClr val="accent1"/>
+          </a:fillRef>
+          <a:effectRef idx="0">
+            <a:schemeClr val="accent1"/>
+          </a:effectRef>
+          <a:fontRef idx="minor">
+            <a:schemeClr val="lt1"/>
+          </a:fontRef>
+        </p:style>
+      </p:sp>
+    </p:spTree>
+    <p:extLst>
+      <p:ext uri="{BB962C8B-B14F-4D97-AF65-F5344CB8AC3E}">
+        <p14:creationId xmlns:p14="http://schemas.microsoft.com/office/powerpoint/2010/main" val="1997043204"/>
+      </p:ext>
+    </p:extLst>
+  </p:cSld>
+  <p:clrMapOvr>
+    <a:masterClrMapping/>
+  </p:clrMapOvr>
+</p:sld>
+</file>
+
+<file path=ppt/slides/slide58.xml><?xml version="1.0" encoding="utf-8"?>
+<p:sld xmlns:a="http://schemas.openxmlformats.org/drawingml/2006/main" xmlns:r="http://schemas.openxmlformats.org/officeDocument/2006/relationships" xmlns:p="http://schemas.openxmlformats.org/presentationml/2006/main">
+  <p:cSld>
+    <p:bg>
+      <p:bgPr>
+        <a:solidFill>
+          <a:schemeClr val="bg1"/>
+        </a:solidFill>
+        <a:effectLst/>
+      </p:bgPr>
+    </p:bg>
+    <p:spTree>
+      <p:nvGrpSpPr>
+        <p:cNvPr id="1" name=""/>
+        <p:cNvGrpSpPr/>
+        <p:nvPr/>
+      </p:nvGrpSpPr>
+      <p:grpSpPr>
+        <a:xfrm>
+          <a:off x="0" y="0"/>
+          <a:ext cx="0" cy="0"/>
+          <a:chOff x="0" y="0"/>
+          <a:chExt cx="0" cy="0"/>
+        </a:xfrm>
+      </p:grpSpPr>
+      <p:sp useBgFill="1">
+        <p:nvSpPr>
+          <p:cNvPr id="87" name="Rectangle 86">
+            <a:extLst>
+              <a:ext uri="{FF2B5EF4-FFF2-40B4-BE49-F238E27FC236}">
+                <a16:creationId xmlns:a16="http://schemas.microsoft.com/office/drawing/2014/main" id="{52ABB703-2B0E-4C3B-B4A2-F3973548E561}"/>
+              </a:ext>
+              <a:ext uri="{C183D7F6-B498-43B3-948B-1728B52AA6E4}">
+                <adec:decorative xmlns:adec="http://schemas.microsoft.com/office/drawing/2017/decorative" val="1"/>
+              </a:ext>
+            </a:extLst>
+          </p:cNvPr>
+          <p:cNvSpPr>
+            <a:spLocks noGrp="1" noRot="1" noChangeAspect="1" noMove="1" noResize="1" noEditPoints="1" noAdjustHandles="1" noChangeArrowheads="1" noChangeShapeType="1" noTextEdit="1"/>
+          </p:cNvSpPr>
+          <p:nvPr>
+            <p:extLst>
+              <p:ext uri="{386F3935-93C4-4BCD-93E2-E3B085C9AB24}">
+                <p16:designElem xmlns:p16="http://schemas.microsoft.com/office/powerpoint/2015/main" val="1"/>
+              </p:ext>
+            </p:extLst>
+          </p:nvPr>
+        </p:nvSpPr>
+        <p:spPr>
+          <a:xfrm>
+            <a:off x="0" y="0"/>
+            <a:ext cx="12192001" cy="6334316"/>
+          </a:xfrm>
+          <a:prstGeom prst="rect">
+            <a:avLst/>
+          </a:prstGeom>
+          <a:ln>
+            <a:noFill/>
+          </a:ln>
+        </p:spPr>
+        <p:style>
+          <a:lnRef idx="2">
+            <a:schemeClr val="accent1">
+              <a:shade val="50000"/>
+            </a:schemeClr>
+          </a:lnRef>
+          <a:fillRef idx="1">
+            <a:schemeClr val="accent1"/>
+          </a:fillRef>
+          <a:effectRef idx="0">
+            <a:schemeClr val="accent1"/>
+          </a:effectRef>
+          <a:fontRef idx="minor">
+            <a:schemeClr val="lt1"/>
+          </a:fontRef>
+        </p:style>
+        <p:txBody>
+          <a:bodyPr rtlCol="0" anchor="ctr"/>
+          <a:lstStyle/>
+          <a:p>
+            <a:pPr algn="ctr"/>
+            <a:endParaRPr lang="en-US"/>
+          </a:p>
+        </p:txBody>
+      </p:sp>
+      <p:sp>
+        <p:nvSpPr>
+          <p:cNvPr id="2" name="Title 1">
+            <a:extLst>
+              <a:ext uri="{FF2B5EF4-FFF2-40B4-BE49-F238E27FC236}">
+                <a16:creationId xmlns:a16="http://schemas.microsoft.com/office/drawing/2014/main" id="{0CF820E1-E514-4B58-98AB-89F302D91E31}"/>
+              </a:ext>
+            </a:extLst>
+          </p:cNvPr>
+          <p:cNvSpPr>
+            <a:spLocks noGrp="1"/>
+          </p:cNvSpPr>
+          <p:nvPr>
+            <p:ph type="title"/>
+          </p:nvPr>
+        </p:nvSpPr>
+        <p:spPr>
+          <a:xfrm>
+            <a:off x="6411685" y="634946"/>
+            <a:ext cx="5127171" cy="1450757"/>
+          </a:xfrm>
+        </p:spPr>
+        <p:txBody>
+          <a:bodyPr>
+            <a:normAutofit/>
+          </a:bodyPr>
+          <a:lstStyle/>
+          <a:p>
+            <a:r>
+              <a:rPr lang="en-IN" b="1" dirty="0"/>
+              <a:t>Divide Size 7</a:t>
+            </a:r>
+          </a:p>
+        </p:txBody>
+      </p:sp>
+      <p:pic>
+        <p:nvPicPr>
+          <p:cNvPr id="5" name="Content Placeholder 4">
+            <a:extLst>
+              <a:ext uri="{FF2B5EF4-FFF2-40B4-BE49-F238E27FC236}">
+                <a16:creationId xmlns:a16="http://schemas.microsoft.com/office/drawing/2014/main" id="{66ACF5EE-B012-4BDB-A31F-C5EBFB1ECF9F}"/>
+              </a:ext>
+            </a:extLst>
+          </p:cNvPr>
+          <p:cNvPicPr>
+            <a:picLocks noChangeAspect="1"/>
+          </p:cNvPicPr>
+          <p:nvPr/>
+        </p:nvPicPr>
+        <p:blipFill>
+          <a:blip r:embed="rId2">
+            <a:extLst>
+              <a:ext uri="{28A0092B-C50C-407E-A947-70E740481C1C}">
+                <a14:useLocalDpi xmlns:a14="http://schemas.microsoft.com/office/drawing/2010/main" val="0"/>
+              </a:ext>
+            </a:extLst>
+          </a:blip>
+          <a:srcRect l="7592" r="7592"/>
+          <a:stretch/>
+        </p:blipFill>
+        <p:spPr>
+          <a:xfrm>
+            <a:off x="643192" y="697942"/>
+            <a:ext cx="5451627" cy="5142074"/>
+          </a:xfrm>
+          <a:prstGeom prst="rect">
+            <a:avLst/>
+          </a:prstGeom>
+        </p:spPr>
+      </p:pic>
+      <p:cxnSp>
+        <p:nvCxnSpPr>
+          <p:cNvPr id="89" name="Straight Connector 88">
+            <a:extLst>
+              <a:ext uri="{FF2B5EF4-FFF2-40B4-BE49-F238E27FC236}">
+                <a16:creationId xmlns:a16="http://schemas.microsoft.com/office/drawing/2014/main" id="{9C21570E-E159-49A6-9891-FA397B7A92D3}"/>
+              </a:ext>
+              <a:ext uri="{C183D7F6-B498-43B3-948B-1728B52AA6E4}">
+                <adec:decorative xmlns:adec="http://schemas.microsoft.com/office/drawing/2017/decorative" val="1"/>
+              </a:ext>
+            </a:extLst>
+          </p:cNvPr>
+          <p:cNvCxnSpPr>
+            <a:cxnSpLocks noGrp="1" noRot="1" noChangeAspect="1" noMove="1" noResize="1" noEditPoints="1" noAdjustHandles="1" noChangeArrowheads="1" noChangeShapeType="1"/>
+          </p:cNvCxnSpPr>
+          <p:nvPr>
+            <p:extLst>
+              <p:ext uri="{386F3935-93C4-4BCD-93E2-E3B085C9AB24}">
+                <p16:designElem xmlns:p16="http://schemas.microsoft.com/office/powerpoint/2015/main" val="1"/>
+              </p:ext>
+            </p:extLst>
+          </p:nvPr>
+        </p:nvCxnSpPr>
+        <p:spPr>
+          <a:xfrm>
+            <a:off x="6411684" y="2086188"/>
+            <a:ext cx="4748808" cy="0"/>
+          </a:xfrm>
+          <a:prstGeom prst="line">
+            <a:avLst/>
+          </a:prstGeom>
+          <a:ln w="6350">
+            <a:solidFill>
+              <a:schemeClr val="tx1">
+                <a:lumMod val="50000"/>
+                <a:lumOff val="50000"/>
+                <a:alpha val="90000"/>
+              </a:schemeClr>
+            </a:solidFill>
+          </a:ln>
+        </p:spPr>
+        <p:style>
+          <a:lnRef idx="1">
+            <a:schemeClr val="accent1"/>
+          </a:lnRef>
+          <a:fillRef idx="0">
+            <a:schemeClr val="accent1"/>
+          </a:fillRef>
+          <a:effectRef idx="0">
+            <a:schemeClr val="accent1"/>
+          </a:effectRef>
+          <a:fontRef idx="minor">
+            <a:schemeClr val="tx1"/>
+          </a:fontRef>
+        </p:style>
+      </p:cxnSp>
+      <p:sp>
+        <p:nvSpPr>
+          <p:cNvPr id="9" name="Content Placeholder 8">
+            <a:extLst>
+              <a:ext uri="{FF2B5EF4-FFF2-40B4-BE49-F238E27FC236}">
+                <a16:creationId xmlns:a16="http://schemas.microsoft.com/office/drawing/2014/main" id="{FB3ADEF1-B48E-4597-8478-E89F81BA647C}"/>
+              </a:ext>
+            </a:extLst>
+          </p:cNvPr>
+          <p:cNvSpPr>
+            <a:spLocks noGrp="1"/>
+          </p:cNvSpPr>
+          <p:nvPr>
+            <p:ph idx="1"/>
+          </p:nvPr>
+        </p:nvSpPr>
+        <p:spPr>
+          <a:xfrm>
+            <a:off x="6411684" y="2198914"/>
+            <a:ext cx="5127172" cy="3670180"/>
+          </a:xfrm>
+        </p:spPr>
+        <p:txBody>
+          <a:bodyPr>
+            <a:normAutofit/>
+          </a:bodyPr>
+          <a:lstStyle/>
+          <a:p>
+            <a:pPr lvl="1"/>
+            <a:r>
+              <a:rPr lang="en-US" dirty="0"/>
+              <a:t>Here we see that the difference between the Uniform and Normal is like divide size 5, but the drop region has gone away.</a:t>
+            </a:r>
+          </a:p>
+          <a:p>
+            <a:pPr lvl="1"/>
+            <a:r>
+              <a:rPr lang="en-US" dirty="0"/>
+              <a:t>By this observation, we could say that we might getting the “drops” as out divide size is very small and increasing the divide size might potentially remove the “drops”.</a:t>
+            </a:r>
+          </a:p>
+        </p:txBody>
+      </p:sp>
+      <p:sp>
+        <p:nvSpPr>
+          <p:cNvPr id="91" name="Rectangle 90">
+            <a:extLst>
+              <a:ext uri="{FF2B5EF4-FFF2-40B4-BE49-F238E27FC236}">
+                <a16:creationId xmlns:a16="http://schemas.microsoft.com/office/drawing/2014/main" id="{E95DA498-D9A2-4DA9-B9DA-B3776E08CF7E}"/>
+              </a:ext>
+              <a:ext uri="{C183D7F6-B498-43B3-948B-1728B52AA6E4}">
+                <adec:decorative xmlns:adec="http://schemas.microsoft.com/office/drawing/2017/decorative" val="1"/>
+              </a:ext>
+            </a:extLst>
+          </p:cNvPr>
+          <p:cNvSpPr>
+            <a:spLocks noGrp="1" noRot="1" noChangeAspect="1" noMove="1" noResize="1" noEditPoints="1" noAdjustHandles="1" noChangeArrowheads="1" noChangeShapeType="1" noTextEdit="1"/>
+          </p:cNvSpPr>
+          <p:nvPr>
+            <p:extLst>
+              <p:ext uri="{386F3935-93C4-4BCD-93E2-E3B085C9AB24}">
+                <p16:designElem xmlns:p16="http://schemas.microsoft.com/office/powerpoint/2015/main" val="1"/>
+              </p:ext>
+            </p:extLst>
+          </p:nvPr>
+        </p:nvSpPr>
+        <p:spPr>
+          <a:xfrm>
+            <a:off x="15" y="6334316"/>
+            <a:ext cx="12191985" cy="66484"/>
+          </a:xfrm>
+          <a:prstGeom prst="rect">
+            <a:avLst/>
+          </a:prstGeom>
+          <a:solidFill>
+            <a:schemeClr val="accent1"/>
+          </a:solidFill>
+          <a:ln>
+            <a:noFill/>
+          </a:ln>
+        </p:spPr>
+        <p:style>
+          <a:lnRef idx="2">
+            <a:schemeClr val="accent1">
+              <a:shade val="50000"/>
+            </a:schemeClr>
+          </a:lnRef>
+          <a:fillRef idx="1">
+            <a:schemeClr val="accent1"/>
+          </a:fillRef>
+          <a:effectRef idx="0">
+            <a:schemeClr val="accent1"/>
+          </a:effectRef>
+          <a:fontRef idx="minor">
+            <a:schemeClr val="lt1"/>
+          </a:fontRef>
+        </p:style>
+      </p:sp>
+      <p:sp>
+        <p:nvSpPr>
+          <p:cNvPr id="93" name="Rectangle 92">
+            <a:extLst>
+              <a:ext uri="{FF2B5EF4-FFF2-40B4-BE49-F238E27FC236}">
+                <a16:creationId xmlns:a16="http://schemas.microsoft.com/office/drawing/2014/main" id="{82A73093-4B9D-420D-B17E-52293703A1D4}"/>
+              </a:ext>
+              <a:ext uri="{C183D7F6-B498-43B3-948B-1728B52AA6E4}">
+                <adec:decorative xmlns:adec="http://schemas.microsoft.com/office/drawing/2017/decorative" val="1"/>
+              </a:ext>
+            </a:extLst>
+          </p:cNvPr>
+          <p:cNvSpPr>
+            <a:spLocks noGrp="1" noRot="1" noChangeAspect="1" noMove="1" noResize="1" noEditPoints="1" noAdjustHandles="1" noChangeArrowheads="1" noChangeShapeType="1" noTextEdit="1"/>
+          </p:cNvSpPr>
+          <p:nvPr>
+            <p:extLst>
+              <p:ext uri="{386F3935-93C4-4BCD-93E2-E3B085C9AB24}">
+                <p16:designElem xmlns:p16="http://schemas.microsoft.com/office/powerpoint/2015/main" val="1"/>
+              </p:ext>
+            </p:extLst>
+          </p:nvPr>
+        </p:nvSpPr>
+        <p:spPr>
+          <a:xfrm>
+            <a:off x="1" y="6400800"/>
+            <a:ext cx="12192000" cy="457200"/>
+          </a:xfrm>
+          <a:prstGeom prst="rect">
+            <a:avLst/>
+          </a:prstGeom>
+          <a:solidFill>
+            <a:schemeClr val="accent2"/>
+          </a:solidFill>
+          <a:ln>
+            <a:noFill/>
+          </a:ln>
+        </p:spPr>
+        <p:style>
+          <a:lnRef idx="2">
+            <a:schemeClr val="accent1">
+              <a:shade val="50000"/>
+            </a:schemeClr>
+          </a:lnRef>
+          <a:fillRef idx="1">
+            <a:schemeClr val="accent1"/>
+          </a:fillRef>
+          <a:effectRef idx="0">
+            <a:schemeClr val="accent1"/>
+          </a:effectRef>
+          <a:fontRef idx="minor">
+            <a:schemeClr val="lt1"/>
+          </a:fontRef>
+        </p:style>
+      </p:sp>
+    </p:spTree>
+    <p:extLst>
+      <p:ext uri="{BB962C8B-B14F-4D97-AF65-F5344CB8AC3E}">
+        <p14:creationId xmlns:p14="http://schemas.microsoft.com/office/powerpoint/2010/main" val="3663795224"/>
+      </p:ext>
+    </p:extLst>
+  </p:cSld>
+  <p:clrMapOvr>
+    <a:masterClrMapping/>
+  </p:clrMapOvr>
+</p:sld>
+</file>
+
+<file path=ppt/slides/slide59.xml><?xml version="1.0" encoding="utf-8"?>
 <p:sld xmlns:a="http://schemas.openxmlformats.org/drawingml/2006/main" xmlns:r="http://schemas.openxmlformats.org/officeDocument/2006/relationships" xmlns:p="http://schemas.openxmlformats.org/presentationml/2006/main">
   <p:cSld>
     <p:bg>

</xml_diff>